<commit_message>
updated powerpoint where i make graphs
</commit_message>
<xml_diff>
--- a/Slides/graph-maker.pptx
+++ b/Slides/graph-maker.pptx
@@ -7,6 +7,9 @@
   <p:sldIdLst>
     <p:sldId id="256" r:id="rId2"/>
     <p:sldId id="257" r:id="rId3"/>
+    <p:sldId id="258" r:id="rId4"/>
+    <p:sldId id="259" r:id="rId5"/>
+    <p:sldId id="260" r:id="rId6"/>
   </p:sldIdLst>
   <p:sldSz cx="12192000" cy="6858000"/>
   <p:notesSz cx="6858000" cy="9144000"/>
@@ -105,6 +108,11 @@
       </a:defRPr>
     </a:lvl9pPr>
   </p:defaultTextStyle>
+  <p:extLst>
+    <p:ext uri="{EFAFB233-063F-42B5-8137-9DF3F51BA10A}">
+      <p15:sldGuideLst xmlns:p15="http://schemas.microsoft.com/office/powerpoint/2012/main"/>
+    </p:ext>
+  </p:extLst>
 </p:presentation>
 </file>
 
@@ -3406,8 +3414,8 @@
           </a:fontRef>
         </p:style>
       </p:cxnSp>
-      <mc:AlternateContent xmlns:mc="http://schemas.openxmlformats.org/markup-compatibility/2006">
-        <mc:Choice xmlns:a14="http://schemas.microsoft.com/office/drawing/2010/main" Requires="a14">
+      <mc:AlternateContent xmlns:mc="http://schemas.openxmlformats.org/markup-compatibility/2006" xmlns:a14="http://schemas.microsoft.com/office/drawing/2010/main">
+        <mc:Choice Requires="a14">
           <p:sp>
             <p:nvSpPr>
               <p:cNvPr id="18" name="TextBox 17">
@@ -3436,6 +3444,7 @@
               </a:bodyPr>
               <a:lstStyle/>
               <a:p>
+                <a:pPr/>
                 <a14:m>
                   <m:oMathPara xmlns:m="http://schemas.openxmlformats.org/officeDocument/2006/math">
                     <m:oMathParaPr>
@@ -3488,7 +3497,7 @@
             </p:txBody>
           </p:sp>
         </mc:Choice>
-        <mc:Fallback>
+        <mc:Fallback xmlns="">
           <p:sp>
             <p:nvSpPr>
               <p:cNvPr id="18" name="TextBox 17">
@@ -3533,8 +3542,8 @@
           </p:sp>
         </mc:Fallback>
       </mc:AlternateContent>
-      <mc:AlternateContent xmlns:mc="http://schemas.openxmlformats.org/markup-compatibility/2006">
-        <mc:Choice xmlns:a14="http://schemas.microsoft.com/office/drawing/2010/main" Requires="a14">
+      <mc:AlternateContent xmlns:mc="http://schemas.openxmlformats.org/markup-compatibility/2006" xmlns:a14="http://schemas.microsoft.com/office/drawing/2010/main">
+        <mc:Choice Requires="a14">
           <p:sp>
             <p:nvSpPr>
               <p:cNvPr id="19" name="TextBox 18">
@@ -3563,6 +3572,7 @@
               </a:bodyPr>
               <a:lstStyle/>
               <a:p>
+                <a:pPr/>
                 <a14:m>
                   <m:oMathPara xmlns:m="http://schemas.openxmlformats.org/officeDocument/2006/math">
                     <m:oMathParaPr>
@@ -3626,7 +3636,7 @@
             </p:txBody>
           </p:sp>
         </mc:Choice>
-        <mc:Fallback>
+        <mc:Fallback xmlns="">
           <p:sp>
             <p:nvSpPr>
               <p:cNvPr id="19" name="TextBox 18">
@@ -3671,8 +3681,8 @@
           </p:sp>
         </mc:Fallback>
       </mc:AlternateContent>
-      <mc:AlternateContent xmlns:mc="http://schemas.openxmlformats.org/markup-compatibility/2006">
-        <mc:Choice xmlns:a14="http://schemas.microsoft.com/office/drawing/2010/main" Requires="a14">
+      <mc:AlternateContent xmlns:mc="http://schemas.openxmlformats.org/markup-compatibility/2006" xmlns:a14="http://schemas.microsoft.com/office/drawing/2010/main">
+        <mc:Choice Requires="a14">
           <p:sp>
             <p:nvSpPr>
               <p:cNvPr id="21" name="TextBox 20">
@@ -3701,6 +3711,7 @@
               </a:bodyPr>
               <a:lstStyle/>
               <a:p>
+                <a:pPr/>
                 <a14:m>
                   <m:oMathPara xmlns:m="http://schemas.openxmlformats.org/officeDocument/2006/math">
                     <m:oMathParaPr>
@@ -3728,7 +3739,7 @@
             </p:txBody>
           </p:sp>
         </mc:Choice>
-        <mc:Fallback>
+        <mc:Fallback xmlns="">
           <p:sp>
             <p:nvSpPr>
               <p:cNvPr id="21" name="TextBox 20">
@@ -3773,8 +3784,8 @@
           </p:sp>
         </mc:Fallback>
       </mc:AlternateContent>
-      <mc:AlternateContent xmlns:mc="http://schemas.openxmlformats.org/markup-compatibility/2006">
-        <mc:Choice xmlns:a14="http://schemas.microsoft.com/office/drawing/2010/main" Requires="a14">
+      <mc:AlternateContent xmlns:mc="http://schemas.openxmlformats.org/markup-compatibility/2006" xmlns:a14="http://schemas.microsoft.com/office/drawing/2010/main">
+        <mc:Choice Requires="a14">
           <p:sp>
             <p:nvSpPr>
               <p:cNvPr id="25" name="TextBox 24">
@@ -3803,6 +3814,7 @@
               </a:bodyPr>
               <a:lstStyle/>
               <a:p>
+                <a:pPr/>
                 <a14:m>
                   <m:oMathPara xmlns:m="http://schemas.openxmlformats.org/officeDocument/2006/math">
                     <m:oMathParaPr>
@@ -3839,7 +3851,7 @@
             </p:txBody>
           </p:sp>
         </mc:Choice>
-        <mc:Fallback>
+        <mc:Fallback xmlns="">
           <p:sp>
             <p:nvSpPr>
               <p:cNvPr id="25" name="TextBox 24">
@@ -3884,8 +3896,8 @@
           </p:sp>
         </mc:Fallback>
       </mc:AlternateContent>
-      <mc:AlternateContent xmlns:mc="http://schemas.openxmlformats.org/markup-compatibility/2006">
-        <mc:Choice xmlns:a14="http://schemas.microsoft.com/office/drawing/2010/main" Requires="a14">
+      <mc:AlternateContent xmlns:mc="http://schemas.openxmlformats.org/markup-compatibility/2006" xmlns:a14="http://schemas.microsoft.com/office/drawing/2010/main">
+        <mc:Choice Requires="a14">
           <p:sp>
             <p:nvSpPr>
               <p:cNvPr id="26" name="TextBox 25">
@@ -3914,6 +3926,7 @@
               </a:bodyPr>
               <a:lstStyle/>
               <a:p>
+                <a:pPr/>
                 <a14:m>
                   <m:oMathPara xmlns:m="http://schemas.openxmlformats.org/officeDocument/2006/math">
                     <m:oMathParaPr>
@@ -3977,7 +3990,7 @@
             </p:txBody>
           </p:sp>
         </mc:Choice>
-        <mc:Fallback>
+        <mc:Fallback xmlns="">
           <p:sp>
             <p:nvSpPr>
               <p:cNvPr id="26" name="TextBox 25">
@@ -4022,8 +4035,8 @@
           </p:sp>
         </mc:Fallback>
       </mc:AlternateContent>
-      <mc:AlternateContent xmlns:mc="http://schemas.openxmlformats.org/markup-compatibility/2006">
-        <mc:Choice xmlns:a14="http://schemas.microsoft.com/office/drawing/2010/main" Requires="a14">
+      <mc:AlternateContent xmlns:mc="http://schemas.openxmlformats.org/markup-compatibility/2006" xmlns:a14="http://schemas.microsoft.com/office/drawing/2010/main">
+        <mc:Choice Requires="a14">
           <p:sp>
             <p:nvSpPr>
               <p:cNvPr id="27" name="TextBox 26">
@@ -4052,6 +4065,7 @@
               </a:bodyPr>
               <a:lstStyle/>
               <a:p>
+                <a:pPr/>
                 <a14:m>
                   <m:oMathPara xmlns:m="http://schemas.openxmlformats.org/officeDocument/2006/math">
                     <m:oMathParaPr>
@@ -4104,7 +4118,7 @@
             </p:txBody>
           </p:sp>
         </mc:Choice>
-        <mc:Fallback>
+        <mc:Fallback xmlns="">
           <p:sp>
             <p:nvSpPr>
               <p:cNvPr id="27" name="TextBox 26">
@@ -4149,8 +4163,8 @@
           </p:sp>
         </mc:Fallback>
       </mc:AlternateContent>
-      <mc:AlternateContent xmlns:mc="http://schemas.openxmlformats.org/markup-compatibility/2006">
-        <mc:Choice xmlns:a14="http://schemas.microsoft.com/office/drawing/2010/main" Requires="a14">
+      <mc:AlternateContent xmlns:mc="http://schemas.openxmlformats.org/markup-compatibility/2006" xmlns:a14="http://schemas.microsoft.com/office/drawing/2010/main">
+        <mc:Choice Requires="a14">
           <p:sp>
             <p:nvSpPr>
               <p:cNvPr id="31" name="TextBox 30">
@@ -4179,6 +4193,7 @@
               </a:bodyPr>
               <a:lstStyle/>
               <a:p>
+                <a:pPr/>
                 <a14:m>
                   <m:oMathPara xmlns:m="http://schemas.openxmlformats.org/officeDocument/2006/math">
                     <m:oMathParaPr>
@@ -4206,7 +4221,7 @@
             </p:txBody>
           </p:sp>
         </mc:Choice>
-        <mc:Fallback>
+        <mc:Fallback xmlns="">
           <p:sp>
             <p:nvSpPr>
               <p:cNvPr id="31" name="TextBox 30">
@@ -4295,8 +4310,8 @@
           </a:fontRef>
         </p:style>
       </p:cxnSp>
-      <mc:AlternateContent xmlns:mc="http://schemas.openxmlformats.org/markup-compatibility/2006">
-        <mc:Choice xmlns:a14="http://schemas.microsoft.com/office/drawing/2010/main" Requires="a14">
+      <mc:AlternateContent xmlns:mc="http://schemas.openxmlformats.org/markup-compatibility/2006" xmlns:a14="http://schemas.microsoft.com/office/drawing/2010/main">
+        <mc:Choice Requires="a14">
           <p:sp>
             <p:nvSpPr>
               <p:cNvPr id="52" name="TextBox 51">
@@ -4325,6 +4340,7 @@
               </a:bodyPr>
               <a:lstStyle/>
               <a:p>
+                <a:pPr/>
                 <a14:m>
                   <m:oMathPara xmlns:m="http://schemas.openxmlformats.org/officeDocument/2006/math">
                     <m:oMathParaPr>
@@ -4352,7 +4368,7 @@
             </p:txBody>
           </p:sp>
         </mc:Choice>
-        <mc:Fallback>
+        <mc:Fallback xmlns="">
           <p:sp>
             <p:nvSpPr>
               <p:cNvPr id="52" name="TextBox 51">
@@ -4604,8 +4620,8 @@
           </a:fontRef>
         </p:style>
       </p:cxnSp>
-      <mc:AlternateContent xmlns:mc="http://schemas.openxmlformats.org/markup-compatibility/2006">
-        <mc:Choice xmlns:a14="http://schemas.microsoft.com/office/drawing/2010/main" Requires="a14">
+      <mc:AlternateContent xmlns:mc="http://schemas.openxmlformats.org/markup-compatibility/2006" xmlns:a14="http://schemas.microsoft.com/office/drawing/2010/main">
+        <mc:Choice Requires="a14">
           <p:sp>
             <p:nvSpPr>
               <p:cNvPr id="60" name="TextBox 59">
@@ -4634,6 +4650,7 @@
               </a:bodyPr>
               <a:lstStyle/>
               <a:p>
+                <a:pPr/>
                 <a14:m>
                   <m:oMathPara xmlns:m="http://schemas.openxmlformats.org/officeDocument/2006/math">
                     <m:oMathParaPr>
@@ -4707,7 +4724,7 @@
             </p:txBody>
           </p:sp>
         </mc:Choice>
-        <mc:Fallback>
+        <mc:Fallback xmlns="">
           <p:sp>
             <p:nvSpPr>
               <p:cNvPr id="60" name="TextBox 59">
@@ -4752,8 +4769,8 @@
           </p:sp>
         </mc:Fallback>
       </mc:AlternateContent>
-      <mc:AlternateContent xmlns:mc="http://schemas.openxmlformats.org/markup-compatibility/2006">
-        <mc:Choice xmlns:a14="http://schemas.microsoft.com/office/drawing/2010/main" Requires="a14">
+      <mc:AlternateContent xmlns:mc="http://schemas.openxmlformats.org/markup-compatibility/2006" xmlns:a14="http://schemas.microsoft.com/office/drawing/2010/main">
+        <mc:Choice Requires="a14">
           <p:sp>
             <p:nvSpPr>
               <p:cNvPr id="61" name="TextBox 60">
@@ -4859,7 +4876,7 @@
             </p:txBody>
           </p:sp>
         </mc:Choice>
-        <mc:Fallback>
+        <mc:Fallback xmlns="">
           <p:sp>
             <p:nvSpPr>
               <p:cNvPr id="61" name="TextBox 60">
@@ -4904,8 +4921,8 @@
           </p:sp>
         </mc:Fallback>
       </mc:AlternateContent>
-      <mc:AlternateContent xmlns:mc="http://schemas.openxmlformats.org/markup-compatibility/2006">
-        <mc:Choice xmlns:a14="http://schemas.microsoft.com/office/drawing/2010/main" Requires="a14">
+      <mc:AlternateContent xmlns:mc="http://schemas.openxmlformats.org/markup-compatibility/2006" xmlns:a14="http://schemas.microsoft.com/office/drawing/2010/main">
+        <mc:Choice Requires="a14">
           <p:sp>
             <p:nvSpPr>
               <p:cNvPr id="62" name="TextBox 61">
@@ -4934,6 +4951,7 @@
               </a:bodyPr>
               <a:lstStyle/>
               <a:p>
+                <a:pPr/>
                 <a14:m>
                   <m:oMathPara xmlns:m="http://schemas.openxmlformats.org/officeDocument/2006/math">
                     <m:oMathParaPr>
@@ -4961,7 +4979,7 @@
             </p:txBody>
           </p:sp>
         </mc:Choice>
-        <mc:Fallback>
+        <mc:Fallback xmlns="">
           <p:sp>
             <p:nvSpPr>
               <p:cNvPr id="62" name="TextBox 61">
@@ -5036,8 +5054,8 @@
           <a:chExt cx="0" cy="0"/>
         </a:xfrm>
       </p:grpSpPr>
-      <mc:AlternateContent xmlns:mc="http://schemas.openxmlformats.org/markup-compatibility/2006">
-        <mc:Choice xmlns:a14="http://schemas.microsoft.com/office/drawing/2010/main" Requires="a14">
+      <mc:AlternateContent xmlns:mc="http://schemas.openxmlformats.org/markup-compatibility/2006" xmlns:a14="http://schemas.microsoft.com/office/drawing/2010/main">
+        <mc:Choice Requires="a14">
           <p:sp>
             <p:nvSpPr>
               <p:cNvPr id="26" name="TextBox 25">
@@ -5130,7 +5148,7 @@
             </p:txBody>
           </p:sp>
         </mc:Choice>
-        <mc:Fallback>
+        <mc:Fallback xmlns="">
           <p:sp>
             <p:nvSpPr>
               <p:cNvPr id="26" name="TextBox 25">
@@ -5175,8 +5193,8 @@
           </p:sp>
         </mc:Fallback>
       </mc:AlternateContent>
-      <mc:AlternateContent xmlns:mc="http://schemas.openxmlformats.org/markup-compatibility/2006">
-        <mc:Choice xmlns:a14="http://schemas.microsoft.com/office/drawing/2010/main" Requires="a14">
+      <mc:AlternateContent xmlns:mc="http://schemas.openxmlformats.org/markup-compatibility/2006" xmlns:a14="http://schemas.microsoft.com/office/drawing/2010/main">
+        <mc:Choice Requires="a14">
           <p:sp>
             <p:nvSpPr>
               <p:cNvPr id="27" name="TextBox 26">
@@ -5258,7 +5276,7 @@
             </p:txBody>
           </p:sp>
         </mc:Choice>
-        <mc:Fallback>
+        <mc:Fallback xmlns="">
           <p:sp>
             <p:nvSpPr>
               <p:cNvPr id="27" name="TextBox 26">
@@ -5599,8 +5617,8 @@
           </a:p>
         </p:txBody>
       </p:sp>
-      <mc:AlternateContent xmlns:mc="http://schemas.openxmlformats.org/markup-compatibility/2006">
-        <mc:Choice xmlns:a14="http://schemas.microsoft.com/office/drawing/2010/main" Requires="a14">
+      <mc:AlternateContent xmlns:mc="http://schemas.openxmlformats.org/markup-compatibility/2006" xmlns:a14="http://schemas.microsoft.com/office/drawing/2010/main">
+        <mc:Choice Requires="a14">
           <p:sp>
             <p:nvSpPr>
               <p:cNvPr id="7" name="TextBox 6">
@@ -5629,6 +5647,7 @@
               </a:bodyPr>
               <a:lstStyle/>
               <a:p>
+                <a:pPr/>
                 <a14:m>
                   <m:oMathPara xmlns:m="http://schemas.openxmlformats.org/officeDocument/2006/math">
                     <m:oMathParaPr>
@@ -5681,7 +5700,7 @@
             </p:txBody>
           </p:sp>
         </mc:Choice>
-        <mc:Fallback>
+        <mc:Fallback xmlns="">
           <p:sp>
             <p:nvSpPr>
               <p:cNvPr id="7" name="TextBox 6">
@@ -5726,8 +5745,8 @@
           </p:sp>
         </mc:Fallback>
       </mc:AlternateContent>
-      <mc:AlternateContent xmlns:mc="http://schemas.openxmlformats.org/markup-compatibility/2006">
-        <mc:Choice xmlns:a14="http://schemas.microsoft.com/office/drawing/2010/main" Requires="a14">
+      <mc:AlternateContent xmlns:mc="http://schemas.openxmlformats.org/markup-compatibility/2006" xmlns:a14="http://schemas.microsoft.com/office/drawing/2010/main">
+        <mc:Choice Requires="a14">
           <p:sp>
             <p:nvSpPr>
               <p:cNvPr id="9" name="TextBox 8">
@@ -5756,6 +5775,7 @@
               </a:bodyPr>
               <a:lstStyle/>
               <a:p>
+                <a:pPr/>
                 <a14:m>
                   <m:oMathPara xmlns:m="http://schemas.openxmlformats.org/officeDocument/2006/math">
                     <m:oMathParaPr>
@@ -5819,7 +5839,7 @@
             </p:txBody>
           </p:sp>
         </mc:Choice>
-        <mc:Fallback>
+        <mc:Fallback xmlns="">
           <p:sp>
             <p:nvSpPr>
               <p:cNvPr id="9" name="TextBox 8">
@@ -5864,8 +5884,8 @@
           </p:sp>
         </mc:Fallback>
       </mc:AlternateContent>
-      <mc:AlternateContent xmlns:mc="http://schemas.openxmlformats.org/markup-compatibility/2006">
-        <mc:Choice xmlns:a14="http://schemas.microsoft.com/office/drawing/2010/main" Requires="a14">
+      <mc:AlternateContent xmlns:mc="http://schemas.openxmlformats.org/markup-compatibility/2006" xmlns:a14="http://schemas.microsoft.com/office/drawing/2010/main">
+        <mc:Choice Requires="a14">
           <p:sp>
             <p:nvSpPr>
               <p:cNvPr id="10" name="TextBox 9">
@@ -5894,6 +5914,7 @@
               </a:bodyPr>
               <a:lstStyle/>
               <a:p>
+                <a:pPr/>
                 <a14:m>
                   <m:oMathPara xmlns:m="http://schemas.openxmlformats.org/officeDocument/2006/math">
                     <m:oMathParaPr>
@@ -5967,7 +5988,7 @@
             </p:txBody>
           </p:sp>
         </mc:Choice>
-        <mc:Fallback>
+        <mc:Fallback xmlns="">
           <p:sp>
             <p:nvSpPr>
               <p:cNvPr id="10" name="TextBox 9">
@@ -6095,6 +6116,3606 @@
     <p:extLst>
       <p:ext uri="{BB962C8B-B14F-4D97-AF65-F5344CB8AC3E}">
         <p14:creationId xmlns:p14="http://schemas.microsoft.com/office/powerpoint/2010/main" val="3839737813"/>
+      </p:ext>
+    </p:extLst>
+  </p:cSld>
+  <p:clrMapOvr>
+    <a:masterClrMapping/>
+  </p:clrMapOvr>
+</p:sld>
+</file>
+
+<file path=ppt/slides/slide3.xml><?xml version="1.0" encoding="utf-8"?>
+<p:sld xmlns:a="http://schemas.openxmlformats.org/drawingml/2006/main" xmlns:r="http://schemas.openxmlformats.org/officeDocument/2006/relationships" xmlns:p="http://schemas.openxmlformats.org/presentationml/2006/main">
+  <p:cSld>
+    <p:spTree>
+      <p:nvGrpSpPr>
+        <p:cNvPr id="1" name=""/>
+        <p:cNvGrpSpPr/>
+        <p:nvPr/>
+      </p:nvGrpSpPr>
+      <p:grpSpPr>
+        <a:xfrm>
+          <a:off x="0" y="0"/>
+          <a:ext cx="0" cy="0"/>
+          <a:chOff x="0" y="0"/>
+          <a:chExt cx="0" cy="0"/>
+        </a:xfrm>
+      </p:grpSpPr>
+      <mc:AlternateContent xmlns:mc="http://schemas.openxmlformats.org/markup-compatibility/2006">
+        <mc:Choice xmlns:a14="http://schemas.microsoft.com/office/drawing/2010/main" Requires="a14">
+          <p:sp>
+            <p:nvSpPr>
+              <p:cNvPr id="26" name="TextBox 25">
+                <a:extLst>
+                  <a:ext uri="{FF2B5EF4-FFF2-40B4-BE49-F238E27FC236}">
+                    <a16:creationId xmlns:a16="http://schemas.microsoft.com/office/drawing/2014/main" id="{7F93BDE7-A731-C302-19A1-DCAFA5C13CF4}"/>
+                  </a:ext>
+                </a:extLst>
+              </p:cNvPr>
+              <p:cNvSpPr txBox="1"/>
+              <p:nvPr/>
+            </p:nvSpPr>
+            <p:spPr>
+              <a:xfrm>
+                <a:off x="9681954" y="5796407"/>
+                <a:ext cx="807396" cy="369332"/>
+              </a:xfrm>
+              <a:prstGeom prst="rect">
+                <a:avLst/>
+              </a:prstGeom>
+              <a:noFill/>
+            </p:spPr>
+            <p:txBody>
+              <a:bodyPr wrap="square" rtlCol="0">
+                <a:spAutoFit/>
+              </a:bodyPr>
+              <a:lstStyle/>
+              <a:p>
+                <a:pPr/>
+                <a14:m>
+                  <m:oMathPara xmlns:m="http://schemas.openxmlformats.org/officeDocument/2006/math">
+                    <m:oMathParaPr>
+                      <m:jc m:val="centerGroup"/>
+                    </m:oMathParaPr>
+                    <m:oMath xmlns:m="http://schemas.openxmlformats.org/officeDocument/2006/math">
+                      <m:r>
+                        <a:rPr lang="en-US" b="1" i="1" smtClean="0">
+                          <a:solidFill>
+                            <a:schemeClr val="tx1"/>
+                          </a:solidFill>
+                          <a:latin typeface="Cambria Math" panose="02040503050406030204" pitchFamily="18" charset="0"/>
+                        </a:rPr>
+                        <m:t>𝑿</m:t>
+                      </m:r>
+                    </m:oMath>
+                  </m:oMathPara>
+                </a14:m>
+                <a:endParaRPr lang="en-US" b="1" dirty="0">
+                  <a:solidFill>
+                    <a:schemeClr val="tx1"/>
+                  </a:solidFill>
+                </a:endParaRPr>
+              </a:p>
+            </p:txBody>
+          </p:sp>
+        </mc:Choice>
+        <mc:Fallback>
+          <p:sp>
+            <p:nvSpPr>
+              <p:cNvPr id="26" name="TextBox 25">
+                <a:extLst>
+                  <a:ext uri="{FF2B5EF4-FFF2-40B4-BE49-F238E27FC236}">
+                    <a16:creationId xmlns:a16="http://schemas.microsoft.com/office/drawing/2014/main" id="{7F93BDE7-A731-C302-19A1-DCAFA5C13CF4}"/>
+                  </a:ext>
+                </a:extLst>
+              </p:cNvPr>
+              <p:cNvSpPr txBox="1">
+                <a:spLocks noRot="1" noChangeAspect="1" noMove="1" noResize="1" noEditPoints="1" noAdjustHandles="1" noChangeArrowheads="1" noChangeShapeType="1" noTextEdit="1"/>
+              </p:cNvSpPr>
+              <p:nvPr/>
+            </p:nvSpPr>
+            <p:spPr>
+              <a:xfrm>
+                <a:off x="9681954" y="5796407"/>
+                <a:ext cx="807396" cy="369332"/>
+              </a:xfrm>
+              <a:prstGeom prst="rect">
+                <a:avLst/>
+              </a:prstGeom>
+              <a:blipFill>
+                <a:blip r:embed="rId2"/>
+                <a:stretch>
+                  <a:fillRect/>
+                </a:stretch>
+              </a:blipFill>
+            </p:spPr>
+            <p:txBody>
+              <a:bodyPr/>
+              <a:lstStyle/>
+              <a:p>
+                <a:r>
+                  <a:rPr lang="en-US">
+                    <a:noFill/>
+                  </a:rPr>
+                  <a:t> </a:t>
+                </a:r>
+              </a:p>
+            </p:txBody>
+          </p:sp>
+        </mc:Fallback>
+      </mc:AlternateContent>
+      <mc:AlternateContent xmlns:mc="http://schemas.openxmlformats.org/markup-compatibility/2006">
+        <mc:Choice xmlns:a14="http://schemas.microsoft.com/office/drawing/2010/main" Requires="a14">
+          <p:sp>
+            <p:nvSpPr>
+              <p:cNvPr id="27" name="TextBox 26">
+                <a:extLst>
+                  <a:ext uri="{FF2B5EF4-FFF2-40B4-BE49-F238E27FC236}">
+                    <a16:creationId xmlns:a16="http://schemas.microsoft.com/office/drawing/2014/main" id="{0DDA7B57-B430-94C9-FFC6-65F76A85F963}"/>
+                  </a:ext>
+                </a:extLst>
+              </p:cNvPr>
+              <p:cNvSpPr txBox="1"/>
+              <p:nvPr/>
+            </p:nvSpPr>
+            <p:spPr>
+              <a:xfrm>
+                <a:off x="1645109" y="210640"/>
+                <a:ext cx="807396" cy="369332"/>
+              </a:xfrm>
+              <a:prstGeom prst="rect">
+                <a:avLst/>
+              </a:prstGeom>
+              <a:noFill/>
+            </p:spPr>
+            <p:txBody>
+              <a:bodyPr wrap="square" rtlCol="0">
+                <a:spAutoFit/>
+              </a:bodyPr>
+              <a:lstStyle/>
+              <a:p>
+                <a:pPr/>
+                <a14:m>
+                  <m:oMathPara xmlns:m="http://schemas.openxmlformats.org/officeDocument/2006/math">
+                    <m:oMathParaPr>
+                      <m:jc m:val="centerGroup"/>
+                    </m:oMathParaPr>
+                    <m:oMath xmlns:m="http://schemas.openxmlformats.org/officeDocument/2006/math">
+                      <m:r>
+                        <a:rPr lang="en-US" b="1" i="1" smtClean="0">
+                          <a:solidFill>
+                            <a:schemeClr val="tx1"/>
+                          </a:solidFill>
+                          <a:latin typeface="Cambria Math" panose="02040503050406030204" pitchFamily="18" charset="0"/>
+                        </a:rPr>
+                        <m:t>𝒀</m:t>
+                      </m:r>
+                    </m:oMath>
+                  </m:oMathPara>
+                </a14:m>
+                <a:endParaRPr lang="en-US" b="1" dirty="0">
+                  <a:solidFill>
+                    <a:schemeClr val="tx1"/>
+                  </a:solidFill>
+                </a:endParaRPr>
+              </a:p>
+            </p:txBody>
+          </p:sp>
+        </mc:Choice>
+        <mc:Fallback>
+          <p:sp>
+            <p:nvSpPr>
+              <p:cNvPr id="27" name="TextBox 26">
+                <a:extLst>
+                  <a:ext uri="{FF2B5EF4-FFF2-40B4-BE49-F238E27FC236}">
+                    <a16:creationId xmlns:a16="http://schemas.microsoft.com/office/drawing/2014/main" id="{0DDA7B57-B430-94C9-FFC6-65F76A85F963}"/>
+                  </a:ext>
+                </a:extLst>
+              </p:cNvPr>
+              <p:cNvSpPr txBox="1">
+                <a:spLocks noRot="1" noChangeAspect="1" noMove="1" noResize="1" noEditPoints="1" noAdjustHandles="1" noChangeArrowheads="1" noChangeShapeType="1" noTextEdit="1"/>
+              </p:cNvSpPr>
+              <p:nvPr/>
+            </p:nvSpPr>
+            <p:spPr>
+              <a:xfrm>
+                <a:off x="1645109" y="210640"/>
+                <a:ext cx="807396" cy="369332"/>
+              </a:xfrm>
+              <a:prstGeom prst="rect">
+                <a:avLst/>
+              </a:prstGeom>
+              <a:blipFill>
+                <a:blip r:embed="rId3"/>
+                <a:stretch>
+                  <a:fillRect/>
+                </a:stretch>
+              </a:blipFill>
+            </p:spPr>
+            <p:txBody>
+              <a:bodyPr/>
+              <a:lstStyle/>
+              <a:p>
+                <a:r>
+                  <a:rPr lang="en-US">
+                    <a:noFill/>
+                  </a:rPr>
+                  <a:t> </a:t>
+                </a:r>
+              </a:p>
+            </p:txBody>
+          </p:sp>
+        </mc:Fallback>
+      </mc:AlternateContent>
+      <p:sp>
+        <p:nvSpPr>
+          <p:cNvPr id="6" name="Freeform: Shape 5">
+            <a:extLst>
+              <a:ext uri="{FF2B5EF4-FFF2-40B4-BE49-F238E27FC236}">
+                <a16:creationId xmlns:a16="http://schemas.microsoft.com/office/drawing/2014/main" id="{0CF6D7D9-CF42-B396-29A8-52DACB5F1FF9}"/>
+              </a:ext>
+            </a:extLst>
+          </p:cNvPr>
+          <p:cNvSpPr/>
+          <p:nvPr/>
+        </p:nvSpPr>
+        <p:spPr>
+          <a:xfrm>
+            <a:off x="2286000" y="395306"/>
+            <a:ext cx="7601613" cy="5637321"/>
+          </a:xfrm>
+          <a:custGeom>
+            <a:avLst/>
+            <a:gdLst>
+              <a:gd name="connsiteX0" fmla="*/ 0 w 10227076"/>
+              <a:gd name="connsiteY0" fmla="*/ 0 h 5637321"/>
+              <a:gd name="connsiteX1" fmla="*/ 35511 w 10227076"/>
+              <a:gd name="connsiteY1" fmla="*/ 5637321 h 5637321"/>
+              <a:gd name="connsiteX2" fmla="*/ 10227076 w 10227076"/>
+              <a:gd name="connsiteY2" fmla="*/ 5584055 h 5637321"/>
+            </a:gdLst>
+            <a:ahLst/>
+            <a:cxnLst>
+              <a:cxn ang="0">
+                <a:pos x="connsiteX0" y="connsiteY0"/>
+              </a:cxn>
+              <a:cxn ang="0">
+                <a:pos x="connsiteX1" y="connsiteY1"/>
+              </a:cxn>
+              <a:cxn ang="0">
+                <a:pos x="connsiteX2" y="connsiteY2"/>
+              </a:cxn>
+            </a:cxnLst>
+            <a:rect l="l" t="t" r="r" b="b"/>
+            <a:pathLst>
+              <a:path w="10227076" h="5637321">
+                <a:moveTo>
+                  <a:pt x="0" y="0"/>
+                </a:moveTo>
+                <a:lnTo>
+                  <a:pt x="35511" y="5637321"/>
+                </a:lnTo>
+                <a:lnTo>
+                  <a:pt x="10227076" y="5584055"/>
+                </a:lnTo>
+              </a:path>
+            </a:pathLst>
+          </a:custGeom>
+          <a:ln w="38100"/>
+        </p:spPr>
+        <p:style>
+          <a:lnRef idx="3">
+            <a:schemeClr val="dk1"/>
+          </a:lnRef>
+          <a:fillRef idx="0">
+            <a:schemeClr val="dk1"/>
+          </a:fillRef>
+          <a:effectRef idx="2">
+            <a:schemeClr val="dk1"/>
+          </a:effectRef>
+          <a:fontRef idx="minor">
+            <a:schemeClr val="tx1"/>
+          </a:fontRef>
+        </p:style>
+        <p:txBody>
+          <a:bodyPr rtlCol="0" anchor="ctr"/>
+          <a:lstStyle/>
+          <a:p>
+            <a:pPr algn="ctr"/>
+            <a:endParaRPr lang="en-US"/>
+          </a:p>
+        </p:txBody>
+      </p:sp>
+      <p:cxnSp>
+        <p:nvCxnSpPr>
+          <p:cNvPr id="8" name="Straight Connector 7">
+            <a:extLst>
+              <a:ext uri="{FF2B5EF4-FFF2-40B4-BE49-F238E27FC236}">
+                <a16:creationId xmlns:a16="http://schemas.microsoft.com/office/drawing/2014/main" id="{B16F4518-E948-C3F6-AAE1-784E53A694CC}"/>
+              </a:ext>
+            </a:extLst>
+          </p:cNvPr>
+          <p:cNvCxnSpPr>
+            <a:cxnSpLocks/>
+          </p:cNvCxnSpPr>
+          <p:nvPr/>
+        </p:nvCxnSpPr>
+        <p:spPr>
+          <a:xfrm>
+            <a:off x="2286000" y="1544715"/>
+            <a:ext cx="5816600" cy="4430635"/>
+          </a:xfrm>
+          <a:prstGeom prst="line">
+            <a:avLst/>
+          </a:prstGeom>
+          <a:ln w="38100"/>
+        </p:spPr>
+        <p:style>
+          <a:lnRef idx="1">
+            <a:schemeClr val="accent1"/>
+          </a:lnRef>
+          <a:fillRef idx="0">
+            <a:schemeClr val="accent1"/>
+          </a:fillRef>
+          <a:effectRef idx="0">
+            <a:schemeClr val="accent1"/>
+          </a:effectRef>
+          <a:fontRef idx="minor">
+            <a:schemeClr val="tx1"/>
+          </a:fontRef>
+        </p:style>
+      </p:cxnSp>
+      <p:sp>
+        <p:nvSpPr>
+          <p:cNvPr id="13" name="Oval 12">
+            <a:extLst>
+              <a:ext uri="{FF2B5EF4-FFF2-40B4-BE49-F238E27FC236}">
+                <a16:creationId xmlns:a16="http://schemas.microsoft.com/office/drawing/2014/main" id="{74860EB7-06C0-20B7-720F-A37B0040C65B}"/>
+              </a:ext>
+            </a:extLst>
+          </p:cNvPr>
+          <p:cNvSpPr/>
+          <p:nvPr/>
+        </p:nvSpPr>
+        <p:spPr>
+          <a:xfrm>
+            <a:off x="2230040" y="1489103"/>
+            <a:ext cx="111919" cy="119063"/>
+          </a:xfrm>
+          <a:prstGeom prst="ellipse">
+            <a:avLst/>
+          </a:prstGeom>
+          <a:solidFill>
+            <a:srgbClr val="FF0000"/>
+          </a:solidFill>
+          <a:ln>
+            <a:solidFill>
+              <a:schemeClr val="tx1"/>
+            </a:solidFill>
+          </a:ln>
+        </p:spPr>
+        <p:style>
+          <a:lnRef idx="1">
+            <a:schemeClr val="accent2"/>
+          </a:lnRef>
+          <a:fillRef idx="3">
+            <a:schemeClr val="accent2"/>
+          </a:fillRef>
+          <a:effectRef idx="2">
+            <a:schemeClr val="accent2"/>
+          </a:effectRef>
+          <a:fontRef idx="minor">
+            <a:schemeClr val="lt1"/>
+          </a:fontRef>
+        </p:style>
+        <p:txBody>
+          <a:bodyPr rtlCol="0" anchor="ctr"/>
+          <a:lstStyle/>
+          <a:p>
+            <a:pPr algn="ctr"/>
+            <a:endParaRPr lang="en-US"/>
+          </a:p>
+        </p:txBody>
+      </p:sp>
+      <p:sp>
+        <p:nvSpPr>
+          <p:cNvPr id="14" name="Oval 13">
+            <a:extLst>
+              <a:ext uri="{FF2B5EF4-FFF2-40B4-BE49-F238E27FC236}">
+                <a16:creationId xmlns:a16="http://schemas.microsoft.com/office/drawing/2014/main" id="{E4511A1E-CACA-0C9B-9CC9-09A5F1B05BE1}"/>
+              </a:ext>
+            </a:extLst>
+          </p:cNvPr>
+          <p:cNvSpPr/>
+          <p:nvPr/>
+        </p:nvSpPr>
+        <p:spPr>
+          <a:xfrm>
+            <a:off x="8046640" y="5911899"/>
+            <a:ext cx="111919" cy="119063"/>
+          </a:xfrm>
+          <a:prstGeom prst="ellipse">
+            <a:avLst/>
+          </a:prstGeom>
+          <a:solidFill>
+            <a:srgbClr val="FF0000"/>
+          </a:solidFill>
+          <a:ln>
+            <a:solidFill>
+              <a:schemeClr val="tx1"/>
+            </a:solidFill>
+          </a:ln>
+        </p:spPr>
+        <p:style>
+          <a:lnRef idx="1">
+            <a:schemeClr val="accent2"/>
+          </a:lnRef>
+          <a:fillRef idx="3">
+            <a:schemeClr val="accent2"/>
+          </a:fillRef>
+          <a:effectRef idx="2">
+            <a:schemeClr val="accent2"/>
+          </a:effectRef>
+          <a:fontRef idx="minor">
+            <a:schemeClr val="lt1"/>
+          </a:fontRef>
+        </p:style>
+        <p:txBody>
+          <a:bodyPr rtlCol="0" anchor="ctr"/>
+          <a:lstStyle/>
+          <a:p>
+            <a:pPr algn="ctr"/>
+            <a:endParaRPr lang="en-US"/>
+          </a:p>
+        </p:txBody>
+      </p:sp>
+      <mc:AlternateContent xmlns:mc="http://schemas.openxmlformats.org/markup-compatibility/2006">
+        <mc:Choice xmlns:a14="http://schemas.microsoft.com/office/drawing/2010/main" Requires="a14">
+          <p:sp>
+            <p:nvSpPr>
+              <p:cNvPr id="15" name="TextBox 14">
+                <a:extLst>
+                  <a:ext uri="{FF2B5EF4-FFF2-40B4-BE49-F238E27FC236}">
+                    <a16:creationId xmlns:a16="http://schemas.microsoft.com/office/drawing/2014/main" id="{5E296CC9-8ED3-C80C-2298-0927D064BF83}"/>
+                  </a:ext>
+                </a:extLst>
+              </p:cNvPr>
+              <p:cNvSpPr txBox="1"/>
+              <p:nvPr/>
+            </p:nvSpPr>
+            <p:spPr>
+              <a:xfrm>
+                <a:off x="7698901" y="6032627"/>
+                <a:ext cx="807396" cy="657552"/>
+              </a:xfrm>
+              <a:prstGeom prst="rect">
+                <a:avLst/>
+              </a:prstGeom>
+              <a:noFill/>
+            </p:spPr>
+            <p:txBody>
+              <a:bodyPr wrap="square" rtlCol="0">
+                <a:spAutoFit/>
+              </a:bodyPr>
+              <a:lstStyle/>
+              <a:p>
+                <a:pPr/>
+                <a14:m>
+                  <m:oMathPara xmlns:m="http://schemas.openxmlformats.org/officeDocument/2006/math">
+                    <m:oMathParaPr>
+                      <m:jc m:val="centerGroup"/>
+                    </m:oMathParaPr>
+                    <m:oMath xmlns:m="http://schemas.openxmlformats.org/officeDocument/2006/math">
+                      <m:f>
+                        <m:fPr>
+                          <m:ctrlPr>
+                            <a:rPr lang="en-US" b="1" i="1" smtClean="0">
+                              <a:solidFill>
+                                <a:schemeClr val="tx1"/>
+                              </a:solidFill>
+                              <a:latin typeface="Cambria Math" panose="02040503050406030204" pitchFamily="18" charset="0"/>
+                            </a:rPr>
+                          </m:ctrlPr>
+                        </m:fPr>
+                        <m:num>
+                          <m:r>
+                            <a:rPr lang="en-US" b="1" i="1" smtClean="0">
+                              <a:solidFill>
+                                <a:schemeClr val="tx1"/>
+                              </a:solidFill>
+                              <a:latin typeface="Cambria Math" panose="02040503050406030204" pitchFamily="18" charset="0"/>
+                            </a:rPr>
+                            <m:t>𝑴</m:t>
+                          </m:r>
+                        </m:num>
+                        <m:den>
+                          <m:sSub>
+                            <m:sSubPr>
+                              <m:ctrlPr>
+                                <a:rPr lang="en-US" b="1" i="1" smtClean="0">
+                                  <a:solidFill>
+                                    <a:schemeClr val="tx1"/>
+                                  </a:solidFill>
+                                  <a:latin typeface="Cambria Math" panose="02040503050406030204" pitchFamily="18" charset="0"/>
+                                </a:rPr>
+                              </m:ctrlPr>
+                            </m:sSubPr>
+                            <m:e>
+                              <m:r>
+                                <a:rPr lang="en-US" b="1" i="1" smtClean="0">
+                                  <a:solidFill>
+                                    <a:schemeClr val="tx1"/>
+                                  </a:solidFill>
+                                  <a:latin typeface="Cambria Math" panose="02040503050406030204" pitchFamily="18" charset="0"/>
+                                </a:rPr>
+                                <m:t>𝑷</m:t>
+                              </m:r>
+                            </m:e>
+                            <m:sub>
+                              <m:r>
+                                <a:rPr lang="en-US" b="1" i="1" smtClean="0">
+                                  <a:solidFill>
+                                    <a:schemeClr val="tx1"/>
+                                  </a:solidFill>
+                                  <a:latin typeface="Cambria Math" panose="02040503050406030204" pitchFamily="18" charset="0"/>
+                                </a:rPr>
+                                <m:t>𝒙</m:t>
+                              </m:r>
+                            </m:sub>
+                          </m:sSub>
+                        </m:den>
+                      </m:f>
+                    </m:oMath>
+                  </m:oMathPara>
+                </a14:m>
+                <a:endParaRPr lang="en-US" b="1" dirty="0">
+                  <a:solidFill>
+                    <a:schemeClr val="tx1"/>
+                  </a:solidFill>
+                </a:endParaRPr>
+              </a:p>
+            </p:txBody>
+          </p:sp>
+        </mc:Choice>
+        <mc:Fallback>
+          <p:sp>
+            <p:nvSpPr>
+              <p:cNvPr id="15" name="TextBox 14">
+                <a:extLst>
+                  <a:ext uri="{FF2B5EF4-FFF2-40B4-BE49-F238E27FC236}">
+                    <a16:creationId xmlns:a16="http://schemas.microsoft.com/office/drawing/2014/main" id="{5E296CC9-8ED3-C80C-2298-0927D064BF83}"/>
+                  </a:ext>
+                </a:extLst>
+              </p:cNvPr>
+              <p:cNvSpPr txBox="1">
+                <a:spLocks noRot="1" noChangeAspect="1" noMove="1" noResize="1" noEditPoints="1" noAdjustHandles="1" noChangeArrowheads="1" noChangeShapeType="1" noTextEdit="1"/>
+              </p:cNvSpPr>
+              <p:nvPr/>
+            </p:nvSpPr>
+            <p:spPr>
+              <a:xfrm>
+                <a:off x="7698901" y="6032627"/>
+                <a:ext cx="807396" cy="657552"/>
+              </a:xfrm>
+              <a:prstGeom prst="rect">
+                <a:avLst/>
+              </a:prstGeom>
+              <a:blipFill>
+                <a:blip r:embed="rId4"/>
+                <a:stretch>
+                  <a:fillRect/>
+                </a:stretch>
+              </a:blipFill>
+            </p:spPr>
+            <p:txBody>
+              <a:bodyPr/>
+              <a:lstStyle/>
+              <a:p>
+                <a:r>
+                  <a:rPr lang="en-US">
+                    <a:noFill/>
+                  </a:rPr>
+                  <a:t> </a:t>
+                </a:r>
+              </a:p>
+            </p:txBody>
+          </p:sp>
+        </mc:Fallback>
+      </mc:AlternateContent>
+      <mc:AlternateContent xmlns:mc="http://schemas.openxmlformats.org/markup-compatibility/2006">
+        <mc:Choice xmlns:a14="http://schemas.microsoft.com/office/drawing/2010/main" Requires="a14">
+          <p:sp>
+            <p:nvSpPr>
+              <p:cNvPr id="16" name="TextBox 15">
+                <a:extLst>
+                  <a:ext uri="{FF2B5EF4-FFF2-40B4-BE49-F238E27FC236}">
+                    <a16:creationId xmlns:a16="http://schemas.microsoft.com/office/drawing/2014/main" id="{ECC1AEE7-E434-1760-5BD5-630C90A0234A}"/>
+                  </a:ext>
+                </a:extLst>
+              </p:cNvPr>
+              <p:cNvSpPr txBox="1"/>
+              <p:nvPr/>
+            </p:nvSpPr>
+            <p:spPr>
+              <a:xfrm>
+                <a:off x="1561857" y="1215939"/>
+                <a:ext cx="807396" cy="692177"/>
+              </a:xfrm>
+              <a:prstGeom prst="rect">
+                <a:avLst/>
+              </a:prstGeom>
+              <a:noFill/>
+            </p:spPr>
+            <p:txBody>
+              <a:bodyPr wrap="square" rtlCol="0">
+                <a:spAutoFit/>
+              </a:bodyPr>
+              <a:lstStyle/>
+              <a:p>
+                <a:pPr/>
+                <a14:m>
+                  <m:oMathPara xmlns:m="http://schemas.openxmlformats.org/officeDocument/2006/math">
+                    <m:oMathParaPr>
+                      <m:jc m:val="centerGroup"/>
+                    </m:oMathParaPr>
+                    <m:oMath xmlns:m="http://schemas.openxmlformats.org/officeDocument/2006/math">
+                      <m:f>
+                        <m:fPr>
+                          <m:ctrlPr>
+                            <a:rPr lang="en-US" b="1" i="1" smtClean="0">
+                              <a:solidFill>
+                                <a:schemeClr val="tx1"/>
+                              </a:solidFill>
+                              <a:latin typeface="Cambria Math" panose="02040503050406030204" pitchFamily="18" charset="0"/>
+                            </a:rPr>
+                          </m:ctrlPr>
+                        </m:fPr>
+                        <m:num>
+                          <m:r>
+                            <a:rPr lang="en-US" b="1" i="1" smtClean="0">
+                              <a:solidFill>
+                                <a:schemeClr val="tx1"/>
+                              </a:solidFill>
+                              <a:latin typeface="Cambria Math" panose="02040503050406030204" pitchFamily="18" charset="0"/>
+                            </a:rPr>
+                            <m:t>𝑴</m:t>
+                          </m:r>
+                        </m:num>
+                        <m:den>
+                          <m:sSub>
+                            <m:sSubPr>
+                              <m:ctrlPr>
+                                <a:rPr lang="en-US" b="1" i="1" smtClean="0">
+                                  <a:solidFill>
+                                    <a:schemeClr val="tx1"/>
+                                  </a:solidFill>
+                                  <a:latin typeface="Cambria Math" panose="02040503050406030204" pitchFamily="18" charset="0"/>
+                                </a:rPr>
+                              </m:ctrlPr>
+                            </m:sSubPr>
+                            <m:e>
+                              <m:r>
+                                <a:rPr lang="en-US" b="1" i="1" smtClean="0">
+                                  <a:solidFill>
+                                    <a:schemeClr val="tx1"/>
+                                  </a:solidFill>
+                                  <a:latin typeface="Cambria Math" panose="02040503050406030204" pitchFamily="18" charset="0"/>
+                                </a:rPr>
+                                <m:t>𝑷</m:t>
+                              </m:r>
+                            </m:e>
+                            <m:sub>
+                              <m:r>
+                                <a:rPr lang="en-US" b="1" i="1" smtClean="0">
+                                  <a:solidFill>
+                                    <a:schemeClr val="tx1"/>
+                                  </a:solidFill>
+                                  <a:latin typeface="Cambria Math" panose="02040503050406030204" pitchFamily="18" charset="0"/>
+                                </a:rPr>
+                                <m:t>𝒚</m:t>
+                              </m:r>
+                            </m:sub>
+                          </m:sSub>
+                        </m:den>
+                      </m:f>
+                    </m:oMath>
+                  </m:oMathPara>
+                </a14:m>
+                <a:endParaRPr lang="en-US" b="1" dirty="0">
+                  <a:solidFill>
+                    <a:schemeClr val="tx1"/>
+                  </a:solidFill>
+                </a:endParaRPr>
+              </a:p>
+            </p:txBody>
+          </p:sp>
+        </mc:Choice>
+        <mc:Fallback>
+          <p:sp>
+            <p:nvSpPr>
+              <p:cNvPr id="16" name="TextBox 15">
+                <a:extLst>
+                  <a:ext uri="{FF2B5EF4-FFF2-40B4-BE49-F238E27FC236}">
+                    <a16:creationId xmlns:a16="http://schemas.microsoft.com/office/drawing/2014/main" id="{ECC1AEE7-E434-1760-5BD5-630C90A0234A}"/>
+                  </a:ext>
+                </a:extLst>
+              </p:cNvPr>
+              <p:cNvSpPr txBox="1">
+                <a:spLocks noRot="1" noChangeAspect="1" noMove="1" noResize="1" noEditPoints="1" noAdjustHandles="1" noChangeArrowheads="1" noChangeShapeType="1" noTextEdit="1"/>
+              </p:cNvSpPr>
+              <p:nvPr/>
+            </p:nvSpPr>
+            <p:spPr>
+              <a:xfrm>
+                <a:off x="1561857" y="1215939"/>
+                <a:ext cx="807396" cy="692177"/>
+              </a:xfrm>
+              <a:prstGeom prst="rect">
+                <a:avLst/>
+              </a:prstGeom>
+              <a:blipFill>
+                <a:blip r:embed="rId5"/>
+                <a:stretch>
+                  <a:fillRect/>
+                </a:stretch>
+              </a:blipFill>
+            </p:spPr>
+            <p:txBody>
+              <a:bodyPr/>
+              <a:lstStyle/>
+              <a:p>
+                <a:r>
+                  <a:rPr lang="en-US">
+                    <a:noFill/>
+                  </a:rPr>
+                  <a:t> </a:t>
+                </a:r>
+              </a:p>
+            </p:txBody>
+          </p:sp>
+        </mc:Fallback>
+      </mc:AlternateContent>
+    </p:spTree>
+    <p:extLst>
+      <p:ext uri="{BB962C8B-B14F-4D97-AF65-F5344CB8AC3E}">
+        <p14:creationId xmlns:p14="http://schemas.microsoft.com/office/powerpoint/2010/main" val="2243848489"/>
+      </p:ext>
+    </p:extLst>
+  </p:cSld>
+  <p:clrMapOvr>
+    <a:masterClrMapping/>
+  </p:clrMapOvr>
+</p:sld>
+</file>
+
+<file path=ppt/slides/slide4.xml><?xml version="1.0" encoding="utf-8"?>
+<p:sld xmlns:a="http://schemas.openxmlformats.org/drawingml/2006/main" xmlns:r="http://schemas.openxmlformats.org/officeDocument/2006/relationships" xmlns:p="http://schemas.openxmlformats.org/presentationml/2006/main">
+  <p:cSld>
+    <p:spTree>
+      <p:nvGrpSpPr>
+        <p:cNvPr id="1" name=""/>
+        <p:cNvGrpSpPr/>
+        <p:nvPr/>
+      </p:nvGrpSpPr>
+      <p:grpSpPr>
+        <a:xfrm>
+          <a:off x="0" y="0"/>
+          <a:ext cx="0" cy="0"/>
+          <a:chOff x="0" y="0"/>
+          <a:chExt cx="0" cy="0"/>
+        </a:xfrm>
+      </p:grpSpPr>
+      <mc:AlternateContent xmlns:mc="http://schemas.openxmlformats.org/markup-compatibility/2006">
+        <mc:Choice xmlns:a14="http://schemas.microsoft.com/office/drawing/2010/main" Requires="a14">
+          <p:sp>
+            <p:nvSpPr>
+              <p:cNvPr id="26" name="TextBox 25">
+                <a:extLst>
+                  <a:ext uri="{FF2B5EF4-FFF2-40B4-BE49-F238E27FC236}">
+                    <a16:creationId xmlns:a16="http://schemas.microsoft.com/office/drawing/2014/main" id="{7F93BDE7-A731-C302-19A1-DCAFA5C13CF4}"/>
+                  </a:ext>
+                </a:extLst>
+              </p:cNvPr>
+              <p:cNvSpPr txBox="1"/>
+              <p:nvPr/>
+            </p:nvSpPr>
+            <p:spPr>
+              <a:xfrm>
+                <a:off x="9681954" y="5796407"/>
+                <a:ext cx="807396" cy="369332"/>
+              </a:xfrm>
+              <a:prstGeom prst="rect">
+                <a:avLst/>
+              </a:prstGeom>
+              <a:noFill/>
+            </p:spPr>
+            <p:txBody>
+              <a:bodyPr wrap="square" rtlCol="0">
+                <a:spAutoFit/>
+              </a:bodyPr>
+              <a:lstStyle/>
+              <a:p>
+                <a:pPr/>
+                <a14:m>
+                  <m:oMathPara xmlns:m="http://schemas.openxmlformats.org/officeDocument/2006/math">
+                    <m:oMathParaPr>
+                      <m:jc m:val="centerGroup"/>
+                    </m:oMathParaPr>
+                    <m:oMath xmlns:m="http://schemas.openxmlformats.org/officeDocument/2006/math">
+                      <m:r>
+                        <a:rPr lang="en-US" b="1" i="1" smtClean="0">
+                          <a:solidFill>
+                            <a:schemeClr val="tx1"/>
+                          </a:solidFill>
+                          <a:latin typeface="Cambria Math" panose="02040503050406030204" pitchFamily="18" charset="0"/>
+                        </a:rPr>
+                        <m:t>𝑿</m:t>
+                      </m:r>
+                    </m:oMath>
+                  </m:oMathPara>
+                </a14:m>
+                <a:endParaRPr lang="en-US" b="1" dirty="0">
+                  <a:solidFill>
+                    <a:schemeClr val="tx1"/>
+                  </a:solidFill>
+                </a:endParaRPr>
+              </a:p>
+            </p:txBody>
+          </p:sp>
+        </mc:Choice>
+        <mc:Fallback>
+          <p:sp>
+            <p:nvSpPr>
+              <p:cNvPr id="26" name="TextBox 25">
+                <a:extLst>
+                  <a:ext uri="{FF2B5EF4-FFF2-40B4-BE49-F238E27FC236}">
+                    <a16:creationId xmlns:a16="http://schemas.microsoft.com/office/drawing/2014/main" id="{7F93BDE7-A731-C302-19A1-DCAFA5C13CF4}"/>
+                  </a:ext>
+                </a:extLst>
+              </p:cNvPr>
+              <p:cNvSpPr txBox="1">
+                <a:spLocks noRot="1" noChangeAspect="1" noMove="1" noResize="1" noEditPoints="1" noAdjustHandles="1" noChangeArrowheads="1" noChangeShapeType="1" noTextEdit="1"/>
+              </p:cNvSpPr>
+              <p:nvPr/>
+            </p:nvSpPr>
+            <p:spPr>
+              <a:xfrm>
+                <a:off x="9681954" y="5796407"/>
+                <a:ext cx="807396" cy="369332"/>
+              </a:xfrm>
+              <a:prstGeom prst="rect">
+                <a:avLst/>
+              </a:prstGeom>
+              <a:blipFill>
+                <a:blip r:embed="rId2"/>
+                <a:stretch>
+                  <a:fillRect/>
+                </a:stretch>
+              </a:blipFill>
+            </p:spPr>
+            <p:txBody>
+              <a:bodyPr/>
+              <a:lstStyle/>
+              <a:p>
+                <a:r>
+                  <a:rPr lang="en-US">
+                    <a:noFill/>
+                  </a:rPr>
+                  <a:t> </a:t>
+                </a:r>
+              </a:p>
+            </p:txBody>
+          </p:sp>
+        </mc:Fallback>
+      </mc:AlternateContent>
+      <mc:AlternateContent xmlns:mc="http://schemas.openxmlformats.org/markup-compatibility/2006">
+        <mc:Choice xmlns:a14="http://schemas.microsoft.com/office/drawing/2010/main" Requires="a14">
+          <p:sp>
+            <p:nvSpPr>
+              <p:cNvPr id="27" name="TextBox 26">
+                <a:extLst>
+                  <a:ext uri="{FF2B5EF4-FFF2-40B4-BE49-F238E27FC236}">
+                    <a16:creationId xmlns:a16="http://schemas.microsoft.com/office/drawing/2014/main" id="{0DDA7B57-B430-94C9-FFC6-65F76A85F963}"/>
+                  </a:ext>
+                </a:extLst>
+              </p:cNvPr>
+              <p:cNvSpPr txBox="1"/>
+              <p:nvPr/>
+            </p:nvSpPr>
+            <p:spPr>
+              <a:xfrm>
+                <a:off x="1645109" y="210640"/>
+                <a:ext cx="807396" cy="369332"/>
+              </a:xfrm>
+              <a:prstGeom prst="rect">
+                <a:avLst/>
+              </a:prstGeom>
+              <a:noFill/>
+            </p:spPr>
+            <p:txBody>
+              <a:bodyPr wrap="square" rtlCol="0">
+                <a:spAutoFit/>
+              </a:bodyPr>
+              <a:lstStyle/>
+              <a:p>
+                <a:pPr/>
+                <a14:m>
+                  <m:oMathPara xmlns:m="http://schemas.openxmlformats.org/officeDocument/2006/math">
+                    <m:oMathParaPr>
+                      <m:jc m:val="centerGroup"/>
+                    </m:oMathParaPr>
+                    <m:oMath xmlns:m="http://schemas.openxmlformats.org/officeDocument/2006/math">
+                      <m:r>
+                        <a:rPr lang="en-US" b="1" i="1" smtClean="0">
+                          <a:solidFill>
+                            <a:schemeClr val="tx1"/>
+                          </a:solidFill>
+                          <a:latin typeface="Cambria Math" panose="02040503050406030204" pitchFamily="18" charset="0"/>
+                        </a:rPr>
+                        <m:t>𝒀</m:t>
+                      </m:r>
+                    </m:oMath>
+                  </m:oMathPara>
+                </a14:m>
+                <a:endParaRPr lang="en-US" b="1" dirty="0">
+                  <a:solidFill>
+                    <a:schemeClr val="tx1"/>
+                  </a:solidFill>
+                </a:endParaRPr>
+              </a:p>
+            </p:txBody>
+          </p:sp>
+        </mc:Choice>
+        <mc:Fallback>
+          <p:sp>
+            <p:nvSpPr>
+              <p:cNvPr id="27" name="TextBox 26">
+                <a:extLst>
+                  <a:ext uri="{FF2B5EF4-FFF2-40B4-BE49-F238E27FC236}">
+                    <a16:creationId xmlns:a16="http://schemas.microsoft.com/office/drawing/2014/main" id="{0DDA7B57-B430-94C9-FFC6-65F76A85F963}"/>
+                  </a:ext>
+                </a:extLst>
+              </p:cNvPr>
+              <p:cNvSpPr txBox="1">
+                <a:spLocks noRot="1" noChangeAspect="1" noMove="1" noResize="1" noEditPoints="1" noAdjustHandles="1" noChangeArrowheads="1" noChangeShapeType="1" noTextEdit="1"/>
+              </p:cNvSpPr>
+              <p:nvPr/>
+            </p:nvSpPr>
+            <p:spPr>
+              <a:xfrm>
+                <a:off x="1645109" y="210640"/>
+                <a:ext cx="807396" cy="369332"/>
+              </a:xfrm>
+              <a:prstGeom prst="rect">
+                <a:avLst/>
+              </a:prstGeom>
+              <a:blipFill>
+                <a:blip r:embed="rId3"/>
+                <a:stretch>
+                  <a:fillRect/>
+                </a:stretch>
+              </a:blipFill>
+            </p:spPr>
+            <p:txBody>
+              <a:bodyPr/>
+              <a:lstStyle/>
+              <a:p>
+                <a:r>
+                  <a:rPr lang="en-US">
+                    <a:noFill/>
+                  </a:rPr>
+                  <a:t> </a:t>
+                </a:r>
+              </a:p>
+            </p:txBody>
+          </p:sp>
+        </mc:Fallback>
+      </mc:AlternateContent>
+      <p:cxnSp>
+        <p:nvCxnSpPr>
+          <p:cNvPr id="8" name="Straight Connector 7">
+            <a:extLst>
+              <a:ext uri="{FF2B5EF4-FFF2-40B4-BE49-F238E27FC236}">
+                <a16:creationId xmlns:a16="http://schemas.microsoft.com/office/drawing/2014/main" id="{B16F4518-E948-C3F6-AAE1-784E53A694CC}"/>
+              </a:ext>
+            </a:extLst>
+          </p:cNvPr>
+          <p:cNvCxnSpPr>
+            <a:cxnSpLocks/>
+          </p:cNvCxnSpPr>
+          <p:nvPr/>
+        </p:nvCxnSpPr>
+        <p:spPr>
+          <a:xfrm>
+            <a:off x="2286000" y="1544715"/>
+            <a:ext cx="5816600" cy="4430635"/>
+          </a:xfrm>
+          <a:prstGeom prst="line">
+            <a:avLst/>
+          </a:prstGeom>
+          <a:ln w="38100">
+            <a:solidFill>
+              <a:schemeClr val="accent6"/>
+            </a:solidFill>
+          </a:ln>
+        </p:spPr>
+        <p:style>
+          <a:lnRef idx="1">
+            <a:schemeClr val="accent1"/>
+          </a:lnRef>
+          <a:fillRef idx="0">
+            <a:schemeClr val="accent1"/>
+          </a:fillRef>
+          <a:effectRef idx="0">
+            <a:schemeClr val="accent1"/>
+          </a:effectRef>
+          <a:fontRef idx="minor">
+            <a:schemeClr val="tx1"/>
+          </a:fontRef>
+        </p:style>
+      </p:cxnSp>
+      <mc:AlternateContent xmlns:mc="http://schemas.openxmlformats.org/markup-compatibility/2006">
+        <mc:Choice xmlns:a14="http://schemas.microsoft.com/office/drawing/2010/main" Requires="a14">
+          <p:sp>
+            <p:nvSpPr>
+              <p:cNvPr id="15" name="TextBox 14">
+                <a:extLst>
+                  <a:ext uri="{FF2B5EF4-FFF2-40B4-BE49-F238E27FC236}">
+                    <a16:creationId xmlns:a16="http://schemas.microsoft.com/office/drawing/2014/main" id="{5E296CC9-8ED3-C80C-2298-0927D064BF83}"/>
+                  </a:ext>
+                </a:extLst>
+              </p:cNvPr>
+              <p:cNvSpPr txBox="1"/>
+              <p:nvPr/>
+            </p:nvSpPr>
+            <p:spPr>
+              <a:xfrm>
+                <a:off x="7698901" y="6032627"/>
+                <a:ext cx="807396" cy="657552"/>
+              </a:xfrm>
+              <a:prstGeom prst="rect">
+                <a:avLst/>
+              </a:prstGeom>
+              <a:noFill/>
+            </p:spPr>
+            <p:txBody>
+              <a:bodyPr wrap="square" rtlCol="0">
+                <a:spAutoFit/>
+              </a:bodyPr>
+              <a:lstStyle/>
+              <a:p>
+                <a:pPr/>
+                <a14:m>
+                  <m:oMathPara xmlns:m="http://schemas.openxmlformats.org/officeDocument/2006/math">
+                    <m:oMathParaPr>
+                      <m:jc m:val="centerGroup"/>
+                    </m:oMathParaPr>
+                    <m:oMath xmlns:m="http://schemas.openxmlformats.org/officeDocument/2006/math">
+                      <m:f>
+                        <m:fPr>
+                          <m:ctrlPr>
+                            <a:rPr lang="en-US" b="1" i="1" smtClean="0">
+                              <a:solidFill>
+                                <a:schemeClr val="tx1"/>
+                              </a:solidFill>
+                              <a:latin typeface="Cambria Math" panose="02040503050406030204" pitchFamily="18" charset="0"/>
+                            </a:rPr>
+                          </m:ctrlPr>
+                        </m:fPr>
+                        <m:num>
+                          <m:r>
+                            <a:rPr lang="en-US" b="1" i="1" smtClean="0">
+                              <a:solidFill>
+                                <a:schemeClr val="tx1"/>
+                              </a:solidFill>
+                              <a:latin typeface="Cambria Math" panose="02040503050406030204" pitchFamily="18" charset="0"/>
+                            </a:rPr>
+                            <m:t>𝑴</m:t>
+                          </m:r>
+                        </m:num>
+                        <m:den>
+                          <m:sSub>
+                            <m:sSubPr>
+                              <m:ctrlPr>
+                                <a:rPr lang="en-US" b="1" i="1" smtClean="0">
+                                  <a:solidFill>
+                                    <a:schemeClr val="tx1"/>
+                                  </a:solidFill>
+                                  <a:latin typeface="Cambria Math" panose="02040503050406030204" pitchFamily="18" charset="0"/>
+                                </a:rPr>
+                              </m:ctrlPr>
+                            </m:sSubPr>
+                            <m:e>
+                              <m:r>
+                                <a:rPr lang="en-US" b="1" i="1" smtClean="0">
+                                  <a:solidFill>
+                                    <a:schemeClr val="tx1"/>
+                                  </a:solidFill>
+                                  <a:latin typeface="Cambria Math" panose="02040503050406030204" pitchFamily="18" charset="0"/>
+                                </a:rPr>
+                                <m:t>𝑷</m:t>
+                              </m:r>
+                            </m:e>
+                            <m:sub>
+                              <m:r>
+                                <a:rPr lang="en-US" b="1" i="1" smtClean="0">
+                                  <a:solidFill>
+                                    <a:schemeClr val="tx1"/>
+                                  </a:solidFill>
+                                  <a:latin typeface="Cambria Math" panose="02040503050406030204" pitchFamily="18" charset="0"/>
+                                </a:rPr>
+                                <m:t>𝒙</m:t>
+                              </m:r>
+                            </m:sub>
+                          </m:sSub>
+                        </m:den>
+                      </m:f>
+                    </m:oMath>
+                  </m:oMathPara>
+                </a14:m>
+                <a:endParaRPr lang="en-US" b="1" dirty="0">
+                  <a:solidFill>
+                    <a:schemeClr val="tx1"/>
+                  </a:solidFill>
+                </a:endParaRPr>
+              </a:p>
+            </p:txBody>
+          </p:sp>
+        </mc:Choice>
+        <mc:Fallback>
+          <p:sp>
+            <p:nvSpPr>
+              <p:cNvPr id="15" name="TextBox 14">
+                <a:extLst>
+                  <a:ext uri="{FF2B5EF4-FFF2-40B4-BE49-F238E27FC236}">
+                    <a16:creationId xmlns:a16="http://schemas.microsoft.com/office/drawing/2014/main" id="{5E296CC9-8ED3-C80C-2298-0927D064BF83}"/>
+                  </a:ext>
+                </a:extLst>
+              </p:cNvPr>
+              <p:cNvSpPr txBox="1">
+                <a:spLocks noRot="1" noChangeAspect="1" noMove="1" noResize="1" noEditPoints="1" noAdjustHandles="1" noChangeArrowheads="1" noChangeShapeType="1" noTextEdit="1"/>
+              </p:cNvSpPr>
+              <p:nvPr/>
+            </p:nvSpPr>
+            <p:spPr>
+              <a:xfrm>
+                <a:off x="7698901" y="6032627"/>
+                <a:ext cx="807396" cy="657552"/>
+              </a:xfrm>
+              <a:prstGeom prst="rect">
+                <a:avLst/>
+              </a:prstGeom>
+              <a:blipFill>
+                <a:blip r:embed="rId4"/>
+                <a:stretch>
+                  <a:fillRect/>
+                </a:stretch>
+              </a:blipFill>
+            </p:spPr>
+            <p:txBody>
+              <a:bodyPr/>
+              <a:lstStyle/>
+              <a:p>
+                <a:r>
+                  <a:rPr lang="en-US">
+                    <a:noFill/>
+                  </a:rPr>
+                  <a:t> </a:t>
+                </a:r>
+              </a:p>
+            </p:txBody>
+          </p:sp>
+        </mc:Fallback>
+      </mc:AlternateContent>
+      <mc:AlternateContent xmlns:mc="http://schemas.openxmlformats.org/markup-compatibility/2006">
+        <mc:Choice xmlns:a14="http://schemas.microsoft.com/office/drawing/2010/main" Requires="a14">
+          <p:sp>
+            <p:nvSpPr>
+              <p:cNvPr id="16" name="TextBox 15">
+                <a:extLst>
+                  <a:ext uri="{FF2B5EF4-FFF2-40B4-BE49-F238E27FC236}">
+                    <a16:creationId xmlns:a16="http://schemas.microsoft.com/office/drawing/2014/main" id="{ECC1AEE7-E434-1760-5BD5-630C90A0234A}"/>
+                  </a:ext>
+                </a:extLst>
+              </p:cNvPr>
+              <p:cNvSpPr txBox="1"/>
+              <p:nvPr/>
+            </p:nvSpPr>
+            <p:spPr>
+              <a:xfrm>
+                <a:off x="1585632" y="1198626"/>
+                <a:ext cx="807396" cy="692177"/>
+              </a:xfrm>
+              <a:prstGeom prst="rect">
+                <a:avLst/>
+              </a:prstGeom>
+              <a:noFill/>
+            </p:spPr>
+            <p:txBody>
+              <a:bodyPr wrap="square" rtlCol="0">
+                <a:spAutoFit/>
+              </a:bodyPr>
+              <a:lstStyle/>
+              <a:p>
+                <a:pPr/>
+                <a14:m>
+                  <m:oMathPara xmlns:m="http://schemas.openxmlformats.org/officeDocument/2006/math">
+                    <m:oMathParaPr>
+                      <m:jc m:val="centerGroup"/>
+                    </m:oMathParaPr>
+                    <m:oMath xmlns:m="http://schemas.openxmlformats.org/officeDocument/2006/math">
+                      <m:f>
+                        <m:fPr>
+                          <m:ctrlPr>
+                            <a:rPr lang="en-US" b="1" i="1" smtClean="0">
+                              <a:solidFill>
+                                <a:schemeClr val="tx1"/>
+                              </a:solidFill>
+                              <a:latin typeface="Cambria Math" panose="02040503050406030204" pitchFamily="18" charset="0"/>
+                            </a:rPr>
+                          </m:ctrlPr>
+                        </m:fPr>
+                        <m:num>
+                          <m:r>
+                            <a:rPr lang="en-US" b="1" i="1" smtClean="0">
+                              <a:solidFill>
+                                <a:schemeClr val="tx1"/>
+                              </a:solidFill>
+                              <a:latin typeface="Cambria Math" panose="02040503050406030204" pitchFamily="18" charset="0"/>
+                            </a:rPr>
+                            <m:t>𝑴</m:t>
+                          </m:r>
+                        </m:num>
+                        <m:den>
+                          <m:sSub>
+                            <m:sSubPr>
+                              <m:ctrlPr>
+                                <a:rPr lang="en-US" b="1" i="1" smtClean="0">
+                                  <a:solidFill>
+                                    <a:schemeClr val="tx1"/>
+                                  </a:solidFill>
+                                  <a:latin typeface="Cambria Math" panose="02040503050406030204" pitchFamily="18" charset="0"/>
+                                </a:rPr>
+                              </m:ctrlPr>
+                            </m:sSubPr>
+                            <m:e>
+                              <m:r>
+                                <a:rPr lang="en-US" b="1" i="1" smtClean="0">
+                                  <a:solidFill>
+                                    <a:schemeClr val="tx1"/>
+                                  </a:solidFill>
+                                  <a:latin typeface="Cambria Math" panose="02040503050406030204" pitchFamily="18" charset="0"/>
+                                </a:rPr>
+                                <m:t>𝑷</m:t>
+                              </m:r>
+                            </m:e>
+                            <m:sub>
+                              <m:r>
+                                <a:rPr lang="en-US" b="1" i="1" smtClean="0">
+                                  <a:solidFill>
+                                    <a:schemeClr val="tx1"/>
+                                  </a:solidFill>
+                                  <a:latin typeface="Cambria Math" panose="02040503050406030204" pitchFamily="18" charset="0"/>
+                                </a:rPr>
+                                <m:t>𝒚</m:t>
+                              </m:r>
+                            </m:sub>
+                          </m:sSub>
+                        </m:den>
+                      </m:f>
+                    </m:oMath>
+                  </m:oMathPara>
+                </a14:m>
+                <a:endParaRPr lang="en-US" b="1" dirty="0">
+                  <a:solidFill>
+                    <a:schemeClr val="tx1"/>
+                  </a:solidFill>
+                </a:endParaRPr>
+              </a:p>
+            </p:txBody>
+          </p:sp>
+        </mc:Choice>
+        <mc:Fallback>
+          <p:sp>
+            <p:nvSpPr>
+              <p:cNvPr id="16" name="TextBox 15">
+                <a:extLst>
+                  <a:ext uri="{FF2B5EF4-FFF2-40B4-BE49-F238E27FC236}">
+                    <a16:creationId xmlns:a16="http://schemas.microsoft.com/office/drawing/2014/main" id="{ECC1AEE7-E434-1760-5BD5-630C90A0234A}"/>
+                  </a:ext>
+                </a:extLst>
+              </p:cNvPr>
+              <p:cNvSpPr txBox="1">
+                <a:spLocks noRot="1" noChangeAspect="1" noMove="1" noResize="1" noEditPoints="1" noAdjustHandles="1" noChangeArrowheads="1" noChangeShapeType="1" noTextEdit="1"/>
+              </p:cNvSpPr>
+              <p:nvPr/>
+            </p:nvSpPr>
+            <p:spPr>
+              <a:xfrm>
+                <a:off x="1585632" y="1198626"/>
+                <a:ext cx="807396" cy="692177"/>
+              </a:xfrm>
+              <a:prstGeom prst="rect">
+                <a:avLst/>
+              </a:prstGeom>
+              <a:blipFill>
+                <a:blip r:embed="rId5"/>
+                <a:stretch>
+                  <a:fillRect/>
+                </a:stretch>
+              </a:blipFill>
+            </p:spPr>
+            <p:txBody>
+              <a:bodyPr/>
+              <a:lstStyle/>
+              <a:p>
+                <a:r>
+                  <a:rPr lang="en-US">
+                    <a:noFill/>
+                  </a:rPr>
+                  <a:t> </a:t>
+                </a:r>
+              </a:p>
+            </p:txBody>
+          </p:sp>
+        </mc:Fallback>
+      </mc:AlternateContent>
+      <p:cxnSp>
+        <p:nvCxnSpPr>
+          <p:cNvPr id="2" name="Straight Connector 1">
+            <a:extLst>
+              <a:ext uri="{FF2B5EF4-FFF2-40B4-BE49-F238E27FC236}">
+                <a16:creationId xmlns:a16="http://schemas.microsoft.com/office/drawing/2014/main" id="{EF31A2F2-A117-2BE4-2D65-13043E037080}"/>
+              </a:ext>
+            </a:extLst>
+          </p:cNvPr>
+          <p:cNvCxnSpPr>
+            <a:cxnSpLocks/>
+          </p:cNvCxnSpPr>
+          <p:nvPr/>
+        </p:nvCxnSpPr>
+        <p:spPr>
+          <a:xfrm>
+            <a:off x="2285999" y="1544714"/>
+            <a:ext cx="4167210" cy="4430636"/>
+          </a:xfrm>
+          <a:prstGeom prst="line">
+            <a:avLst/>
+          </a:prstGeom>
+          <a:ln w="38100"/>
+        </p:spPr>
+        <p:style>
+          <a:lnRef idx="1">
+            <a:schemeClr val="accent1"/>
+          </a:lnRef>
+          <a:fillRef idx="0">
+            <a:schemeClr val="accent1"/>
+          </a:fillRef>
+          <a:effectRef idx="0">
+            <a:schemeClr val="accent1"/>
+          </a:effectRef>
+          <a:fontRef idx="minor">
+            <a:schemeClr val="tx1"/>
+          </a:fontRef>
+        </p:style>
+      </p:cxnSp>
+      <p:cxnSp>
+        <p:nvCxnSpPr>
+          <p:cNvPr id="4" name="Straight Connector 3">
+            <a:extLst>
+              <a:ext uri="{FF2B5EF4-FFF2-40B4-BE49-F238E27FC236}">
+                <a16:creationId xmlns:a16="http://schemas.microsoft.com/office/drawing/2014/main" id="{4EC7C22C-F756-AEAC-81D1-9C763D58E603}"/>
+              </a:ext>
+            </a:extLst>
+          </p:cNvPr>
+          <p:cNvCxnSpPr>
+            <a:cxnSpLocks/>
+          </p:cNvCxnSpPr>
+          <p:nvPr/>
+        </p:nvCxnSpPr>
+        <p:spPr>
+          <a:xfrm>
+            <a:off x="2285999" y="1544714"/>
+            <a:ext cx="2083605" cy="4430636"/>
+          </a:xfrm>
+          <a:prstGeom prst="line">
+            <a:avLst/>
+          </a:prstGeom>
+          <a:ln w="38100">
+            <a:solidFill>
+              <a:schemeClr val="accent2"/>
+            </a:solidFill>
+          </a:ln>
+        </p:spPr>
+        <p:style>
+          <a:lnRef idx="1">
+            <a:schemeClr val="accent1"/>
+          </a:lnRef>
+          <a:fillRef idx="0">
+            <a:schemeClr val="accent1"/>
+          </a:fillRef>
+          <a:effectRef idx="0">
+            <a:schemeClr val="accent1"/>
+          </a:effectRef>
+          <a:fontRef idx="minor">
+            <a:schemeClr val="tx1"/>
+          </a:fontRef>
+        </p:style>
+      </p:cxnSp>
+      <mc:AlternateContent xmlns:mc="http://schemas.openxmlformats.org/markup-compatibility/2006">
+        <mc:Choice xmlns:a14="http://schemas.microsoft.com/office/drawing/2010/main" Requires="a14">
+          <p:sp>
+            <p:nvSpPr>
+              <p:cNvPr id="7" name="TextBox 6">
+                <a:extLst>
+                  <a:ext uri="{FF2B5EF4-FFF2-40B4-BE49-F238E27FC236}">
+                    <a16:creationId xmlns:a16="http://schemas.microsoft.com/office/drawing/2014/main" id="{0BC3A4DA-9F52-F1F8-93EC-F1A1A1F31CF2}"/>
+                  </a:ext>
+                </a:extLst>
+              </p:cNvPr>
+              <p:cNvSpPr txBox="1"/>
+              <p:nvPr/>
+            </p:nvSpPr>
+            <p:spPr>
+              <a:xfrm>
+                <a:off x="6049511" y="6032627"/>
+                <a:ext cx="807396" cy="657552"/>
+              </a:xfrm>
+              <a:prstGeom prst="rect">
+                <a:avLst/>
+              </a:prstGeom>
+              <a:noFill/>
+            </p:spPr>
+            <p:txBody>
+              <a:bodyPr wrap="square" rtlCol="0">
+                <a:spAutoFit/>
+              </a:bodyPr>
+              <a:lstStyle/>
+              <a:p>
+                <a:pPr/>
+                <a14:m>
+                  <m:oMathPara xmlns:m="http://schemas.openxmlformats.org/officeDocument/2006/math">
+                    <m:oMathParaPr>
+                      <m:jc m:val="centerGroup"/>
+                    </m:oMathParaPr>
+                    <m:oMath xmlns:m="http://schemas.openxmlformats.org/officeDocument/2006/math">
+                      <m:f>
+                        <m:fPr>
+                          <m:ctrlPr>
+                            <a:rPr lang="en-US" b="1" i="1" smtClean="0">
+                              <a:solidFill>
+                                <a:schemeClr val="tx1"/>
+                              </a:solidFill>
+                              <a:latin typeface="Cambria Math" panose="02040503050406030204" pitchFamily="18" charset="0"/>
+                            </a:rPr>
+                          </m:ctrlPr>
+                        </m:fPr>
+                        <m:num>
+                          <m:r>
+                            <a:rPr lang="en-US" b="1" i="1" smtClean="0">
+                              <a:solidFill>
+                                <a:schemeClr val="tx1"/>
+                              </a:solidFill>
+                              <a:latin typeface="Cambria Math" panose="02040503050406030204" pitchFamily="18" charset="0"/>
+                            </a:rPr>
+                            <m:t>𝑴</m:t>
+                          </m:r>
+                        </m:num>
+                        <m:den>
+                          <m:sSub>
+                            <m:sSubPr>
+                              <m:ctrlPr>
+                                <a:rPr lang="en-US" b="1" i="1" smtClean="0">
+                                  <a:solidFill>
+                                    <a:schemeClr val="tx1"/>
+                                  </a:solidFill>
+                                  <a:latin typeface="Cambria Math" panose="02040503050406030204" pitchFamily="18" charset="0"/>
+                                </a:rPr>
+                              </m:ctrlPr>
+                            </m:sSubPr>
+                            <m:e>
+                              <m:r>
+                                <a:rPr lang="en-US" b="1" i="1" smtClean="0">
+                                  <a:solidFill>
+                                    <a:schemeClr val="tx1"/>
+                                  </a:solidFill>
+                                  <a:latin typeface="Cambria Math" panose="02040503050406030204" pitchFamily="18" charset="0"/>
+                                </a:rPr>
+                                <m:t>𝑷</m:t>
+                              </m:r>
+                            </m:e>
+                            <m:sub>
+                              <m:r>
+                                <a:rPr lang="en-US" b="1" i="1" smtClean="0">
+                                  <a:solidFill>
+                                    <a:schemeClr val="tx1"/>
+                                  </a:solidFill>
+                                  <a:latin typeface="Cambria Math" panose="02040503050406030204" pitchFamily="18" charset="0"/>
+                                </a:rPr>
+                                <m:t>𝒙</m:t>
+                              </m:r>
+                            </m:sub>
+                          </m:sSub>
+                        </m:den>
+                      </m:f>
+                    </m:oMath>
+                  </m:oMathPara>
+                </a14:m>
+                <a:endParaRPr lang="en-US" b="1" dirty="0">
+                  <a:solidFill>
+                    <a:schemeClr val="tx1"/>
+                  </a:solidFill>
+                </a:endParaRPr>
+              </a:p>
+            </p:txBody>
+          </p:sp>
+        </mc:Choice>
+        <mc:Fallback>
+          <p:sp>
+            <p:nvSpPr>
+              <p:cNvPr id="7" name="TextBox 6">
+                <a:extLst>
+                  <a:ext uri="{FF2B5EF4-FFF2-40B4-BE49-F238E27FC236}">
+                    <a16:creationId xmlns:a16="http://schemas.microsoft.com/office/drawing/2014/main" id="{0BC3A4DA-9F52-F1F8-93EC-F1A1A1F31CF2}"/>
+                  </a:ext>
+                </a:extLst>
+              </p:cNvPr>
+              <p:cNvSpPr txBox="1">
+                <a:spLocks noRot="1" noChangeAspect="1" noMove="1" noResize="1" noEditPoints="1" noAdjustHandles="1" noChangeArrowheads="1" noChangeShapeType="1" noTextEdit="1"/>
+              </p:cNvSpPr>
+              <p:nvPr/>
+            </p:nvSpPr>
+            <p:spPr>
+              <a:xfrm>
+                <a:off x="6049511" y="6032627"/>
+                <a:ext cx="807396" cy="657552"/>
+              </a:xfrm>
+              <a:prstGeom prst="rect">
+                <a:avLst/>
+              </a:prstGeom>
+              <a:blipFill>
+                <a:blip r:embed="rId6"/>
+                <a:stretch>
+                  <a:fillRect/>
+                </a:stretch>
+              </a:blipFill>
+            </p:spPr>
+            <p:txBody>
+              <a:bodyPr/>
+              <a:lstStyle/>
+              <a:p>
+                <a:r>
+                  <a:rPr lang="en-US">
+                    <a:noFill/>
+                  </a:rPr>
+                  <a:t> </a:t>
+                </a:r>
+              </a:p>
+            </p:txBody>
+          </p:sp>
+        </mc:Fallback>
+      </mc:AlternateContent>
+      <mc:AlternateContent xmlns:mc="http://schemas.openxmlformats.org/markup-compatibility/2006">
+        <mc:Choice xmlns:a14="http://schemas.microsoft.com/office/drawing/2010/main" Requires="a14">
+          <p:sp>
+            <p:nvSpPr>
+              <p:cNvPr id="9" name="TextBox 8">
+                <a:extLst>
+                  <a:ext uri="{FF2B5EF4-FFF2-40B4-BE49-F238E27FC236}">
+                    <a16:creationId xmlns:a16="http://schemas.microsoft.com/office/drawing/2014/main" id="{F85F37D3-1F3F-75A2-4519-A8C0982570EA}"/>
+                  </a:ext>
+                </a:extLst>
+              </p:cNvPr>
+              <p:cNvSpPr txBox="1"/>
+              <p:nvPr/>
+            </p:nvSpPr>
+            <p:spPr>
+              <a:xfrm>
+                <a:off x="3965906" y="6032627"/>
+                <a:ext cx="807396" cy="657552"/>
+              </a:xfrm>
+              <a:prstGeom prst="rect">
+                <a:avLst/>
+              </a:prstGeom>
+              <a:noFill/>
+            </p:spPr>
+            <p:txBody>
+              <a:bodyPr wrap="square" rtlCol="0">
+                <a:spAutoFit/>
+              </a:bodyPr>
+              <a:lstStyle/>
+              <a:p>
+                <a:pPr/>
+                <a14:m>
+                  <m:oMathPara xmlns:m="http://schemas.openxmlformats.org/officeDocument/2006/math">
+                    <m:oMathParaPr>
+                      <m:jc m:val="centerGroup"/>
+                    </m:oMathParaPr>
+                    <m:oMath xmlns:m="http://schemas.openxmlformats.org/officeDocument/2006/math">
+                      <m:f>
+                        <m:fPr>
+                          <m:ctrlPr>
+                            <a:rPr lang="en-US" b="1" i="1" smtClean="0">
+                              <a:solidFill>
+                                <a:schemeClr val="tx1"/>
+                              </a:solidFill>
+                              <a:latin typeface="Cambria Math" panose="02040503050406030204" pitchFamily="18" charset="0"/>
+                            </a:rPr>
+                          </m:ctrlPr>
+                        </m:fPr>
+                        <m:num>
+                          <m:r>
+                            <a:rPr lang="en-US" b="1" i="1" smtClean="0">
+                              <a:solidFill>
+                                <a:schemeClr val="tx1"/>
+                              </a:solidFill>
+                              <a:latin typeface="Cambria Math" panose="02040503050406030204" pitchFamily="18" charset="0"/>
+                            </a:rPr>
+                            <m:t>𝑴</m:t>
+                          </m:r>
+                        </m:num>
+                        <m:den>
+                          <m:sSub>
+                            <m:sSubPr>
+                              <m:ctrlPr>
+                                <a:rPr lang="en-US" b="1" i="1" smtClean="0">
+                                  <a:solidFill>
+                                    <a:schemeClr val="tx1"/>
+                                  </a:solidFill>
+                                  <a:latin typeface="Cambria Math" panose="02040503050406030204" pitchFamily="18" charset="0"/>
+                                </a:rPr>
+                              </m:ctrlPr>
+                            </m:sSubPr>
+                            <m:e>
+                              <m:r>
+                                <a:rPr lang="en-US" b="1" i="1" smtClean="0">
+                                  <a:solidFill>
+                                    <a:schemeClr val="tx1"/>
+                                  </a:solidFill>
+                                  <a:latin typeface="Cambria Math" panose="02040503050406030204" pitchFamily="18" charset="0"/>
+                                </a:rPr>
+                                <m:t>𝑷</m:t>
+                              </m:r>
+                            </m:e>
+                            <m:sub>
+                              <m:r>
+                                <a:rPr lang="en-US" b="1" i="1" smtClean="0">
+                                  <a:solidFill>
+                                    <a:schemeClr val="tx1"/>
+                                  </a:solidFill>
+                                  <a:latin typeface="Cambria Math" panose="02040503050406030204" pitchFamily="18" charset="0"/>
+                                </a:rPr>
+                                <m:t>𝒙</m:t>
+                              </m:r>
+                            </m:sub>
+                          </m:sSub>
+                        </m:den>
+                      </m:f>
+                    </m:oMath>
+                  </m:oMathPara>
+                </a14:m>
+                <a:endParaRPr lang="en-US" b="1" dirty="0">
+                  <a:solidFill>
+                    <a:schemeClr val="tx1"/>
+                  </a:solidFill>
+                </a:endParaRPr>
+              </a:p>
+            </p:txBody>
+          </p:sp>
+        </mc:Choice>
+        <mc:Fallback>
+          <p:sp>
+            <p:nvSpPr>
+              <p:cNvPr id="9" name="TextBox 8">
+                <a:extLst>
+                  <a:ext uri="{FF2B5EF4-FFF2-40B4-BE49-F238E27FC236}">
+                    <a16:creationId xmlns:a16="http://schemas.microsoft.com/office/drawing/2014/main" id="{F85F37D3-1F3F-75A2-4519-A8C0982570EA}"/>
+                  </a:ext>
+                </a:extLst>
+              </p:cNvPr>
+              <p:cNvSpPr txBox="1">
+                <a:spLocks noRot="1" noChangeAspect="1" noMove="1" noResize="1" noEditPoints="1" noAdjustHandles="1" noChangeArrowheads="1" noChangeShapeType="1" noTextEdit="1"/>
+              </p:cNvSpPr>
+              <p:nvPr/>
+            </p:nvSpPr>
+            <p:spPr>
+              <a:xfrm>
+                <a:off x="3965906" y="6032627"/>
+                <a:ext cx="807396" cy="657552"/>
+              </a:xfrm>
+              <a:prstGeom prst="rect">
+                <a:avLst/>
+              </a:prstGeom>
+              <a:blipFill>
+                <a:blip r:embed="rId7"/>
+                <a:stretch>
+                  <a:fillRect/>
+                </a:stretch>
+              </a:blipFill>
+            </p:spPr>
+            <p:txBody>
+              <a:bodyPr/>
+              <a:lstStyle/>
+              <a:p>
+                <a:r>
+                  <a:rPr lang="en-US">
+                    <a:noFill/>
+                  </a:rPr>
+                  <a:t> </a:t>
+                </a:r>
+              </a:p>
+            </p:txBody>
+          </p:sp>
+        </mc:Fallback>
+      </mc:AlternateContent>
+      <mc:AlternateContent xmlns:mc="http://schemas.openxmlformats.org/markup-compatibility/2006">
+        <mc:Choice xmlns:a14="http://schemas.microsoft.com/office/drawing/2010/main" Requires="a14">
+          <p:sp>
+            <p:nvSpPr>
+              <p:cNvPr id="10" name="TextBox 9">
+                <a:extLst>
+                  <a:ext uri="{FF2B5EF4-FFF2-40B4-BE49-F238E27FC236}">
+                    <a16:creationId xmlns:a16="http://schemas.microsoft.com/office/drawing/2014/main" id="{F0D09E51-0C6C-A8D4-EC24-D1A8DB26C74E}"/>
+                  </a:ext>
+                </a:extLst>
+              </p:cNvPr>
+              <p:cNvSpPr txBox="1"/>
+              <p:nvPr/>
+            </p:nvSpPr>
+            <p:spPr>
+              <a:xfrm>
+                <a:off x="4193125" y="5280775"/>
+                <a:ext cx="1160353" cy="523220"/>
+              </a:xfrm>
+              <a:prstGeom prst="rect">
+                <a:avLst/>
+              </a:prstGeom>
+              <a:noFill/>
+            </p:spPr>
+            <p:txBody>
+              <a:bodyPr wrap="square" rtlCol="0">
+                <a:spAutoFit/>
+              </a:bodyPr>
+              <a:lstStyle/>
+              <a:p>
+                <a:pPr/>
+                <a14:m>
+                  <m:oMathPara xmlns:m="http://schemas.openxmlformats.org/officeDocument/2006/math">
+                    <m:oMathParaPr>
+                      <m:jc m:val="centerGroup"/>
+                    </m:oMathParaPr>
+                    <m:oMath xmlns:m="http://schemas.openxmlformats.org/officeDocument/2006/math">
+                      <m:sSub>
+                        <m:sSubPr>
+                          <m:ctrlPr>
+                            <a:rPr lang="en-US" sz="2800" b="1" i="1" smtClean="0">
+                              <a:solidFill>
+                                <a:schemeClr val="accent2"/>
+                              </a:solidFill>
+                              <a:latin typeface="Cambria Math" panose="02040503050406030204" pitchFamily="18" charset="0"/>
+                            </a:rPr>
+                          </m:ctrlPr>
+                        </m:sSubPr>
+                        <m:e>
+                          <m:r>
+                            <a:rPr lang="en-US" sz="2800" b="1" i="1" smtClean="0">
+                              <a:solidFill>
+                                <a:schemeClr val="accent2"/>
+                              </a:solidFill>
+                              <a:latin typeface="Cambria Math" panose="02040503050406030204" pitchFamily="18" charset="0"/>
+                            </a:rPr>
+                            <m:t>𝑷</m:t>
+                          </m:r>
+                        </m:e>
+                        <m:sub>
+                          <m:r>
+                            <a:rPr lang="en-US" sz="2800" b="1" i="1" smtClean="0">
+                              <a:solidFill>
+                                <a:schemeClr val="accent2"/>
+                              </a:solidFill>
+                              <a:latin typeface="Cambria Math" panose="02040503050406030204" pitchFamily="18" charset="0"/>
+                            </a:rPr>
+                            <m:t>𝒙</m:t>
+                          </m:r>
+                        </m:sub>
+                      </m:sSub>
+                      <m:r>
+                        <a:rPr lang="en-US" sz="2800" b="1" i="1" smtClean="0">
+                          <a:solidFill>
+                            <a:schemeClr val="accent2"/>
+                          </a:solidFill>
+                          <a:latin typeface="Cambria Math" panose="02040503050406030204" pitchFamily="18" charset="0"/>
+                        </a:rPr>
+                        <m:t>↑</m:t>
+                      </m:r>
+                    </m:oMath>
+                  </m:oMathPara>
+                </a14:m>
+                <a:endParaRPr lang="en-US" sz="2800" b="1" dirty="0">
+                  <a:solidFill>
+                    <a:schemeClr val="accent2"/>
+                  </a:solidFill>
+                </a:endParaRPr>
+              </a:p>
+            </p:txBody>
+          </p:sp>
+        </mc:Choice>
+        <mc:Fallback>
+          <p:sp>
+            <p:nvSpPr>
+              <p:cNvPr id="10" name="TextBox 9">
+                <a:extLst>
+                  <a:ext uri="{FF2B5EF4-FFF2-40B4-BE49-F238E27FC236}">
+                    <a16:creationId xmlns:a16="http://schemas.microsoft.com/office/drawing/2014/main" id="{F0D09E51-0C6C-A8D4-EC24-D1A8DB26C74E}"/>
+                  </a:ext>
+                </a:extLst>
+              </p:cNvPr>
+              <p:cNvSpPr txBox="1">
+                <a:spLocks noRot="1" noChangeAspect="1" noMove="1" noResize="1" noEditPoints="1" noAdjustHandles="1" noChangeArrowheads="1" noChangeShapeType="1" noTextEdit="1"/>
+              </p:cNvSpPr>
+              <p:nvPr/>
+            </p:nvSpPr>
+            <p:spPr>
+              <a:xfrm>
+                <a:off x="4193125" y="5280775"/>
+                <a:ext cx="1160353" cy="523220"/>
+              </a:xfrm>
+              <a:prstGeom prst="rect">
+                <a:avLst/>
+              </a:prstGeom>
+              <a:blipFill>
+                <a:blip r:embed="rId8"/>
+                <a:stretch>
+                  <a:fillRect/>
+                </a:stretch>
+              </a:blipFill>
+            </p:spPr>
+            <p:txBody>
+              <a:bodyPr/>
+              <a:lstStyle/>
+              <a:p>
+                <a:r>
+                  <a:rPr lang="en-US">
+                    <a:noFill/>
+                  </a:rPr>
+                  <a:t> </a:t>
+                </a:r>
+              </a:p>
+            </p:txBody>
+          </p:sp>
+        </mc:Fallback>
+      </mc:AlternateContent>
+      <mc:AlternateContent xmlns:mc="http://schemas.openxmlformats.org/markup-compatibility/2006">
+        <mc:Choice xmlns:a14="http://schemas.microsoft.com/office/drawing/2010/main" Requires="a14">
+          <p:sp>
+            <p:nvSpPr>
+              <p:cNvPr id="11" name="TextBox 10">
+                <a:extLst>
+                  <a:ext uri="{FF2B5EF4-FFF2-40B4-BE49-F238E27FC236}">
+                    <a16:creationId xmlns:a16="http://schemas.microsoft.com/office/drawing/2014/main" id="{D0439795-E0F5-6E9A-F1DC-5F79F0CED195}"/>
+                  </a:ext>
+                </a:extLst>
+              </p:cNvPr>
+              <p:cNvSpPr txBox="1"/>
+              <p:nvPr/>
+            </p:nvSpPr>
+            <p:spPr>
+              <a:xfrm>
+                <a:off x="7612425" y="5280775"/>
+                <a:ext cx="1314011" cy="523220"/>
+              </a:xfrm>
+              <a:prstGeom prst="rect">
+                <a:avLst/>
+              </a:prstGeom>
+              <a:noFill/>
+            </p:spPr>
+            <p:txBody>
+              <a:bodyPr wrap="square" rtlCol="0">
+                <a:spAutoFit/>
+              </a:bodyPr>
+              <a:lstStyle/>
+              <a:p>
+                <a:pPr/>
+                <a14:m>
+                  <m:oMathPara xmlns:m="http://schemas.openxmlformats.org/officeDocument/2006/math">
+                    <m:oMathParaPr>
+                      <m:jc m:val="centerGroup"/>
+                    </m:oMathParaPr>
+                    <m:oMath xmlns:m="http://schemas.openxmlformats.org/officeDocument/2006/math">
+                      <m:sSub>
+                        <m:sSubPr>
+                          <m:ctrlPr>
+                            <a:rPr lang="en-US" sz="2800" b="1" i="1" smtClean="0">
+                              <a:solidFill>
+                                <a:schemeClr val="accent6"/>
+                              </a:solidFill>
+                              <a:latin typeface="Cambria Math" panose="02040503050406030204" pitchFamily="18" charset="0"/>
+                            </a:rPr>
+                          </m:ctrlPr>
+                        </m:sSubPr>
+                        <m:e>
+                          <m:r>
+                            <a:rPr lang="en-US" sz="2800" b="1" i="1" smtClean="0">
+                              <a:solidFill>
+                                <a:schemeClr val="accent6"/>
+                              </a:solidFill>
+                              <a:latin typeface="Cambria Math" panose="02040503050406030204" pitchFamily="18" charset="0"/>
+                            </a:rPr>
+                            <m:t>𝑷</m:t>
+                          </m:r>
+                        </m:e>
+                        <m:sub>
+                          <m:r>
+                            <a:rPr lang="en-US" sz="2800" b="1" i="1" smtClean="0">
+                              <a:solidFill>
+                                <a:schemeClr val="accent6"/>
+                              </a:solidFill>
+                              <a:latin typeface="Cambria Math" panose="02040503050406030204" pitchFamily="18" charset="0"/>
+                            </a:rPr>
+                            <m:t>𝒙</m:t>
+                          </m:r>
+                        </m:sub>
+                      </m:sSub>
+                      <m:r>
+                        <a:rPr lang="en-US" sz="2800" b="1" i="1" smtClean="0">
+                          <a:solidFill>
+                            <a:schemeClr val="accent6"/>
+                          </a:solidFill>
+                          <a:latin typeface="Cambria Math" panose="02040503050406030204" pitchFamily="18" charset="0"/>
+                        </a:rPr>
+                        <m:t>↓</m:t>
+                      </m:r>
+                    </m:oMath>
+                  </m:oMathPara>
+                </a14:m>
+                <a:endParaRPr lang="en-US" sz="2800" b="1" dirty="0">
+                  <a:solidFill>
+                    <a:schemeClr val="accent6"/>
+                  </a:solidFill>
+                </a:endParaRPr>
+              </a:p>
+            </p:txBody>
+          </p:sp>
+        </mc:Choice>
+        <mc:Fallback>
+          <p:sp>
+            <p:nvSpPr>
+              <p:cNvPr id="11" name="TextBox 10">
+                <a:extLst>
+                  <a:ext uri="{FF2B5EF4-FFF2-40B4-BE49-F238E27FC236}">
+                    <a16:creationId xmlns:a16="http://schemas.microsoft.com/office/drawing/2014/main" id="{D0439795-E0F5-6E9A-F1DC-5F79F0CED195}"/>
+                  </a:ext>
+                </a:extLst>
+              </p:cNvPr>
+              <p:cNvSpPr txBox="1">
+                <a:spLocks noRot="1" noChangeAspect="1" noMove="1" noResize="1" noEditPoints="1" noAdjustHandles="1" noChangeArrowheads="1" noChangeShapeType="1" noTextEdit="1"/>
+              </p:cNvSpPr>
+              <p:nvPr/>
+            </p:nvSpPr>
+            <p:spPr>
+              <a:xfrm>
+                <a:off x="7612425" y="5280775"/>
+                <a:ext cx="1314011" cy="523220"/>
+              </a:xfrm>
+              <a:prstGeom prst="rect">
+                <a:avLst/>
+              </a:prstGeom>
+              <a:blipFill>
+                <a:blip r:embed="rId9"/>
+                <a:stretch>
+                  <a:fillRect/>
+                </a:stretch>
+              </a:blipFill>
+            </p:spPr>
+            <p:txBody>
+              <a:bodyPr/>
+              <a:lstStyle/>
+              <a:p>
+                <a:r>
+                  <a:rPr lang="en-US">
+                    <a:noFill/>
+                  </a:rPr>
+                  <a:t> </a:t>
+                </a:r>
+              </a:p>
+            </p:txBody>
+          </p:sp>
+        </mc:Fallback>
+      </mc:AlternateContent>
+      <p:cxnSp>
+        <p:nvCxnSpPr>
+          <p:cNvPr id="17" name="Straight Arrow Connector 16">
+            <a:extLst>
+              <a:ext uri="{FF2B5EF4-FFF2-40B4-BE49-F238E27FC236}">
+                <a16:creationId xmlns:a16="http://schemas.microsoft.com/office/drawing/2014/main" id="{2336FE25-AA9F-E1BC-8A8A-8A3FB0A9E8E3}"/>
+              </a:ext>
+            </a:extLst>
+          </p:cNvPr>
+          <p:cNvCxnSpPr>
+            <a:cxnSpLocks/>
+            <a:stCxn id="7" idx="1"/>
+            <a:endCxn id="9" idx="3"/>
+          </p:cNvCxnSpPr>
+          <p:nvPr/>
+        </p:nvCxnSpPr>
+        <p:spPr>
+          <a:xfrm flipH="1">
+            <a:off x="4773302" y="6361403"/>
+            <a:ext cx="1276209" cy="0"/>
+          </a:xfrm>
+          <a:prstGeom prst="straightConnector1">
+            <a:avLst/>
+          </a:prstGeom>
+          <a:ln w="57150">
+            <a:solidFill>
+              <a:schemeClr val="accent2"/>
+            </a:solidFill>
+            <a:tailEnd type="triangle"/>
+          </a:ln>
+        </p:spPr>
+        <p:style>
+          <a:lnRef idx="1">
+            <a:schemeClr val="accent1"/>
+          </a:lnRef>
+          <a:fillRef idx="0">
+            <a:schemeClr val="accent1"/>
+          </a:fillRef>
+          <a:effectRef idx="0">
+            <a:schemeClr val="accent1"/>
+          </a:effectRef>
+          <a:fontRef idx="minor">
+            <a:schemeClr val="tx1"/>
+          </a:fontRef>
+        </p:style>
+      </p:cxnSp>
+      <p:cxnSp>
+        <p:nvCxnSpPr>
+          <p:cNvPr id="20" name="Straight Arrow Connector 19">
+            <a:extLst>
+              <a:ext uri="{FF2B5EF4-FFF2-40B4-BE49-F238E27FC236}">
+                <a16:creationId xmlns:a16="http://schemas.microsoft.com/office/drawing/2014/main" id="{680B5365-1936-EBE1-64F3-26357CDAB416}"/>
+              </a:ext>
+            </a:extLst>
+          </p:cNvPr>
+          <p:cNvCxnSpPr>
+            <a:cxnSpLocks/>
+            <a:stCxn id="7" idx="3"/>
+            <a:endCxn id="15" idx="1"/>
+          </p:cNvCxnSpPr>
+          <p:nvPr/>
+        </p:nvCxnSpPr>
+        <p:spPr>
+          <a:xfrm>
+            <a:off x="6856907" y="6361403"/>
+            <a:ext cx="841994" cy="0"/>
+          </a:xfrm>
+          <a:prstGeom prst="straightConnector1">
+            <a:avLst/>
+          </a:prstGeom>
+          <a:ln w="57150">
+            <a:solidFill>
+              <a:schemeClr val="accent6"/>
+            </a:solidFill>
+            <a:tailEnd type="triangle"/>
+          </a:ln>
+        </p:spPr>
+        <p:style>
+          <a:lnRef idx="1">
+            <a:schemeClr val="accent1"/>
+          </a:lnRef>
+          <a:fillRef idx="0">
+            <a:schemeClr val="accent1"/>
+          </a:fillRef>
+          <a:effectRef idx="0">
+            <a:schemeClr val="accent1"/>
+          </a:effectRef>
+          <a:fontRef idx="minor">
+            <a:schemeClr val="tx1"/>
+          </a:fontRef>
+        </p:style>
+      </p:cxnSp>
+      <p:sp>
+        <p:nvSpPr>
+          <p:cNvPr id="6" name="Freeform: Shape 5">
+            <a:extLst>
+              <a:ext uri="{FF2B5EF4-FFF2-40B4-BE49-F238E27FC236}">
+                <a16:creationId xmlns:a16="http://schemas.microsoft.com/office/drawing/2014/main" id="{0CF6D7D9-CF42-B396-29A8-52DACB5F1FF9}"/>
+              </a:ext>
+            </a:extLst>
+          </p:cNvPr>
+          <p:cNvSpPr/>
+          <p:nvPr/>
+        </p:nvSpPr>
+        <p:spPr>
+          <a:xfrm>
+            <a:off x="2286000" y="395306"/>
+            <a:ext cx="7601613" cy="5637321"/>
+          </a:xfrm>
+          <a:custGeom>
+            <a:avLst/>
+            <a:gdLst>
+              <a:gd name="connsiteX0" fmla="*/ 0 w 10227076"/>
+              <a:gd name="connsiteY0" fmla="*/ 0 h 5637321"/>
+              <a:gd name="connsiteX1" fmla="*/ 35511 w 10227076"/>
+              <a:gd name="connsiteY1" fmla="*/ 5637321 h 5637321"/>
+              <a:gd name="connsiteX2" fmla="*/ 10227076 w 10227076"/>
+              <a:gd name="connsiteY2" fmla="*/ 5584055 h 5637321"/>
+            </a:gdLst>
+            <a:ahLst/>
+            <a:cxnLst>
+              <a:cxn ang="0">
+                <a:pos x="connsiteX0" y="connsiteY0"/>
+              </a:cxn>
+              <a:cxn ang="0">
+                <a:pos x="connsiteX1" y="connsiteY1"/>
+              </a:cxn>
+              <a:cxn ang="0">
+                <a:pos x="connsiteX2" y="connsiteY2"/>
+              </a:cxn>
+            </a:cxnLst>
+            <a:rect l="l" t="t" r="r" b="b"/>
+            <a:pathLst>
+              <a:path w="10227076" h="5637321">
+                <a:moveTo>
+                  <a:pt x="0" y="0"/>
+                </a:moveTo>
+                <a:lnTo>
+                  <a:pt x="35511" y="5637321"/>
+                </a:lnTo>
+                <a:lnTo>
+                  <a:pt x="10227076" y="5584055"/>
+                </a:lnTo>
+              </a:path>
+            </a:pathLst>
+          </a:custGeom>
+          <a:ln w="38100"/>
+        </p:spPr>
+        <p:style>
+          <a:lnRef idx="3">
+            <a:schemeClr val="dk1"/>
+          </a:lnRef>
+          <a:fillRef idx="0">
+            <a:schemeClr val="dk1"/>
+          </a:fillRef>
+          <a:effectRef idx="2">
+            <a:schemeClr val="dk1"/>
+          </a:effectRef>
+          <a:fontRef idx="minor">
+            <a:schemeClr val="tx1"/>
+          </a:fontRef>
+        </p:style>
+        <p:txBody>
+          <a:bodyPr rtlCol="0" anchor="ctr"/>
+          <a:lstStyle/>
+          <a:p>
+            <a:pPr algn="ctr"/>
+            <a:endParaRPr lang="en-US" dirty="0"/>
+          </a:p>
+        </p:txBody>
+      </p:sp>
+    </p:spTree>
+    <p:extLst>
+      <p:ext uri="{BB962C8B-B14F-4D97-AF65-F5344CB8AC3E}">
+        <p14:creationId xmlns:p14="http://schemas.microsoft.com/office/powerpoint/2010/main" val="2513106465"/>
+      </p:ext>
+    </p:extLst>
+  </p:cSld>
+  <p:clrMapOvr>
+    <a:masterClrMapping/>
+  </p:clrMapOvr>
+</p:sld>
+</file>
+
+<file path=ppt/slides/slide5.xml><?xml version="1.0" encoding="utf-8"?>
+<p:sld xmlns:a="http://schemas.openxmlformats.org/drawingml/2006/main" xmlns:r="http://schemas.openxmlformats.org/officeDocument/2006/relationships" xmlns:p="http://schemas.openxmlformats.org/presentationml/2006/main">
+  <p:cSld>
+    <p:spTree>
+      <p:nvGrpSpPr>
+        <p:cNvPr id="1" name=""/>
+        <p:cNvGrpSpPr/>
+        <p:nvPr/>
+      </p:nvGrpSpPr>
+      <p:grpSpPr>
+        <a:xfrm>
+          <a:off x="0" y="0"/>
+          <a:ext cx="0" cy="0"/>
+          <a:chOff x="0" y="0"/>
+          <a:chExt cx="0" cy="0"/>
+        </a:xfrm>
+      </p:grpSpPr>
+      <mc:AlternateContent xmlns:mc="http://schemas.openxmlformats.org/markup-compatibility/2006">
+        <mc:Choice xmlns:a14="http://schemas.microsoft.com/office/drawing/2010/main" Requires="a14">
+          <p:sp>
+            <p:nvSpPr>
+              <p:cNvPr id="26" name="TextBox 25">
+                <a:extLst>
+                  <a:ext uri="{FF2B5EF4-FFF2-40B4-BE49-F238E27FC236}">
+                    <a16:creationId xmlns:a16="http://schemas.microsoft.com/office/drawing/2014/main" id="{7F93BDE7-A731-C302-19A1-DCAFA5C13CF4}"/>
+                  </a:ext>
+                </a:extLst>
+              </p:cNvPr>
+              <p:cNvSpPr txBox="1"/>
+              <p:nvPr/>
+            </p:nvSpPr>
+            <p:spPr>
+              <a:xfrm>
+                <a:off x="9681954" y="5796407"/>
+                <a:ext cx="807396" cy="369332"/>
+              </a:xfrm>
+              <a:prstGeom prst="rect">
+                <a:avLst/>
+              </a:prstGeom>
+              <a:noFill/>
+            </p:spPr>
+            <p:txBody>
+              <a:bodyPr wrap="square" rtlCol="0">
+                <a:spAutoFit/>
+              </a:bodyPr>
+              <a:lstStyle/>
+              <a:p>
+                <a:pPr/>
+                <a14:m>
+                  <m:oMathPara xmlns:m="http://schemas.openxmlformats.org/officeDocument/2006/math">
+                    <m:oMathParaPr>
+                      <m:jc m:val="centerGroup"/>
+                    </m:oMathParaPr>
+                    <m:oMath xmlns:m="http://schemas.openxmlformats.org/officeDocument/2006/math">
+                      <m:r>
+                        <a:rPr lang="en-US" b="1" i="1" smtClean="0">
+                          <a:solidFill>
+                            <a:schemeClr val="tx1"/>
+                          </a:solidFill>
+                          <a:latin typeface="Cambria Math" panose="02040503050406030204" pitchFamily="18" charset="0"/>
+                        </a:rPr>
+                        <m:t>𝑿</m:t>
+                      </m:r>
+                    </m:oMath>
+                  </m:oMathPara>
+                </a14:m>
+                <a:endParaRPr lang="en-US" b="1" dirty="0">
+                  <a:solidFill>
+                    <a:schemeClr val="tx1"/>
+                  </a:solidFill>
+                </a:endParaRPr>
+              </a:p>
+            </p:txBody>
+          </p:sp>
+        </mc:Choice>
+        <mc:Fallback>
+          <p:sp>
+            <p:nvSpPr>
+              <p:cNvPr id="26" name="TextBox 25">
+                <a:extLst>
+                  <a:ext uri="{FF2B5EF4-FFF2-40B4-BE49-F238E27FC236}">
+                    <a16:creationId xmlns:a16="http://schemas.microsoft.com/office/drawing/2014/main" id="{7F93BDE7-A731-C302-19A1-DCAFA5C13CF4}"/>
+                  </a:ext>
+                </a:extLst>
+              </p:cNvPr>
+              <p:cNvSpPr txBox="1">
+                <a:spLocks noRot="1" noChangeAspect="1" noMove="1" noResize="1" noEditPoints="1" noAdjustHandles="1" noChangeArrowheads="1" noChangeShapeType="1" noTextEdit="1"/>
+              </p:cNvSpPr>
+              <p:nvPr/>
+            </p:nvSpPr>
+            <p:spPr>
+              <a:xfrm>
+                <a:off x="9681954" y="5796407"/>
+                <a:ext cx="807396" cy="369332"/>
+              </a:xfrm>
+              <a:prstGeom prst="rect">
+                <a:avLst/>
+              </a:prstGeom>
+              <a:blipFill>
+                <a:blip r:embed="rId2"/>
+                <a:stretch>
+                  <a:fillRect/>
+                </a:stretch>
+              </a:blipFill>
+            </p:spPr>
+            <p:txBody>
+              <a:bodyPr/>
+              <a:lstStyle/>
+              <a:p>
+                <a:r>
+                  <a:rPr lang="en-US">
+                    <a:noFill/>
+                  </a:rPr>
+                  <a:t> </a:t>
+                </a:r>
+              </a:p>
+            </p:txBody>
+          </p:sp>
+        </mc:Fallback>
+      </mc:AlternateContent>
+      <mc:AlternateContent xmlns:mc="http://schemas.openxmlformats.org/markup-compatibility/2006">
+        <mc:Choice xmlns:a14="http://schemas.microsoft.com/office/drawing/2010/main" Requires="a14">
+          <p:sp>
+            <p:nvSpPr>
+              <p:cNvPr id="27" name="TextBox 26">
+                <a:extLst>
+                  <a:ext uri="{FF2B5EF4-FFF2-40B4-BE49-F238E27FC236}">
+                    <a16:creationId xmlns:a16="http://schemas.microsoft.com/office/drawing/2014/main" id="{0DDA7B57-B430-94C9-FFC6-65F76A85F963}"/>
+                  </a:ext>
+                </a:extLst>
+              </p:cNvPr>
+              <p:cNvSpPr txBox="1"/>
+              <p:nvPr/>
+            </p:nvSpPr>
+            <p:spPr>
+              <a:xfrm>
+                <a:off x="1645109" y="210640"/>
+                <a:ext cx="807396" cy="369332"/>
+              </a:xfrm>
+              <a:prstGeom prst="rect">
+                <a:avLst/>
+              </a:prstGeom>
+              <a:noFill/>
+            </p:spPr>
+            <p:txBody>
+              <a:bodyPr wrap="square" rtlCol="0">
+                <a:spAutoFit/>
+              </a:bodyPr>
+              <a:lstStyle/>
+              <a:p>
+                <a:pPr/>
+                <a14:m>
+                  <m:oMathPara xmlns:m="http://schemas.openxmlformats.org/officeDocument/2006/math">
+                    <m:oMathParaPr>
+                      <m:jc m:val="centerGroup"/>
+                    </m:oMathParaPr>
+                    <m:oMath xmlns:m="http://schemas.openxmlformats.org/officeDocument/2006/math">
+                      <m:r>
+                        <a:rPr lang="en-US" b="1" i="1" smtClean="0">
+                          <a:solidFill>
+                            <a:schemeClr val="tx1"/>
+                          </a:solidFill>
+                          <a:latin typeface="Cambria Math" panose="02040503050406030204" pitchFamily="18" charset="0"/>
+                        </a:rPr>
+                        <m:t>𝒀</m:t>
+                      </m:r>
+                    </m:oMath>
+                  </m:oMathPara>
+                </a14:m>
+                <a:endParaRPr lang="en-US" b="1" dirty="0">
+                  <a:solidFill>
+                    <a:schemeClr val="tx1"/>
+                  </a:solidFill>
+                </a:endParaRPr>
+              </a:p>
+            </p:txBody>
+          </p:sp>
+        </mc:Choice>
+        <mc:Fallback>
+          <p:sp>
+            <p:nvSpPr>
+              <p:cNvPr id="27" name="TextBox 26">
+                <a:extLst>
+                  <a:ext uri="{FF2B5EF4-FFF2-40B4-BE49-F238E27FC236}">
+                    <a16:creationId xmlns:a16="http://schemas.microsoft.com/office/drawing/2014/main" id="{0DDA7B57-B430-94C9-FFC6-65F76A85F963}"/>
+                  </a:ext>
+                </a:extLst>
+              </p:cNvPr>
+              <p:cNvSpPr txBox="1">
+                <a:spLocks noRot="1" noChangeAspect="1" noMove="1" noResize="1" noEditPoints="1" noAdjustHandles="1" noChangeArrowheads="1" noChangeShapeType="1" noTextEdit="1"/>
+              </p:cNvSpPr>
+              <p:nvPr/>
+            </p:nvSpPr>
+            <p:spPr>
+              <a:xfrm>
+                <a:off x="1645109" y="210640"/>
+                <a:ext cx="807396" cy="369332"/>
+              </a:xfrm>
+              <a:prstGeom prst="rect">
+                <a:avLst/>
+              </a:prstGeom>
+              <a:blipFill>
+                <a:blip r:embed="rId3"/>
+                <a:stretch>
+                  <a:fillRect/>
+                </a:stretch>
+              </a:blipFill>
+            </p:spPr>
+            <p:txBody>
+              <a:bodyPr/>
+              <a:lstStyle/>
+              <a:p>
+                <a:r>
+                  <a:rPr lang="en-US">
+                    <a:noFill/>
+                  </a:rPr>
+                  <a:t> </a:t>
+                </a:r>
+              </a:p>
+            </p:txBody>
+          </p:sp>
+        </mc:Fallback>
+      </mc:AlternateContent>
+      <p:cxnSp>
+        <p:nvCxnSpPr>
+          <p:cNvPr id="8" name="Straight Connector 7">
+            <a:extLst>
+              <a:ext uri="{FF2B5EF4-FFF2-40B4-BE49-F238E27FC236}">
+                <a16:creationId xmlns:a16="http://schemas.microsoft.com/office/drawing/2014/main" id="{B16F4518-E948-C3F6-AAE1-784E53A694CC}"/>
+              </a:ext>
+            </a:extLst>
+          </p:cNvPr>
+          <p:cNvCxnSpPr>
+            <a:cxnSpLocks/>
+          </p:cNvCxnSpPr>
+          <p:nvPr/>
+        </p:nvCxnSpPr>
+        <p:spPr>
+          <a:xfrm>
+            <a:off x="2304387" y="1067316"/>
+            <a:ext cx="4148822" cy="4908034"/>
+          </a:xfrm>
+          <a:prstGeom prst="line">
+            <a:avLst/>
+          </a:prstGeom>
+          <a:ln w="38100">
+            <a:solidFill>
+              <a:schemeClr val="accent6"/>
+            </a:solidFill>
+          </a:ln>
+        </p:spPr>
+        <p:style>
+          <a:lnRef idx="1">
+            <a:schemeClr val="accent1"/>
+          </a:lnRef>
+          <a:fillRef idx="0">
+            <a:schemeClr val="accent1"/>
+          </a:fillRef>
+          <a:effectRef idx="0">
+            <a:schemeClr val="accent1"/>
+          </a:effectRef>
+          <a:fontRef idx="minor">
+            <a:schemeClr val="tx1"/>
+          </a:fontRef>
+        </p:style>
+      </p:cxnSp>
+      <mc:AlternateContent xmlns:mc="http://schemas.openxmlformats.org/markup-compatibility/2006">
+        <mc:Choice xmlns:a14="http://schemas.microsoft.com/office/drawing/2010/main" Requires="a14">
+          <p:sp>
+            <p:nvSpPr>
+              <p:cNvPr id="16" name="TextBox 15">
+                <a:extLst>
+                  <a:ext uri="{FF2B5EF4-FFF2-40B4-BE49-F238E27FC236}">
+                    <a16:creationId xmlns:a16="http://schemas.microsoft.com/office/drawing/2014/main" id="{ECC1AEE7-E434-1760-5BD5-630C90A0234A}"/>
+                  </a:ext>
+                </a:extLst>
+              </p:cNvPr>
+              <p:cNvSpPr txBox="1"/>
+              <p:nvPr/>
+            </p:nvSpPr>
+            <p:spPr>
+              <a:xfrm>
+                <a:off x="1580244" y="2176625"/>
+                <a:ext cx="807396" cy="692177"/>
+              </a:xfrm>
+              <a:prstGeom prst="rect">
+                <a:avLst/>
+              </a:prstGeom>
+              <a:noFill/>
+            </p:spPr>
+            <p:txBody>
+              <a:bodyPr wrap="square" rtlCol="0">
+                <a:spAutoFit/>
+              </a:bodyPr>
+              <a:lstStyle/>
+              <a:p>
+                <a:pPr/>
+                <a14:m>
+                  <m:oMathPara xmlns:m="http://schemas.openxmlformats.org/officeDocument/2006/math">
+                    <m:oMathParaPr>
+                      <m:jc m:val="centerGroup"/>
+                    </m:oMathParaPr>
+                    <m:oMath xmlns:m="http://schemas.openxmlformats.org/officeDocument/2006/math">
+                      <m:f>
+                        <m:fPr>
+                          <m:ctrlPr>
+                            <a:rPr lang="en-US" b="1" i="1" smtClean="0">
+                              <a:solidFill>
+                                <a:schemeClr val="tx1"/>
+                              </a:solidFill>
+                              <a:latin typeface="Cambria Math" panose="02040503050406030204" pitchFamily="18" charset="0"/>
+                            </a:rPr>
+                          </m:ctrlPr>
+                        </m:fPr>
+                        <m:num>
+                          <m:r>
+                            <a:rPr lang="en-US" b="1" i="1" smtClean="0">
+                              <a:solidFill>
+                                <a:schemeClr val="tx1"/>
+                              </a:solidFill>
+                              <a:latin typeface="Cambria Math" panose="02040503050406030204" pitchFamily="18" charset="0"/>
+                            </a:rPr>
+                            <m:t>𝑴</m:t>
+                          </m:r>
+                        </m:num>
+                        <m:den>
+                          <m:sSub>
+                            <m:sSubPr>
+                              <m:ctrlPr>
+                                <a:rPr lang="en-US" b="1" i="1" smtClean="0">
+                                  <a:solidFill>
+                                    <a:schemeClr val="tx1"/>
+                                  </a:solidFill>
+                                  <a:latin typeface="Cambria Math" panose="02040503050406030204" pitchFamily="18" charset="0"/>
+                                </a:rPr>
+                              </m:ctrlPr>
+                            </m:sSubPr>
+                            <m:e>
+                              <m:r>
+                                <a:rPr lang="en-US" b="1" i="1" smtClean="0">
+                                  <a:solidFill>
+                                    <a:schemeClr val="tx1"/>
+                                  </a:solidFill>
+                                  <a:latin typeface="Cambria Math" panose="02040503050406030204" pitchFamily="18" charset="0"/>
+                                </a:rPr>
+                                <m:t>𝑷</m:t>
+                              </m:r>
+                            </m:e>
+                            <m:sub>
+                              <m:r>
+                                <a:rPr lang="en-US" b="1" i="1" smtClean="0">
+                                  <a:solidFill>
+                                    <a:schemeClr val="tx1"/>
+                                  </a:solidFill>
+                                  <a:latin typeface="Cambria Math" panose="02040503050406030204" pitchFamily="18" charset="0"/>
+                                </a:rPr>
+                                <m:t>𝒚</m:t>
+                              </m:r>
+                            </m:sub>
+                          </m:sSub>
+                        </m:den>
+                      </m:f>
+                    </m:oMath>
+                  </m:oMathPara>
+                </a14:m>
+                <a:endParaRPr lang="en-US" b="1" dirty="0">
+                  <a:solidFill>
+                    <a:schemeClr val="tx1"/>
+                  </a:solidFill>
+                </a:endParaRPr>
+              </a:p>
+            </p:txBody>
+          </p:sp>
+        </mc:Choice>
+        <mc:Fallback>
+          <p:sp>
+            <p:nvSpPr>
+              <p:cNvPr id="16" name="TextBox 15">
+                <a:extLst>
+                  <a:ext uri="{FF2B5EF4-FFF2-40B4-BE49-F238E27FC236}">
+                    <a16:creationId xmlns:a16="http://schemas.microsoft.com/office/drawing/2014/main" id="{ECC1AEE7-E434-1760-5BD5-630C90A0234A}"/>
+                  </a:ext>
+                </a:extLst>
+              </p:cNvPr>
+              <p:cNvSpPr txBox="1">
+                <a:spLocks noRot="1" noChangeAspect="1" noMove="1" noResize="1" noEditPoints="1" noAdjustHandles="1" noChangeArrowheads="1" noChangeShapeType="1" noTextEdit="1"/>
+              </p:cNvSpPr>
+              <p:nvPr/>
+            </p:nvSpPr>
+            <p:spPr>
+              <a:xfrm>
+                <a:off x="1580244" y="2176625"/>
+                <a:ext cx="807396" cy="692177"/>
+              </a:xfrm>
+              <a:prstGeom prst="rect">
+                <a:avLst/>
+              </a:prstGeom>
+              <a:blipFill>
+                <a:blip r:embed="rId4"/>
+                <a:stretch>
+                  <a:fillRect/>
+                </a:stretch>
+              </a:blipFill>
+            </p:spPr>
+            <p:txBody>
+              <a:bodyPr/>
+              <a:lstStyle/>
+              <a:p>
+                <a:r>
+                  <a:rPr lang="en-US">
+                    <a:noFill/>
+                  </a:rPr>
+                  <a:t> </a:t>
+                </a:r>
+              </a:p>
+            </p:txBody>
+          </p:sp>
+        </mc:Fallback>
+      </mc:AlternateContent>
+      <p:cxnSp>
+        <p:nvCxnSpPr>
+          <p:cNvPr id="2" name="Straight Connector 1">
+            <a:extLst>
+              <a:ext uri="{FF2B5EF4-FFF2-40B4-BE49-F238E27FC236}">
+                <a16:creationId xmlns:a16="http://schemas.microsoft.com/office/drawing/2014/main" id="{EF31A2F2-A117-2BE4-2D65-13043E037080}"/>
+              </a:ext>
+            </a:extLst>
+          </p:cNvPr>
+          <p:cNvCxnSpPr>
+            <a:cxnSpLocks/>
+          </p:cNvCxnSpPr>
+          <p:nvPr/>
+        </p:nvCxnSpPr>
+        <p:spPr>
+          <a:xfrm>
+            <a:off x="2304387" y="2509457"/>
+            <a:ext cx="4148822" cy="3465893"/>
+          </a:xfrm>
+          <a:prstGeom prst="line">
+            <a:avLst/>
+          </a:prstGeom>
+          <a:ln w="38100"/>
+        </p:spPr>
+        <p:style>
+          <a:lnRef idx="1">
+            <a:schemeClr val="accent1"/>
+          </a:lnRef>
+          <a:fillRef idx="0">
+            <a:schemeClr val="accent1"/>
+          </a:fillRef>
+          <a:effectRef idx="0">
+            <a:schemeClr val="accent1"/>
+          </a:effectRef>
+          <a:fontRef idx="minor">
+            <a:schemeClr val="tx1"/>
+          </a:fontRef>
+        </p:style>
+      </p:cxnSp>
+      <p:cxnSp>
+        <p:nvCxnSpPr>
+          <p:cNvPr id="4" name="Straight Connector 3">
+            <a:extLst>
+              <a:ext uri="{FF2B5EF4-FFF2-40B4-BE49-F238E27FC236}">
+                <a16:creationId xmlns:a16="http://schemas.microsoft.com/office/drawing/2014/main" id="{4EC7C22C-F756-AEAC-81D1-9C763D58E603}"/>
+              </a:ext>
+            </a:extLst>
+          </p:cNvPr>
+          <p:cNvCxnSpPr>
+            <a:cxnSpLocks/>
+          </p:cNvCxnSpPr>
+          <p:nvPr/>
+        </p:nvCxnSpPr>
+        <p:spPr>
+          <a:xfrm>
+            <a:off x="2339514" y="4199924"/>
+            <a:ext cx="4113695" cy="1775426"/>
+          </a:xfrm>
+          <a:prstGeom prst="line">
+            <a:avLst/>
+          </a:prstGeom>
+          <a:ln w="38100">
+            <a:solidFill>
+              <a:schemeClr val="accent2"/>
+            </a:solidFill>
+          </a:ln>
+        </p:spPr>
+        <p:style>
+          <a:lnRef idx="1">
+            <a:schemeClr val="accent1"/>
+          </a:lnRef>
+          <a:fillRef idx="0">
+            <a:schemeClr val="accent1"/>
+          </a:fillRef>
+          <a:effectRef idx="0">
+            <a:schemeClr val="accent1"/>
+          </a:effectRef>
+          <a:fontRef idx="minor">
+            <a:schemeClr val="tx1"/>
+          </a:fontRef>
+        </p:style>
+      </p:cxnSp>
+      <mc:AlternateContent xmlns:mc="http://schemas.openxmlformats.org/markup-compatibility/2006">
+        <mc:Choice xmlns:a14="http://schemas.microsoft.com/office/drawing/2010/main" Requires="a14">
+          <p:sp>
+            <p:nvSpPr>
+              <p:cNvPr id="7" name="TextBox 6">
+                <a:extLst>
+                  <a:ext uri="{FF2B5EF4-FFF2-40B4-BE49-F238E27FC236}">
+                    <a16:creationId xmlns:a16="http://schemas.microsoft.com/office/drawing/2014/main" id="{0BC3A4DA-9F52-F1F8-93EC-F1A1A1F31CF2}"/>
+                  </a:ext>
+                </a:extLst>
+              </p:cNvPr>
+              <p:cNvSpPr txBox="1"/>
+              <p:nvPr/>
+            </p:nvSpPr>
+            <p:spPr>
+              <a:xfrm>
+                <a:off x="6049511" y="6032627"/>
+                <a:ext cx="807396" cy="657552"/>
+              </a:xfrm>
+              <a:prstGeom prst="rect">
+                <a:avLst/>
+              </a:prstGeom>
+              <a:noFill/>
+            </p:spPr>
+            <p:txBody>
+              <a:bodyPr wrap="square" rtlCol="0">
+                <a:spAutoFit/>
+              </a:bodyPr>
+              <a:lstStyle/>
+              <a:p>
+                <a:pPr/>
+                <a14:m>
+                  <m:oMathPara xmlns:m="http://schemas.openxmlformats.org/officeDocument/2006/math">
+                    <m:oMathParaPr>
+                      <m:jc m:val="centerGroup"/>
+                    </m:oMathParaPr>
+                    <m:oMath xmlns:m="http://schemas.openxmlformats.org/officeDocument/2006/math">
+                      <m:f>
+                        <m:fPr>
+                          <m:ctrlPr>
+                            <a:rPr lang="en-US" b="1" i="1" smtClean="0">
+                              <a:solidFill>
+                                <a:schemeClr val="tx1"/>
+                              </a:solidFill>
+                              <a:latin typeface="Cambria Math" panose="02040503050406030204" pitchFamily="18" charset="0"/>
+                            </a:rPr>
+                          </m:ctrlPr>
+                        </m:fPr>
+                        <m:num>
+                          <m:r>
+                            <a:rPr lang="en-US" b="1" i="1" smtClean="0">
+                              <a:solidFill>
+                                <a:schemeClr val="tx1"/>
+                              </a:solidFill>
+                              <a:latin typeface="Cambria Math" panose="02040503050406030204" pitchFamily="18" charset="0"/>
+                            </a:rPr>
+                            <m:t>𝑴</m:t>
+                          </m:r>
+                        </m:num>
+                        <m:den>
+                          <m:sSub>
+                            <m:sSubPr>
+                              <m:ctrlPr>
+                                <a:rPr lang="en-US" b="1" i="1" smtClean="0">
+                                  <a:solidFill>
+                                    <a:schemeClr val="tx1"/>
+                                  </a:solidFill>
+                                  <a:latin typeface="Cambria Math" panose="02040503050406030204" pitchFamily="18" charset="0"/>
+                                </a:rPr>
+                              </m:ctrlPr>
+                            </m:sSubPr>
+                            <m:e>
+                              <m:r>
+                                <a:rPr lang="en-US" b="1" i="1" smtClean="0">
+                                  <a:solidFill>
+                                    <a:schemeClr val="tx1"/>
+                                  </a:solidFill>
+                                  <a:latin typeface="Cambria Math" panose="02040503050406030204" pitchFamily="18" charset="0"/>
+                                </a:rPr>
+                                <m:t>𝑷</m:t>
+                              </m:r>
+                            </m:e>
+                            <m:sub>
+                              <m:r>
+                                <a:rPr lang="en-US" b="1" i="1" smtClean="0">
+                                  <a:solidFill>
+                                    <a:schemeClr val="tx1"/>
+                                  </a:solidFill>
+                                  <a:latin typeface="Cambria Math" panose="02040503050406030204" pitchFamily="18" charset="0"/>
+                                </a:rPr>
+                                <m:t>𝒙</m:t>
+                              </m:r>
+                            </m:sub>
+                          </m:sSub>
+                        </m:den>
+                      </m:f>
+                    </m:oMath>
+                  </m:oMathPara>
+                </a14:m>
+                <a:endParaRPr lang="en-US" b="1" dirty="0">
+                  <a:solidFill>
+                    <a:schemeClr val="tx1"/>
+                  </a:solidFill>
+                </a:endParaRPr>
+              </a:p>
+            </p:txBody>
+          </p:sp>
+        </mc:Choice>
+        <mc:Fallback>
+          <p:sp>
+            <p:nvSpPr>
+              <p:cNvPr id="7" name="TextBox 6">
+                <a:extLst>
+                  <a:ext uri="{FF2B5EF4-FFF2-40B4-BE49-F238E27FC236}">
+                    <a16:creationId xmlns:a16="http://schemas.microsoft.com/office/drawing/2014/main" id="{0BC3A4DA-9F52-F1F8-93EC-F1A1A1F31CF2}"/>
+                  </a:ext>
+                </a:extLst>
+              </p:cNvPr>
+              <p:cNvSpPr txBox="1">
+                <a:spLocks noRot="1" noChangeAspect="1" noMove="1" noResize="1" noEditPoints="1" noAdjustHandles="1" noChangeArrowheads="1" noChangeShapeType="1" noTextEdit="1"/>
+              </p:cNvSpPr>
+              <p:nvPr/>
+            </p:nvSpPr>
+            <p:spPr>
+              <a:xfrm>
+                <a:off x="6049511" y="6032627"/>
+                <a:ext cx="807396" cy="657552"/>
+              </a:xfrm>
+              <a:prstGeom prst="rect">
+                <a:avLst/>
+              </a:prstGeom>
+              <a:blipFill>
+                <a:blip r:embed="rId5"/>
+                <a:stretch>
+                  <a:fillRect/>
+                </a:stretch>
+              </a:blipFill>
+            </p:spPr>
+            <p:txBody>
+              <a:bodyPr/>
+              <a:lstStyle/>
+              <a:p>
+                <a:r>
+                  <a:rPr lang="en-US">
+                    <a:noFill/>
+                  </a:rPr>
+                  <a:t> </a:t>
+                </a:r>
+              </a:p>
+            </p:txBody>
+          </p:sp>
+        </mc:Fallback>
+      </mc:AlternateContent>
+      <mc:AlternateContent xmlns:mc="http://schemas.openxmlformats.org/markup-compatibility/2006">
+        <mc:Choice xmlns:a14="http://schemas.microsoft.com/office/drawing/2010/main" Requires="a14">
+          <p:sp>
+            <p:nvSpPr>
+              <p:cNvPr id="10" name="TextBox 9">
+                <a:extLst>
+                  <a:ext uri="{FF2B5EF4-FFF2-40B4-BE49-F238E27FC236}">
+                    <a16:creationId xmlns:a16="http://schemas.microsoft.com/office/drawing/2014/main" id="{F0D09E51-0C6C-A8D4-EC24-D1A8DB26C74E}"/>
+                  </a:ext>
+                </a:extLst>
+              </p:cNvPr>
+              <p:cNvSpPr txBox="1"/>
+              <p:nvPr/>
+            </p:nvSpPr>
+            <p:spPr>
+              <a:xfrm>
+                <a:off x="2393028" y="4564417"/>
+                <a:ext cx="1160353" cy="562718"/>
+              </a:xfrm>
+              <a:prstGeom prst="rect">
+                <a:avLst/>
+              </a:prstGeom>
+              <a:noFill/>
+            </p:spPr>
+            <p:txBody>
+              <a:bodyPr wrap="square" rtlCol="0">
+                <a:spAutoFit/>
+              </a:bodyPr>
+              <a:lstStyle/>
+              <a:p>
+                <a:pPr/>
+                <a14:m>
+                  <m:oMathPara xmlns:m="http://schemas.openxmlformats.org/officeDocument/2006/math">
+                    <m:oMathParaPr>
+                      <m:jc m:val="centerGroup"/>
+                    </m:oMathParaPr>
+                    <m:oMath xmlns:m="http://schemas.openxmlformats.org/officeDocument/2006/math">
+                      <m:sSub>
+                        <m:sSubPr>
+                          <m:ctrlPr>
+                            <a:rPr lang="en-US" sz="2800" b="1" i="1" smtClean="0">
+                              <a:solidFill>
+                                <a:schemeClr val="accent2"/>
+                              </a:solidFill>
+                              <a:latin typeface="Cambria Math" panose="02040503050406030204" pitchFamily="18" charset="0"/>
+                            </a:rPr>
+                          </m:ctrlPr>
+                        </m:sSubPr>
+                        <m:e>
+                          <m:r>
+                            <a:rPr lang="en-US" sz="2800" b="1" i="1" smtClean="0">
+                              <a:solidFill>
+                                <a:schemeClr val="accent2"/>
+                              </a:solidFill>
+                              <a:latin typeface="Cambria Math" panose="02040503050406030204" pitchFamily="18" charset="0"/>
+                            </a:rPr>
+                            <m:t>𝑷</m:t>
+                          </m:r>
+                        </m:e>
+                        <m:sub>
+                          <m:r>
+                            <a:rPr lang="en-US" sz="2800" b="1" i="1" smtClean="0">
+                              <a:solidFill>
+                                <a:schemeClr val="accent2"/>
+                              </a:solidFill>
+                              <a:latin typeface="Cambria Math" panose="02040503050406030204" pitchFamily="18" charset="0"/>
+                            </a:rPr>
+                            <m:t>𝒚</m:t>
+                          </m:r>
+                        </m:sub>
+                      </m:sSub>
+                      <m:r>
+                        <a:rPr lang="en-US" sz="2800" b="1" i="1" smtClean="0">
+                          <a:solidFill>
+                            <a:schemeClr val="accent2"/>
+                          </a:solidFill>
+                          <a:latin typeface="Cambria Math" panose="02040503050406030204" pitchFamily="18" charset="0"/>
+                        </a:rPr>
+                        <m:t>↑</m:t>
+                      </m:r>
+                    </m:oMath>
+                  </m:oMathPara>
+                </a14:m>
+                <a:endParaRPr lang="en-US" sz="2800" b="1" dirty="0">
+                  <a:solidFill>
+                    <a:schemeClr val="accent2"/>
+                  </a:solidFill>
+                </a:endParaRPr>
+              </a:p>
+            </p:txBody>
+          </p:sp>
+        </mc:Choice>
+        <mc:Fallback>
+          <p:sp>
+            <p:nvSpPr>
+              <p:cNvPr id="10" name="TextBox 9">
+                <a:extLst>
+                  <a:ext uri="{FF2B5EF4-FFF2-40B4-BE49-F238E27FC236}">
+                    <a16:creationId xmlns:a16="http://schemas.microsoft.com/office/drawing/2014/main" id="{F0D09E51-0C6C-A8D4-EC24-D1A8DB26C74E}"/>
+                  </a:ext>
+                </a:extLst>
+              </p:cNvPr>
+              <p:cNvSpPr txBox="1">
+                <a:spLocks noRot="1" noChangeAspect="1" noMove="1" noResize="1" noEditPoints="1" noAdjustHandles="1" noChangeArrowheads="1" noChangeShapeType="1" noTextEdit="1"/>
+              </p:cNvSpPr>
+              <p:nvPr/>
+            </p:nvSpPr>
+            <p:spPr>
+              <a:xfrm>
+                <a:off x="2393028" y="4564417"/>
+                <a:ext cx="1160353" cy="562718"/>
+              </a:xfrm>
+              <a:prstGeom prst="rect">
+                <a:avLst/>
+              </a:prstGeom>
+              <a:blipFill>
+                <a:blip r:embed="rId6"/>
+                <a:stretch>
+                  <a:fillRect/>
+                </a:stretch>
+              </a:blipFill>
+            </p:spPr>
+            <p:txBody>
+              <a:bodyPr/>
+              <a:lstStyle/>
+              <a:p>
+                <a:r>
+                  <a:rPr lang="en-US">
+                    <a:noFill/>
+                  </a:rPr>
+                  <a:t> </a:t>
+                </a:r>
+              </a:p>
+            </p:txBody>
+          </p:sp>
+        </mc:Fallback>
+      </mc:AlternateContent>
+      <mc:AlternateContent xmlns:mc="http://schemas.openxmlformats.org/markup-compatibility/2006">
+        <mc:Choice xmlns:a14="http://schemas.microsoft.com/office/drawing/2010/main" Requires="a14">
+          <p:sp>
+            <p:nvSpPr>
+              <p:cNvPr id="11" name="TextBox 10">
+                <a:extLst>
+                  <a:ext uri="{FF2B5EF4-FFF2-40B4-BE49-F238E27FC236}">
+                    <a16:creationId xmlns:a16="http://schemas.microsoft.com/office/drawing/2014/main" id="{D0439795-E0F5-6E9A-F1DC-5F79F0CED195}"/>
+                  </a:ext>
+                </a:extLst>
+              </p:cNvPr>
+              <p:cNvSpPr txBox="1"/>
+              <p:nvPr/>
+            </p:nvSpPr>
+            <p:spPr>
+              <a:xfrm>
+                <a:off x="2536369" y="882650"/>
+                <a:ext cx="1314011" cy="562718"/>
+              </a:xfrm>
+              <a:prstGeom prst="rect">
+                <a:avLst/>
+              </a:prstGeom>
+              <a:noFill/>
+            </p:spPr>
+            <p:txBody>
+              <a:bodyPr wrap="square" rtlCol="0">
+                <a:spAutoFit/>
+              </a:bodyPr>
+              <a:lstStyle/>
+              <a:p>
+                <a:pPr/>
+                <a14:m>
+                  <m:oMathPara xmlns:m="http://schemas.openxmlformats.org/officeDocument/2006/math">
+                    <m:oMathParaPr>
+                      <m:jc m:val="centerGroup"/>
+                    </m:oMathParaPr>
+                    <m:oMath xmlns:m="http://schemas.openxmlformats.org/officeDocument/2006/math">
+                      <m:sSub>
+                        <m:sSubPr>
+                          <m:ctrlPr>
+                            <a:rPr lang="en-US" sz="2800" b="1" i="1" smtClean="0">
+                              <a:solidFill>
+                                <a:schemeClr val="accent6"/>
+                              </a:solidFill>
+                              <a:latin typeface="Cambria Math" panose="02040503050406030204" pitchFamily="18" charset="0"/>
+                            </a:rPr>
+                          </m:ctrlPr>
+                        </m:sSubPr>
+                        <m:e>
+                          <m:r>
+                            <a:rPr lang="en-US" sz="2800" b="1" i="1" smtClean="0">
+                              <a:solidFill>
+                                <a:schemeClr val="accent6"/>
+                              </a:solidFill>
+                              <a:latin typeface="Cambria Math" panose="02040503050406030204" pitchFamily="18" charset="0"/>
+                            </a:rPr>
+                            <m:t>𝑷</m:t>
+                          </m:r>
+                        </m:e>
+                        <m:sub>
+                          <m:r>
+                            <a:rPr lang="en-US" sz="2800" b="1" i="1" smtClean="0">
+                              <a:solidFill>
+                                <a:schemeClr val="accent6"/>
+                              </a:solidFill>
+                              <a:latin typeface="Cambria Math" panose="02040503050406030204" pitchFamily="18" charset="0"/>
+                            </a:rPr>
+                            <m:t>𝒚</m:t>
+                          </m:r>
+                        </m:sub>
+                      </m:sSub>
+                      <m:r>
+                        <a:rPr lang="en-US" sz="2800" b="1" i="1" smtClean="0">
+                          <a:solidFill>
+                            <a:schemeClr val="accent6"/>
+                          </a:solidFill>
+                          <a:latin typeface="Cambria Math" panose="02040503050406030204" pitchFamily="18" charset="0"/>
+                        </a:rPr>
+                        <m:t>↓</m:t>
+                      </m:r>
+                    </m:oMath>
+                  </m:oMathPara>
+                </a14:m>
+                <a:endParaRPr lang="en-US" sz="2800" b="1" dirty="0">
+                  <a:solidFill>
+                    <a:schemeClr val="accent6"/>
+                  </a:solidFill>
+                </a:endParaRPr>
+              </a:p>
+            </p:txBody>
+          </p:sp>
+        </mc:Choice>
+        <mc:Fallback>
+          <p:sp>
+            <p:nvSpPr>
+              <p:cNvPr id="11" name="TextBox 10">
+                <a:extLst>
+                  <a:ext uri="{FF2B5EF4-FFF2-40B4-BE49-F238E27FC236}">
+                    <a16:creationId xmlns:a16="http://schemas.microsoft.com/office/drawing/2014/main" id="{D0439795-E0F5-6E9A-F1DC-5F79F0CED195}"/>
+                  </a:ext>
+                </a:extLst>
+              </p:cNvPr>
+              <p:cNvSpPr txBox="1">
+                <a:spLocks noRot="1" noChangeAspect="1" noMove="1" noResize="1" noEditPoints="1" noAdjustHandles="1" noChangeArrowheads="1" noChangeShapeType="1" noTextEdit="1"/>
+              </p:cNvSpPr>
+              <p:nvPr/>
+            </p:nvSpPr>
+            <p:spPr>
+              <a:xfrm>
+                <a:off x="2536369" y="882650"/>
+                <a:ext cx="1314011" cy="562718"/>
+              </a:xfrm>
+              <a:prstGeom prst="rect">
+                <a:avLst/>
+              </a:prstGeom>
+              <a:blipFill>
+                <a:blip r:embed="rId7"/>
+                <a:stretch>
+                  <a:fillRect/>
+                </a:stretch>
+              </a:blipFill>
+            </p:spPr>
+            <p:txBody>
+              <a:bodyPr/>
+              <a:lstStyle/>
+              <a:p>
+                <a:r>
+                  <a:rPr lang="en-US">
+                    <a:noFill/>
+                  </a:rPr>
+                  <a:t> </a:t>
+                </a:r>
+              </a:p>
+            </p:txBody>
+          </p:sp>
+        </mc:Fallback>
+      </mc:AlternateContent>
+      <p:cxnSp>
+        <p:nvCxnSpPr>
+          <p:cNvPr id="17" name="Straight Arrow Connector 16">
+            <a:extLst>
+              <a:ext uri="{FF2B5EF4-FFF2-40B4-BE49-F238E27FC236}">
+                <a16:creationId xmlns:a16="http://schemas.microsoft.com/office/drawing/2014/main" id="{2336FE25-AA9F-E1BC-8A8A-8A3FB0A9E8E3}"/>
+              </a:ext>
+            </a:extLst>
+          </p:cNvPr>
+          <p:cNvCxnSpPr>
+            <a:cxnSpLocks/>
+            <a:stCxn id="16" idx="2"/>
+            <a:endCxn id="18" idx="0"/>
+          </p:cNvCxnSpPr>
+          <p:nvPr/>
+        </p:nvCxnSpPr>
+        <p:spPr>
+          <a:xfrm>
+            <a:off x="1983942" y="2868802"/>
+            <a:ext cx="0" cy="1002346"/>
+          </a:xfrm>
+          <a:prstGeom prst="straightConnector1">
+            <a:avLst/>
+          </a:prstGeom>
+          <a:ln w="57150">
+            <a:solidFill>
+              <a:schemeClr val="accent2"/>
+            </a:solidFill>
+            <a:tailEnd type="triangle"/>
+          </a:ln>
+        </p:spPr>
+        <p:style>
+          <a:lnRef idx="1">
+            <a:schemeClr val="accent1"/>
+          </a:lnRef>
+          <a:fillRef idx="0">
+            <a:schemeClr val="accent1"/>
+          </a:fillRef>
+          <a:effectRef idx="0">
+            <a:schemeClr val="accent1"/>
+          </a:effectRef>
+          <a:fontRef idx="minor">
+            <a:schemeClr val="tx1"/>
+          </a:fontRef>
+        </p:style>
+      </p:cxnSp>
+      <p:cxnSp>
+        <p:nvCxnSpPr>
+          <p:cNvPr id="20" name="Straight Arrow Connector 19">
+            <a:extLst>
+              <a:ext uri="{FF2B5EF4-FFF2-40B4-BE49-F238E27FC236}">
+                <a16:creationId xmlns:a16="http://schemas.microsoft.com/office/drawing/2014/main" id="{680B5365-1936-EBE1-64F3-26357CDAB416}"/>
+              </a:ext>
+            </a:extLst>
+          </p:cNvPr>
+          <p:cNvCxnSpPr>
+            <a:cxnSpLocks/>
+            <a:stCxn id="16" idx="0"/>
+            <a:endCxn id="19" idx="2"/>
+          </p:cNvCxnSpPr>
+          <p:nvPr/>
+        </p:nvCxnSpPr>
+        <p:spPr>
+          <a:xfrm flipV="1">
+            <a:off x="1983942" y="1427233"/>
+            <a:ext cx="0" cy="749392"/>
+          </a:xfrm>
+          <a:prstGeom prst="straightConnector1">
+            <a:avLst/>
+          </a:prstGeom>
+          <a:ln w="57150">
+            <a:solidFill>
+              <a:schemeClr val="accent6"/>
+            </a:solidFill>
+            <a:tailEnd type="triangle"/>
+          </a:ln>
+        </p:spPr>
+        <p:style>
+          <a:lnRef idx="1">
+            <a:schemeClr val="accent1"/>
+          </a:lnRef>
+          <a:fillRef idx="0">
+            <a:schemeClr val="accent1"/>
+          </a:fillRef>
+          <a:effectRef idx="0">
+            <a:schemeClr val="accent1"/>
+          </a:effectRef>
+          <a:fontRef idx="minor">
+            <a:schemeClr val="tx1"/>
+          </a:fontRef>
+        </p:style>
+      </p:cxnSp>
+      <p:sp>
+        <p:nvSpPr>
+          <p:cNvPr id="6" name="Freeform: Shape 5">
+            <a:extLst>
+              <a:ext uri="{FF2B5EF4-FFF2-40B4-BE49-F238E27FC236}">
+                <a16:creationId xmlns:a16="http://schemas.microsoft.com/office/drawing/2014/main" id="{0CF6D7D9-CF42-B396-29A8-52DACB5F1FF9}"/>
+              </a:ext>
+            </a:extLst>
+          </p:cNvPr>
+          <p:cNvSpPr/>
+          <p:nvPr/>
+        </p:nvSpPr>
+        <p:spPr>
+          <a:xfrm>
+            <a:off x="2286000" y="395306"/>
+            <a:ext cx="7601613" cy="5637321"/>
+          </a:xfrm>
+          <a:custGeom>
+            <a:avLst/>
+            <a:gdLst>
+              <a:gd name="connsiteX0" fmla="*/ 0 w 10227076"/>
+              <a:gd name="connsiteY0" fmla="*/ 0 h 5637321"/>
+              <a:gd name="connsiteX1" fmla="*/ 35511 w 10227076"/>
+              <a:gd name="connsiteY1" fmla="*/ 5637321 h 5637321"/>
+              <a:gd name="connsiteX2" fmla="*/ 10227076 w 10227076"/>
+              <a:gd name="connsiteY2" fmla="*/ 5584055 h 5637321"/>
+            </a:gdLst>
+            <a:ahLst/>
+            <a:cxnLst>
+              <a:cxn ang="0">
+                <a:pos x="connsiteX0" y="connsiteY0"/>
+              </a:cxn>
+              <a:cxn ang="0">
+                <a:pos x="connsiteX1" y="connsiteY1"/>
+              </a:cxn>
+              <a:cxn ang="0">
+                <a:pos x="connsiteX2" y="connsiteY2"/>
+              </a:cxn>
+            </a:cxnLst>
+            <a:rect l="l" t="t" r="r" b="b"/>
+            <a:pathLst>
+              <a:path w="10227076" h="5637321">
+                <a:moveTo>
+                  <a:pt x="0" y="0"/>
+                </a:moveTo>
+                <a:lnTo>
+                  <a:pt x="35511" y="5637321"/>
+                </a:lnTo>
+                <a:lnTo>
+                  <a:pt x="10227076" y="5584055"/>
+                </a:lnTo>
+              </a:path>
+            </a:pathLst>
+          </a:custGeom>
+          <a:ln w="38100"/>
+        </p:spPr>
+        <p:style>
+          <a:lnRef idx="3">
+            <a:schemeClr val="dk1"/>
+          </a:lnRef>
+          <a:fillRef idx="0">
+            <a:schemeClr val="dk1"/>
+          </a:fillRef>
+          <a:effectRef idx="2">
+            <a:schemeClr val="dk1"/>
+          </a:effectRef>
+          <a:fontRef idx="minor">
+            <a:schemeClr val="tx1"/>
+          </a:fontRef>
+        </p:style>
+        <p:txBody>
+          <a:bodyPr rtlCol="0" anchor="ctr"/>
+          <a:lstStyle/>
+          <a:p>
+            <a:pPr algn="ctr"/>
+            <a:endParaRPr lang="en-US" dirty="0"/>
+          </a:p>
+        </p:txBody>
+      </p:sp>
+      <mc:AlternateContent xmlns:mc="http://schemas.openxmlformats.org/markup-compatibility/2006">
+        <mc:Choice xmlns:a14="http://schemas.microsoft.com/office/drawing/2010/main" Requires="a14">
+          <p:sp>
+            <p:nvSpPr>
+              <p:cNvPr id="18" name="TextBox 17">
+                <a:extLst>
+                  <a:ext uri="{FF2B5EF4-FFF2-40B4-BE49-F238E27FC236}">
+                    <a16:creationId xmlns:a16="http://schemas.microsoft.com/office/drawing/2014/main" id="{246CB4B2-1BEC-10CD-2309-5826C69EA0EB}"/>
+                  </a:ext>
+                </a:extLst>
+              </p:cNvPr>
+              <p:cNvSpPr txBox="1"/>
+              <p:nvPr/>
+            </p:nvSpPr>
+            <p:spPr>
+              <a:xfrm>
+                <a:off x="1580244" y="3871148"/>
+                <a:ext cx="807396" cy="692177"/>
+              </a:xfrm>
+              <a:prstGeom prst="rect">
+                <a:avLst/>
+              </a:prstGeom>
+              <a:noFill/>
+            </p:spPr>
+            <p:txBody>
+              <a:bodyPr wrap="square" rtlCol="0">
+                <a:spAutoFit/>
+              </a:bodyPr>
+              <a:lstStyle/>
+              <a:p>
+                <a:pPr/>
+                <a14:m>
+                  <m:oMathPara xmlns:m="http://schemas.openxmlformats.org/officeDocument/2006/math">
+                    <m:oMathParaPr>
+                      <m:jc m:val="centerGroup"/>
+                    </m:oMathParaPr>
+                    <m:oMath xmlns:m="http://schemas.openxmlformats.org/officeDocument/2006/math">
+                      <m:f>
+                        <m:fPr>
+                          <m:ctrlPr>
+                            <a:rPr lang="en-US" b="1" i="1" smtClean="0">
+                              <a:solidFill>
+                                <a:schemeClr val="tx1"/>
+                              </a:solidFill>
+                              <a:latin typeface="Cambria Math" panose="02040503050406030204" pitchFamily="18" charset="0"/>
+                            </a:rPr>
+                          </m:ctrlPr>
+                        </m:fPr>
+                        <m:num>
+                          <m:r>
+                            <a:rPr lang="en-US" b="1" i="1" smtClean="0">
+                              <a:solidFill>
+                                <a:schemeClr val="tx1"/>
+                              </a:solidFill>
+                              <a:latin typeface="Cambria Math" panose="02040503050406030204" pitchFamily="18" charset="0"/>
+                            </a:rPr>
+                            <m:t>𝑴</m:t>
+                          </m:r>
+                        </m:num>
+                        <m:den>
+                          <m:sSub>
+                            <m:sSubPr>
+                              <m:ctrlPr>
+                                <a:rPr lang="en-US" b="1" i="1" smtClean="0">
+                                  <a:solidFill>
+                                    <a:schemeClr val="tx1"/>
+                                  </a:solidFill>
+                                  <a:latin typeface="Cambria Math" panose="02040503050406030204" pitchFamily="18" charset="0"/>
+                                </a:rPr>
+                              </m:ctrlPr>
+                            </m:sSubPr>
+                            <m:e>
+                              <m:r>
+                                <a:rPr lang="en-US" b="1" i="1" smtClean="0">
+                                  <a:solidFill>
+                                    <a:schemeClr val="tx1"/>
+                                  </a:solidFill>
+                                  <a:latin typeface="Cambria Math" panose="02040503050406030204" pitchFamily="18" charset="0"/>
+                                </a:rPr>
+                                <m:t>𝑷</m:t>
+                              </m:r>
+                            </m:e>
+                            <m:sub>
+                              <m:r>
+                                <a:rPr lang="en-US" b="1" i="1" smtClean="0">
+                                  <a:solidFill>
+                                    <a:schemeClr val="tx1"/>
+                                  </a:solidFill>
+                                  <a:latin typeface="Cambria Math" panose="02040503050406030204" pitchFamily="18" charset="0"/>
+                                </a:rPr>
+                                <m:t>𝒚</m:t>
+                              </m:r>
+                            </m:sub>
+                          </m:sSub>
+                        </m:den>
+                      </m:f>
+                    </m:oMath>
+                  </m:oMathPara>
+                </a14:m>
+                <a:endParaRPr lang="en-US" b="1" dirty="0">
+                  <a:solidFill>
+                    <a:schemeClr val="tx1"/>
+                  </a:solidFill>
+                </a:endParaRPr>
+              </a:p>
+            </p:txBody>
+          </p:sp>
+        </mc:Choice>
+        <mc:Fallback>
+          <p:sp>
+            <p:nvSpPr>
+              <p:cNvPr id="18" name="TextBox 17">
+                <a:extLst>
+                  <a:ext uri="{FF2B5EF4-FFF2-40B4-BE49-F238E27FC236}">
+                    <a16:creationId xmlns:a16="http://schemas.microsoft.com/office/drawing/2014/main" id="{246CB4B2-1BEC-10CD-2309-5826C69EA0EB}"/>
+                  </a:ext>
+                </a:extLst>
+              </p:cNvPr>
+              <p:cNvSpPr txBox="1">
+                <a:spLocks noRot="1" noChangeAspect="1" noMove="1" noResize="1" noEditPoints="1" noAdjustHandles="1" noChangeArrowheads="1" noChangeShapeType="1" noTextEdit="1"/>
+              </p:cNvSpPr>
+              <p:nvPr/>
+            </p:nvSpPr>
+            <p:spPr>
+              <a:xfrm>
+                <a:off x="1580244" y="3871148"/>
+                <a:ext cx="807396" cy="692177"/>
+              </a:xfrm>
+              <a:prstGeom prst="rect">
+                <a:avLst/>
+              </a:prstGeom>
+              <a:blipFill>
+                <a:blip r:embed="rId8"/>
+                <a:stretch>
+                  <a:fillRect/>
+                </a:stretch>
+              </a:blipFill>
+            </p:spPr>
+            <p:txBody>
+              <a:bodyPr/>
+              <a:lstStyle/>
+              <a:p>
+                <a:r>
+                  <a:rPr lang="en-US">
+                    <a:noFill/>
+                  </a:rPr>
+                  <a:t> </a:t>
+                </a:r>
+              </a:p>
+            </p:txBody>
+          </p:sp>
+        </mc:Fallback>
+      </mc:AlternateContent>
+      <mc:AlternateContent xmlns:mc="http://schemas.openxmlformats.org/markup-compatibility/2006">
+        <mc:Choice xmlns:a14="http://schemas.microsoft.com/office/drawing/2010/main" Requires="a14">
+          <p:sp>
+            <p:nvSpPr>
+              <p:cNvPr id="19" name="TextBox 18">
+                <a:extLst>
+                  <a:ext uri="{FF2B5EF4-FFF2-40B4-BE49-F238E27FC236}">
+                    <a16:creationId xmlns:a16="http://schemas.microsoft.com/office/drawing/2014/main" id="{6321E2FD-A659-65D8-B5C2-22853296692B}"/>
+                  </a:ext>
+                </a:extLst>
+              </p:cNvPr>
+              <p:cNvSpPr txBox="1"/>
+              <p:nvPr/>
+            </p:nvSpPr>
+            <p:spPr>
+              <a:xfrm>
+                <a:off x="1580244" y="735056"/>
+                <a:ext cx="807396" cy="692177"/>
+              </a:xfrm>
+              <a:prstGeom prst="rect">
+                <a:avLst/>
+              </a:prstGeom>
+              <a:noFill/>
+            </p:spPr>
+            <p:txBody>
+              <a:bodyPr wrap="square" rtlCol="0">
+                <a:spAutoFit/>
+              </a:bodyPr>
+              <a:lstStyle/>
+              <a:p>
+                <a:pPr/>
+                <a14:m>
+                  <m:oMathPara xmlns:m="http://schemas.openxmlformats.org/officeDocument/2006/math">
+                    <m:oMathParaPr>
+                      <m:jc m:val="centerGroup"/>
+                    </m:oMathParaPr>
+                    <m:oMath xmlns:m="http://schemas.openxmlformats.org/officeDocument/2006/math">
+                      <m:f>
+                        <m:fPr>
+                          <m:ctrlPr>
+                            <a:rPr lang="en-US" b="1" i="1" smtClean="0">
+                              <a:solidFill>
+                                <a:schemeClr val="tx1"/>
+                              </a:solidFill>
+                              <a:latin typeface="Cambria Math" panose="02040503050406030204" pitchFamily="18" charset="0"/>
+                            </a:rPr>
+                          </m:ctrlPr>
+                        </m:fPr>
+                        <m:num>
+                          <m:r>
+                            <a:rPr lang="en-US" b="1" i="1" smtClean="0">
+                              <a:solidFill>
+                                <a:schemeClr val="tx1"/>
+                              </a:solidFill>
+                              <a:latin typeface="Cambria Math" panose="02040503050406030204" pitchFamily="18" charset="0"/>
+                            </a:rPr>
+                            <m:t>𝑴</m:t>
+                          </m:r>
+                        </m:num>
+                        <m:den>
+                          <m:sSub>
+                            <m:sSubPr>
+                              <m:ctrlPr>
+                                <a:rPr lang="en-US" b="1" i="1" smtClean="0">
+                                  <a:solidFill>
+                                    <a:schemeClr val="tx1"/>
+                                  </a:solidFill>
+                                  <a:latin typeface="Cambria Math" panose="02040503050406030204" pitchFamily="18" charset="0"/>
+                                </a:rPr>
+                              </m:ctrlPr>
+                            </m:sSubPr>
+                            <m:e>
+                              <m:r>
+                                <a:rPr lang="en-US" b="1" i="1" smtClean="0">
+                                  <a:solidFill>
+                                    <a:schemeClr val="tx1"/>
+                                  </a:solidFill>
+                                  <a:latin typeface="Cambria Math" panose="02040503050406030204" pitchFamily="18" charset="0"/>
+                                </a:rPr>
+                                <m:t>𝑷</m:t>
+                              </m:r>
+                            </m:e>
+                            <m:sub>
+                              <m:r>
+                                <a:rPr lang="en-US" b="1" i="1" smtClean="0">
+                                  <a:solidFill>
+                                    <a:schemeClr val="tx1"/>
+                                  </a:solidFill>
+                                  <a:latin typeface="Cambria Math" panose="02040503050406030204" pitchFamily="18" charset="0"/>
+                                </a:rPr>
+                                <m:t>𝒚</m:t>
+                              </m:r>
+                            </m:sub>
+                          </m:sSub>
+                        </m:den>
+                      </m:f>
+                    </m:oMath>
+                  </m:oMathPara>
+                </a14:m>
+                <a:endParaRPr lang="en-US" b="1" dirty="0">
+                  <a:solidFill>
+                    <a:schemeClr val="tx1"/>
+                  </a:solidFill>
+                </a:endParaRPr>
+              </a:p>
+            </p:txBody>
+          </p:sp>
+        </mc:Choice>
+        <mc:Fallback>
+          <p:sp>
+            <p:nvSpPr>
+              <p:cNvPr id="19" name="TextBox 18">
+                <a:extLst>
+                  <a:ext uri="{FF2B5EF4-FFF2-40B4-BE49-F238E27FC236}">
+                    <a16:creationId xmlns:a16="http://schemas.microsoft.com/office/drawing/2014/main" id="{6321E2FD-A659-65D8-B5C2-22853296692B}"/>
+                  </a:ext>
+                </a:extLst>
+              </p:cNvPr>
+              <p:cNvSpPr txBox="1">
+                <a:spLocks noRot="1" noChangeAspect="1" noMove="1" noResize="1" noEditPoints="1" noAdjustHandles="1" noChangeArrowheads="1" noChangeShapeType="1" noTextEdit="1"/>
+              </p:cNvSpPr>
+              <p:nvPr/>
+            </p:nvSpPr>
+            <p:spPr>
+              <a:xfrm>
+                <a:off x="1580244" y="735056"/>
+                <a:ext cx="807396" cy="692177"/>
+              </a:xfrm>
+              <a:prstGeom prst="rect">
+                <a:avLst/>
+              </a:prstGeom>
+              <a:blipFill>
+                <a:blip r:embed="rId9"/>
+                <a:stretch>
+                  <a:fillRect/>
+                </a:stretch>
+              </a:blipFill>
+            </p:spPr>
+            <p:txBody>
+              <a:bodyPr/>
+              <a:lstStyle/>
+              <a:p>
+                <a:r>
+                  <a:rPr lang="en-US">
+                    <a:noFill/>
+                  </a:rPr>
+                  <a:t> </a:t>
+                </a:r>
+              </a:p>
+            </p:txBody>
+          </p:sp>
+        </mc:Fallback>
+      </mc:AlternateContent>
+    </p:spTree>
+    <p:extLst>
+      <p:ext uri="{BB962C8B-B14F-4D97-AF65-F5344CB8AC3E}">
+        <p14:creationId xmlns:p14="http://schemas.microsoft.com/office/powerpoint/2010/main" val="24738882"/>
       </p:ext>
     </p:extLst>
   </p:cSld>

</xml_diff>

<commit_message>
added income change graph
</commit_message>
<xml_diff>
--- a/Slides/graph-maker.pptx
+++ b/Slides/graph-maker.pptx
@@ -9,17 +9,18 @@
     <p:sldId id="257" r:id="rId3"/>
     <p:sldId id="258" r:id="rId4"/>
     <p:sldId id="259" r:id="rId5"/>
-    <p:sldId id="260" r:id="rId6"/>
-    <p:sldId id="266" r:id="rId7"/>
-    <p:sldId id="261" r:id="rId8"/>
-    <p:sldId id="262" r:id="rId9"/>
-    <p:sldId id="263" r:id="rId10"/>
-    <p:sldId id="264" r:id="rId11"/>
-    <p:sldId id="265" r:id="rId12"/>
-    <p:sldId id="267" r:id="rId13"/>
-    <p:sldId id="268" r:id="rId14"/>
-    <p:sldId id="269" r:id="rId15"/>
-    <p:sldId id="270" r:id="rId16"/>
+    <p:sldId id="271" r:id="rId6"/>
+    <p:sldId id="260" r:id="rId7"/>
+    <p:sldId id="266" r:id="rId8"/>
+    <p:sldId id="261" r:id="rId9"/>
+    <p:sldId id="262" r:id="rId10"/>
+    <p:sldId id="263" r:id="rId11"/>
+    <p:sldId id="264" r:id="rId12"/>
+    <p:sldId id="265" r:id="rId13"/>
+    <p:sldId id="267" r:id="rId14"/>
+    <p:sldId id="268" r:id="rId15"/>
+    <p:sldId id="269" r:id="rId16"/>
+    <p:sldId id="270" r:id="rId17"/>
   </p:sldIdLst>
   <p:sldSz cx="12192000" cy="6858000"/>
   <p:notesSz cx="6858000" cy="9144000"/>
@@ -273,7 +274,7 @@
           <a:p>
             <a:fld id="{B3C0BABF-8EDA-4B51-8A1B-0A9A6121571D}" type="datetimeFigureOut">
               <a:rPr lang="en-US" smtClean="0"/>
-              <a:t>1/22/2024</a:t>
+              <a:t>1/23/2024</a:t>
             </a:fld>
             <a:endParaRPr lang="en-US"/>
           </a:p>
@@ -471,7 +472,7 @@
           <a:p>
             <a:fld id="{B3C0BABF-8EDA-4B51-8A1B-0A9A6121571D}" type="datetimeFigureOut">
               <a:rPr lang="en-US" smtClean="0"/>
-              <a:t>1/22/2024</a:t>
+              <a:t>1/23/2024</a:t>
             </a:fld>
             <a:endParaRPr lang="en-US"/>
           </a:p>
@@ -679,7 +680,7 @@
           <a:p>
             <a:fld id="{B3C0BABF-8EDA-4B51-8A1B-0A9A6121571D}" type="datetimeFigureOut">
               <a:rPr lang="en-US" smtClean="0"/>
-              <a:t>1/22/2024</a:t>
+              <a:t>1/23/2024</a:t>
             </a:fld>
             <a:endParaRPr lang="en-US"/>
           </a:p>
@@ -877,7 +878,7 @@
           <a:p>
             <a:fld id="{B3C0BABF-8EDA-4B51-8A1B-0A9A6121571D}" type="datetimeFigureOut">
               <a:rPr lang="en-US" smtClean="0"/>
-              <a:t>1/22/2024</a:t>
+              <a:t>1/23/2024</a:t>
             </a:fld>
             <a:endParaRPr lang="en-US"/>
           </a:p>
@@ -1152,7 +1153,7 @@
           <a:p>
             <a:fld id="{B3C0BABF-8EDA-4B51-8A1B-0A9A6121571D}" type="datetimeFigureOut">
               <a:rPr lang="en-US" smtClean="0"/>
-              <a:t>1/22/2024</a:t>
+              <a:t>1/23/2024</a:t>
             </a:fld>
             <a:endParaRPr lang="en-US"/>
           </a:p>
@@ -1417,7 +1418,7 @@
           <a:p>
             <a:fld id="{B3C0BABF-8EDA-4B51-8A1B-0A9A6121571D}" type="datetimeFigureOut">
               <a:rPr lang="en-US" smtClean="0"/>
-              <a:t>1/22/2024</a:t>
+              <a:t>1/23/2024</a:t>
             </a:fld>
             <a:endParaRPr lang="en-US"/>
           </a:p>
@@ -1829,7 +1830,7 @@
           <a:p>
             <a:fld id="{B3C0BABF-8EDA-4B51-8A1B-0A9A6121571D}" type="datetimeFigureOut">
               <a:rPr lang="en-US" smtClean="0"/>
-              <a:t>1/22/2024</a:t>
+              <a:t>1/23/2024</a:t>
             </a:fld>
             <a:endParaRPr lang="en-US"/>
           </a:p>
@@ -1970,7 +1971,7 @@
           <a:p>
             <a:fld id="{B3C0BABF-8EDA-4B51-8A1B-0A9A6121571D}" type="datetimeFigureOut">
               <a:rPr lang="en-US" smtClean="0"/>
-              <a:t>1/22/2024</a:t>
+              <a:t>1/23/2024</a:t>
             </a:fld>
             <a:endParaRPr lang="en-US"/>
           </a:p>
@@ -2083,7 +2084,7 @@
           <a:p>
             <a:fld id="{B3C0BABF-8EDA-4B51-8A1B-0A9A6121571D}" type="datetimeFigureOut">
               <a:rPr lang="en-US" smtClean="0"/>
-              <a:t>1/22/2024</a:t>
+              <a:t>1/23/2024</a:t>
             </a:fld>
             <a:endParaRPr lang="en-US"/>
           </a:p>
@@ -2394,7 +2395,7 @@
           <a:p>
             <a:fld id="{B3C0BABF-8EDA-4B51-8A1B-0A9A6121571D}" type="datetimeFigureOut">
               <a:rPr lang="en-US" smtClean="0"/>
-              <a:t>1/22/2024</a:t>
+              <a:t>1/23/2024</a:t>
             </a:fld>
             <a:endParaRPr lang="en-US"/>
           </a:p>
@@ -2682,7 +2683,7 @@
           <a:p>
             <a:fld id="{B3C0BABF-8EDA-4B51-8A1B-0A9A6121571D}" type="datetimeFigureOut">
               <a:rPr lang="en-US" smtClean="0"/>
-              <a:t>1/22/2024</a:t>
+              <a:t>1/23/2024</a:t>
             </a:fld>
             <a:endParaRPr lang="en-US"/>
           </a:p>
@@ -2923,7 +2924,7 @@
           <a:p>
             <a:fld id="{B3C0BABF-8EDA-4B51-8A1B-0A9A6121571D}" type="datetimeFigureOut">
               <a:rPr lang="en-US" smtClean="0"/>
-              <a:t>1/22/2024</a:t>
+              <a:t>1/23/2024</a:t>
             </a:fld>
             <a:endParaRPr lang="en-US"/>
           </a:p>
@@ -5066,6 +5067,1229 @@
       </p:grpSpPr>
       <p:sp>
         <p:nvSpPr>
+          <p:cNvPr id="2" name="Freeform: Shape 1">
+            <a:extLst>
+              <a:ext uri="{FF2B5EF4-FFF2-40B4-BE49-F238E27FC236}">
+                <a16:creationId xmlns:a16="http://schemas.microsoft.com/office/drawing/2014/main" id="{D68EDA48-D74D-45EB-44D7-69F41E2846F4}"/>
+              </a:ext>
+            </a:extLst>
+          </p:cNvPr>
+          <p:cNvSpPr/>
+          <p:nvPr/>
+        </p:nvSpPr>
+        <p:spPr>
+          <a:xfrm>
+            <a:off x="2286000" y="395306"/>
+            <a:ext cx="7601613" cy="5637321"/>
+          </a:xfrm>
+          <a:custGeom>
+            <a:avLst/>
+            <a:gdLst>
+              <a:gd name="connsiteX0" fmla="*/ 0 w 10227076"/>
+              <a:gd name="connsiteY0" fmla="*/ 0 h 5637321"/>
+              <a:gd name="connsiteX1" fmla="*/ 35511 w 10227076"/>
+              <a:gd name="connsiteY1" fmla="*/ 5637321 h 5637321"/>
+              <a:gd name="connsiteX2" fmla="*/ 10227076 w 10227076"/>
+              <a:gd name="connsiteY2" fmla="*/ 5584055 h 5637321"/>
+            </a:gdLst>
+            <a:ahLst/>
+            <a:cxnLst>
+              <a:cxn ang="0">
+                <a:pos x="connsiteX0" y="connsiteY0"/>
+              </a:cxn>
+              <a:cxn ang="0">
+                <a:pos x="connsiteX1" y="connsiteY1"/>
+              </a:cxn>
+              <a:cxn ang="0">
+                <a:pos x="connsiteX2" y="connsiteY2"/>
+              </a:cxn>
+            </a:cxnLst>
+            <a:rect l="l" t="t" r="r" b="b"/>
+            <a:pathLst>
+              <a:path w="10227076" h="5637321">
+                <a:moveTo>
+                  <a:pt x="0" y="0"/>
+                </a:moveTo>
+                <a:lnTo>
+                  <a:pt x="35511" y="5637321"/>
+                </a:lnTo>
+                <a:lnTo>
+                  <a:pt x="10227076" y="5584055"/>
+                </a:lnTo>
+              </a:path>
+            </a:pathLst>
+          </a:custGeom>
+          <a:ln w="38100"/>
+        </p:spPr>
+        <p:style>
+          <a:lnRef idx="3">
+            <a:schemeClr val="dk1"/>
+          </a:lnRef>
+          <a:fillRef idx="0">
+            <a:schemeClr val="dk1"/>
+          </a:fillRef>
+          <a:effectRef idx="2">
+            <a:schemeClr val="dk1"/>
+          </a:effectRef>
+          <a:fontRef idx="minor">
+            <a:schemeClr val="tx1"/>
+          </a:fontRef>
+        </p:style>
+        <p:txBody>
+          <a:bodyPr rtlCol="0" anchor="ctr"/>
+          <a:lstStyle/>
+          <a:p>
+            <a:pPr algn="ctr"/>
+            <a:endParaRPr lang="en-US" dirty="0"/>
+          </a:p>
+        </p:txBody>
+      </p:sp>
+      <p:sp>
+        <p:nvSpPr>
+          <p:cNvPr id="3" name="Freeform: Shape 2">
+            <a:extLst>
+              <a:ext uri="{FF2B5EF4-FFF2-40B4-BE49-F238E27FC236}">
+                <a16:creationId xmlns:a16="http://schemas.microsoft.com/office/drawing/2014/main" id="{5307EFDA-60D6-DA65-C642-2EC9B9650D66}"/>
+              </a:ext>
+            </a:extLst>
+          </p:cNvPr>
+          <p:cNvSpPr/>
+          <p:nvPr/>
+        </p:nvSpPr>
+        <p:spPr>
+          <a:xfrm rot="20865587">
+            <a:off x="3027367" y="1320180"/>
+            <a:ext cx="5681709" cy="3187083"/>
+          </a:xfrm>
+          <a:custGeom>
+            <a:avLst/>
+            <a:gdLst>
+              <a:gd name="connsiteX0" fmla="*/ 0 w 5681709"/>
+              <a:gd name="connsiteY0" fmla="*/ 0 h 3187083"/>
+              <a:gd name="connsiteX1" fmla="*/ 514905 w 5681709"/>
+              <a:gd name="connsiteY1" fmla="*/ 1189608 h 3187083"/>
+              <a:gd name="connsiteX2" fmla="*/ 1997476 w 5681709"/>
+              <a:gd name="connsiteY2" fmla="*/ 2414726 h 3187083"/>
+              <a:gd name="connsiteX3" fmla="*/ 4136994 w 5681709"/>
+              <a:gd name="connsiteY3" fmla="*/ 3053918 h 3187083"/>
+              <a:gd name="connsiteX4" fmla="*/ 5681709 w 5681709"/>
+              <a:gd name="connsiteY4" fmla="*/ 3187083 h 3187083"/>
+            </a:gdLst>
+            <a:ahLst/>
+            <a:cxnLst>
+              <a:cxn ang="0">
+                <a:pos x="connsiteX0" y="connsiteY0"/>
+              </a:cxn>
+              <a:cxn ang="0">
+                <a:pos x="connsiteX1" y="connsiteY1"/>
+              </a:cxn>
+              <a:cxn ang="0">
+                <a:pos x="connsiteX2" y="connsiteY2"/>
+              </a:cxn>
+              <a:cxn ang="0">
+                <a:pos x="connsiteX3" y="connsiteY3"/>
+              </a:cxn>
+              <a:cxn ang="0">
+                <a:pos x="connsiteX4" y="connsiteY4"/>
+              </a:cxn>
+            </a:cxnLst>
+            <a:rect l="l" t="t" r="r" b="b"/>
+            <a:pathLst>
+              <a:path w="5681709" h="3187083">
+                <a:moveTo>
+                  <a:pt x="0" y="0"/>
+                </a:moveTo>
+                <a:cubicBezTo>
+                  <a:pt x="90996" y="393577"/>
+                  <a:pt x="181992" y="787154"/>
+                  <a:pt x="514905" y="1189608"/>
+                </a:cubicBezTo>
+                <a:cubicBezTo>
+                  <a:pt x="847818" y="1592062"/>
+                  <a:pt x="1393795" y="2104008"/>
+                  <a:pt x="1997476" y="2414726"/>
+                </a:cubicBezTo>
+                <a:cubicBezTo>
+                  <a:pt x="2601157" y="2725444"/>
+                  <a:pt x="3522955" y="2925192"/>
+                  <a:pt x="4136994" y="3053918"/>
+                </a:cubicBezTo>
+                <a:cubicBezTo>
+                  <a:pt x="4751033" y="3182644"/>
+                  <a:pt x="5434614" y="3133817"/>
+                  <a:pt x="5681709" y="3187083"/>
+                </a:cubicBezTo>
+              </a:path>
+            </a:pathLst>
+          </a:custGeom>
+          <a:noFill/>
+          <a:ln w="57150"/>
+        </p:spPr>
+        <p:style>
+          <a:lnRef idx="2">
+            <a:schemeClr val="accent1">
+              <a:shade val="15000"/>
+            </a:schemeClr>
+          </a:lnRef>
+          <a:fillRef idx="1">
+            <a:schemeClr val="accent1"/>
+          </a:fillRef>
+          <a:effectRef idx="0">
+            <a:schemeClr val="accent1"/>
+          </a:effectRef>
+          <a:fontRef idx="minor">
+            <a:schemeClr val="lt1"/>
+          </a:fontRef>
+        </p:style>
+        <p:txBody>
+          <a:bodyPr rtlCol="0" anchor="ctr"/>
+          <a:lstStyle/>
+          <a:p>
+            <a:pPr algn="ctr"/>
+            <a:endParaRPr lang="en-US"/>
+          </a:p>
+        </p:txBody>
+      </p:sp>
+      <p:sp>
+        <p:nvSpPr>
+          <p:cNvPr id="4" name="Freeform: Shape 3">
+            <a:extLst>
+              <a:ext uri="{FF2B5EF4-FFF2-40B4-BE49-F238E27FC236}">
+                <a16:creationId xmlns:a16="http://schemas.microsoft.com/office/drawing/2014/main" id="{CABC5D48-6001-2E19-50C0-0C0D75D1F06D}"/>
+              </a:ext>
+            </a:extLst>
+          </p:cNvPr>
+          <p:cNvSpPr/>
+          <p:nvPr/>
+        </p:nvSpPr>
+        <p:spPr>
+          <a:xfrm rot="563085">
+            <a:off x="3534367" y="1620425"/>
+            <a:ext cx="5681709" cy="3187083"/>
+          </a:xfrm>
+          <a:custGeom>
+            <a:avLst/>
+            <a:gdLst>
+              <a:gd name="connsiteX0" fmla="*/ 0 w 5681709"/>
+              <a:gd name="connsiteY0" fmla="*/ 0 h 3187083"/>
+              <a:gd name="connsiteX1" fmla="*/ 514905 w 5681709"/>
+              <a:gd name="connsiteY1" fmla="*/ 1189608 h 3187083"/>
+              <a:gd name="connsiteX2" fmla="*/ 1997476 w 5681709"/>
+              <a:gd name="connsiteY2" fmla="*/ 2414726 h 3187083"/>
+              <a:gd name="connsiteX3" fmla="*/ 4136994 w 5681709"/>
+              <a:gd name="connsiteY3" fmla="*/ 3053918 h 3187083"/>
+              <a:gd name="connsiteX4" fmla="*/ 5681709 w 5681709"/>
+              <a:gd name="connsiteY4" fmla="*/ 3187083 h 3187083"/>
+            </a:gdLst>
+            <a:ahLst/>
+            <a:cxnLst>
+              <a:cxn ang="0">
+                <a:pos x="connsiteX0" y="connsiteY0"/>
+              </a:cxn>
+              <a:cxn ang="0">
+                <a:pos x="connsiteX1" y="connsiteY1"/>
+              </a:cxn>
+              <a:cxn ang="0">
+                <a:pos x="connsiteX2" y="connsiteY2"/>
+              </a:cxn>
+              <a:cxn ang="0">
+                <a:pos x="connsiteX3" y="connsiteY3"/>
+              </a:cxn>
+              <a:cxn ang="0">
+                <a:pos x="connsiteX4" y="connsiteY4"/>
+              </a:cxn>
+            </a:cxnLst>
+            <a:rect l="l" t="t" r="r" b="b"/>
+            <a:pathLst>
+              <a:path w="5681709" h="3187083">
+                <a:moveTo>
+                  <a:pt x="0" y="0"/>
+                </a:moveTo>
+                <a:cubicBezTo>
+                  <a:pt x="90996" y="393577"/>
+                  <a:pt x="181992" y="787154"/>
+                  <a:pt x="514905" y="1189608"/>
+                </a:cubicBezTo>
+                <a:cubicBezTo>
+                  <a:pt x="847818" y="1592062"/>
+                  <a:pt x="1393795" y="2104008"/>
+                  <a:pt x="1997476" y="2414726"/>
+                </a:cubicBezTo>
+                <a:cubicBezTo>
+                  <a:pt x="2601157" y="2725444"/>
+                  <a:pt x="3522955" y="2925192"/>
+                  <a:pt x="4136994" y="3053918"/>
+                </a:cubicBezTo>
+                <a:cubicBezTo>
+                  <a:pt x="4751033" y="3182644"/>
+                  <a:pt x="5434614" y="3133817"/>
+                  <a:pt x="5681709" y="3187083"/>
+                </a:cubicBezTo>
+              </a:path>
+            </a:pathLst>
+          </a:custGeom>
+          <a:noFill/>
+          <a:ln w="57150"/>
+        </p:spPr>
+        <p:style>
+          <a:lnRef idx="2">
+            <a:schemeClr val="accent1">
+              <a:shade val="15000"/>
+            </a:schemeClr>
+          </a:lnRef>
+          <a:fillRef idx="1">
+            <a:schemeClr val="accent1"/>
+          </a:fillRef>
+          <a:effectRef idx="0">
+            <a:schemeClr val="accent1"/>
+          </a:effectRef>
+          <a:fontRef idx="minor">
+            <a:schemeClr val="lt1"/>
+          </a:fontRef>
+        </p:style>
+        <p:txBody>
+          <a:bodyPr rtlCol="0" anchor="ctr"/>
+          <a:lstStyle/>
+          <a:p>
+            <a:pPr algn="ctr"/>
+            <a:endParaRPr lang="en-US"/>
+          </a:p>
+        </p:txBody>
+      </p:sp>
+      <p:sp>
+        <p:nvSpPr>
+          <p:cNvPr id="5" name="Oval 4">
+            <a:extLst>
+              <a:ext uri="{FF2B5EF4-FFF2-40B4-BE49-F238E27FC236}">
+                <a16:creationId xmlns:a16="http://schemas.microsoft.com/office/drawing/2014/main" id="{42A7851D-22A8-51B5-F97F-CFF8B814B351}"/>
+              </a:ext>
+            </a:extLst>
+          </p:cNvPr>
+          <p:cNvSpPr/>
+          <p:nvPr/>
+        </p:nvSpPr>
+        <p:spPr>
+          <a:xfrm>
+            <a:off x="3799644" y="1695635"/>
+            <a:ext cx="213064" cy="213065"/>
+          </a:xfrm>
+          <a:prstGeom prst="ellipse">
+            <a:avLst/>
+          </a:prstGeom>
+          <a:ln w="28575"/>
+        </p:spPr>
+        <p:style>
+          <a:lnRef idx="2">
+            <a:schemeClr val="accent2">
+              <a:shade val="15000"/>
+            </a:schemeClr>
+          </a:lnRef>
+          <a:fillRef idx="1">
+            <a:schemeClr val="accent2"/>
+          </a:fillRef>
+          <a:effectRef idx="0">
+            <a:schemeClr val="accent2"/>
+          </a:effectRef>
+          <a:fontRef idx="minor">
+            <a:schemeClr val="lt1"/>
+          </a:fontRef>
+        </p:style>
+        <p:txBody>
+          <a:bodyPr rtlCol="0" anchor="ctr"/>
+          <a:lstStyle/>
+          <a:p>
+            <a:pPr algn="ctr"/>
+            <a:endParaRPr lang="en-US"/>
+          </a:p>
+        </p:txBody>
+      </p:sp>
+      <p:sp>
+        <p:nvSpPr>
+          <p:cNvPr id="6" name="Oval 5">
+            <a:extLst>
+              <a:ext uri="{FF2B5EF4-FFF2-40B4-BE49-F238E27FC236}">
+                <a16:creationId xmlns:a16="http://schemas.microsoft.com/office/drawing/2014/main" id="{54BE53CE-48E6-EA8E-A8EE-C13DDD64332C}"/>
+              </a:ext>
+            </a:extLst>
+          </p:cNvPr>
+          <p:cNvSpPr/>
+          <p:nvPr/>
+        </p:nvSpPr>
+        <p:spPr>
+          <a:xfrm>
+            <a:off x="3206009" y="2700656"/>
+            <a:ext cx="213064" cy="213065"/>
+          </a:xfrm>
+          <a:prstGeom prst="ellipse">
+            <a:avLst/>
+          </a:prstGeom>
+          <a:ln w="28575"/>
+        </p:spPr>
+        <p:style>
+          <a:lnRef idx="2">
+            <a:schemeClr val="accent2">
+              <a:shade val="15000"/>
+            </a:schemeClr>
+          </a:lnRef>
+          <a:fillRef idx="1">
+            <a:schemeClr val="accent2"/>
+          </a:fillRef>
+          <a:effectRef idx="0">
+            <a:schemeClr val="accent2"/>
+          </a:effectRef>
+          <a:fontRef idx="minor">
+            <a:schemeClr val="lt1"/>
+          </a:fontRef>
+        </p:style>
+        <p:txBody>
+          <a:bodyPr rtlCol="0" anchor="ctr"/>
+          <a:lstStyle/>
+          <a:p>
+            <a:pPr algn="ctr"/>
+            <a:endParaRPr lang="en-US"/>
+          </a:p>
+        </p:txBody>
+      </p:sp>
+      <p:sp>
+        <p:nvSpPr>
+          <p:cNvPr id="7" name="Oval 6">
+            <a:extLst>
+              <a:ext uri="{FF2B5EF4-FFF2-40B4-BE49-F238E27FC236}">
+                <a16:creationId xmlns:a16="http://schemas.microsoft.com/office/drawing/2014/main" id="{9A8511C9-2EEC-AF61-0A6E-5EFBC7B49780}"/>
+              </a:ext>
+            </a:extLst>
+          </p:cNvPr>
+          <p:cNvSpPr/>
+          <p:nvPr/>
+        </p:nvSpPr>
+        <p:spPr>
+          <a:xfrm>
+            <a:off x="8195570" y="3854388"/>
+            <a:ext cx="213064" cy="213065"/>
+          </a:xfrm>
+          <a:prstGeom prst="ellipse">
+            <a:avLst/>
+          </a:prstGeom>
+          <a:ln w="28575"/>
+        </p:spPr>
+        <p:style>
+          <a:lnRef idx="2">
+            <a:schemeClr val="accent2">
+              <a:shade val="15000"/>
+            </a:schemeClr>
+          </a:lnRef>
+          <a:fillRef idx="1">
+            <a:schemeClr val="accent2"/>
+          </a:fillRef>
+          <a:effectRef idx="0">
+            <a:schemeClr val="accent2"/>
+          </a:effectRef>
+          <a:fontRef idx="minor">
+            <a:schemeClr val="lt1"/>
+          </a:fontRef>
+        </p:style>
+        <p:txBody>
+          <a:bodyPr rtlCol="0" anchor="ctr"/>
+          <a:lstStyle/>
+          <a:p>
+            <a:pPr algn="ctr"/>
+            <a:endParaRPr lang="en-US"/>
+          </a:p>
+        </p:txBody>
+      </p:sp>
+      <p:sp>
+        <p:nvSpPr>
+          <p:cNvPr id="8" name="Oval 7">
+            <a:extLst>
+              <a:ext uri="{FF2B5EF4-FFF2-40B4-BE49-F238E27FC236}">
+                <a16:creationId xmlns:a16="http://schemas.microsoft.com/office/drawing/2014/main" id="{C61D24B5-CA0D-F517-200D-2002127E228F}"/>
+              </a:ext>
+            </a:extLst>
+          </p:cNvPr>
+          <p:cNvSpPr/>
+          <p:nvPr/>
+        </p:nvSpPr>
+        <p:spPr>
+          <a:xfrm>
+            <a:off x="7565256" y="4835116"/>
+            <a:ext cx="213064" cy="213065"/>
+          </a:xfrm>
+          <a:prstGeom prst="ellipse">
+            <a:avLst/>
+          </a:prstGeom>
+          <a:ln w="28575"/>
+        </p:spPr>
+        <p:style>
+          <a:lnRef idx="2">
+            <a:schemeClr val="accent2">
+              <a:shade val="15000"/>
+            </a:schemeClr>
+          </a:lnRef>
+          <a:fillRef idx="1">
+            <a:schemeClr val="accent2"/>
+          </a:fillRef>
+          <a:effectRef idx="0">
+            <a:schemeClr val="accent2"/>
+          </a:effectRef>
+          <a:fontRef idx="minor">
+            <a:schemeClr val="lt1"/>
+          </a:fontRef>
+        </p:style>
+        <p:txBody>
+          <a:bodyPr rtlCol="0" anchor="ctr"/>
+          <a:lstStyle/>
+          <a:p>
+            <a:pPr algn="ctr"/>
+            <a:endParaRPr lang="en-US"/>
+          </a:p>
+        </p:txBody>
+      </p:sp>
+      <p:sp>
+        <p:nvSpPr>
+          <p:cNvPr id="9" name="TextBox 8">
+            <a:extLst>
+              <a:ext uri="{FF2B5EF4-FFF2-40B4-BE49-F238E27FC236}">
+                <a16:creationId xmlns:a16="http://schemas.microsoft.com/office/drawing/2014/main" id="{2B8D1283-CA27-D912-86AA-E2F59D2519DE}"/>
+              </a:ext>
+            </a:extLst>
+          </p:cNvPr>
+          <p:cNvSpPr txBox="1"/>
+          <p:nvPr/>
+        </p:nvSpPr>
+        <p:spPr>
+          <a:xfrm>
+            <a:off x="8243154" y="3331168"/>
+            <a:ext cx="451777" cy="523220"/>
+          </a:xfrm>
+          <a:prstGeom prst="rect">
+            <a:avLst/>
+          </a:prstGeom>
+          <a:noFill/>
+        </p:spPr>
+        <p:txBody>
+          <a:bodyPr wrap="square" rtlCol="0">
+            <a:spAutoFit/>
+          </a:bodyPr>
+          <a:lstStyle/>
+          <a:p>
+            <a:pPr algn="ctr"/>
+            <a:r>
+              <a:rPr lang="en-US" sz="2800" b="1" dirty="0"/>
+              <a:t>D</a:t>
+            </a:r>
+          </a:p>
+        </p:txBody>
+      </p:sp>
+      <p:sp>
+        <p:nvSpPr>
+          <p:cNvPr id="10" name="TextBox 9">
+            <a:extLst>
+              <a:ext uri="{FF2B5EF4-FFF2-40B4-BE49-F238E27FC236}">
+                <a16:creationId xmlns:a16="http://schemas.microsoft.com/office/drawing/2014/main" id="{705C2E80-25F0-A131-6518-E24ABB48165E}"/>
+              </a:ext>
+            </a:extLst>
+          </p:cNvPr>
+          <p:cNvSpPr txBox="1"/>
+          <p:nvPr/>
+        </p:nvSpPr>
+        <p:spPr>
+          <a:xfrm>
+            <a:off x="7658963" y="5029758"/>
+            <a:ext cx="451777" cy="523220"/>
+          </a:xfrm>
+          <a:prstGeom prst="rect">
+            <a:avLst/>
+          </a:prstGeom>
+          <a:noFill/>
+        </p:spPr>
+        <p:txBody>
+          <a:bodyPr wrap="square" rtlCol="0">
+            <a:spAutoFit/>
+          </a:bodyPr>
+          <a:lstStyle/>
+          <a:p>
+            <a:pPr algn="ctr"/>
+            <a:r>
+              <a:rPr lang="en-US" sz="2800" b="1" dirty="0"/>
+              <a:t>B</a:t>
+            </a:r>
+          </a:p>
+        </p:txBody>
+      </p:sp>
+      <p:sp>
+        <p:nvSpPr>
+          <p:cNvPr id="11" name="TextBox 10">
+            <a:extLst>
+              <a:ext uri="{FF2B5EF4-FFF2-40B4-BE49-F238E27FC236}">
+                <a16:creationId xmlns:a16="http://schemas.microsoft.com/office/drawing/2014/main" id="{BE8CAC74-4248-763A-E1C8-C7729058D8FF}"/>
+              </a:ext>
+            </a:extLst>
+          </p:cNvPr>
+          <p:cNvSpPr txBox="1"/>
+          <p:nvPr/>
+        </p:nvSpPr>
+        <p:spPr>
+          <a:xfrm>
+            <a:off x="3937614" y="1346971"/>
+            <a:ext cx="451777" cy="523220"/>
+          </a:xfrm>
+          <a:prstGeom prst="rect">
+            <a:avLst/>
+          </a:prstGeom>
+          <a:noFill/>
+        </p:spPr>
+        <p:txBody>
+          <a:bodyPr wrap="square" rtlCol="0">
+            <a:spAutoFit/>
+          </a:bodyPr>
+          <a:lstStyle/>
+          <a:p>
+            <a:pPr algn="ctr"/>
+            <a:r>
+              <a:rPr lang="en-US" sz="2800" b="1" dirty="0"/>
+              <a:t>C</a:t>
+            </a:r>
+          </a:p>
+        </p:txBody>
+      </p:sp>
+      <p:sp>
+        <p:nvSpPr>
+          <p:cNvPr id="12" name="TextBox 11">
+            <a:extLst>
+              <a:ext uri="{FF2B5EF4-FFF2-40B4-BE49-F238E27FC236}">
+                <a16:creationId xmlns:a16="http://schemas.microsoft.com/office/drawing/2014/main" id="{86371DE3-D71C-02CC-D2D9-B3480243C680}"/>
+              </a:ext>
+            </a:extLst>
+          </p:cNvPr>
+          <p:cNvSpPr txBox="1"/>
+          <p:nvPr/>
+        </p:nvSpPr>
+        <p:spPr>
+          <a:xfrm>
+            <a:off x="2852603" y="2698310"/>
+            <a:ext cx="451777" cy="523220"/>
+          </a:xfrm>
+          <a:prstGeom prst="rect">
+            <a:avLst/>
+          </a:prstGeom>
+          <a:noFill/>
+        </p:spPr>
+        <p:txBody>
+          <a:bodyPr wrap="square" rtlCol="0">
+            <a:spAutoFit/>
+          </a:bodyPr>
+          <a:lstStyle/>
+          <a:p>
+            <a:pPr algn="ctr"/>
+            <a:r>
+              <a:rPr lang="en-US" sz="2800" b="1" dirty="0"/>
+              <a:t>A</a:t>
+            </a:r>
+          </a:p>
+        </p:txBody>
+      </p:sp>
+      <mc:AlternateContent xmlns:mc="http://schemas.openxmlformats.org/markup-compatibility/2006" xmlns:a14="http://schemas.microsoft.com/office/drawing/2010/main">
+        <mc:Choice Requires="a14">
+          <p:sp>
+            <p:nvSpPr>
+              <p:cNvPr id="13" name="TextBox 12">
+                <a:extLst>
+                  <a:ext uri="{FF2B5EF4-FFF2-40B4-BE49-F238E27FC236}">
+                    <a16:creationId xmlns:a16="http://schemas.microsoft.com/office/drawing/2014/main" id="{43AA751F-FA41-5FE8-D780-7D2F389D9090}"/>
+                  </a:ext>
+                </a:extLst>
+              </p:cNvPr>
+              <p:cNvSpPr txBox="1"/>
+              <p:nvPr/>
+            </p:nvSpPr>
+            <p:spPr>
+              <a:xfrm>
+                <a:off x="9088876" y="3592778"/>
+                <a:ext cx="451777" cy="461665"/>
+              </a:xfrm>
+              <a:prstGeom prst="rect">
+                <a:avLst/>
+              </a:prstGeom>
+              <a:noFill/>
+            </p:spPr>
+            <p:txBody>
+              <a:bodyPr wrap="square" rtlCol="0">
+                <a:spAutoFit/>
+              </a:bodyPr>
+              <a:lstStyle/>
+              <a:p>
+                <a:pPr algn="ctr"/>
+                <a14:m>
+                  <m:oMathPara xmlns:m="http://schemas.openxmlformats.org/officeDocument/2006/math">
+                    <m:oMathParaPr>
+                      <m:jc m:val="centerGroup"/>
+                    </m:oMathParaPr>
+                    <m:oMath xmlns:m="http://schemas.openxmlformats.org/officeDocument/2006/math">
+                      <m:sSub>
+                        <m:sSubPr>
+                          <m:ctrlPr>
+                            <a:rPr lang="en-US" sz="2400" b="1" i="1" smtClean="0">
+                              <a:solidFill>
+                                <a:schemeClr val="accent1"/>
+                              </a:solidFill>
+                              <a:latin typeface="Cambria Math" panose="02040503050406030204" pitchFamily="18" charset="0"/>
+                            </a:rPr>
+                          </m:ctrlPr>
+                        </m:sSubPr>
+                        <m:e>
+                          <m:r>
+                            <a:rPr lang="en-US" sz="2400" b="1" i="1" smtClean="0">
+                              <a:solidFill>
+                                <a:schemeClr val="accent1"/>
+                              </a:solidFill>
+                              <a:latin typeface="Cambria Math" panose="02040503050406030204" pitchFamily="18" charset="0"/>
+                            </a:rPr>
+                            <m:t>𝑼</m:t>
+                          </m:r>
+                        </m:e>
+                        <m:sub>
+                          <m:r>
+                            <a:rPr lang="en-US" sz="2400" b="1" i="1" smtClean="0">
+                              <a:solidFill>
+                                <a:schemeClr val="accent1"/>
+                              </a:solidFill>
+                              <a:latin typeface="Cambria Math" panose="02040503050406030204" pitchFamily="18" charset="0"/>
+                            </a:rPr>
+                            <m:t>𝟐</m:t>
+                          </m:r>
+                        </m:sub>
+                      </m:sSub>
+                    </m:oMath>
+                  </m:oMathPara>
+                </a14:m>
+                <a:endParaRPr lang="en-US" sz="2400" b="1" dirty="0">
+                  <a:solidFill>
+                    <a:schemeClr val="accent1"/>
+                  </a:solidFill>
+                </a:endParaRPr>
+              </a:p>
+            </p:txBody>
+          </p:sp>
+        </mc:Choice>
+        <mc:Fallback xmlns="">
+          <p:sp>
+            <p:nvSpPr>
+              <p:cNvPr id="13" name="TextBox 12">
+                <a:extLst>
+                  <a:ext uri="{FF2B5EF4-FFF2-40B4-BE49-F238E27FC236}">
+                    <a16:creationId xmlns:a16="http://schemas.microsoft.com/office/drawing/2014/main" id="{43AA751F-FA41-5FE8-D780-7D2F389D9090}"/>
+                  </a:ext>
+                </a:extLst>
+              </p:cNvPr>
+              <p:cNvSpPr txBox="1">
+                <a:spLocks noRot="1" noChangeAspect="1" noMove="1" noResize="1" noEditPoints="1" noAdjustHandles="1" noChangeArrowheads="1" noChangeShapeType="1" noTextEdit="1"/>
+              </p:cNvSpPr>
+              <p:nvPr/>
+            </p:nvSpPr>
+            <p:spPr>
+              <a:xfrm>
+                <a:off x="9088876" y="3592778"/>
+                <a:ext cx="451777" cy="461665"/>
+              </a:xfrm>
+              <a:prstGeom prst="rect">
+                <a:avLst/>
+              </a:prstGeom>
+              <a:blipFill>
+                <a:blip r:embed="rId2"/>
+                <a:stretch>
+                  <a:fillRect l="-21622" b="-2632"/>
+                </a:stretch>
+              </a:blipFill>
+            </p:spPr>
+            <p:txBody>
+              <a:bodyPr/>
+              <a:lstStyle/>
+              <a:p>
+                <a:r>
+                  <a:rPr lang="en-US">
+                    <a:noFill/>
+                  </a:rPr>
+                  <a:t> </a:t>
+                </a:r>
+              </a:p>
+            </p:txBody>
+          </p:sp>
+        </mc:Fallback>
+      </mc:AlternateContent>
+      <mc:AlternateContent xmlns:mc="http://schemas.openxmlformats.org/markup-compatibility/2006" xmlns:a14="http://schemas.microsoft.com/office/drawing/2010/main">
+        <mc:Choice Requires="a14">
+          <p:sp>
+            <p:nvSpPr>
+              <p:cNvPr id="14" name="TextBox 13">
+                <a:extLst>
+                  <a:ext uri="{FF2B5EF4-FFF2-40B4-BE49-F238E27FC236}">
+                    <a16:creationId xmlns:a16="http://schemas.microsoft.com/office/drawing/2014/main" id="{DBF186C8-06FF-FFC3-C20C-C55A5D0E1D3D}"/>
+                  </a:ext>
+                </a:extLst>
+              </p:cNvPr>
+              <p:cNvSpPr txBox="1"/>
+              <p:nvPr/>
+            </p:nvSpPr>
+            <p:spPr>
+              <a:xfrm>
+                <a:off x="9037500" y="5018586"/>
+                <a:ext cx="451777" cy="461665"/>
+              </a:xfrm>
+              <a:prstGeom prst="rect">
+                <a:avLst/>
+              </a:prstGeom>
+              <a:noFill/>
+            </p:spPr>
+            <p:txBody>
+              <a:bodyPr wrap="square" rtlCol="0">
+                <a:spAutoFit/>
+              </a:bodyPr>
+              <a:lstStyle/>
+              <a:p>
+                <a:pPr algn="ctr"/>
+                <a14:m>
+                  <m:oMathPara xmlns:m="http://schemas.openxmlformats.org/officeDocument/2006/math">
+                    <m:oMathParaPr>
+                      <m:jc m:val="centerGroup"/>
+                    </m:oMathParaPr>
+                    <m:oMath xmlns:m="http://schemas.openxmlformats.org/officeDocument/2006/math">
+                      <m:sSub>
+                        <m:sSubPr>
+                          <m:ctrlPr>
+                            <a:rPr lang="en-US" sz="2400" b="1" i="1" smtClean="0">
+                              <a:solidFill>
+                                <a:schemeClr val="accent1"/>
+                              </a:solidFill>
+                              <a:latin typeface="Cambria Math" panose="02040503050406030204" pitchFamily="18" charset="0"/>
+                            </a:rPr>
+                          </m:ctrlPr>
+                        </m:sSubPr>
+                        <m:e>
+                          <m:r>
+                            <a:rPr lang="en-US" sz="2400" b="1" i="1" smtClean="0">
+                              <a:solidFill>
+                                <a:schemeClr val="accent1"/>
+                              </a:solidFill>
+                              <a:latin typeface="Cambria Math" panose="02040503050406030204" pitchFamily="18" charset="0"/>
+                            </a:rPr>
+                            <m:t>𝑼</m:t>
+                          </m:r>
+                        </m:e>
+                        <m:sub>
+                          <m:r>
+                            <a:rPr lang="en-US" sz="2400" b="1" i="1" smtClean="0">
+                              <a:solidFill>
+                                <a:schemeClr val="accent1"/>
+                              </a:solidFill>
+                              <a:latin typeface="Cambria Math" panose="02040503050406030204" pitchFamily="18" charset="0"/>
+                            </a:rPr>
+                            <m:t>𝟏</m:t>
+                          </m:r>
+                        </m:sub>
+                      </m:sSub>
+                    </m:oMath>
+                  </m:oMathPara>
+                </a14:m>
+                <a:endParaRPr lang="en-US" sz="2400" b="1" dirty="0">
+                  <a:solidFill>
+                    <a:schemeClr val="accent1"/>
+                  </a:solidFill>
+                </a:endParaRPr>
+              </a:p>
+            </p:txBody>
+          </p:sp>
+        </mc:Choice>
+        <mc:Fallback xmlns="">
+          <p:sp>
+            <p:nvSpPr>
+              <p:cNvPr id="14" name="TextBox 13">
+                <a:extLst>
+                  <a:ext uri="{FF2B5EF4-FFF2-40B4-BE49-F238E27FC236}">
+                    <a16:creationId xmlns:a16="http://schemas.microsoft.com/office/drawing/2014/main" id="{DBF186C8-06FF-FFC3-C20C-C55A5D0E1D3D}"/>
+                  </a:ext>
+                </a:extLst>
+              </p:cNvPr>
+              <p:cNvSpPr txBox="1">
+                <a:spLocks noRot="1" noChangeAspect="1" noMove="1" noResize="1" noEditPoints="1" noAdjustHandles="1" noChangeArrowheads="1" noChangeShapeType="1" noTextEdit="1"/>
+              </p:cNvSpPr>
+              <p:nvPr/>
+            </p:nvSpPr>
+            <p:spPr>
+              <a:xfrm>
+                <a:off x="9037500" y="5018586"/>
+                <a:ext cx="451777" cy="461665"/>
+              </a:xfrm>
+              <a:prstGeom prst="rect">
+                <a:avLst/>
+              </a:prstGeom>
+              <a:blipFill>
+                <a:blip r:embed="rId3"/>
+                <a:stretch>
+                  <a:fillRect l="-22973" b="-2632"/>
+                </a:stretch>
+              </a:blipFill>
+            </p:spPr>
+            <p:txBody>
+              <a:bodyPr/>
+              <a:lstStyle/>
+              <a:p>
+                <a:r>
+                  <a:rPr lang="en-US">
+                    <a:noFill/>
+                  </a:rPr>
+                  <a:t> </a:t>
+                </a:r>
+              </a:p>
+            </p:txBody>
+          </p:sp>
+        </mc:Fallback>
+      </mc:AlternateContent>
+      <mc:AlternateContent xmlns:mc="http://schemas.openxmlformats.org/markup-compatibility/2006" xmlns:a14="http://schemas.microsoft.com/office/drawing/2010/main">
+        <mc:Choice Requires="a14">
+          <p:sp>
+            <p:nvSpPr>
+              <p:cNvPr id="15" name="TextBox 14">
+                <a:extLst>
+                  <a:ext uri="{FF2B5EF4-FFF2-40B4-BE49-F238E27FC236}">
+                    <a16:creationId xmlns:a16="http://schemas.microsoft.com/office/drawing/2014/main" id="{2E6C6B36-FAB8-F9E8-B292-CD466B86CF99}"/>
+                  </a:ext>
+                </a:extLst>
+              </p:cNvPr>
+              <p:cNvSpPr txBox="1"/>
+              <p:nvPr/>
+            </p:nvSpPr>
+            <p:spPr>
+              <a:xfrm>
+                <a:off x="5679190" y="2058479"/>
+                <a:ext cx="1633490" cy="1077218"/>
+              </a:xfrm>
+              <a:prstGeom prst="rect">
+                <a:avLst/>
+              </a:prstGeom>
+              <a:noFill/>
+            </p:spPr>
+            <p:txBody>
+              <a:bodyPr wrap="square" rtlCol="0">
+                <a:spAutoFit/>
+              </a:bodyPr>
+              <a:lstStyle/>
+              <a:p>
+                <a:pPr/>
+                <a14:m>
+                  <m:oMathPara xmlns:m="http://schemas.openxmlformats.org/officeDocument/2006/math">
+                    <m:oMathParaPr>
+                      <m:jc m:val="centerGroup"/>
+                    </m:oMathParaPr>
+                    <m:oMath xmlns:m="http://schemas.openxmlformats.org/officeDocument/2006/math">
+                      <m:r>
+                        <a:rPr lang="en-US" sz="3200" b="1" i="1" smtClean="0">
+                          <a:latin typeface="Cambria Math" panose="02040503050406030204" pitchFamily="18" charset="0"/>
+                        </a:rPr>
+                        <m:t>𝑨</m:t>
+                      </m:r>
+                      <m:r>
+                        <a:rPr lang="en-US" sz="3200" b="1" i="1" smtClean="0">
+                          <a:latin typeface="Cambria Math" panose="02040503050406030204" pitchFamily="18" charset="0"/>
+                        </a:rPr>
+                        <m:t>&gt;</m:t>
+                      </m:r>
+                      <m:r>
+                        <a:rPr lang="en-US" sz="3200" b="1" i="1" smtClean="0">
+                          <a:latin typeface="Cambria Math" panose="02040503050406030204" pitchFamily="18" charset="0"/>
+                        </a:rPr>
+                        <m:t>𝑩</m:t>
+                      </m:r>
+                    </m:oMath>
+                  </m:oMathPara>
+                </a14:m>
+                <a:endParaRPr lang="en-US" sz="3200" b="1" dirty="0"/>
+              </a:p>
+              <a:p>
+                <a:pPr/>
+                <a14:m>
+                  <m:oMathPara xmlns:m="http://schemas.openxmlformats.org/officeDocument/2006/math">
+                    <m:oMathParaPr>
+                      <m:jc m:val="centerGroup"/>
+                    </m:oMathParaPr>
+                    <m:oMath xmlns:m="http://schemas.openxmlformats.org/officeDocument/2006/math">
+                      <m:r>
+                        <a:rPr lang="en-US" sz="3200" b="1" i="1" smtClean="0">
+                          <a:latin typeface="Cambria Math" panose="02040503050406030204" pitchFamily="18" charset="0"/>
+                        </a:rPr>
+                        <m:t>𝑩</m:t>
+                      </m:r>
+                      <m:r>
+                        <a:rPr lang="en-US" sz="3200" b="1" i="1" smtClean="0">
+                          <a:latin typeface="Cambria Math" panose="02040503050406030204" pitchFamily="18" charset="0"/>
+                        </a:rPr>
+                        <m:t>&gt;</m:t>
+                      </m:r>
+                      <m:r>
+                        <a:rPr lang="en-US" sz="3200" b="1" i="1" smtClean="0">
+                          <a:latin typeface="Cambria Math" panose="02040503050406030204" pitchFamily="18" charset="0"/>
+                        </a:rPr>
+                        <m:t>𝑨</m:t>
+                      </m:r>
+                    </m:oMath>
+                  </m:oMathPara>
+                </a14:m>
+                <a:endParaRPr lang="en-US" sz="3200" b="1" dirty="0"/>
+              </a:p>
+            </p:txBody>
+          </p:sp>
+        </mc:Choice>
+        <mc:Fallback xmlns="">
+          <p:sp>
+            <p:nvSpPr>
+              <p:cNvPr id="15" name="TextBox 14">
+                <a:extLst>
+                  <a:ext uri="{FF2B5EF4-FFF2-40B4-BE49-F238E27FC236}">
+                    <a16:creationId xmlns:a16="http://schemas.microsoft.com/office/drawing/2014/main" id="{2E6C6B36-FAB8-F9E8-B292-CD466B86CF99}"/>
+                  </a:ext>
+                </a:extLst>
+              </p:cNvPr>
+              <p:cNvSpPr txBox="1">
+                <a:spLocks noRot="1" noChangeAspect="1" noMove="1" noResize="1" noEditPoints="1" noAdjustHandles="1" noChangeArrowheads="1" noChangeShapeType="1" noTextEdit="1"/>
+              </p:cNvSpPr>
+              <p:nvPr/>
+            </p:nvSpPr>
+            <p:spPr>
+              <a:xfrm>
+                <a:off x="5679190" y="2058479"/>
+                <a:ext cx="1633490" cy="1077218"/>
+              </a:xfrm>
+              <a:prstGeom prst="rect">
+                <a:avLst/>
+              </a:prstGeom>
+              <a:blipFill>
+                <a:blip r:embed="rId4"/>
+                <a:stretch>
+                  <a:fillRect/>
+                </a:stretch>
+              </a:blipFill>
+            </p:spPr>
+            <p:txBody>
+              <a:bodyPr/>
+              <a:lstStyle/>
+              <a:p>
+                <a:r>
+                  <a:rPr lang="en-US">
+                    <a:noFill/>
+                  </a:rPr>
+                  <a:t> </a:t>
+                </a:r>
+              </a:p>
+            </p:txBody>
+          </p:sp>
+        </mc:Fallback>
+      </mc:AlternateContent>
+      <mc:AlternateContent xmlns:mc="http://schemas.openxmlformats.org/markup-compatibility/2006" xmlns:a14="http://schemas.microsoft.com/office/drawing/2010/main">
+        <mc:Choice Requires="a14">
+          <p:sp>
+            <p:nvSpPr>
+              <p:cNvPr id="16" name="TextBox 15">
+                <a:extLst>
+                  <a:ext uri="{FF2B5EF4-FFF2-40B4-BE49-F238E27FC236}">
+                    <a16:creationId xmlns:a16="http://schemas.microsoft.com/office/drawing/2014/main" id="{0024F0E8-50F0-3AB8-49F7-3972CC0BB117}"/>
+                  </a:ext>
+                </a:extLst>
+              </p:cNvPr>
+              <p:cNvSpPr txBox="1"/>
+              <p:nvPr/>
+            </p:nvSpPr>
+            <p:spPr>
+              <a:xfrm>
+                <a:off x="7851041" y="2057107"/>
+                <a:ext cx="1733004" cy="1077218"/>
+              </a:xfrm>
+              <a:prstGeom prst="rect">
+                <a:avLst/>
+              </a:prstGeom>
+              <a:noFill/>
+            </p:spPr>
+            <p:txBody>
+              <a:bodyPr wrap="square" rtlCol="0">
+                <a:spAutoFit/>
+              </a:bodyPr>
+              <a:lstStyle/>
+              <a:p>
+                <a:pPr/>
+                <a14:m>
+                  <m:oMathPara xmlns:m="http://schemas.openxmlformats.org/officeDocument/2006/math">
+                    <m:oMathParaPr>
+                      <m:jc m:val="centerGroup"/>
+                    </m:oMathParaPr>
+                    <m:oMath xmlns:m="http://schemas.openxmlformats.org/officeDocument/2006/math">
+                      <m:r>
+                        <a:rPr lang="en-US" sz="3200" b="1" i="1" smtClean="0">
+                          <a:latin typeface="Cambria Math" panose="02040503050406030204" pitchFamily="18" charset="0"/>
+                        </a:rPr>
+                        <m:t>𝑪</m:t>
+                      </m:r>
+                      <m:r>
+                        <a:rPr lang="en-US" sz="3200" b="1" i="1" smtClean="0">
+                          <a:latin typeface="Cambria Math" panose="02040503050406030204" pitchFamily="18" charset="0"/>
+                        </a:rPr>
+                        <m:t>&gt;</m:t>
+                      </m:r>
+                      <m:r>
+                        <a:rPr lang="en-US" sz="3200" b="1" i="1" smtClean="0">
+                          <a:latin typeface="Cambria Math" panose="02040503050406030204" pitchFamily="18" charset="0"/>
+                        </a:rPr>
+                        <m:t>𝑫</m:t>
+                      </m:r>
+                    </m:oMath>
+                  </m:oMathPara>
+                </a14:m>
+                <a:endParaRPr lang="en-US" sz="3200" b="1" dirty="0"/>
+              </a:p>
+              <a:p>
+                <a:pPr/>
+                <a14:m>
+                  <m:oMathPara xmlns:m="http://schemas.openxmlformats.org/officeDocument/2006/math">
+                    <m:oMathParaPr>
+                      <m:jc m:val="centerGroup"/>
+                    </m:oMathParaPr>
+                    <m:oMath xmlns:m="http://schemas.openxmlformats.org/officeDocument/2006/math">
+                      <m:r>
+                        <a:rPr lang="en-US" sz="3200" b="1" i="1" smtClean="0">
+                          <a:latin typeface="Cambria Math" panose="02040503050406030204" pitchFamily="18" charset="0"/>
+                        </a:rPr>
+                        <m:t>𝑫</m:t>
+                      </m:r>
+                      <m:r>
+                        <a:rPr lang="en-US" sz="3200" b="1" i="1" smtClean="0">
+                          <a:latin typeface="Cambria Math" panose="02040503050406030204" pitchFamily="18" charset="0"/>
+                        </a:rPr>
+                        <m:t>&gt;</m:t>
+                      </m:r>
+                      <m:r>
+                        <a:rPr lang="en-US" sz="3200" b="1" i="1" smtClean="0">
+                          <a:latin typeface="Cambria Math" panose="02040503050406030204" pitchFamily="18" charset="0"/>
+                        </a:rPr>
+                        <m:t>𝑪</m:t>
+                      </m:r>
+                    </m:oMath>
+                  </m:oMathPara>
+                </a14:m>
+                <a:endParaRPr lang="en-US" sz="3200" b="1" dirty="0"/>
+              </a:p>
+            </p:txBody>
+          </p:sp>
+        </mc:Choice>
+        <mc:Fallback xmlns="">
+          <p:sp>
+            <p:nvSpPr>
+              <p:cNvPr id="16" name="TextBox 15">
+                <a:extLst>
+                  <a:ext uri="{FF2B5EF4-FFF2-40B4-BE49-F238E27FC236}">
+                    <a16:creationId xmlns:a16="http://schemas.microsoft.com/office/drawing/2014/main" id="{0024F0E8-50F0-3AB8-49F7-3972CC0BB117}"/>
+                  </a:ext>
+                </a:extLst>
+              </p:cNvPr>
+              <p:cNvSpPr txBox="1">
+                <a:spLocks noRot="1" noChangeAspect="1" noMove="1" noResize="1" noEditPoints="1" noAdjustHandles="1" noChangeArrowheads="1" noChangeShapeType="1" noTextEdit="1"/>
+              </p:cNvSpPr>
+              <p:nvPr/>
+            </p:nvSpPr>
+            <p:spPr>
+              <a:xfrm>
+                <a:off x="7851041" y="2057107"/>
+                <a:ext cx="1733004" cy="1077218"/>
+              </a:xfrm>
+              <a:prstGeom prst="rect">
+                <a:avLst/>
+              </a:prstGeom>
+              <a:blipFill>
+                <a:blip r:embed="rId5"/>
+                <a:stretch>
+                  <a:fillRect/>
+                </a:stretch>
+              </a:blipFill>
+            </p:spPr>
+            <p:txBody>
+              <a:bodyPr/>
+              <a:lstStyle/>
+              <a:p>
+                <a:r>
+                  <a:rPr lang="en-US">
+                    <a:noFill/>
+                  </a:rPr>
+                  <a:t> </a:t>
+                </a:r>
+              </a:p>
+            </p:txBody>
+          </p:sp>
+        </mc:Fallback>
+      </mc:AlternateContent>
+      <p:sp>
+        <p:nvSpPr>
+          <p:cNvPr id="17" name="TextBox 16">
+            <a:extLst>
+              <a:ext uri="{FF2B5EF4-FFF2-40B4-BE49-F238E27FC236}">
+                <a16:creationId xmlns:a16="http://schemas.microsoft.com/office/drawing/2014/main" id="{615ACE95-673B-3454-D2DF-B7B2FF224A25}"/>
+              </a:ext>
+            </a:extLst>
+          </p:cNvPr>
+          <p:cNvSpPr txBox="1"/>
+          <p:nvPr/>
+        </p:nvSpPr>
+        <p:spPr>
+          <a:xfrm>
+            <a:off x="5321371" y="850765"/>
+            <a:ext cx="4584629" cy="1200329"/>
+          </a:xfrm>
+          <a:prstGeom prst="rect">
+            <a:avLst/>
+          </a:prstGeom>
+          <a:noFill/>
+        </p:spPr>
+        <p:txBody>
+          <a:bodyPr wrap="square" rtlCol="0">
+            <a:spAutoFit/>
+          </a:bodyPr>
+          <a:lstStyle/>
+          <a:p>
+            <a:pPr algn="ctr"/>
+            <a:r>
+              <a:rPr lang="en-US" sz="2400" b="1" dirty="0"/>
+              <a:t>THIS GRAPH SAYS THE FOLLOWING ABOUT THESE BUNDLES:</a:t>
+            </a:r>
+          </a:p>
+        </p:txBody>
+      </p:sp>
+    </p:spTree>
+    <p:extLst>
+      <p:ext uri="{BB962C8B-B14F-4D97-AF65-F5344CB8AC3E}">
+        <p14:creationId xmlns:p14="http://schemas.microsoft.com/office/powerpoint/2010/main" val="1592041748"/>
+      </p:ext>
+    </p:extLst>
+  </p:cSld>
+  <p:clrMapOvr>
+    <a:masterClrMapping/>
+  </p:clrMapOvr>
+</p:sld>
+</file>
+
+<file path=ppt/slides/slide11.xml><?xml version="1.0" encoding="utf-8"?>
+<p:sld xmlns:a="http://schemas.openxmlformats.org/drawingml/2006/main" xmlns:r="http://schemas.openxmlformats.org/officeDocument/2006/relationships" xmlns:p="http://schemas.openxmlformats.org/presentationml/2006/main">
+  <p:cSld>
+    <p:spTree>
+      <p:nvGrpSpPr>
+        <p:cNvPr id="1" name=""/>
+        <p:cNvGrpSpPr/>
+        <p:nvPr/>
+      </p:nvGrpSpPr>
+      <p:grpSpPr>
+        <a:xfrm>
+          <a:off x="0" y="0"/>
+          <a:ext cx="0" cy="0"/>
+          <a:chOff x="0" y="0"/>
+          <a:chExt cx="0" cy="0"/>
+        </a:xfrm>
+      </p:grpSpPr>
+      <p:sp>
+        <p:nvSpPr>
           <p:cNvPr id="3" name="Freeform: Shape 2">
             <a:extLst>
               <a:ext uri="{FF2B5EF4-FFF2-40B4-BE49-F238E27FC236}">
@@ -5556,7 +6780,7 @@
 </p:sld>
 </file>
 
-<file path=ppt/slides/slide11.xml><?xml version="1.0" encoding="utf-8"?>
+<file path=ppt/slides/slide12.xml><?xml version="1.0" encoding="utf-8"?>
 <p:sld xmlns:a="http://schemas.openxmlformats.org/drawingml/2006/main" xmlns:r="http://schemas.openxmlformats.org/officeDocument/2006/relationships" xmlns:p="http://schemas.openxmlformats.org/presentationml/2006/main">
   <p:cSld>
     <p:spTree>
@@ -6460,7 +7684,7 @@
 </p:sld>
 </file>
 
-<file path=ppt/slides/slide12.xml><?xml version="1.0" encoding="utf-8"?>
+<file path=ppt/slides/slide13.xml><?xml version="1.0" encoding="utf-8"?>
 <p:sld xmlns:a="http://schemas.openxmlformats.org/drawingml/2006/main" xmlns:r="http://schemas.openxmlformats.org/officeDocument/2006/relationships" xmlns:p="http://schemas.openxmlformats.org/presentationml/2006/main">
   <p:cSld>
     <p:spTree>
@@ -6856,7 +8080,7 @@
 </p:sld>
 </file>
 
-<file path=ppt/slides/slide13.xml><?xml version="1.0" encoding="utf-8"?>
+<file path=ppt/slides/slide14.xml><?xml version="1.0" encoding="utf-8"?>
 <p:sld xmlns:a="http://schemas.openxmlformats.org/drawingml/2006/main" xmlns:r="http://schemas.openxmlformats.org/officeDocument/2006/relationships" xmlns:p="http://schemas.openxmlformats.org/presentationml/2006/main">
   <p:cSld>
     <p:spTree>
@@ -7064,8 +8288,8 @@
           </a:p>
         </p:txBody>
       </p:sp>
-      <mc:AlternateContent xmlns:mc="http://schemas.openxmlformats.org/markup-compatibility/2006">
-        <mc:Choice xmlns:a14="http://schemas.microsoft.com/office/drawing/2010/main" Requires="a14">
+      <mc:AlternateContent xmlns:mc="http://schemas.openxmlformats.org/markup-compatibility/2006" xmlns:a14="http://schemas.microsoft.com/office/drawing/2010/main">
+        <mc:Choice Requires="a14">
           <p:sp>
             <p:nvSpPr>
               <p:cNvPr id="2" name="TextBox 1">
@@ -7122,7 +8346,7 @@
             </p:txBody>
           </p:sp>
         </mc:Choice>
-        <mc:Fallback>
+        <mc:Fallback xmlns="">
           <p:sp>
             <p:nvSpPr>
               <p:cNvPr id="2" name="TextBox 1">
@@ -7167,8 +8391,8 @@
           </p:sp>
         </mc:Fallback>
       </mc:AlternateContent>
-      <mc:AlternateContent xmlns:mc="http://schemas.openxmlformats.org/markup-compatibility/2006">
-        <mc:Choice xmlns:a14="http://schemas.microsoft.com/office/drawing/2010/main" Requires="a14">
+      <mc:AlternateContent xmlns:mc="http://schemas.openxmlformats.org/markup-compatibility/2006" xmlns:a14="http://schemas.microsoft.com/office/drawing/2010/main">
+        <mc:Choice Requires="a14">
           <p:sp>
             <p:nvSpPr>
               <p:cNvPr id="5" name="TextBox 4">
@@ -7225,7 +8449,7 @@
             </p:txBody>
           </p:sp>
         </mc:Choice>
-        <mc:Fallback>
+        <mc:Fallback xmlns="">
           <p:sp>
             <p:nvSpPr>
               <p:cNvPr id="5" name="TextBox 4">
@@ -7325,7 +8549,7 @@
 </p:sld>
 </file>
 
-<file path=ppt/slides/slide14.xml><?xml version="1.0" encoding="utf-8"?>
+<file path=ppt/slides/slide15.xml><?xml version="1.0" encoding="utf-8"?>
 <p:sld xmlns:a="http://schemas.openxmlformats.org/drawingml/2006/main" xmlns:r="http://schemas.openxmlformats.org/officeDocument/2006/relationships" xmlns:p="http://schemas.openxmlformats.org/presentationml/2006/main">
   <p:cSld>
     <p:spTree>
@@ -7342,8 +8566,8 @@
           <a:chExt cx="0" cy="0"/>
         </a:xfrm>
       </p:grpSpPr>
-      <mc:AlternateContent xmlns:mc="http://schemas.openxmlformats.org/markup-compatibility/2006">
-        <mc:Choice xmlns:a14="http://schemas.microsoft.com/office/drawing/2010/main" Requires="a14">
+      <mc:AlternateContent xmlns:mc="http://schemas.openxmlformats.org/markup-compatibility/2006" xmlns:a14="http://schemas.microsoft.com/office/drawing/2010/main">
+        <mc:Choice Requires="a14">
           <p:sp>
             <p:nvSpPr>
               <p:cNvPr id="26" name="TextBox 25">
@@ -7400,7 +8624,7 @@
             </p:txBody>
           </p:sp>
         </mc:Choice>
-        <mc:Fallback>
+        <mc:Fallback xmlns="">
           <p:sp>
             <p:nvSpPr>
               <p:cNvPr id="26" name="TextBox 25">
@@ -7445,8 +8669,8 @@
           </p:sp>
         </mc:Fallback>
       </mc:AlternateContent>
-      <mc:AlternateContent xmlns:mc="http://schemas.openxmlformats.org/markup-compatibility/2006">
-        <mc:Choice xmlns:a14="http://schemas.microsoft.com/office/drawing/2010/main" Requires="a14">
+      <mc:AlternateContent xmlns:mc="http://schemas.openxmlformats.org/markup-compatibility/2006" xmlns:a14="http://schemas.microsoft.com/office/drawing/2010/main">
+        <mc:Choice Requires="a14">
           <p:sp>
             <p:nvSpPr>
               <p:cNvPr id="27" name="TextBox 26">
@@ -7503,7 +8727,7 @@
             </p:txBody>
           </p:sp>
         </mc:Choice>
-        <mc:Fallback>
+        <mc:Fallback xmlns="">
           <p:sp>
             <p:nvSpPr>
               <p:cNvPr id="27" name="TextBox 26">
@@ -8015,7 +9239,7 @@
 </p:sld>
 </file>
 
-<file path=ppt/slides/slide15.xml><?xml version="1.0" encoding="utf-8"?>
+<file path=ppt/slides/slide16.xml><?xml version="1.0" encoding="utf-8"?>
 <p:sld xmlns:a="http://schemas.openxmlformats.org/drawingml/2006/main" xmlns:r="http://schemas.openxmlformats.org/officeDocument/2006/relationships" xmlns:p="http://schemas.openxmlformats.org/presentationml/2006/main">
   <p:cSld>
     <p:spTree>
@@ -8032,8 +9256,8 @@
           <a:chExt cx="0" cy="0"/>
         </a:xfrm>
       </p:grpSpPr>
-      <mc:AlternateContent xmlns:mc="http://schemas.openxmlformats.org/markup-compatibility/2006">
-        <mc:Choice xmlns:a14="http://schemas.microsoft.com/office/drawing/2010/main" Requires="a14">
+      <mc:AlternateContent xmlns:mc="http://schemas.openxmlformats.org/markup-compatibility/2006" xmlns:a14="http://schemas.microsoft.com/office/drawing/2010/main">
+        <mc:Choice Requires="a14">
           <p:sp>
             <p:nvSpPr>
               <p:cNvPr id="26" name="TextBox 25">
@@ -8090,7 +9314,7 @@
             </p:txBody>
           </p:sp>
         </mc:Choice>
-        <mc:Fallback>
+        <mc:Fallback xmlns="">
           <p:sp>
             <p:nvSpPr>
               <p:cNvPr id="26" name="TextBox 25">
@@ -8135,8 +9359,8 @@
           </p:sp>
         </mc:Fallback>
       </mc:AlternateContent>
-      <mc:AlternateContent xmlns:mc="http://schemas.openxmlformats.org/markup-compatibility/2006">
-        <mc:Choice xmlns:a14="http://schemas.microsoft.com/office/drawing/2010/main" Requires="a14">
+      <mc:AlternateContent xmlns:mc="http://schemas.openxmlformats.org/markup-compatibility/2006" xmlns:a14="http://schemas.microsoft.com/office/drawing/2010/main">
+        <mc:Choice Requires="a14">
           <p:sp>
             <p:nvSpPr>
               <p:cNvPr id="27" name="TextBox 26">
@@ -8193,7 +9417,7 @@
             </p:txBody>
           </p:sp>
         </mc:Choice>
-        <mc:Fallback>
+        <mc:Fallback xmlns="">
           <p:sp>
             <p:nvSpPr>
               <p:cNvPr id="27" name="TextBox 26">
@@ -12324,6 +13548,1778 @@
           <a:chExt cx="0" cy="0"/>
         </a:xfrm>
       </p:grpSpPr>
+      <mc:AlternateContent xmlns:mc="http://schemas.openxmlformats.org/markup-compatibility/2006">
+        <mc:Choice xmlns:a14="http://schemas.microsoft.com/office/drawing/2010/main" Requires="a14">
+          <p:sp>
+            <p:nvSpPr>
+              <p:cNvPr id="26" name="TextBox 25">
+                <a:extLst>
+                  <a:ext uri="{FF2B5EF4-FFF2-40B4-BE49-F238E27FC236}">
+                    <a16:creationId xmlns:a16="http://schemas.microsoft.com/office/drawing/2014/main" id="{7F93BDE7-A731-C302-19A1-DCAFA5C13CF4}"/>
+                  </a:ext>
+                </a:extLst>
+              </p:cNvPr>
+              <p:cNvSpPr txBox="1"/>
+              <p:nvPr/>
+            </p:nvSpPr>
+            <p:spPr>
+              <a:xfrm>
+                <a:off x="9681954" y="5796407"/>
+                <a:ext cx="807396" cy="369332"/>
+              </a:xfrm>
+              <a:prstGeom prst="rect">
+                <a:avLst/>
+              </a:prstGeom>
+              <a:noFill/>
+            </p:spPr>
+            <p:txBody>
+              <a:bodyPr wrap="square" rtlCol="0">
+                <a:spAutoFit/>
+              </a:bodyPr>
+              <a:lstStyle/>
+              <a:p>
+                <a:pPr/>
+                <a14:m>
+                  <m:oMathPara xmlns:m="http://schemas.openxmlformats.org/officeDocument/2006/math">
+                    <m:oMathParaPr>
+                      <m:jc m:val="centerGroup"/>
+                    </m:oMathParaPr>
+                    <m:oMath xmlns:m="http://schemas.openxmlformats.org/officeDocument/2006/math">
+                      <m:r>
+                        <a:rPr lang="en-US" b="1" i="1" smtClean="0">
+                          <a:solidFill>
+                            <a:schemeClr val="tx1"/>
+                          </a:solidFill>
+                          <a:latin typeface="Cambria Math" panose="02040503050406030204" pitchFamily="18" charset="0"/>
+                        </a:rPr>
+                        <m:t>𝑿</m:t>
+                      </m:r>
+                    </m:oMath>
+                  </m:oMathPara>
+                </a14:m>
+                <a:endParaRPr lang="en-US" b="1" dirty="0">
+                  <a:solidFill>
+                    <a:schemeClr val="tx1"/>
+                  </a:solidFill>
+                </a:endParaRPr>
+              </a:p>
+            </p:txBody>
+          </p:sp>
+        </mc:Choice>
+        <mc:Fallback>
+          <p:sp>
+            <p:nvSpPr>
+              <p:cNvPr id="26" name="TextBox 25">
+                <a:extLst>
+                  <a:ext uri="{FF2B5EF4-FFF2-40B4-BE49-F238E27FC236}">
+                    <a16:creationId xmlns:a16="http://schemas.microsoft.com/office/drawing/2014/main" id="{7F93BDE7-A731-C302-19A1-DCAFA5C13CF4}"/>
+                  </a:ext>
+                </a:extLst>
+              </p:cNvPr>
+              <p:cNvSpPr txBox="1">
+                <a:spLocks noRot="1" noChangeAspect="1" noMove="1" noResize="1" noEditPoints="1" noAdjustHandles="1" noChangeArrowheads="1" noChangeShapeType="1" noTextEdit="1"/>
+              </p:cNvSpPr>
+              <p:nvPr/>
+            </p:nvSpPr>
+            <p:spPr>
+              <a:xfrm>
+                <a:off x="9681954" y="5796407"/>
+                <a:ext cx="807396" cy="369332"/>
+              </a:xfrm>
+              <a:prstGeom prst="rect">
+                <a:avLst/>
+              </a:prstGeom>
+              <a:blipFill>
+                <a:blip r:embed="rId2"/>
+                <a:stretch>
+                  <a:fillRect/>
+                </a:stretch>
+              </a:blipFill>
+            </p:spPr>
+            <p:txBody>
+              <a:bodyPr/>
+              <a:lstStyle/>
+              <a:p>
+                <a:r>
+                  <a:rPr lang="en-US">
+                    <a:noFill/>
+                  </a:rPr>
+                  <a:t> </a:t>
+                </a:r>
+              </a:p>
+            </p:txBody>
+          </p:sp>
+        </mc:Fallback>
+      </mc:AlternateContent>
+      <mc:AlternateContent xmlns:mc="http://schemas.openxmlformats.org/markup-compatibility/2006">
+        <mc:Choice xmlns:a14="http://schemas.microsoft.com/office/drawing/2010/main" Requires="a14">
+          <p:sp>
+            <p:nvSpPr>
+              <p:cNvPr id="27" name="TextBox 26">
+                <a:extLst>
+                  <a:ext uri="{FF2B5EF4-FFF2-40B4-BE49-F238E27FC236}">
+                    <a16:creationId xmlns:a16="http://schemas.microsoft.com/office/drawing/2014/main" id="{0DDA7B57-B430-94C9-FFC6-65F76A85F963}"/>
+                  </a:ext>
+                </a:extLst>
+              </p:cNvPr>
+              <p:cNvSpPr txBox="1"/>
+              <p:nvPr/>
+            </p:nvSpPr>
+            <p:spPr>
+              <a:xfrm>
+                <a:off x="1645109" y="210640"/>
+                <a:ext cx="807396" cy="369332"/>
+              </a:xfrm>
+              <a:prstGeom prst="rect">
+                <a:avLst/>
+              </a:prstGeom>
+              <a:noFill/>
+            </p:spPr>
+            <p:txBody>
+              <a:bodyPr wrap="square" rtlCol="0">
+                <a:spAutoFit/>
+              </a:bodyPr>
+              <a:lstStyle/>
+              <a:p>
+                <a:pPr/>
+                <a14:m>
+                  <m:oMathPara xmlns:m="http://schemas.openxmlformats.org/officeDocument/2006/math">
+                    <m:oMathParaPr>
+                      <m:jc m:val="centerGroup"/>
+                    </m:oMathParaPr>
+                    <m:oMath xmlns:m="http://schemas.openxmlformats.org/officeDocument/2006/math">
+                      <m:r>
+                        <a:rPr lang="en-US" b="1" i="1" smtClean="0">
+                          <a:solidFill>
+                            <a:schemeClr val="tx1"/>
+                          </a:solidFill>
+                          <a:latin typeface="Cambria Math" panose="02040503050406030204" pitchFamily="18" charset="0"/>
+                        </a:rPr>
+                        <m:t>𝒀</m:t>
+                      </m:r>
+                    </m:oMath>
+                  </m:oMathPara>
+                </a14:m>
+                <a:endParaRPr lang="en-US" b="1" dirty="0">
+                  <a:solidFill>
+                    <a:schemeClr val="tx1"/>
+                  </a:solidFill>
+                </a:endParaRPr>
+              </a:p>
+            </p:txBody>
+          </p:sp>
+        </mc:Choice>
+        <mc:Fallback>
+          <p:sp>
+            <p:nvSpPr>
+              <p:cNvPr id="27" name="TextBox 26">
+                <a:extLst>
+                  <a:ext uri="{FF2B5EF4-FFF2-40B4-BE49-F238E27FC236}">
+                    <a16:creationId xmlns:a16="http://schemas.microsoft.com/office/drawing/2014/main" id="{0DDA7B57-B430-94C9-FFC6-65F76A85F963}"/>
+                  </a:ext>
+                </a:extLst>
+              </p:cNvPr>
+              <p:cNvSpPr txBox="1">
+                <a:spLocks noRot="1" noChangeAspect="1" noMove="1" noResize="1" noEditPoints="1" noAdjustHandles="1" noChangeArrowheads="1" noChangeShapeType="1" noTextEdit="1"/>
+              </p:cNvSpPr>
+              <p:nvPr/>
+            </p:nvSpPr>
+            <p:spPr>
+              <a:xfrm>
+                <a:off x="1645109" y="210640"/>
+                <a:ext cx="807396" cy="369332"/>
+              </a:xfrm>
+              <a:prstGeom prst="rect">
+                <a:avLst/>
+              </a:prstGeom>
+              <a:blipFill>
+                <a:blip r:embed="rId3"/>
+                <a:stretch>
+                  <a:fillRect/>
+                </a:stretch>
+              </a:blipFill>
+            </p:spPr>
+            <p:txBody>
+              <a:bodyPr/>
+              <a:lstStyle/>
+              <a:p>
+                <a:r>
+                  <a:rPr lang="en-US">
+                    <a:noFill/>
+                  </a:rPr>
+                  <a:t> </a:t>
+                </a:r>
+              </a:p>
+            </p:txBody>
+          </p:sp>
+        </mc:Fallback>
+      </mc:AlternateContent>
+      <p:cxnSp>
+        <p:nvCxnSpPr>
+          <p:cNvPr id="8" name="Straight Connector 7">
+            <a:extLst>
+              <a:ext uri="{FF2B5EF4-FFF2-40B4-BE49-F238E27FC236}">
+                <a16:creationId xmlns:a16="http://schemas.microsoft.com/office/drawing/2014/main" id="{B16F4518-E948-C3F6-AAE1-784E53A694CC}"/>
+              </a:ext>
+            </a:extLst>
+          </p:cNvPr>
+          <p:cNvCxnSpPr>
+            <a:cxnSpLocks/>
+          </p:cNvCxnSpPr>
+          <p:nvPr/>
+        </p:nvCxnSpPr>
+        <p:spPr>
+          <a:xfrm>
+            <a:off x="2304387" y="3362325"/>
+            <a:ext cx="2248563" cy="2613025"/>
+          </a:xfrm>
+          <a:prstGeom prst="line">
+            <a:avLst/>
+          </a:prstGeom>
+          <a:ln w="38100">
+            <a:solidFill>
+              <a:schemeClr val="accent6"/>
+            </a:solidFill>
+          </a:ln>
+        </p:spPr>
+        <p:style>
+          <a:lnRef idx="1">
+            <a:schemeClr val="accent1"/>
+          </a:lnRef>
+          <a:fillRef idx="0">
+            <a:schemeClr val="accent1"/>
+          </a:fillRef>
+          <a:effectRef idx="0">
+            <a:schemeClr val="accent1"/>
+          </a:effectRef>
+          <a:fontRef idx="minor">
+            <a:schemeClr val="tx1"/>
+          </a:fontRef>
+        </p:style>
+      </p:cxnSp>
+      <mc:AlternateContent xmlns:mc="http://schemas.openxmlformats.org/markup-compatibility/2006">
+        <mc:Choice xmlns:a14="http://schemas.microsoft.com/office/drawing/2010/main" Requires="a14">
+          <p:sp>
+            <p:nvSpPr>
+              <p:cNvPr id="15" name="TextBox 14">
+                <a:extLst>
+                  <a:ext uri="{FF2B5EF4-FFF2-40B4-BE49-F238E27FC236}">
+                    <a16:creationId xmlns:a16="http://schemas.microsoft.com/office/drawing/2014/main" id="{5E296CC9-8ED3-C80C-2298-0927D064BF83}"/>
+                  </a:ext>
+                </a:extLst>
+              </p:cNvPr>
+              <p:cNvSpPr txBox="1"/>
+              <p:nvPr/>
+            </p:nvSpPr>
+            <p:spPr>
+              <a:xfrm>
+                <a:off x="6830376" y="6064584"/>
+                <a:ext cx="807396" cy="657552"/>
+              </a:xfrm>
+              <a:prstGeom prst="rect">
+                <a:avLst/>
+              </a:prstGeom>
+              <a:noFill/>
+            </p:spPr>
+            <p:txBody>
+              <a:bodyPr wrap="square" rtlCol="0">
+                <a:spAutoFit/>
+              </a:bodyPr>
+              <a:lstStyle/>
+              <a:p>
+                <a:pPr/>
+                <a14:m>
+                  <m:oMathPara xmlns:m="http://schemas.openxmlformats.org/officeDocument/2006/math">
+                    <m:oMathParaPr>
+                      <m:jc m:val="centerGroup"/>
+                    </m:oMathParaPr>
+                    <m:oMath xmlns:m="http://schemas.openxmlformats.org/officeDocument/2006/math">
+                      <m:f>
+                        <m:fPr>
+                          <m:ctrlPr>
+                            <a:rPr lang="en-US" b="1" i="1" smtClean="0">
+                              <a:solidFill>
+                                <a:schemeClr val="tx1"/>
+                              </a:solidFill>
+                              <a:latin typeface="Cambria Math" panose="02040503050406030204" pitchFamily="18" charset="0"/>
+                            </a:rPr>
+                          </m:ctrlPr>
+                        </m:fPr>
+                        <m:num>
+                          <m:r>
+                            <a:rPr lang="en-US" b="1" i="1" smtClean="0">
+                              <a:solidFill>
+                                <a:schemeClr val="accent2">
+                                  <a:lumMod val="75000"/>
+                                </a:schemeClr>
+                              </a:solidFill>
+                              <a:latin typeface="Cambria Math" panose="02040503050406030204" pitchFamily="18" charset="0"/>
+                            </a:rPr>
+                            <m:t>𝑴</m:t>
+                          </m:r>
+                        </m:num>
+                        <m:den>
+                          <m:sSub>
+                            <m:sSubPr>
+                              <m:ctrlPr>
+                                <a:rPr lang="en-US" b="1" i="1" smtClean="0">
+                                  <a:solidFill>
+                                    <a:schemeClr val="tx1"/>
+                                  </a:solidFill>
+                                  <a:latin typeface="Cambria Math" panose="02040503050406030204" pitchFamily="18" charset="0"/>
+                                </a:rPr>
+                              </m:ctrlPr>
+                            </m:sSubPr>
+                            <m:e>
+                              <m:r>
+                                <a:rPr lang="en-US" b="1" i="1" smtClean="0">
+                                  <a:solidFill>
+                                    <a:schemeClr val="tx1"/>
+                                  </a:solidFill>
+                                  <a:latin typeface="Cambria Math" panose="02040503050406030204" pitchFamily="18" charset="0"/>
+                                </a:rPr>
+                                <m:t>𝑷</m:t>
+                              </m:r>
+                            </m:e>
+                            <m:sub>
+                              <m:r>
+                                <a:rPr lang="en-US" b="1" i="1" smtClean="0">
+                                  <a:solidFill>
+                                    <a:schemeClr val="tx1"/>
+                                  </a:solidFill>
+                                  <a:latin typeface="Cambria Math" panose="02040503050406030204" pitchFamily="18" charset="0"/>
+                                </a:rPr>
+                                <m:t>𝒙</m:t>
+                              </m:r>
+                            </m:sub>
+                          </m:sSub>
+                        </m:den>
+                      </m:f>
+                    </m:oMath>
+                  </m:oMathPara>
+                </a14:m>
+                <a:endParaRPr lang="en-US" b="1" dirty="0">
+                  <a:solidFill>
+                    <a:schemeClr val="tx1"/>
+                  </a:solidFill>
+                </a:endParaRPr>
+              </a:p>
+            </p:txBody>
+          </p:sp>
+        </mc:Choice>
+        <mc:Fallback>
+          <p:sp>
+            <p:nvSpPr>
+              <p:cNvPr id="15" name="TextBox 14">
+                <a:extLst>
+                  <a:ext uri="{FF2B5EF4-FFF2-40B4-BE49-F238E27FC236}">
+                    <a16:creationId xmlns:a16="http://schemas.microsoft.com/office/drawing/2014/main" id="{5E296CC9-8ED3-C80C-2298-0927D064BF83}"/>
+                  </a:ext>
+                </a:extLst>
+              </p:cNvPr>
+              <p:cNvSpPr txBox="1">
+                <a:spLocks noRot="1" noChangeAspect="1" noMove="1" noResize="1" noEditPoints="1" noAdjustHandles="1" noChangeArrowheads="1" noChangeShapeType="1" noTextEdit="1"/>
+              </p:cNvSpPr>
+              <p:nvPr/>
+            </p:nvSpPr>
+            <p:spPr>
+              <a:xfrm>
+                <a:off x="6830376" y="6064584"/>
+                <a:ext cx="807396" cy="657552"/>
+              </a:xfrm>
+              <a:prstGeom prst="rect">
+                <a:avLst/>
+              </a:prstGeom>
+              <a:blipFill>
+                <a:blip r:embed="rId4"/>
+                <a:stretch>
+                  <a:fillRect/>
+                </a:stretch>
+              </a:blipFill>
+            </p:spPr>
+            <p:txBody>
+              <a:bodyPr/>
+              <a:lstStyle/>
+              <a:p>
+                <a:r>
+                  <a:rPr lang="en-US">
+                    <a:noFill/>
+                  </a:rPr>
+                  <a:t> </a:t>
+                </a:r>
+              </a:p>
+            </p:txBody>
+          </p:sp>
+        </mc:Fallback>
+      </mc:AlternateContent>
+      <mc:AlternateContent xmlns:mc="http://schemas.openxmlformats.org/markup-compatibility/2006">
+        <mc:Choice xmlns:a14="http://schemas.microsoft.com/office/drawing/2010/main" Requires="a14">
+          <p:sp>
+            <p:nvSpPr>
+              <p:cNvPr id="16" name="TextBox 15">
+                <a:extLst>
+                  <a:ext uri="{FF2B5EF4-FFF2-40B4-BE49-F238E27FC236}">
+                    <a16:creationId xmlns:a16="http://schemas.microsoft.com/office/drawing/2014/main" id="{ECC1AEE7-E434-1760-5BD5-630C90A0234A}"/>
+                  </a:ext>
+                </a:extLst>
+              </p:cNvPr>
+              <p:cNvSpPr txBox="1"/>
+              <p:nvPr/>
+            </p:nvSpPr>
+            <p:spPr>
+              <a:xfrm>
+                <a:off x="1618518" y="1715822"/>
+                <a:ext cx="807396" cy="692177"/>
+              </a:xfrm>
+              <a:prstGeom prst="rect">
+                <a:avLst/>
+              </a:prstGeom>
+              <a:noFill/>
+            </p:spPr>
+            <p:txBody>
+              <a:bodyPr wrap="square" rtlCol="0">
+                <a:spAutoFit/>
+              </a:bodyPr>
+              <a:lstStyle/>
+              <a:p>
+                <a:pPr/>
+                <a14:m>
+                  <m:oMathPara xmlns:m="http://schemas.openxmlformats.org/officeDocument/2006/math">
+                    <m:oMathParaPr>
+                      <m:jc m:val="centerGroup"/>
+                    </m:oMathParaPr>
+                    <m:oMath xmlns:m="http://schemas.openxmlformats.org/officeDocument/2006/math">
+                      <m:f>
+                        <m:fPr>
+                          <m:ctrlPr>
+                            <a:rPr lang="en-US" b="1" i="1" smtClean="0">
+                              <a:solidFill>
+                                <a:schemeClr val="tx1"/>
+                              </a:solidFill>
+                              <a:latin typeface="Cambria Math" panose="02040503050406030204" pitchFamily="18" charset="0"/>
+                            </a:rPr>
+                          </m:ctrlPr>
+                        </m:fPr>
+                        <m:num>
+                          <m:r>
+                            <a:rPr lang="en-US" b="1" i="1" smtClean="0">
+                              <a:solidFill>
+                                <a:schemeClr val="tx1"/>
+                              </a:solidFill>
+                              <a:latin typeface="Cambria Math" panose="02040503050406030204" pitchFamily="18" charset="0"/>
+                            </a:rPr>
+                            <m:t>𝑴</m:t>
+                          </m:r>
+                        </m:num>
+                        <m:den>
+                          <m:sSub>
+                            <m:sSubPr>
+                              <m:ctrlPr>
+                                <a:rPr lang="en-US" b="1" i="1" smtClean="0">
+                                  <a:solidFill>
+                                    <a:schemeClr val="tx1"/>
+                                  </a:solidFill>
+                                  <a:latin typeface="Cambria Math" panose="02040503050406030204" pitchFamily="18" charset="0"/>
+                                </a:rPr>
+                              </m:ctrlPr>
+                            </m:sSubPr>
+                            <m:e>
+                              <m:r>
+                                <a:rPr lang="en-US" b="1" i="1" smtClean="0">
+                                  <a:solidFill>
+                                    <a:schemeClr val="tx1"/>
+                                  </a:solidFill>
+                                  <a:latin typeface="Cambria Math" panose="02040503050406030204" pitchFamily="18" charset="0"/>
+                                </a:rPr>
+                                <m:t>𝑷</m:t>
+                              </m:r>
+                            </m:e>
+                            <m:sub>
+                              <m:r>
+                                <a:rPr lang="en-US" b="1" i="1" smtClean="0">
+                                  <a:solidFill>
+                                    <a:schemeClr val="tx1"/>
+                                  </a:solidFill>
+                                  <a:latin typeface="Cambria Math" panose="02040503050406030204" pitchFamily="18" charset="0"/>
+                                </a:rPr>
+                                <m:t>𝒚</m:t>
+                              </m:r>
+                            </m:sub>
+                          </m:sSub>
+                        </m:den>
+                      </m:f>
+                    </m:oMath>
+                  </m:oMathPara>
+                </a14:m>
+                <a:endParaRPr lang="en-US" b="1" dirty="0">
+                  <a:solidFill>
+                    <a:schemeClr val="tx1"/>
+                  </a:solidFill>
+                </a:endParaRPr>
+              </a:p>
+            </p:txBody>
+          </p:sp>
+        </mc:Choice>
+        <mc:Fallback>
+          <p:sp>
+            <p:nvSpPr>
+              <p:cNvPr id="16" name="TextBox 15">
+                <a:extLst>
+                  <a:ext uri="{FF2B5EF4-FFF2-40B4-BE49-F238E27FC236}">
+                    <a16:creationId xmlns:a16="http://schemas.microsoft.com/office/drawing/2014/main" id="{ECC1AEE7-E434-1760-5BD5-630C90A0234A}"/>
+                  </a:ext>
+                </a:extLst>
+              </p:cNvPr>
+              <p:cNvSpPr txBox="1">
+                <a:spLocks noRot="1" noChangeAspect="1" noMove="1" noResize="1" noEditPoints="1" noAdjustHandles="1" noChangeArrowheads="1" noChangeShapeType="1" noTextEdit="1"/>
+              </p:cNvSpPr>
+              <p:nvPr/>
+            </p:nvSpPr>
+            <p:spPr>
+              <a:xfrm>
+                <a:off x="1618518" y="1715822"/>
+                <a:ext cx="807396" cy="692177"/>
+              </a:xfrm>
+              <a:prstGeom prst="rect">
+                <a:avLst/>
+              </a:prstGeom>
+              <a:blipFill>
+                <a:blip r:embed="rId5"/>
+                <a:stretch>
+                  <a:fillRect/>
+                </a:stretch>
+              </a:blipFill>
+            </p:spPr>
+            <p:txBody>
+              <a:bodyPr/>
+              <a:lstStyle/>
+              <a:p>
+                <a:r>
+                  <a:rPr lang="en-US">
+                    <a:noFill/>
+                  </a:rPr>
+                  <a:t> </a:t>
+                </a:r>
+              </a:p>
+            </p:txBody>
+          </p:sp>
+        </mc:Fallback>
+      </mc:AlternateContent>
+      <p:cxnSp>
+        <p:nvCxnSpPr>
+          <p:cNvPr id="2" name="Straight Connector 1">
+            <a:extLst>
+              <a:ext uri="{FF2B5EF4-FFF2-40B4-BE49-F238E27FC236}">
+                <a16:creationId xmlns:a16="http://schemas.microsoft.com/office/drawing/2014/main" id="{EF31A2F2-A117-2BE4-2D65-13043E037080}"/>
+              </a:ext>
+            </a:extLst>
+          </p:cNvPr>
+          <p:cNvCxnSpPr>
+            <a:cxnSpLocks/>
+          </p:cNvCxnSpPr>
+          <p:nvPr/>
+        </p:nvCxnSpPr>
+        <p:spPr>
+          <a:xfrm>
+            <a:off x="2304387" y="2075469"/>
+            <a:ext cx="3594288" cy="3899881"/>
+          </a:xfrm>
+          <a:prstGeom prst="line">
+            <a:avLst/>
+          </a:prstGeom>
+          <a:ln w="38100"/>
+        </p:spPr>
+        <p:style>
+          <a:lnRef idx="1">
+            <a:schemeClr val="accent1"/>
+          </a:lnRef>
+          <a:fillRef idx="0">
+            <a:schemeClr val="accent1"/>
+          </a:fillRef>
+          <a:effectRef idx="0">
+            <a:schemeClr val="accent1"/>
+          </a:effectRef>
+          <a:fontRef idx="minor">
+            <a:schemeClr val="tx1"/>
+          </a:fontRef>
+        </p:style>
+      </p:cxnSp>
+      <mc:AlternateContent xmlns:mc="http://schemas.openxmlformats.org/markup-compatibility/2006">
+        <mc:Choice xmlns:a14="http://schemas.microsoft.com/office/drawing/2010/main" Requires="a14">
+          <p:sp>
+            <p:nvSpPr>
+              <p:cNvPr id="7" name="TextBox 6">
+                <a:extLst>
+                  <a:ext uri="{FF2B5EF4-FFF2-40B4-BE49-F238E27FC236}">
+                    <a16:creationId xmlns:a16="http://schemas.microsoft.com/office/drawing/2014/main" id="{0BC3A4DA-9F52-F1F8-93EC-F1A1A1F31CF2}"/>
+                  </a:ext>
+                </a:extLst>
+              </p:cNvPr>
+              <p:cNvSpPr txBox="1"/>
+              <p:nvPr/>
+            </p:nvSpPr>
+            <p:spPr>
+              <a:xfrm>
+                <a:off x="5494977" y="6064584"/>
+                <a:ext cx="807396" cy="657552"/>
+              </a:xfrm>
+              <a:prstGeom prst="rect">
+                <a:avLst/>
+              </a:prstGeom>
+              <a:noFill/>
+            </p:spPr>
+            <p:txBody>
+              <a:bodyPr wrap="square" rtlCol="0">
+                <a:spAutoFit/>
+              </a:bodyPr>
+              <a:lstStyle/>
+              <a:p>
+                <a:pPr/>
+                <a14:m>
+                  <m:oMathPara xmlns:m="http://schemas.openxmlformats.org/officeDocument/2006/math">
+                    <m:oMathParaPr>
+                      <m:jc m:val="centerGroup"/>
+                    </m:oMathParaPr>
+                    <m:oMath xmlns:m="http://schemas.openxmlformats.org/officeDocument/2006/math">
+                      <m:f>
+                        <m:fPr>
+                          <m:ctrlPr>
+                            <a:rPr lang="en-US" b="1" i="1" smtClean="0">
+                              <a:solidFill>
+                                <a:schemeClr val="tx1"/>
+                              </a:solidFill>
+                              <a:latin typeface="Cambria Math" panose="02040503050406030204" pitchFamily="18" charset="0"/>
+                            </a:rPr>
+                          </m:ctrlPr>
+                        </m:fPr>
+                        <m:num>
+                          <m:r>
+                            <a:rPr lang="en-US" b="1" i="1" smtClean="0">
+                              <a:solidFill>
+                                <a:schemeClr val="tx1"/>
+                              </a:solidFill>
+                              <a:latin typeface="Cambria Math" panose="02040503050406030204" pitchFamily="18" charset="0"/>
+                            </a:rPr>
+                            <m:t>𝑴</m:t>
+                          </m:r>
+                        </m:num>
+                        <m:den>
+                          <m:sSub>
+                            <m:sSubPr>
+                              <m:ctrlPr>
+                                <a:rPr lang="en-US" b="1" i="1" smtClean="0">
+                                  <a:solidFill>
+                                    <a:schemeClr val="tx1"/>
+                                  </a:solidFill>
+                                  <a:latin typeface="Cambria Math" panose="02040503050406030204" pitchFamily="18" charset="0"/>
+                                </a:rPr>
+                              </m:ctrlPr>
+                            </m:sSubPr>
+                            <m:e>
+                              <m:r>
+                                <a:rPr lang="en-US" b="1" i="1" smtClean="0">
+                                  <a:solidFill>
+                                    <a:schemeClr val="tx1"/>
+                                  </a:solidFill>
+                                  <a:latin typeface="Cambria Math" panose="02040503050406030204" pitchFamily="18" charset="0"/>
+                                </a:rPr>
+                                <m:t>𝑷</m:t>
+                              </m:r>
+                            </m:e>
+                            <m:sub>
+                              <m:r>
+                                <a:rPr lang="en-US" b="1" i="1" smtClean="0">
+                                  <a:solidFill>
+                                    <a:schemeClr val="tx1"/>
+                                  </a:solidFill>
+                                  <a:latin typeface="Cambria Math" panose="02040503050406030204" pitchFamily="18" charset="0"/>
+                                </a:rPr>
+                                <m:t>𝒙</m:t>
+                              </m:r>
+                            </m:sub>
+                          </m:sSub>
+                        </m:den>
+                      </m:f>
+                    </m:oMath>
+                  </m:oMathPara>
+                </a14:m>
+                <a:endParaRPr lang="en-US" b="1" dirty="0">
+                  <a:solidFill>
+                    <a:schemeClr val="tx1"/>
+                  </a:solidFill>
+                </a:endParaRPr>
+              </a:p>
+            </p:txBody>
+          </p:sp>
+        </mc:Choice>
+        <mc:Fallback>
+          <p:sp>
+            <p:nvSpPr>
+              <p:cNvPr id="7" name="TextBox 6">
+                <a:extLst>
+                  <a:ext uri="{FF2B5EF4-FFF2-40B4-BE49-F238E27FC236}">
+                    <a16:creationId xmlns:a16="http://schemas.microsoft.com/office/drawing/2014/main" id="{0BC3A4DA-9F52-F1F8-93EC-F1A1A1F31CF2}"/>
+                  </a:ext>
+                </a:extLst>
+              </p:cNvPr>
+              <p:cNvSpPr txBox="1">
+                <a:spLocks noRot="1" noChangeAspect="1" noMove="1" noResize="1" noEditPoints="1" noAdjustHandles="1" noChangeArrowheads="1" noChangeShapeType="1" noTextEdit="1"/>
+              </p:cNvSpPr>
+              <p:nvPr/>
+            </p:nvSpPr>
+            <p:spPr>
+              <a:xfrm>
+                <a:off x="5494977" y="6064584"/>
+                <a:ext cx="807396" cy="657552"/>
+              </a:xfrm>
+              <a:prstGeom prst="rect">
+                <a:avLst/>
+              </a:prstGeom>
+              <a:blipFill>
+                <a:blip r:embed="rId6"/>
+                <a:stretch>
+                  <a:fillRect/>
+                </a:stretch>
+              </a:blipFill>
+            </p:spPr>
+            <p:txBody>
+              <a:bodyPr/>
+              <a:lstStyle/>
+              <a:p>
+                <a:r>
+                  <a:rPr lang="en-US">
+                    <a:noFill/>
+                  </a:rPr>
+                  <a:t> </a:t>
+                </a:r>
+              </a:p>
+            </p:txBody>
+          </p:sp>
+        </mc:Fallback>
+      </mc:AlternateContent>
+      <mc:AlternateContent xmlns:mc="http://schemas.openxmlformats.org/markup-compatibility/2006">
+        <mc:Choice xmlns:a14="http://schemas.microsoft.com/office/drawing/2010/main" Requires="a14">
+          <p:sp>
+            <p:nvSpPr>
+              <p:cNvPr id="9" name="TextBox 8">
+                <a:extLst>
+                  <a:ext uri="{FF2B5EF4-FFF2-40B4-BE49-F238E27FC236}">
+                    <a16:creationId xmlns:a16="http://schemas.microsoft.com/office/drawing/2014/main" id="{F85F37D3-1F3F-75A2-4519-A8C0982570EA}"/>
+                  </a:ext>
+                </a:extLst>
+              </p:cNvPr>
+              <p:cNvSpPr txBox="1"/>
+              <p:nvPr/>
+            </p:nvSpPr>
+            <p:spPr>
+              <a:xfrm>
+                <a:off x="3965906" y="6032627"/>
+                <a:ext cx="807396" cy="657552"/>
+              </a:xfrm>
+              <a:prstGeom prst="rect">
+                <a:avLst/>
+              </a:prstGeom>
+              <a:noFill/>
+            </p:spPr>
+            <p:txBody>
+              <a:bodyPr wrap="square" rtlCol="0">
+                <a:spAutoFit/>
+              </a:bodyPr>
+              <a:lstStyle/>
+              <a:p>
+                <a:pPr/>
+                <a14:m>
+                  <m:oMathPara xmlns:m="http://schemas.openxmlformats.org/officeDocument/2006/math">
+                    <m:oMathParaPr>
+                      <m:jc m:val="centerGroup"/>
+                    </m:oMathParaPr>
+                    <m:oMath xmlns:m="http://schemas.openxmlformats.org/officeDocument/2006/math">
+                      <m:f>
+                        <m:fPr>
+                          <m:ctrlPr>
+                            <a:rPr lang="en-US" b="1" i="1" smtClean="0">
+                              <a:solidFill>
+                                <a:schemeClr val="tx1"/>
+                              </a:solidFill>
+                              <a:latin typeface="Cambria Math" panose="02040503050406030204" pitchFamily="18" charset="0"/>
+                            </a:rPr>
+                          </m:ctrlPr>
+                        </m:fPr>
+                        <m:num>
+                          <m:r>
+                            <a:rPr lang="en-US" b="1" i="1" smtClean="0">
+                              <a:solidFill>
+                                <a:schemeClr val="accent6"/>
+                              </a:solidFill>
+                              <a:latin typeface="Cambria Math" panose="02040503050406030204" pitchFamily="18" charset="0"/>
+                            </a:rPr>
+                            <m:t>𝑴</m:t>
+                          </m:r>
+                        </m:num>
+                        <m:den>
+                          <m:sSub>
+                            <m:sSubPr>
+                              <m:ctrlPr>
+                                <a:rPr lang="en-US" b="1" i="1" smtClean="0">
+                                  <a:solidFill>
+                                    <a:schemeClr val="tx1"/>
+                                  </a:solidFill>
+                                  <a:latin typeface="Cambria Math" panose="02040503050406030204" pitchFamily="18" charset="0"/>
+                                </a:rPr>
+                              </m:ctrlPr>
+                            </m:sSubPr>
+                            <m:e>
+                              <m:r>
+                                <a:rPr lang="en-US" b="1" i="1" smtClean="0">
+                                  <a:solidFill>
+                                    <a:schemeClr val="tx1"/>
+                                  </a:solidFill>
+                                  <a:latin typeface="Cambria Math" panose="02040503050406030204" pitchFamily="18" charset="0"/>
+                                </a:rPr>
+                                <m:t>𝑷</m:t>
+                              </m:r>
+                            </m:e>
+                            <m:sub>
+                              <m:r>
+                                <a:rPr lang="en-US" b="1" i="1" smtClean="0">
+                                  <a:solidFill>
+                                    <a:schemeClr val="tx1"/>
+                                  </a:solidFill>
+                                  <a:latin typeface="Cambria Math" panose="02040503050406030204" pitchFamily="18" charset="0"/>
+                                </a:rPr>
+                                <m:t>𝒙</m:t>
+                              </m:r>
+                            </m:sub>
+                          </m:sSub>
+                        </m:den>
+                      </m:f>
+                    </m:oMath>
+                  </m:oMathPara>
+                </a14:m>
+                <a:endParaRPr lang="en-US" b="1" dirty="0">
+                  <a:solidFill>
+                    <a:schemeClr val="tx1"/>
+                  </a:solidFill>
+                </a:endParaRPr>
+              </a:p>
+            </p:txBody>
+          </p:sp>
+        </mc:Choice>
+        <mc:Fallback>
+          <p:sp>
+            <p:nvSpPr>
+              <p:cNvPr id="9" name="TextBox 8">
+                <a:extLst>
+                  <a:ext uri="{FF2B5EF4-FFF2-40B4-BE49-F238E27FC236}">
+                    <a16:creationId xmlns:a16="http://schemas.microsoft.com/office/drawing/2014/main" id="{F85F37D3-1F3F-75A2-4519-A8C0982570EA}"/>
+                  </a:ext>
+                </a:extLst>
+              </p:cNvPr>
+              <p:cNvSpPr txBox="1">
+                <a:spLocks noRot="1" noChangeAspect="1" noMove="1" noResize="1" noEditPoints="1" noAdjustHandles="1" noChangeArrowheads="1" noChangeShapeType="1" noTextEdit="1"/>
+              </p:cNvSpPr>
+              <p:nvPr/>
+            </p:nvSpPr>
+            <p:spPr>
+              <a:xfrm>
+                <a:off x="3965906" y="6032627"/>
+                <a:ext cx="807396" cy="657552"/>
+              </a:xfrm>
+              <a:prstGeom prst="rect">
+                <a:avLst/>
+              </a:prstGeom>
+              <a:blipFill>
+                <a:blip r:embed="rId7"/>
+                <a:stretch>
+                  <a:fillRect/>
+                </a:stretch>
+              </a:blipFill>
+            </p:spPr>
+            <p:txBody>
+              <a:bodyPr/>
+              <a:lstStyle/>
+              <a:p>
+                <a:r>
+                  <a:rPr lang="en-US">
+                    <a:noFill/>
+                  </a:rPr>
+                  <a:t> </a:t>
+                </a:r>
+              </a:p>
+            </p:txBody>
+          </p:sp>
+        </mc:Fallback>
+      </mc:AlternateContent>
+      <mc:AlternateContent xmlns:mc="http://schemas.openxmlformats.org/markup-compatibility/2006">
+        <mc:Choice xmlns:a14="http://schemas.microsoft.com/office/drawing/2010/main" Requires="a14">
+          <p:sp>
+            <p:nvSpPr>
+              <p:cNvPr id="10" name="TextBox 9">
+                <a:extLst>
+                  <a:ext uri="{FF2B5EF4-FFF2-40B4-BE49-F238E27FC236}">
+                    <a16:creationId xmlns:a16="http://schemas.microsoft.com/office/drawing/2014/main" id="{F0D09E51-0C6C-A8D4-EC24-D1A8DB26C74E}"/>
+                  </a:ext>
+                </a:extLst>
+              </p:cNvPr>
+              <p:cNvSpPr txBox="1"/>
+              <p:nvPr/>
+            </p:nvSpPr>
+            <p:spPr>
+              <a:xfrm>
+                <a:off x="6697727" y="5269223"/>
+                <a:ext cx="1160353" cy="523220"/>
+              </a:xfrm>
+              <a:prstGeom prst="rect">
+                <a:avLst/>
+              </a:prstGeom>
+              <a:noFill/>
+            </p:spPr>
+            <p:txBody>
+              <a:bodyPr wrap="square" rtlCol="0">
+                <a:spAutoFit/>
+              </a:bodyPr>
+              <a:lstStyle/>
+              <a:p>
+                <a:pPr/>
+                <a14:m>
+                  <m:oMathPara xmlns:m="http://schemas.openxmlformats.org/officeDocument/2006/math">
+                    <m:oMathParaPr>
+                      <m:jc m:val="centerGroup"/>
+                    </m:oMathParaPr>
+                    <m:oMath xmlns:m="http://schemas.openxmlformats.org/officeDocument/2006/math">
+                      <m:r>
+                        <a:rPr lang="en-US" sz="2800" b="1" i="1" smtClean="0">
+                          <a:solidFill>
+                            <a:schemeClr val="accent2"/>
+                          </a:solidFill>
+                          <a:latin typeface="Cambria Math" panose="02040503050406030204" pitchFamily="18" charset="0"/>
+                        </a:rPr>
+                        <m:t>𝑴</m:t>
+                      </m:r>
+                      <m:r>
+                        <a:rPr lang="en-US" sz="2800" b="1" i="1" smtClean="0">
+                          <a:solidFill>
+                            <a:schemeClr val="accent2"/>
+                          </a:solidFill>
+                          <a:latin typeface="Cambria Math" panose="02040503050406030204" pitchFamily="18" charset="0"/>
+                        </a:rPr>
+                        <m:t>↑</m:t>
+                      </m:r>
+                    </m:oMath>
+                  </m:oMathPara>
+                </a14:m>
+                <a:endParaRPr lang="en-US" sz="2800" b="1" dirty="0">
+                  <a:solidFill>
+                    <a:schemeClr val="accent2"/>
+                  </a:solidFill>
+                </a:endParaRPr>
+              </a:p>
+            </p:txBody>
+          </p:sp>
+        </mc:Choice>
+        <mc:Fallback>
+          <p:sp>
+            <p:nvSpPr>
+              <p:cNvPr id="10" name="TextBox 9">
+                <a:extLst>
+                  <a:ext uri="{FF2B5EF4-FFF2-40B4-BE49-F238E27FC236}">
+                    <a16:creationId xmlns:a16="http://schemas.microsoft.com/office/drawing/2014/main" id="{F0D09E51-0C6C-A8D4-EC24-D1A8DB26C74E}"/>
+                  </a:ext>
+                </a:extLst>
+              </p:cNvPr>
+              <p:cNvSpPr txBox="1">
+                <a:spLocks noRot="1" noChangeAspect="1" noMove="1" noResize="1" noEditPoints="1" noAdjustHandles="1" noChangeArrowheads="1" noChangeShapeType="1" noTextEdit="1"/>
+              </p:cNvSpPr>
+              <p:nvPr/>
+            </p:nvSpPr>
+            <p:spPr>
+              <a:xfrm>
+                <a:off x="6697727" y="5269223"/>
+                <a:ext cx="1160353" cy="523220"/>
+              </a:xfrm>
+              <a:prstGeom prst="rect">
+                <a:avLst/>
+              </a:prstGeom>
+              <a:blipFill>
+                <a:blip r:embed="rId8"/>
+                <a:stretch>
+                  <a:fillRect/>
+                </a:stretch>
+              </a:blipFill>
+            </p:spPr>
+            <p:txBody>
+              <a:bodyPr/>
+              <a:lstStyle/>
+              <a:p>
+                <a:r>
+                  <a:rPr lang="en-US">
+                    <a:noFill/>
+                  </a:rPr>
+                  <a:t> </a:t>
+                </a:r>
+              </a:p>
+            </p:txBody>
+          </p:sp>
+        </mc:Fallback>
+      </mc:AlternateContent>
+      <mc:AlternateContent xmlns:mc="http://schemas.openxmlformats.org/markup-compatibility/2006">
+        <mc:Choice xmlns:a14="http://schemas.microsoft.com/office/drawing/2010/main" Requires="a14">
+          <p:sp>
+            <p:nvSpPr>
+              <p:cNvPr id="11" name="TextBox 10">
+                <a:extLst>
+                  <a:ext uri="{FF2B5EF4-FFF2-40B4-BE49-F238E27FC236}">
+                    <a16:creationId xmlns:a16="http://schemas.microsoft.com/office/drawing/2014/main" id="{D0439795-E0F5-6E9A-F1DC-5F79F0CED195}"/>
+                  </a:ext>
+                </a:extLst>
+              </p:cNvPr>
+              <p:cNvSpPr txBox="1"/>
+              <p:nvPr/>
+            </p:nvSpPr>
+            <p:spPr>
+              <a:xfrm>
+                <a:off x="2822435" y="5155464"/>
+                <a:ext cx="1314011" cy="523220"/>
+              </a:xfrm>
+              <a:prstGeom prst="rect">
+                <a:avLst/>
+              </a:prstGeom>
+              <a:noFill/>
+            </p:spPr>
+            <p:txBody>
+              <a:bodyPr wrap="square" rtlCol="0">
+                <a:spAutoFit/>
+              </a:bodyPr>
+              <a:lstStyle/>
+              <a:p>
+                <a:pPr/>
+                <a14:m>
+                  <m:oMathPara xmlns:m="http://schemas.openxmlformats.org/officeDocument/2006/math">
+                    <m:oMathParaPr>
+                      <m:jc m:val="centerGroup"/>
+                    </m:oMathParaPr>
+                    <m:oMath xmlns:m="http://schemas.openxmlformats.org/officeDocument/2006/math">
+                      <m:r>
+                        <a:rPr lang="en-US" sz="2800" b="1" i="1" smtClean="0">
+                          <a:solidFill>
+                            <a:schemeClr val="accent6"/>
+                          </a:solidFill>
+                          <a:latin typeface="Cambria Math" panose="02040503050406030204" pitchFamily="18" charset="0"/>
+                        </a:rPr>
+                        <m:t>𝑴</m:t>
+                      </m:r>
+                      <m:r>
+                        <a:rPr lang="en-US" sz="2800" b="1" i="1" smtClean="0">
+                          <a:solidFill>
+                            <a:schemeClr val="accent6"/>
+                          </a:solidFill>
+                          <a:latin typeface="Cambria Math" panose="02040503050406030204" pitchFamily="18" charset="0"/>
+                        </a:rPr>
+                        <m:t>↓</m:t>
+                      </m:r>
+                    </m:oMath>
+                  </m:oMathPara>
+                </a14:m>
+                <a:endParaRPr lang="en-US" sz="2800" b="1" dirty="0">
+                  <a:solidFill>
+                    <a:schemeClr val="accent6"/>
+                  </a:solidFill>
+                </a:endParaRPr>
+              </a:p>
+            </p:txBody>
+          </p:sp>
+        </mc:Choice>
+        <mc:Fallback>
+          <p:sp>
+            <p:nvSpPr>
+              <p:cNvPr id="11" name="TextBox 10">
+                <a:extLst>
+                  <a:ext uri="{FF2B5EF4-FFF2-40B4-BE49-F238E27FC236}">
+                    <a16:creationId xmlns:a16="http://schemas.microsoft.com/office/drawing/2014/main" id="{D0439795-E0F5-6E9A-F1DC-5F79F0CED195}"/>
+                  </a:ext>
+                </a:extLst>
+              </p:cNvPr>
+              <p:cNvSpPr txBox="1">
+                <a:spLocks noRot="1" noChangeAspect="1" noMove="1" noResize="1" noEditPoints="1" noAdjustHandles="1" noChangeArrowheads="1" noChangeShapeType="1" noTextEdit="1"/>
+              </p:cNvSpPr>
+              <p:nvPr/>
+            </p:nvSpPr>
+            <p:spPr>
+              <a:xfrm>
+                <a:off x="2822435" y="5155464"/>
+                <a:ext cx="1314011" cy="523220"/>
+              </a:xfrm>
+              <a:prstGeom prst="rect">
+                <a:avLst/>
+              </a:prstGeom>
+              <a:blipFill>
+                <a:blip r:embed="rId9"/>
+                <a:stretch>
+                  <a:fillRect/>
+                </a:stretch>
+              </a:blipFill>
+            </p:spPr>
+            <p:txBody>
+              <a:bodyPr/>
+              <a:lstStyle/>
+              <a:p>
+                <a:r>
+                  <a:rPr lang="en-US">
+                    <a:noFill/>
+                  </a:rPr>
+                  <a:t> </a:t>
+                </a:r>
+              </a:p>
+            </p:txBody>
+          </p:sp>
+        </mc:Fallback>
+      </mc:AlternateContent>
+      <p:cxnSp>
+        <p:nvCxnSpPr>
+          <p:cNvPr id="17" name="Straight Arrow Connector 16">
+            <a:extLst>
+              <a:ext uri="{FF2B5EF4-FFF2-40B4-BE49-F238E27FC236}">
+                <a16:creationId xmlns:a16="http://schemas.microsoft.com/office/drawing/2014/main" id="{2336FE25-AA9F-E1BC-8A8A-8A3FB0A9E8E3}"/>
+              </a:ext>
+            </a:extLst>
+          </p:cNvPr>
+          <p:cNvCxnSpPr>
+            <a:cxnSpLocks/>
+            <a:endCxn id="9" idx="3"/>
+          </p:cNvCxnSpPr>
+          <p:nvPr/>
+        </p:nvCxnSpPr>
+        <p:spPr>
+          <a:xfrm flipH="1">
+            <a:off x="4773302" y="6361403"/>
+            <a:ext cx="636898" cy="0"/>
+          </a:xfrm>
+          <a:prstGeom prst="straightConnector1">
+            <a:avLst/>
+          </a:prstGeom>
+          <a:ln w="57150">
+            <a:solidFill>
+              <a:schemeClr val="accent6"/>
+            </a:solidFill>
+            <a:tailEnd type="triangle"/>
+          </a:ln>
+        </p:spPr>
+        <p:style>
+          <a:lnRef idx="1">
+            <a:schemeClr val="accent1"/>
+          </a:lnRef>
+          <a:fillRef idx="0">
+            <a:schemeClr val="accent1"/>
+          </a:fillRef>
+          <a:effectRef idx="0">
+            <a:schemeClr val="accent1"/>
+          </a:effectRef>
+          <a:fontRef idx="minor">
+            <a:schemeClr val="tx1"/>
+          </a:fontRef>
+        </p:style>
+      </p:cxnSp>
+      <p:cxnSp>
+        <p:nvCxnSpPr>
+          <p:cNvPr id="20" name="Straight Arrow Connector 19">
+            <a:extLst>
+              <a:ext uri="{FF2B5EF4-FFF2-40B4-BE49-F238E27FC236}">
+                <a16:creationId xmlns:a16="http://schemas.microsoft.com/office/drawing/2014/main" id="{680B5365-1936-EBE1-64F3-26357CDAB416}"/>
+              </a:ext>
+            </a:extLst>
+          </p:cNvPr>
+          <p:cNvCxnSpPr>
+            <a:cxnSpLocks/>
+          </p:cNvCxnSpPr>
+          <p:nvPr/>
+        </p:nvCxnSpPr>
+        <p:spPr>
+          <a:xfrm>
+            <a:off x="6226102" y="6361403"/>
+            <a:ext cx="721604" cy="0"/>
+          </a:xfrm>
+          <a:prstGeom prst="straightConnector1">
+            <a:avLst/>
+          </a:prstGeom>
+          <a:ln w="57150">
+            <a:solidFill>
+              <a:schemeClr val="accent2">
+                <a:lumMod val="75000"/>
+              </a:schemeClr>
+            </a:solidFill>
+            <a:tailEnd type="triangle"/>
+          </a:ln>
+        </p:spPr>
+        <p:style>
+          <a:lnRef idx="1">
+            <a:schemeClr val="accent1"/>
+          </a:lnRef>
+          <a:fillRef idx="0">
+            <a:schemeClr val="accent1"/>
+          </a:fillRef>
+          <a:effectRef idx="0">
+            <a:schemeClr val="accent1"/>
+          </a:effectRef>
+          <a:fontRef idx="minor">
+            <a:schemeClr val="tx1"/>
+          </a:fontRef>
+        </p:style>
+      </p:cxnSp>
+      <p:sp>
+        <p:nvSpPr>
+          <p:cNvPr id="6" name="Freeform: Shape 5">
+            <a:extLst>
+              <a:ext uri="{FF2B5EF4-FFF2-40B4-BE49-F238E27FC236}">
+                <a16:creationId xmlns:a16="http://schemas.microsoft.com/office/drawing/2014/main" id="{0CF6D7D9-CF42-B396-29A8-52DACB5F1FF9}"/>
+              </a:ext>
+            </a:extLst>
+          </p:cNvPr>
+          <p:cNvSpPr/>
+          <p:nvPr/>
+        </p:nvSpPr>
+        <p:spPr>
+          <a:xfrm>
+            <a:off x="2286000" y="395306"/>
+            <a:ext cx="7601613" cy="5637321"/>
+          </a:xfrm>
+          <a:custGeom>
+            <a:avLst/>
+            <a:gdLst>
+              <a:gd name="connsiteX0" fmla="*/ 0 w 10227076"/>
+              <a:gd name="connsiteY0" fmla="*/ 0 h 5637321"/>
+              <a:gd name="connsiteX1" fmla="*/ 35511 w 10227076"/>
+              <a:gd name="connsiteY1" fmla="*/ 5637321 h 5637321"/>
+              <a:gd name="connsiteX2" fmla="*/ 10227076 w 10227076"/>
+              <a:gd name="connsiteY2" fmla="*/ 5584055 h 5637321"/>
+            </a:gdLst>
+            <a:ahLst/>
+            <a:cxnLst>
+              <a:cxn ang="0">
+                <a:pos x="connsiteX0" y="connsiteY0"/>
+              </a:cxn>
+              <a:cxn ang="0">
+                <a:pos x="connsiteX1" y="connsiteY1"/>
+              </a:cxn>
+              <a:cxn ang="0">
+                <a:pos x="connsiteX2" y="connsiteY2"/>
+              </a:cxn>
+            </a:cxnLst>
+            <a:rect l="l" t="t" r="r" b="b"/>
+            <a:pathLst>
+              <a:path w="10227076" h="5637321">
+                <a:moveTo>
+                  <a:pt x="0" y="0"/>
+                </a:moveTo>
+                <a:lnTo>
+                  <a:pt x="35511" y="5637321"/>
+                </a:lnTo>
+                <a:lnTo>
+                  <a:pt x="10227076" y="5584055"/>
+                </a:lnTo>
+              </a:path>
+            </a:pathLst>
+          </a:custGeom>
+          <a:ln w="38100"/>
+        </p:spPr>
+        <p:style>
+          <a:lnRef idx="3">
+            <a:schemeClr val="dk1"/>
+          </a:lnRef>
+          <a:fillRef idx="0">
+            <a:schemeClr val="dk1"/>
+          </a:fillRef>
+          <a:effectRef idx="2">
+            <a:schemeClr val="dk1"/>
+          </a:effectRef>
+          <a:fontRef idx="minor">
+            <a:schemeClr val="tx1"/>
+          </a:fontRef>
+        </p:style>
+        <p:txBody>
+          <a:bodyPr rtlCol="0" anchor="ctr"/>
+          <a:lstStyle/>
+          <a:p>
+            <a:pPr algn="ctr"/>
+            <a:endParaRPr lang="en-US" dirty="0"/>
+          </a:p>
+        </p:txBody>
+      </p:sp>
+      <p:cxnSp>
+        <p:nvCxnSpPr>
+          <p:cNvPr id="12" name="Straight Connector 11">
+            <a:extLst>
+              <a:ext uri="{FF2B5EF4-FFF2-40B4-BE49-F238E27FC236}">
+                <a16:creationId xmlns:a16="http://schemas.microsoft.com/office/drawing/2014/main" id="{7381AF00-5F52-DC9B-5764-2D797464A5FC}"/>
+              </a:ext>
+            </a:extLst>
+          </p:cNvPr>
+          <p:cNvCxnSpPr>
+            <a:cxnSpLocks/>
+          </p:cNvCxnSpPr>
+          <p:nvPr/>
+        </p:nvCxnSpPr>
+        <p:spPr>
+          <a:xfrm>
+            <a:off x="2286000" y="825373"/>
+            <a:ext cx="4756344" cy="5149977"/>
+          </a:xfrm>
+          <a:prstGeom prst="line">
+            <a:avLst/>
+          </a:prstGeom>
+          <a:ln w="38100">
+            <a:solidFill>
+              <a:schemeClr val="accent2">
+                <a:lumMod val="75000"/>
+              </a:schemeClr>
+            </a:solidFill>
+          </a:ln>
+        </p:spPr>
+        <p:style>
+          <a:lnRef idx="1">
+            <a:schemeClr val="accent1"/>
+          </a:lnRef>
+          <a:fillRef idx="0">
+            <a:schemeClr val="accent1"/>
+          </a:fillRef>
+          <a:effectRef idx="0">
+            <a:schemeClr val="accent1"/>
+          </a:effectRef>
+          <a:fontRef idx="minor">
+            <a:schemeClr val="tx1"/>
+          </a:fontRef>
+        </p:style>
+      </p:cxnSp>
+      <mc:AlternateContent xmlns:mc="http://schemas.openxmlformats.org/markup-compatibility/2006">
+        <mc:Choice xmlns:a14="http://schemas.microsoft.com/office/drawing/2010/main" Requires="a14">
+          <p:sp>
+            <p:nvSpPr>
+              <p:cNvPr id="23" name="TextBox 22">
+                <a:extLst>
+                  <a:ext uri="{FF2B5EF4-FFF2-40B4-BE49-F238E27FC236}">
+                    <a16:creationId xmlns:a16="http://schemas.microsoft.com/office/drawing/2014/main" id="{03E15CB9-113E-4BAC-56AC-0043BEE52486}"/>
+                  </a:ext>
+                </a:extLst>
+              </p:cNvPr>
+              <p:cNvSpPr txBox="1"/>
+              <p:nvPr/>
+            </p:nvSpPr>
+            <p:spPr>
+              <a:xfrm>
+                <a:off x="1618518" y="3033549"/>
+                <a:ext cx="807396" cy="692177"/>
+              </a:xfrm>
+              <a:prstGeom prst="rect">
+                <a:avLst/>
+              </a:prstGeom>
+              <a:noFill/>
+            </p:spPr>
+            <p:txBody>
+              <a:bodyPr wrap="square" rtlCol="0">
+                <a:spAutoFit/>
+              </a:bodyPr>
+              <a:lstStyle/>
+              <a:p>
+                <a:pPr/>
+                <a14:m>
+                  <m:oMathPara xmlns:m="http://schemas.openxmlformats.org/officeDocument/2006/math">
+                    <m:oMathParaPr>
+                      <m:jc m:val="centerGroup"/>
+                    </m:oMathParaPr>
+                    <m:oMath xmlns:m="http://schemas.openxmlformats.org/officeDocument/2006/math">
+                      <m:f>
+                        <m:fPr>
+                          <m:ctrlPr>
+                            <a:rPr lang="en-US" b="1" i="1" smtClean="0">
+                              <a:solidFill>
+                                <a:schemeClr val="tx1"/>
+                              </a:solidFill>
+                              <a:latin typeface="Cambria Math" panose="02040503050406030204" pitchFamily="18" charset="0"/>
+                            </a:rPr>
+                          </m:ctrlPr>
+                        </m:fPr>
+                        <m:num>
+                          <m:r>
+                            <a:rPr lang="en-US" b="1" i="1" smtClean="0">
+                              <a:solidFill>
+                                <a:schemeClr val="accent6"/>
+                              </a:solidFill>
+                              <a:latin typeface="Cambria Math" panose="02040503050406030204" pitchFamily="18" charset="0"/>
+                            </a:rPr>
+                            <m:t>𝑴</m:t>
+                          </m:r>
+                        </m:num>
+                        <m:den>
+                          <m:sSub>
+                            <m:sSubPr>
+                              <m:ctrlPr>
+                                <a:rPr lang="en-US" b="1" i="1" smtClean="0">
+                                  <a:solidFill>
+                                    <a:schemeClr val="tx1"/>
+                                  </a:solidFill>
+                                  <a:latin typeface="Cambria Math" panose="02040503050406030204" pitchFamily="18" charset="0"/>
+                                </a:rPr>
+                              </m:ctrlPr>
+                            </m:sSubPr>
+                            <m:e>
+                              <m:r>
+                                <a:rPr lang="en-US" b="1" i="1" smtClean="0">
+                                  <a:solidFill>
+                                    <a:schemeClr val="tx1"/>
+                                  </a:solidFill>
+                                  <a:latin typeface="Cambria Math" panose="02040503050406030204" pitchFamily="18" charset="0"/>
+                                </a:rPr>
+                                <m:t>𝑷</m:t>
+                              </m:r>
+                            </m:e>
+                            <m:sub>
+                              <m:r>
+                                <a:rPr lang="en-US" b="1" i="1" smtClean="0">
+                                  <a:solidFill>
+                                    <a:schemeClr val="tx1"/>
+                                  </a:solidFill>
+                                  <a:latin typeface="Cambria Math" panose="02040503050406030204" pitchFamily="18" charset="0"/>
+                                </a:rPr>
+                                <m:t>𝒚</m:t>
+                              </m:r>
+                            </m:sub>
+                          </m:sSub>
+                        </m:den>
+                      </m:f>
+                    </m:oMath>
+                  </m:oMathPara>
+                </a14:m>
+                <a:endParaRPr lang="en-US" b="1" dirty="0">
+                  <a:solidFill>
+                    <a:schemeClr val="tx1"/>
+                  </a:solidFill>
+                </a:endParaRPr>
+              </a:p>
+            </p:txBody>
+          </p:sp>
+        </mc:Choice>
+        <mc:Fallback>
+          <p:sp>
+            <p:nvSpPr>
+              <p:cNvPr id="23" name="TextBox 22">
+                <a:extLst>
+                  <a:ext uri="{FF2B5EF4-FFF2-40B4-BE49-F238E27FC236}">
+                    <a16:creationId xmlns:a16="http://schemas.microsoft.com/office/drawing/2014/main" id="{03E15CB9-113E-4BAC-56AC-0043BEE52486}"/>
+                  </a:ext>
+                </a:extLst>
+              </p:cNvPr>
+              <p:cNvSpPr txBox="1">
+                <a:spLocks noRot="1" noChangeAspect="1" noMove="1" noResize="1" noEditPoints="1" noAdjustHandles="1" noChangeArrowheads="1" noChangeShapeType="1" noTextEdit="1"/>
+              </p:cNvSpPr>
+              <p:nvPr/>
+            </p:nvSpPr>
+            <p:spPr>
+              <a:xfrm>
+                <a:off x="1618518" y="3033549"/>
+                <a:ext cx="807396" cy="692177"/>
+              </a:xfrm>
+              <a:prstGeom prst="rect">
+                <a:avLst/>
+              </a:prstGeom>
+              <a:blipFill>
+                <a:blip r:embed="rId10"/>
+                <a:stretch>
+                  <a:fillRect/>
+                </a:stretch>
+              </a:blipFill>
+            </p:spPr>
+            <p:txBody>
+              <a:bodyPr/>
+              <a:lstStyle/>
+              <a:p>
+                <a:r>
+                  <a:rPr lang="en-US">
+                    <a:noFill/>
+                  </a:rPr>
+                  <a:t> </a:t>
+                </a:r>
+              </a:p>
+            </p:txBody>
+          </p:sp>
+        </mc:Fallback>
+      </mc:AlternateContent>
+      <mc:AlternateContent xmlns:mc="http://schemas.openxmlformats.org/markup-compatibility/2006">
+        <mc:Choice xmlns:a14="http://schemas.microsoft.com/office/drawing/2010/main" Requires="a14">
+          <p:sp>
+            <p:nvSpPr>
+              <p:cNvPr id="24" name="TextBox 23">
+                <a:extLst>
+                  <a:ext uri="{FF2B5EF4-FFF2-40B4-BE49-F238E27FC236}">
+                    <a16:creationId xmlns:a16="http://schemas.microsoft.com/office/drawing/2014/main" id="{1CE3BA45-6E4C-D8E2-DAC0-A69FC8987649}"/>
+                  </a:ext>
+                </a:extLst>
+              </p:cNvPr>
+              <p:cNvSpPr txBox="1"/>
+              <p:nvPr/>
+            </p:nvSpPr>
+            <p:spPr>
+              <a:xfrm>
+                <a:off x="1618518" y="531223"/>
+                <a:ext cx="807396" cy="692177"/>
+              </a:xfrm>
+              <a:prstGeom prst="rect">
+                <a:avLst/>
+              </a:prstGeom>
+              <a:noFill/>
+            </p:spPr>
+            <p:txBody>
+              <a:bodyPr wrap="square" rtlCol="0">
+                <a:spAutoFit/>
+              </a:bodyPr>
+              <a:lstStyle/>
+              <a:p>
+                <a:pPr/>
+                <a14:m>
+                  <m:oMathPara xmlns:m="http://schemas.openxmlformats.org/officeDocument/2006/math">
+                    <m:oMathParaPr>
+                      <m:jc m:val="centerGroup"/>
+                    </m:oMathParaPr>
+                    <m:oMath xmlns:m="http://schemas.openxmlformats.org/officeDocument/2006/math">
+                      <m:f>
+                        <m:fPr>
+                          <m:ctrlPr>
+                            <a:rPr lang="en-US" b="1" i="1" smtClean="0">
+                              <a:solidFill>
+                                <a:schemeClr val="tx1"/>
+                              </a:solidFill>
+                              <a:latin typeface="Cambria Math" panose="02040503050406030204" pitchFamily="18" charset="0"/>
+                            </a:rPr>
+                          </m:ctrlPr>
+                        </m:fPr>
+                        <m:num>
+                          <m:r>
+                            <a:rPr lang="en-US" b="1" i="1" smtClean="0">
+                              <a:solidFill>
+                                <a:schemeClr val="accent2">
+                                  <a:lumMod val="75000"/>
+                                </a:schemeClr>
+                              </a:solidFill>
+                              <a:latin typeface="Cambria Math" panose="02040503050406030204" pitchFamily="18" charset="0"/>
+                            </a:rPr>
+                            <m:t>𝑴</m:t>
+                          </m:r>
+                        </m:num>
+                        <m:den>
+                          <m:sSub>
+                            <m:sSubPr>
+                              <m:ctrlPr>
+                                <a:rPr lang="en-US" b="1" i="1" smtClean="0">
+                                  <a:solidFill>
+                                    <a:schemeClr val="tx1"/>
+                                  </a:solidFill>
+                                  <a:latin typeface="Cambria Math" panose="02040503050406030204" pitchFamily="18" charset="0"/>
+                                </a:rPr>
+                              </m:ctrlPr>
+                            </m:sSubPr>
+                            <m:e>
+                              <m:r>
+                                <a:rPr lang="en-US" b="1" i="1" smtClean="0">
+                                  <a:solidFill>
+                                    <a:schemeClr val="tx1"/>
+                                  </a:solidFill>
+                                  <a:latin typeface="Cambria Math" panose="02040503050406030204" pitchFamily="18" charset="0"/>
+                                </a:rPr>
+                                <m:t>𝑷</m:t>
+                              </m:r>
+                            </m:e>
+                            <m:sub>
+                              <m:r>
+                                <a:rPr lang="en-US" b="1" i="1" smtClean="0">
+                                  <a:solidFill>
+                                    <a:schemeClr val="tx1"/>
+                                  </a:solidFill>
+                                  <a:latin typeface="Cambria Math" panose="02040503050406030204" pitchFamily="18" charset="0"/>
+                                </a:rPr>
+                                <m:t>𝒚</m:t>
+                              </m:r>
+                            </m:sub>
+                          </m:sSub>
+                        </m:den>
+                      </m:f>
+                    </m:oMath>
+                  </m:oMathPara>
+                </a14:m>
+                <a:endParaRPr lang="en-US" b="1" dirty="0">
+                  <a:solidFill>
+                    <a:schemeClr val="tx1"/>
+                  </a:solidFill>
+                </a:endParaRPr>
+              </a:p>
+            </p:txBody>
+          </p:sp>
+        </mc:Choice>
+        <mc:Fallback>
+          <p:sp>
+            <p:nvSpPr>
+              <p:cNvPr id="24" name="TextBox 23">
+                <a:extLst>
+                  <a:ext uri="{FF2B5EF4-FFF2-40B4-BE49-F238E27FC236}">
+                    <a16:creationId xmlns:a16="http://schemas.microsoft.com/office/drawing/2014/main" id="{1CE3BA45-6E4C-D8E2-DAC0-A69FC8987649}"/>
+                  </a:ext>
+                </a:extLst>
+              </p:cNvPr>
+              <p:cNvSpPr txBox="1">
+                <a:spLocks noRot="1" noChangeAspect="1" noMove="1" noResize="1" noEditPoints="1" noAdjustHandles="1" noChangeArrowheads="1" noChangeShapeType="1" noTextEdit="1"/>
+              </p:cNvSpPr>
+              <p:nvPr/>
+            </p:nvSpPr>
+            <p:spPr>
+              <a:xfrm>
+                <a:off x="1618518" y="531223"/>
+                <a:ext cx="807396" cy="692177"/>
+              </a:xfrm>
+              <a:prstGeom prst="rect">
+                <a:avLst/>
+              </a:prstGeom>
+              <a:blipFill>
+                <a:blip r:embed="rId11"/>
+                <a:stretch>
+                  <a:fillRect/>
+                </a:stretch>
+              </a:blipFill>
+            </p:spPr>
+            <p:txBody>
+              <a:bodyPr/>
+              <a:lstStyle/>
+              <a:p>
+                <a:r>
+                  <a:rPr lang="en-US">
+                    <a:noFill/>
+                  </a:rPr>
+                  <a:t> </a:t>
+                </a:r>
+              </a:p>
+            </p:txBody>
+          </p:sp>
+        </mc:Fallback>
+      </mc:AlternateContent>
+      <p:cxnSp>
+        <p:nvCxnSpPr>
+          <p:cNvPr id="34" name="Straight Arrow Connector 33">
+            <a:extLst>
+              <a:ext uri="{FF2B5EF4-FFF2-40B4-BE49-F238E27FC236}">
+                <a16:creationId xmlns:a16="http://schemas.microsoft.com/office/drawing/2014/main" id="{4A1CBDD6-7CC5-6903-867D-C8A8D5BAF293}"/>
+              </a:ext>
+            </a:extLst>
+          </p:cNvPr>
+          <p:cNvCxnSpPr>
+            <a:cxnSpLocks/>
+            <a:endCxn id="23" idx="0"/>
+          </p:cNvCxnSpPr>
+          <p:nvPr/>
+        </p:nvCxnSpPr>
+        <p:spPr>
+          <a:xfrm>
+            <a:off x="2022216" y="2455888"/>
+            <a:ext cx="0" cy="577661"/>
+          </a:xfrm>
+          <a:prstGeom prst="straightConnector1">
+            <a:avLst/>
+          </a:prstGeom>
+          <a:ln w="57150">
+            <a:solidFill>
+              <a:schemeClr val="accent6"/>
+            </a:solidFill>
+            <a:tailEnd type="triangle"/>
+          </a:ln>
+        </p:spPr>
+        <p:style>
+          <a:lnRef idx="1">
+            <a:schemeClr val="accent1"/>
+          </a:lnRef>
+          <a:fillRef idx="0">
+            <a:schemeClr val="accent1"/>
+          </a:fillRef>
+          <a:effectRef idx="0">
+            <a:schemeClr val="accent1"/>
+          </a:effectRef>
+          <a:fontRef idx="minor">
+            <a:schemeClr val="tx1"/>
+          </a:fontRef>
+        </p:style>
+      </p:cxnSp>
+      <p:cxnSp>
+        <p:nvCxnSpPr>
+          <p:cNvPr id="37" name="Straight Arrow Connector 36">
+            <a:extLst>
+              <a:ext uri="{FF2B5EF4-FFF2-40B4-BE49-F238E27FC236}">
+                <a16:creationId xmlns:a16="http://schemas.microsoft.com/office/drawing/2014/main" id="{A56EEC58-920D-E87D-D3B1-AEE79979699D}"/>
+              </a:ext>
+            </a:extLst>
+          </p:cNvPr>
+          <p:cNvCxnSpPr>
+            <a:cxnSpLocks/>
+            <a:stCxn id="16" idx="0"/>
+            <a:endCxn id="24" idx="2"/>
+          </p:cNvCxnSpPr>
+          <p:nvPr/>
+        </p:nvCxnSpPr>
+        <p:spPr>
+          <a:xfrm flipV="1">
+            <a:off x="2022216" y="1223400"/>
+            <a:ext cx="0" cy="492422"/>
+          </a:xfrm>
+          <a:prstGeom prst="straightConnector1">
+            <a:avLst/>
+          </a:prstGeom>
+          <a:ln w="57150">
+            <a:solidFill>
+              <a:schemeClr val="accent2">
+                <a:lumMod val="75000"/>
+              </a:schemeClr>
+            </a:solidFill>
+            <a:tailEnd type="triangle"/>
+          </a:ln>
+        </p:spPr>
+        <p:style>
+          <a:lnRef idx="1">
+            <a:schemeClr val="accent1"/>
+          </a:lnRef>
+          <a:fillRef idx="0">
+            <a:schemeClr val="accent1"/>
+          </a:fillRef>
+          <a:effectRef idx="0">
+            <a:schemeClr val="accent1"/>
+          </a:effectRef>
+          <a:fontRef idx="minor">
+            <a:schemeClr val="tx1"/>
+          </a:fontRef>
+        </p:style>
+      </p:cxnSp>
+    </p:spTree>
+    <p:extLst>
+      <p:ext uri="{BB962C8B-B14F-4D97-AF65-F5344CB8AC3E}">
+        <p14:creationId xmlns:p14="http://schemas.microsoft.com/office/powerpoint/2010/main" val="1445790999"/>
+      </p:ext>
+    </p:extLst>
+  </p:cSld>
+  <p:clrMapOvr>
+    <a:masterClrMapping/>
+  </p:clrMapOvr>
+</p:sld>
+</file>
+
+<file path=ppt/slides/slide6.xml><?xml version="1.0" encoding="utf-8"?>
+<p:sld xmlns:a="http://schemas.openxmlformats.org/drawingml/2006/main" xmlns:r="http://schemas.openxmlformats.org/officeDocument/2006/relationships" xmlns:p="http://schemas.openxmlformats.org/presentationml/2006/main">
+  <p:cSld>
+    <p:spTree>
+      <p:nvGrpSpPr>
+        <p:cNvPr id="1" name=""/>
+        <p:cNvGrpSpPr/>
+        <p:nvPr/>
+      </p:nvGrpSpPr>
+      <p:grpSpPr>
+        <a:xfrm>
+          <a:off x="0" y="0"/>
+          <a:ext cx="0" cy="0"/>
+          <a:chOff x="0" y="0"/>
+          <a:chExt cx="0" cy="0"/>
+        </a:xfrm>
+      </p:grpSpPr>
       <mc:AlternateContent xmlns:mc="http://schemas.openxmlformats.org/markup-compatibility/2006" xmlns:a14="http://schemas.microsoft.com/office/drawing/2010/main">
         <mc:Choice Requires="a14">
           <p:sp>
@@ -13725,7 +16721,7 @@
 </p:sld>
 </file>
 
-<file path=ppt/slides/slide6.xml><?xml version="1.0" encoding="utf-8"?>
+<file path=ppt/slides/slide7.xml><?xml version="1.0" encoding="utf-8"?>
 <p:sld xmlns:a="http://schemas.openxmlformats.org/drawingml/2006/main" xmlns:r="http://schemas.openxmlformats.org/officeDocument/2006/relationships" xmlns:p="http://schemas.openxmlformats.org/presentationml/2006/main">
   <p:cSld>
     <p:spTree>
@@ -14063,7 +17059,7 @@
 </p:sld>
 </file>
 
-<file path=ppt/slides/slide7.xml><?xml version="1.0" encoding="utf-8"?>
+<file path=ppt/slides/slide8.xml><?xml version="1.0" encoding="utf-8"?>
 <p:sld xmlns:a="http://schemas.openxmlformats.org/drawingml/2006/main" xmlns:r="http://schemas.openxmlformats.org/officeDocument/2006/relationships" xmlns:p="http://schemas.openxmlformats.org/presentationml/2006/main">
   <p:cSld>
     <p:spTree>
@@ -14819,7 +17815,7 @@
 </p:sld>
 </file>
 
-<file path=ppt/slides/slide8.xml><?xml version="1.0" encoding="utf-8"?>
+<file path=ppt/slides/slide9.xml><?xml version="1.0" encoding="utf-8"?>
 <p:sld xmlns:a="http://schemas.openxmlformats.org/drawingml/2006/main" xmlns:r="http://schemas.openxmlformats.org/officeDocument/2006/relationships" xmlns:p="http://schemas.openxmlformats.org/presentationml/2006/main">
   <p:cSld>
     <p:spTree>
@@ -16128,1229 +19124,6 @@
 </p:sld>
 </file>
 
-<file path=ppt/slides/slide9.xml><?xml version="1.0" encoding="utf-8"?>
-<p:sld xmlns:a="http://schemas.openxmlformats.org/drawingml/2006/main" xmlns:r="http://schemas.openxmlformats.org/officeDocument/2006/relationships" xmlns:p="http://schemas.openxmlformats.org/presentationml/2006/main">
-  <p:cSld>
-    <p:spTree>
-      <p:nvGrpSpPr>
-        <p:cNvPr id="1" name=""/>
-        <p:cNvGrpSpPr/>
-        <p:nvPr/>
-      </p:nvGrpSpPr>
-      <p:grpSpPr>
-        <a:xfrm>
-          <a:off x="0" y="0"/>
-          <a:ext cx="0" cy="0"/>
-          <a:chOff x="0" y="0"/>
-          <a:chExt cx="0" cy="0"/>
-        </a:xfrm>
-      </p:grpSpPr>
-      <p:sp>
-        <p:nvSpPr>
-          <p:cNvPr id="2" name="Freeform: Shape 1">
-            <a:extLst>
-              <a:ext uri="{FF2B5EF4-FFF2-40B4-BE49-F238E27FC236}">
-                <a16:creationId xmlns:a16="http://schemas.microsoft.com/office/drawing/2014/main" id="{D68EDA48-D74D-45EB-44D7-69F41E2846F4}"/>
-              </a:ext>
-            </a:extLst>
-          </p:cNvPr>
-          <p:cNvSpPr/>
-          <p:nvPr/>
-        </p:nvSpPr>
-        <p:spPr>
-          <a:xfrm>
-            <a:off x="2286000" y="395306"/>
-            <a:ext cx="7601613" cy="5637321"/>
-          </a:xfrm>
-          <a:custGeom>
-            <a:avLst/>
-            <a:gdLst>
-              <a:gd name="connsiteX0" fmla="*/ 0 w 10227076"/>
-              <a:gd name="connsiteY0" fmla="*/ 0 h 5637321"/>
-              <a:gd name="connsiteX1" fmla="*/ 35511 w 10227076"/>
-              <a:gd name="connsiteY1" fmla="*/ 5637321 h 5637321"/>
-              <a:gd name="connsiteX2" fmla="*/ 10227076 w 10227076"/>
-              <a:gd name="connsiteY2" fmla="*/ 5584055 h 5637321"/>
-            </a:gdLst>
-            <a:ahLst/>
-            <a:cxnLst>
-              <a:cxn ang="0">
-                <a:pos x="connsiteX0" y="connsiteY0"/>
-              </a:cxn>
-              <a:cxn ang="0">
-                <a:pos x="connsiteX1" y="connsiteY1"/>
-              </a:cxn>
-              <a:cxn ang="0">
-                <a:pos x="connsiteX2" y="connsiteY2"/>
-              </a:cxn>
-            </a:cxnLst>
-            <a:rect l="l" t="t" r="r" b="b"/>
-            <a:pathLst>
-              <a:path w="10227076" h="5637321">
-                <a:moveTo>
-                  <a:pt x="0" y="0"/>
-                </a:moveTo>
-                <a:lnTo>
-                  <a:pt x="35511" y="5637321"/>
-                </a:lnTo>
-                <a:lnTo>
-                  <a:pt x="10227076" y="5584055"/>
-                </a:lnTo>
-              </a:path>
-            </a:pathLst>
-          </a:custGeom>
-          <a:ln w="38100"/>
-        </p:spPr>
-        <p:style>
-          <a:lnRef idx="3">
-            <a:schemeClr val="dk1"/>
-          </a:lnRef>
-          <a:fillRef idx="0">
-            <a:schemeClr val="dk1"/>
-          </a:fillRef>
-          <a:effectRef idx="2">
-            <a:schemeClr val="dk1"/>
-          </a:effectRef>
-          <a:fontRef idx="minor">
-            <a:schemeClr val="tx1"/>
-          </a:fontRef>
-        </p:style>
-        <p:txBody>
-          <a:bodyPr rtlCol="0" anchor="ctr"/>
-          <a:lstStyle/>
-          <a:p>
-            <a:pPr algn="ctr"/>
-            <a:endParaRPr lang="en-US" dirty="0"/>
-          </a:p>
-        </p:txBody>
-      </p:sp>
-      <p:sp>
-        <p:nvSpPr>
-          <p:cNvPr id="3" name="Freeform: Shape 2">
-            <a:extLst>
-              <a:ext uri="{FF2B5EF4-FFF2-40B4-BE49-F238E27FC236}">
-                <a16:creationId xmlns:a16="http://schemas.microsoft.com/office/drawing/2014/main" id="{5307EFDA-60D6-DA65-C642-2EC9B9650D66}"/>
-              </a:ext>
-            </a:extLst>
-          </p:cNvPr>
-          <p:cNvSpPr/>
-          <p:nvPr/>
-        </p:nvSpPr>
-        <p:spPr>
-          <a:xfrm rot="20865587">
-            <a:off x="3027367" y="1320180"/>
-            <a:ext cx="5681709" cy="3187083"/>
-          </a:xfrm>
-          <a:custGeom>
-            <a:avLst/>
-            <a:gdLst>
-              <a:gd name="connsiteX0" fmla="*/ 0 w 5681709"/>
-              <a:gd name="connsiteY0" fmla="*/ 0 h 3187083"/>
-              <a:gd name="connsiteX1" fmla="*/ 514905 w 5681709"/>
-              <a:gd name="connsiteY1" fmla="*/ 1189608 h 3187083"/>
-              <a:gd name="connsiteX2" fmla="*/ 1997476 w 5681709"/>
-              <a:gd name="connsiteY2" fmla="*/ 2414726 h 3187083"/>
-              <a:gd name="connsiteX3" fmla="*/ 4136994 w 5681709"/>
-              <a:gd name="connsiteY3" fmla="*/ 3053918 h 3187083"/>
-              <a:gd name="connsiteX4" fmla="*/ 5681709 w 5681709"/>
-              <a:gd name="connsiteY4" fmla="*/ 3187083 h 3187083"/>
-            </a:gdLst>
-            <a:ahLst/>
-            <a:cxnLst>
-              <a:cxn ang="0">
-                <a:pos x="connsiteX0" y="connsiteY0"/>
-              </a:cxn>
-              <a:cxn ang="0">
-                <a:pos x="connsiteX1" y="connsiteY1"/>
-              </a:cxn>
-              <a:cxn ang="0">
-                <a:pos x="connsiteX2" y="connsiteY2"/>
-              </a:cxn>
-              <a:cxn ang="0">
-                <a:pos x="connsiteX3" y="connsiteY3"/>
-              </a:cxn>
-              <a:cxn ang="0">
-                <a:pos x="connsiteX4" y="connsiteY4"/>
-              </a:cxn>
-            </a:cxnLst>
-            <a:rect l="l" t="t" r="r" b="b"/>
-            <a:pathLst>
-              <a:path w="5681709" h="3187083">
-                <a:moveTo>
-                  <a:pt x="0" y="0"/>
-                </a:moveTo>
-                <a:cubicBezTo>
-                  <a:pt x="90996" y="393577"/>
-                  <a:pt x="181992" y="787154"/>
-                  <a:pt x="514905" y="1189608"/>
-                </a:cubicBezTo>
-                <a:cubicBezTo>
-                  <a:pt x="847818" y="1592062"/>
-                  <a:pt x="1393795" y="2104008"/>
-                  <a:pt x="1997476" y="2414726"/>
-                </a:cubicBezTo>
-                <a:cubicBezTo>
-                  <a:pt x="2601157" y="2725444"/>
-                  <a:pt x="3522955" y="2925192"/>
-                  <a:pt x="4136994" y="3053918"/>
-                </a:cubicBezTo>
-                <a:cubicBezTo>
-                  <a:pt x="4751033" y="3182644"/>
-                  <a:pt x="5434614" y="3133817"/>
-                  <a:pt x="5681709" y="3187083"/>
-                </a:cubicBezTo>
-              </a:path>
-            </a:pathLst>
-          </a:custGeom>
-          <a:noFill/>
-          <a:ln w="57150"/>
-        </p:spPr>
-        <p:style>
-          <a:lnRef idx="2">
-            <a:schemeClr val="accent1">
-              <a:shade val="15000"/>
-            </a:schemeClr>
-          </a:lnRef>
-          <a:fillRef idx="1">
-            <a:schemeClr val="accent1"/>
-          </a:fillRef>
-          <a:effectRef idx="0">
-            <a:schemeClr val="accent1"/>
-          </a:effectRef>
-          <a:fontRef idx="minor">
-            <a:schemeClr val="lt1"/>
-          </a:fontRef>
-        </p:style>
-        <p:txBody>
-          <a:bodyPr rtlCol="0" anchor="ctr"/>
-          <a:lstStyle/>
-          <a:p>
-            <a:pPr algn="ctr"/>
-            <a:endParaRPr lang="en-US"/>
-          </a:p>
-        </p:txBody>
-      </p:sp>
-      <p:sp>
-        <p:nvSpPr>
-          <p:cNvPr id="4" name="Freeform: Shape 3">
-            <a:extLst>
-              <a:ext uri="{FF2B5EF4-FFF2-40B4-BE49-F238E27FC236}">
-                <a16:creationId xmlns:a16="http://schemas.microsoft.com/office/drawing/2014/main" id="{CABC5D48-6001-2E19-50C0-0C0D75D1F06D}"/>
-              </a:ext>
-            </a:extLst>
-          </p:cNvPr>
-          <p:cNvSpPr/>
-          <p:nvPr/>
-        </p:nvSpPr>
-        <p:spPr>
-          <a:xfrm rot="563085">
-            <a:off x="3534367" y="1620425"/>
-            <a:ext cx="5681709" cy="3187083"/>
-          </a:xfrm>
-          <a:custGeom>
-            <a:avLst/>
-            <a:gdLst>
-              <a:gd name="connsiteX0" fmla="*/ 0 w 5681709"/>
-              <a:gd name="connsiteY0" fmla="*/ 0 h 3187083"/>
-              <a:gd name="connsiteX1" fmla="*/ 514905 w 5681709"/>
-              <a:gd name="connsiteY1" fmla="*/ 1189608 h 3187083"/>
-              <a:gd name="connsiteX2" fmla="*/ 1997476 w 5681709"/>
-              <a:gd name="connsiteY2" fmla="*/ 2414726 h 3187083"/>
-              <a:gd name="connsiteX3" fmla="*/ 4136994 w 5681709"/>
-              <a:gd name="connsiteY3" fmla="*/ 3053918 h 3187083"/>
-              <a:gd name="connsiteX4" fmla="*/ 5681709 w 5681709"/>
-              <a:gd name="connsiteY4" fmla="*/ 3187083 h 3187083"/>
-            </a:gdLst>
-            <a:ahLst/>
-            <a:cxnLst>
-              <a:cxn ang="0">
-                <a:pos x="connsiteX0" y="connsiteY0"/>
-              </a:cxn>
-              <a:cxn ang="0">
-                <a:pos x="connsiteX1" y="connsiteY1"/>
-              </a:cxn>
-              <a:cxn ang="0">
-                <a:pos x="connsiteX2" y="connsiteY2"/>
-              </a:cxn>
-              <a:cxn ang="0">
-                <a:pos x="connsiteX3" y="connsiteY3"/>
-              </a:cxn>
-              <a:cxn ang="0">
-                <a:pos x="connsiteX4" y="connsiteY4"/>
-              </a:cxn>
-            </a:cxnLst>
-            <a:rect l="l" t="t" r="r" b="b"/>
-            <a:pathLst>
-              <a:path w="5681709" h="3187083">
-                <a:moveTo>
-                  <a:pt x="0" y="0"/>
-                </a:moveTo>
-                <a:cubicBezTo>
-                  <a:pt x="90996" y="393577"/>
-                  <a:pt x="181992" y="787154"/>
-                  <a:pt x="514905" y="1189608"/>
-                </a:cubicBezTo>
-                <a:cubicBezTo>
-                  <a:pt x="847818" y="1592062"/>
-                  <a:pt x="1393795" y="2104008"/>
-                  <a:pt x="1997476" y="2414726"/>
-                </a:cubicBezTo>
-                <a:cubicBezTo>
-                  <a:pt x="2601157" y="2725444"/>
-                  <a:pt x="3522955" y="2925192"/>
-                  <a:pt x="4136994" y="3053918"/>
-                </a:cubicBezTo>
-                <a:cubicBezTo>
-                  <a:pt x="4751033" y="3182644"/>
-                  <a:pt x="5434614" y="3133817"/>
-                  <a:pt x="5681709" y="3187083"/>
-                </a:cubicBezTo>
-              </a:path>
-            </a:pathLst>
-          </a:custGeom>
-          <a:noFill/>
-          <a:ln w="57150"/>
-        </p:spPr>
-        <p:style>
-          <a:lnRef idx="2">
-            <a:schemeClr val="accent1">
-              <a:shade val="15000"/>
-            </a:schemeClr>
-          </a:lnRef>
-          <a:fillRef idx="1">
-            <a:schemeClr val="accent1"/>
-          </a:fillRef>
-          <a:effectRef idx="0">
-            <a:schemeClr val="accent1"/>
-          </a:effectRef>
-          <a:fontRef idx="minor">
-            <a:schemeClr val="lt1"/>
-          </a:fontRef>
-        </p:style>
-        <p:txBody>
-          <a:bodyPr rtlCol="0" anchor="ctr"/>
-          <a:lstStyle/>
-          <a:p>
-            <a:pPr algn="ctr"/>
-            <a:endParaRPr lang="en-US"/>
-          </a:p>
-        </p:txBody>
-      </p:sp>
-      <p:sp>
-        <p:nvSpPr>
-          <p:cNvPr id="5" name="Oval 4">
-            <a:extLst>
-              <a:ext uri="{FF2B5EF4-FFF2-40B4-BE49-F238E27FC236}">
-                <a16:creationId xmlns:a16="http://schemas.microsoft.com/office/drawing/2014/main" id="{42A7851D-22A8-51B5-F97F-CFF8B814B351}"/>
-              </a:ext>
-            </a:extLst>
-          </p:cNvPr>
-          <p:cNvSpPr/>
-          <p:nvPr/>
-        </p:nvSpPr>
-        <p:spPr>
-          <a:xfrm>
-            <a:off x="3799644" y="1695635"/>
-            <a:ext cx="213064" cy="213065"/>
-          </a:xfrm>
-          <a:prstGeom prst="ellipse">
-            <a:avLst/>
-          </a:prstGeom>
-          <a:ln w="28575"/>
-        </p:spPr>
-        <p:style>
-          <a:lnRef idx="2">
-            <a:schemeClr val="accent2">
-              <a:shade val="15000"/>
-            </a:schemeClr>
-          </a:lnRef>
-          <a:fillRef idx="1">
-            <a:schemeClr val="accent2"/>
-          </a:fillRef>
-          <a:effectRef idx="0">
-            <a:schemeClr val="accent2"/>
-          </a:effectRef>
-          <a:fontRef idx="minor">
-            <a:schemeClr val="lt1"/>
-          </a:fontRef>
-        </p:style>
-        <p:txBody>
-          <a:bodyPr rtlCol="0" anchor="ctr"/>
-          <a:lstStyle/>
-          <a:p>
-            <a:pPr algn="ctr"/>
-            <a:endParaRPr lang="en-US"/>
-          </a:p>
-        </p:txBody>
-      </p:sp>
-      <p:sp>
-        <p:nvSpPr>
-          <p:cNvPr id="6" name="Oval 5">
-            <a:extLst>
-              <a:ext uri="{FF2B5EF4-FFF2-40B4-BE49-F238E27FC236}">
-                <a16:creationId xmlns:a16="http://schemas.microsoft.com/office/drawing/2014/main" id="{54BE53CE-48E6-EA8E-A8EE-C13DDD64332C}"/>
-              </a:ext>
-            </a:extLst>
-          </p:cNvPr>
-          <p:cNvSpPr/>
-          <p:nvPr/>
-        </p:nvSpPr>
-        <p:spPr>
-          <a:xfrm>
-            <a:off x="3206009" y="2700656"/>
-            <a:ext cx="213064" cy="213065"/>
-          </a:xfrm>
-          <a:prstGeom prst="ellipse">
-            <a:avLst/>
-          </a:prstGeom>
-          <a:ln w="28575"/>
-        </p:spPr>
-        <p:style>
-          <a:lnRef idx="2">
-            <a:schemeClr val="accent2">
-              <a:shade val="15000"/>
-            </a:schemeClr>
-          </a:lnRef>
-          <a:fillRef idx="1">
-            <a:schemeClr val="accent2"/>
-          </a:fillRef>
-          <a:effectRef idx="0">
-            <a:schemeClr val="accent2"/>
-          </a:effectRef>
-          <a:fontRef idx="minor">
-            <a:schemeClr val="lt1"/>
-          </a:fontRef>
-        </p:style>
-        <p:txBody>
-          <a:bodyPr rtlCol="0" anchor="ctr"/>
-          <a:lstStyle/>
-          <a:p>
-            <a:pPr algn="ctr"/>
-            <a:endParaRPr lang="en-US"/>
-          </a:p>
-        </p:txBody>
-      </p:sp>
-      <p:sp>
-        <p:nvSpPr>
-          <p:cNvPr id="7" name="Oval 6">
-            <a:extLst>
-              <a:ext uri="{FF2B5EF4-FFF2-40B4-BE49-F238E27FC236}">
-                <a16:creationId xmlns:a16="http://schemas.microsoft.com/office/drawing/2014/main" id="{9A8511C9-2EEC-AF61-0A6E-5EFBC7B49780}"/>
-              </a:ext>
-            </a:extLst>
-          </p:cNvPr>
-          <p:cNvSpPr/>
-          <p:nvPr/>
-        </p:nvSpPr>
-        <p:spPr>
-          <a:xfrm>
-            <a:off x="8195570" y="3854388"/>
-            <a:ext cx="213064" cy="213065"/>
-          </a:xfrm>
-          <a:prstGeom prst="ellipse">
-            <a:avLst/>
-          </a:prstGeom>
-          <a:ln w="28575"/>
-        </p:spPr>
-        <p:style>
-          <a:lnRef idx="2">
-            <a:schemeClr val="accent2">
-              <a:shade val="15000"/>
-            </a:schemeClr>
-          </a:lnRef>
-          <a:fillRef idx="1">
-            <a:schemeClr val="accent2"/>
-          </a:fillRef>
-          <a:effectRef idx="0">
-            <a:schemeClr val="accent2"/>
-          </a:effectRef>
-          <a:fontRef idx="minor">
-            <a:schemeClr val="lt1"/>
-          </a:fontRef>
-        </p:style>
-        <p:txBody>
-          <a:bodyPr rtlCol="0" anchor="ctr"/>
-          <a:lstStyle/>
-          <a:p>
-            <a:pPr algn="ctr"/>
-            <a:endParaRPr lang="en-US"/>
-          </a:p>
-        </p:txBody>
-      </p:sp>
-      <p:sp>
-        <p:nvSpPr>
-          <p:cNvPr id="8" name="Oval 7">
-            <a:extLst>
-              <a:ext uri="{FF2B5EF4-FFF2-40B4-BE49-F238E27FC236}">
-                <a16:creationId xmlns:a16="http://schemas.microsoft.com/office/drawing/2014/main" id="{C61D24B5-CA0D-F517-200D-2002127E228F}"/>
-              </a:ext>
-            </a:extLst>
-          </p:cNvPr>
-          <p:cNvSpPr/>
-          <p:nvPr/>
-        </p:nvSpPr>
-        <p:spPr>
-          <a:xfrm>
-            <a:off x="7565256" y="4835116"/>
-            <a:ext cx="213064" cy="213065"/>
-          </a:xfrm>
-          <a:prstGeom prst="ellipse">
-            <a:avLst/>
-          </a:prstGeom>
-          <a:ln w="28575"/>
-        </p:spPr>
-        <p:style>
-          <a:lnRef idx="2">
-            <a:schemeClr val="accent2">
-              <a:shade val="15000"/>
-            </a:schemeClr>
-          </a:lnRef>
-          <a:fillRef idx="1">
-            <a:schemeClr val="accent2"/>
-          </a:fillRef>
-          <a:effectRef idx="0">
-            <a:schemeClr val="accent2"/>
-          </a:effectRef>
-          <a:fontRef idx="minor">
-            <a:schemeClr val="lt1"/>
-          </a:fontRef>
-        </p:style>
-        <p:txBody>
-          <a:bodyPr rtlCol="0" anchor="ctr"/>
-          <a:lstStyle/>
-          <a:p>
-            <a:pPr algn="ctr"/>
-            <a:endParaRPr lang="en-US"/>
-          </a:p>
-        </p:txBody>
-      </p:sp>
-      <p:sp>
-        <p:nvSpPr>
-          <p:cNvPr id="9" name="TextBox 8">
-            <a:extLst>
-              <a:ext uri="{FF2B5EF4-FFF2-40B4-BE49-F238E27FC236}">
-                <a16:creationId xmlns:a16="http://schemas.microsoft.com/office/drawing/2014/main" id="{2B8D1283-CA27-D912-86AA-E2F59D2519DE}"/>
-              </a:ext>
-            </a:extLst>
-          </p:cNvPr>
-          <p:cNvSpPr txBox="1"/>
-          <p:nvPr/>
-        </p:nvSpPr>
-        <p:spPr>
-          <a:xfrm>
-            <a:off x="8243154" y="3331168"/>
-            <a:ext cx="451777" cy="523220"/>
-          </a:xfrm>
-          <a:prstGeom prst="rect">
-            <a:avLst/>
-          </a:prstGeom>
-          <a:noFill/>
-        </p:spPr>
-        <p:txBody>
-          <a:bodyPr wrap="square" rtlCol="0">
-            <a:spAutoFit/>
-          </a:bodyPr>
-          <a:lstStyle/>
-          <a:p>
-            <a:pPr algn="ctr"/>
-            <a:r>
-              <a:rPr lang="en-US" sz="2800" b="1" dirty="0"/>
-              <a:t>D</a:t>
-            </a:r>
-          </a:p>
-        </p:txBody>
-      </p:sp>
-      <p:sp>
-        <p:nvSpPr>
-          <p:cNvPr id="10" name="TextBox 9">
-            <a:extLst>
-              <a:ext uri="{FF2B5EF4-FFF2-40B4-BE49-F238E27FC236}">
-                <a16:creationId xmlns:a16="http://schemas.microsoft.com/office/drawing/2014/main" id="{705C2E80-25F0-A131-6518-E24ABB48165E}"/>
-              </a:ext>
-            </a:extLst>
-          </p:cNvPr>
-          <p:cNvSpPr txBox="1"/>
-          <p:nvPr/>
-        </p:nvSpPr>
-        <p:spPr>
-          <a:xfrm>
-            <a:off x="7658963" y="5029758"/>
-            <a:ext cx="451777" cy="523220"/>
-          </a:xfrm>
-          <a:prstGeom prst="rect">
-            <a:avLst/>
-          </a:prstGeom>
-          <a:noFill/>
-        </p:spPr>
-        <p:txBody>
-          <a:bodyPr wrap="square" rtlCol="0">
-            <a:spAutoFit/>
-          </a:bodyPr>
-          <a:lstStyle/>
-          <a:p>
-            <a:pPr algn="ctr"/>
-            <a:r>
-              <a:rPr lang="en-US" sz="2800" b="1" dirty="0"/>
-              <a:t>B</a:t>
-            </a:r>
-          </a:p>
-        </p:txBody>
-      </p:sp>
-      <p:sp>
-        <p:nvSpPr>
-          <p:cNvPr id="11" name="TextBox 10">
-            <a:extLst>
-              <a:ext uri="{FF2B5EF4-FFF2-40B4-BE49-F238E27FC236}">
-                <a16:creationId xmlns:a16="http://schemas.microsoft.com/office/drawing/2014/main" id="{BE8CAC74-4248-763A-E1C8-C7729058D8FF}"/>
-              </a:ext>
-            </a:extLst>
-          </p:cNvPr>
-          <p:cNvSpPr txBox="1"/>
-          <p:nvPr/>
-        </p:nvSpPr>
-        <p:spPr>
-          <a:xfrm>
-            <a:off x="3937614" y="1346971"/>
-            <a:ext cx="451777" cy="523220"/>
-          </a:xfrm>
-          <a:prstGeom prst="rect">
-            <a:avLst/>
-          </a:prstGeom>
-          <a:noFill/>
-        </p:spPr>
-        <p:txBody>
-          <a:bodyPr wrap="square" rtlCol="0">
-            <a:spAutoFit/>
-          </a:bodyPr>
-          <a:lstStyle/>
-          <a:p>
-            <a:pPr algn="ctr"/>
-            <a:r>
-              <a:rPr lang="en-US" sz="2800" b="1" dirty="0"/>
-              <a:t>C</a:t>
-            </a:r>
-          </a:p>
-        </p:txBody>
-      </p:sp>
-      <p:sp>
-        <p:nvSpPr>
-          <p:cNvPr id="12" name="TextBox 11">
-            <a:extLst>
-              <a:ext uri="{FF2B5EF4-FFF2-40B4-BE49-F238E27FC236}">
-                <a16:creationId xmlns:a16="http://schemas.microsoft.com/office/drawing/2014/main" id="{86371DE3-D71C-02CC-D2D9-B3480243C680}"/>
-              </a:ext>
-            </a:extLst>
-          </p:cNvPr>
-          <p:cNvSpPr txBox="1"/>
-          <p:nvPr/>
-        </p:nvSpPr>
-        <p:spPr>
-          <a:xfrm>
-            <a:off x="2852603" y="2698310"/>
-            <a:ext cx="451777" cy="523220"/>
-          </a:xfrm>
-          <a:prstGeom prst="rect">
-            <a:avLst/>
-          </a:prstGeom>
-          <a:noFill/>
-        </p:spPr>
-        <p:txBody>
-          <a:bodyPr wrap="square" rtlCol="0">
-            <a:spAutoFit/>
-          </a:bodyPr>
-          <a:lstStyle/>
-          <a:p>
-            <a:pPr algn="ctr"/>
-            <a:r>
-              <a:rPr lang="en-US" sz="2800" b="1" dirty="0"/>
-              <a:t>A</a:t>
-            </a:r>
-          </a:p>
-        </p:txBody>
-      </p:sp>
-      <mc:AlternateContent xmlns:mc="http://schemas.openxmlformats.org/markup-compatibility/2006" xmlns:a14="http://schemas.microsoft.com/office/drawing/2010/main">
-        <mc:Choice Requires="a14">
-          <p:sp>
-            <p:nvSpPr>
-              <p:cNvPr id="13" name="TextBox 12">
-                <a:extLst>
-                  <a:ext uri="{FF2B5EF4-FFF2-40B4-BE49-F238E27FC236}">
-                    <a16:creationId xmlns:a16="http://schemas.microsoft.com/office/drawing/2014/main" id="{43AA751F-FA41-5FE8-D780-7D2F389D9090}"/>
-                  </a:ext>
-                </a:extLst>
-              </p:cNvPr>
-              <p:cNvSpPr txBox="1"/>
-              <p:nvPr/>
-            </p:nvSpPr>
-            <p:spPr>
-              <a:xfrm>
-                <a:off x="9088876" y="3592778"/>
-                <a:ext cx="451777" cy="461665"/>
-              </a:xfrm>
-              <a:prstGeom prst="rect">
-                <a:avLst/>
-              </a:prstGeom>
-              <a:noFill/>
-            </p:spPr>
-            <p:txBody>
-              <a:bodyPr wrap="square" rtlCol="0">
-                <a:spAutoFit/>
-              </a:bodyPr>
-              <a:lstStyle/>
-              <a:p>
-                <a:pPr algn="ctr"/>
-                <a14:m>
-                  <m:oMathPara xmlns:m="http://schemas.openxmlformats.org/officeDocument/2006/math">
-                    <m:oMathParaPr>
-                      <m:jc m:val="centerGroup"/>
-                    </m:oMathParaPr>
-                    <m:oMath xmlns:m="http://schemas.openxmlformats.org/officeDocument/2006/math">
-                      <m:sSub>
-                        <m:sSubPr>
-                          <m:ctrlPr>
-                            <a:rPr lang="en-US" sz="2400" b="1" i="1" smtClean="0">
-                              <a:solidFill>
-                                <a:schemeClr val="accent1"/>
-                              </a:solidFill>
-                              <a:latin typeface="Cambria Math" panose="02040503050406030204" pitchFamily="18" charset="0"/>
-                            </a:rPr>
-                          </m:ctrlPr>
-                        </m:sSubPr>
-                        <m:e>
-                          <m:r>
-                            <a:rPr lang="en-US" sz="2400" b="1" i="1" smtClean="0">
-                              <a:solidFill>
-                                <a:schemeClr val="accent1"/>
-                              </a:solidFill>
-                              <a:latin typeface="Cambria Math" panose="02040503050406030204" pitchFamily="18" charset="0"/>
-                            </a:rPr>
-                            <m:t>𝑼</m:t>
-                          </m:r>
-                        </m:e>
-                        <m:sub>
-                          <m:r>
-                            <a:rPr lang="en-US" sz="2400" b="1" i="1" smtClean="0">
-                              <a:solidFill>
-                                <a:schemeClr val="accent1"/>
-                              </a:solidFill>
-                              <a:latin typeface="Cambria Math" panose="02040503050406030204" pitchFamily="18" charset="0"/>
-                            </a:rPr>
-                            <m:t>𝟐</m:t>
-                          </m:r>
-                        </m:sub>
-                      </m:sSub>
-                    </m:oMath>
-                  </m:oMathPara>
-                </a14:m>
-                <a:endParaRPr lang="en-US" sz="2400" b="1" dirty="0">
-                  <a:solidFill>
-                    <a:schemeClr val="accent1"/>
-                  </a:solidFill>
-                </a:endParaRPr>
-              </a:p>
-            </p:txBody>
-          </p:sp>
-        </mc:Choice>
-        <mc:Fallback xmlns="">
-          <p:sp>
-            <p:nvSpPr>
-              <p:cNvPr id="13" name="TextBox 12">
-                <a:extLst>
-                  <a:ext uri="{FF2B5EF4-FFF2-40B4-BE49-F238E27FC236}">
-                    <a16:creationId xmlns:a16="http://schemas.microsoft.com/office/drawing/2014/main" id="{43AA751F-FA41-5FE8-D780-7D2F389D9090}"/>
-                  </a:ext>
-                </a:extLst>
-              </p:cNvPr>
-              <p:cNvSpPr txBox="1">
-                <a:spLocks noRot="1" noChangeAspect="1" noMove="1" noResize="1" noEditPoints="1" noAdjustHandles="1" noChangeArrowheads="1" noChangeShapeType="1" noTextEdit="1"/>
-              </p:cNvSpPr>
-              <p:nvPr/>
-            </p:nvSpPr>
-            <p:spPr>
-              <a:xfrm>
-                <a:off x="9088876" y="3592778"/>
-                <a:ext cx="451777" cy="461665"/>
-              </a:xfrm>
-              <a:prstGeom prst="rect">
-                <a:avLst/>
-              </a:prstGeom>
-              <a:blipFill>
-                <a:blip r:embed="rId2"/>
-                <a:stretch>
-                  <a:fillRect l="-21622" b="-2632"/>
-                </a:stretch>
-              </a:blipFill>
-            </p:spPr>
-            <p:txBody>
-              <a:bodyPr/>
-              <a:lstStyle/>
-              <a:p>
-                <a:r>
-                  <a:rPr lang="en-US">
-                    <a:noFill/>
-                  </a:rPr>
-                  <a:t> </a:t>
-                </a:r>
-              </a:p>
-            </p:txBody>
-          </p:sp>
-        </mc:Fallback>
-      </mc:AlternateContent>
-      <mc:AlternateContent xmlns:mc="http://schemas.openxmlformats.org/markup-compatibility/2006" xmlns:a14="http://schemas.microsoft.com/office/drawing/2010/main">
-        <mc:Choice Requires="a14">
-          <p:sp>
-            <p:nvSpPr>
-              <p:cNvPr id="14" name="TextBox 13">
-                <a:extLst>
-                  <a:ext uri="{FF2B5EF4-FFF2-40B4-BE49-F238E27FC236}">
-                    <a16:creationId xmlns:a16="http://schemas.microsoft.com/office/drawing/2014/main" id="{DBF186C8-06FF-FFC3-C20C-C55A5D0E1D3D}"/>
-                  </a:ext>
-                </a:extLst>
-              </p:cNvPr>
-              <p:cNvSpPr txBox="1"/>
-              <p:nvPr/>
-            </p:nvSpPr>
-            <p:spPr>
-              <a:xfrm>
-                <a:off x="9037500" y="5018586"/>
-                <a:ext cx="451777" cy="461665"/>
-              </a:xfrm>
-              <a:prstGeom prst="rect">
-                <a:avLst/>
-              </a:prstGeom>
-              <a:noFill/>
-            </p:spPr>
-            <p:txBody>
-              <a:bodyPr wrap="square" rtlCol="0">
-                <a:spAutoFit/>
-              </a:bodyPr>
-              <a:lstStyle/>
-              <a:p>
-                <a:pPr algn="ctr"/>
-                <a14:m>
-                  <m:oMathPara xmlns:m="http://schemas.openxmlformats.org/officeDocument/2006/math">
-                    <m:oMathParaPr>
-                      <m:jc m:val="centerGroup"/>
-                    </m:oMathParaPr>
-                    <m:oMath xmlns:m="http://schemas.openxmlformats.org/officeDocument/2006/math">
-                      <m:sSub>
-                        <m:sSubPr>
-                          <m:ctrlPr>
-                            <a:rPr lang="en-US" sz="2400" b="1" i="1" smtClean="0">
-                              <a:solidFill>
-                                <a:schemeClr val="accent1"/>
-                              </a:solidFill>
-                              <a:latin typeface="Cambria Math" panose="02040503050406030204" pitchFamily="18" charset="0"/>
-                            </a:rPr>
-                          </m:ctrlPr>
-                        </m:sSubPr>
-                        <m:e>
-                          <m:r>
-                            <a:rPr lang="en-US" sz="2400" b="1" i="1" smtClean="0">
-                              <a:solidFill>
-                                <a:schemeClr val="accent1"/>
-                              </a:solidFill>
-                              <a:latin typeface="Cambria Math" panose="02040503050406030204" pitchFamily="18" charset="0"/>
-                            </a:rPr>
-                            <m:t>𝑼</m:t>
-                          </m:r>
-                        </m:e>
-                        <m:sub>
-                          <m:r>
-                            <a:rPr lang="en-US" sz="2400" b="1" i="1" smtClean="0">
-                              <a:solidFill>
-                                <a:schemeClr val="accent1"/>
-                              </a:solidFill>
-                              <a:latin typeface="Cambria Math" panose="02040503050406030204" pitchFamily="18" charset="0"/>
-                            </a:rPr>
-                            <m:t>𝟏</m:t>
-                          </m:r>
-                        </m:sub>
-                      </m:sSub>
-                    </m:oMath>
-                  </m:oMathPara>
-                </a14:m>
-                <a:endParaRPr lang="en-US" sz="2400" b="1" dirty="0">
-                  <a:solidFill>
-                    <a:schemeClr val="accent1"/>
-                  </a:solidFill>
-                </a:endParaRPr>
-              </a:p>
-            </p:txBody>
-          </p:sp>
-        </mc:Choice>
-        <mc:Fallback xmlns="">
-          <p:sp>
-            <p:nvSpPr>
-              <p:cNvPr id="14" name="TextBox 13">
-                <a:extLst>
-                  <a:ext uri="{FF2B5EF4-FFF2-40B4-BE49-F238E27FC236}">
-                    <a16:creationId xmlns:a16="http://schemas.microsoft.com/office/drawing/2014/main" id="{DBF186C8-06FF-FFC3-C20C-C55A5D0E1D3D}"/>
-                  </a:ext>
-                </a:extLst>
-              </p:cNvPr>
-              <p:cNvSpPr txBox="1">
-                <a:spLocks noRot="1" noChangeAspect="1" noMove="1" noResize="1" noEditPoints="1" noAdjustHandles="1" noChangeArrowheads="1" noChangeShapeType="1" noTextEdit="1"/>
-              </p:cNvSpPr>
-              <p:nvPr/>
-            </p:nvSpPr>
-            <p:spPr>
-              <a:xfrm>
-                <a:off x="9037500" y="5018586"/>
-                <a:ext cx="451777" cy="461665"/>
-              </a:xfrm>
-              <a:prstGeom prst="rect">
-                <a:avLst/>
-              </a:prstGeom>
-              <a:blipFill>
-                <a:blip r:embed="rId3"/>
-                <a:stretch>
-                  <a:fillRect l="-22973" b="-2632"/>
-                </a:stretch>
-              </a:blipFill>
-            </p:spPr>
-            <p:txBody>
-              <a:bodyPr/>
-              <a:lstStyle/>
-              <a:p>
-                <a:r>
-                  <a:rPr lang="en-US">
-                    <a:noFill/>
-                  </a:rPr>
-                  <a:t> </a:t>
-                </a:r>
-              </a:p>
-            </p:txBody>
-          </p:sp>
-        </mc:Fallback>
-      </mc:AlternateContent>
-      <mc:AlternateContent xmlns:mc="http://schemas.openxmlformats.org/markup-compatibility/2006" xmlns:a14="http://schemas.microsoft.com/office/drawing/2010/main">
-        <mc:Choice Requires="a14">
-          <p:sp>
-            <p:nvSpPr>
-              <p:cNvPr id="15" name="TextBox 14">
-                <a:extLst>
-                  <a:ext uri="{FF2B5EF4-FFF2-40B4-BE49-F238E27FC236}">
-                    <a16:creationId xmlns:a16="http://schemas.microsoft.com/office/drawing/2014/main" id="{2E6C6B36-FAB8-F9E8-B292-CD466B86CF99}"/>
-                  </a:ext>
-                </a:extLst>
-              </p:cNvPr>
-              <p:cNvSpPr txBox="1"/>
-              <p:nvPr/>
-            </p:nvSpPr>
-            <p:spPr>
-              <a:xfrm>
-                <a:off x="5679190" y="2058479"/>
-                <a:ext cx="1633490" cy="1077218"/>
-              </a:xfrm>
-              <a:prstGeom prst="rect">
-                <a:avLst/>
-              </a:prstGeom>
-              <a:noFill/>
-            </p:spPr>
-            <p:txBody>
-              <a:bodyPr wrap="square" rtlCol="0">
-                <a:spAutoFit/>
-              </a:bodyPr>
-              <a:lstStyle/>
-              <a:p>
-                <a:pPr/>
-                <a14:m>
-                  <m:oMathPara xmlns:m="http://schemas.openxmlformats.org/officeDocument/2006/math">
-                    <m:oMathParaPr>
-                      <m:jc m:val="centerGroup"/>
-                    </m:oMathParaPr>
-                    <m:oMath xmlns:m="http://schemas.openxmlformats.org/officeDocument/2006/math">
-                      <m:r>
-                        <a:rPr lang="en-US" sz="3200" b="1" i="1" smtClean="0">
-                          <a:latin typeface="Cambria Math" panose="02040503050406030204" pitchFamily="18" charset="0"/>
-                        </a:rPr>
-                        <m:t>𝑨</m:t>
-                      </m:r>
-                      <m:r>
-                        <a:rPr lang="en-US" sz="3200" b="1" i="1" smtClean="0">
-                          <a:latin typeface="Cambria Math" panose="02040503050406030204" pitchFamily="18" charset="0"/>
-                        </a:rPr>
-                        <m:t>&gt;</m:t>
-                      </m:r>
-                      <m:r>
-                        <a:rPr lang="en-US" sz="3200" b="1" i="1" smtClean="0">
-                          <a:latin typeface="Cambria Math" panose="02040503050406030204" pitchFamily="18" charset="0"/>
-                        </a:rPr>
-                        <m:t>𝑩</m:t>
-                      </m:r>
-                    </m:oMath>
-                  </m:oMathPara>
-                </a14:m>
-                <a:endParaRPr lang="en-US" sz="3200" b="1" dirty="0"/>
-              </a:p>
-              <a:p>
-                <a:pPr/>
-                <a14:m>
-                  <m:oMathPara xmlns:m="http://schemas.openxmlformats.org/officeDocument/2006/math">
-                    <m:oMathParaPr>
-                      <m:jc m:val="centerGroup"/>
-                    </m:oMathParaPr>
-                    <m:oMath xmlns:m="http://schemas.openxmlformats.org/officeDocument/2006/math">
-                      <m:r>
-                        <a:rPr lang="en-US" sz="3200" b="1" i="1" smtClean="0">
-                          <a:latin typeface="Cambria Math" panose="02040503050406030204" pitchFamily="18" charset="0"/>
-                        </a:rPr>
-                        <m:t>𝑩</m:t>
-                      </m:r>
-                      <m:r>
-                        <a:rPr lang="en-US" sz="3200" b="1" i="1" smtClean="0">
-                          <a:latin typeface="Cambria Math" panose="02040503050406030204" pitchFamily="18" charset="0"/>
-                        </a:rPr>
-                        <m:t>&gt;</m:t>
-                      </m:r>
-                      <m:r>
-                        <a:rPr lang="en-US" sz="3200" b="1" i="1" smtClean="0">
-                          <a:latin typeface="Cambria Math" panose="02040503050406030204" pitchFamily="18" charset="0"/>
-                        </a:rPr>
-                        <m:t>𝑨</m:t>
-                      </m:r>
-                    </m:oMath>
-                  </m:oMathPara>
-                </a14:m>
-                <a:endParaRPr lang="en-US" sz="3200" b="1" dirty="0"/>
-              </a:p>
-            </p:txBody>
-          </p:sp>
-        </mc:Choice>
-        <mc:Fallback xmlns="">
-          <p:sp>
-            <p:nvSpPr>
-              <p:cNvPr id="15" name="TextBox 14">
-                <a:extLst>
-                  <a:ext uri="{FF2B5EF4-FFF2-40B4-BE49-F238E27FC236}">
-                    <a16:creationId xmlns:a16="http://schemas.microsoft.com/office/drawing/2014/main" id="{2E6C6B36-FAB8-F9E8-B292-CD466B86CF99}"/>
-                  </a:ext>
-                </a:extLst>
-              </p:cNvPr>
-              <p:cNvSpPr txBox="1">
-                <a:spLocks noRot="1" noChangeAspect="1" noMove="1" noResize="1" noEditPoints="1" noAdjustHandles="1" noChangeArrowheads="1" noChangeShapeType="1" noTextEdit="1"/>
-              </p:cNvSpPr>
-              <p:nvPr/>
-            </p:nvSpPr>
-            <p:spPr>
-              <a:xfrm>
-                <a:off x="5679190" y="2058479"/>
-                <a:ext cx="1633490" cy="1077218"/>
-              </a:xfrm>
-              <a:prstGeom prst="rect">
-                <a:avLst/>
-              </a:prstGeom>
-              <a:blipFill>
-                <a:blip r:embed="rId4"/>
-                <a:stretch>
-                  <a:fillRect/>
-                </a:stretch>
-              </a:blipFill>
-            </p:spPr>
-            <p:txBody>
-              <a:bodyPr/>
-              <a:lstStyle/>
-              <a:p>
-                <a:r>
-                  <a:rPr lang="en-US">
-                    <a:noFill/>
-                  </a:rPr>
-                  <a:t> </a:t>
-                </a:r>
-              </a:p>
-            </p:txBody>
-          </p:sp>
-        </mc:Fallback>
-      </mc:AlternateContent>
-      <mc:AlternateContent xmlns:mc="http://schemas.openxmlformats.org/markup-compatibility/2006" xmlns:a14="http://schemas.microsoft.com/office/drawing/2010/main">
-        <mc:Choice Requires="a14">
-          <p:sp>
-            <p:nvSpPr>
-              <p:cNvPr id="16" name="TextBox 15">
-                <a:extLst>
-                  <a:ext uri="{FF2B5EF4-FFF2-40B4-BE49-F238E27FC236}">
-                    <a16:creationId xmlns:a16="http://schemas.microsoft.com/office/drawing/2014/main" id="{0024F0E8-50F0-3AB8-49F7-3972CC0BB117}"/>
-                  </a:ext>
-                </a:extLst>
-              </p:cNvPr>
-              <p:cNvSpPr txBox="1"/>
-              <p:nvPr/>
-            </p:nvSpPr>
-            <p:spPr>
-              <a:xfrm>
-                <a:off x="7851041" y="2057107"/>
-                <a:ext cx="1733004" cy="1077218"/>
-              </a:xfrm>
-              <a:prstGeom prst="rect">
-                <a:avLst/>
-              </a:prstGeom>
-              <a:noFill/>
-            </p:spPr>
-            <p:txBody>
-              <a:bodyPr wrap="square" rtlCol="0">
-                <a:spAutoFit/>
-              </a:bodyPr>
-              <a:lstStyle/>
-              <a:p>
-                <a:pPr/>
-                <a14:m>
-                  <m:oMathPara xmlns:m="http://schemas.openxmlformats.org/officeDocument/2006/math">
-                    <m:oMathParaPr>
-                      <m:jc m:val="centerGroup"/>
-                    </m:oMathParaPr>
-                    <m:oMath xmlns:m="http://schemas.openxmlformats.org/officeDocument/2006/math">
-                      <m:r>
-                        <a:rPr lang="en-US" sz="3200" b="1" i="1" smtClean="0">
-                          <a:latin typeface="Cambria Math" panose="02040503050406030204" pitchFamily="18" charset="0"/>
-                        </a:rPr>
-                        <m:t>𝑪</m:t>
-                      </m:r>
-                      <m:r>
-                        <a:rPr lang="en-US" sz="3200" b="1" i="1" smtClean="0">
-                          <a:latin typeface="Cambria Math" panose="02040503050406030204" pitchFamily="18" charset="0"/>
-                        </a:rPr>
-                        <m:t>&gt;</m:t>
-                      </m:r>
-                      <m:r>
-                        <a:rPr lang="en-US" sz="3200" b="1" i="1" smtClean="0">
-                          <a:latin typeface="Cambria Math" panose="02040503050406030204" pitchFamily="18" charset="0"/>
-                        </a:rPr>
-                        <m:t>𝑫</m:t>
-                      </m:r>
-                    </m:oMath>
-                  </m:oMathPara>
-                </a14:m>
-                <a:endParaRPr lang="en-US" sz="3200" b="1" dirty="0"/>
-              </a:p>
-              <a:p>
-                <a:pPr/>
-                <a14:m>
-                  <m:oMathPara xmlns:m="http://schemas.openxmlformats.org/officeDocument/2006/math">
-                    <m:oMathParaPr>
-                      <m:jc m:val="centerGroup"/>
-                    </m:oMathParaPr>
-                    <m:oMath xmlns:m="http://schemas.openxmlformats.org/officeDocument/2006/math">
-                      <m:r>
-                        <a:rPr lang="en-US" sz="3200" b="1" i="1" smtClean="0">
-                          <a:latin typeface="Cambria Math" panose="02040503050406030204" pitchFamily="18" charset="0"/>
-                        </a:rPr>
-                        <m:t>𝑫</m:t>
-                      </m:r>
-                      <m:r>
-                        <a:rPr lang="en-US" sz="3200" b="1" i="1" smtClean="0">
-                          <a:latin typeface="Cambria Math" panose="02040503050406030204" pitchFamily="18" charset="0"/>
-                        </a:rPr>
-                        <m:t>&gt;</m:t>
-                      </m:r>
-                      <m:r>
-                        <a:rPr lang="en-US" sz="3200" b="1" i="1" smtClean="0">
-                          <a:latin typeface="Cambria Math" panose="02040503050406030204" pitchFamily="18" charset="0"/>
-                        </a:rPr>
-                        <m:t>𝑪</m:t>
-                      </m:r>
-                    </m:oMath>
-                  </m:oMathPara>
-                </a14:m>
-                <a:endParaRPr lang="en-US" sz="3200" b="1" dirty="0"/>
-              </a:p>
-            </p:txBody>
-          </p:sp>
-        </mc:Choice>
-        <mc:Fallback xmlns="">
-          <p:sp>
-            <p:nvSpPr>
-              <p:cNvPr id="16" name="TextBox 15">
-                <a:extLst>
-                  <a:ext uri="{FF2B5EF4-FFF2-40B4-BE49-F238E27FC236}">
-                    <a16:creationId xmlns:a16="http://schemas.microsoft.com/office/drawing/2014/main" id="{0024F0E8-50F0-3AB8-49F7-3972CC0BB117}"/>
-                  </a:ext>
-                </a:extLst>
-              </p:cNvPr>
-              <p:cNvSpPr txBox="1">
-                <a:spLocks noRot="1" noChangeAspect="1" noMove="1" noResize="1" noEditPoints="1" noAdjustHandles="1" noChangeArrowheads="1" noChangeShapeType="1" noTextEdit="1"/>
-              </p:cNvSpPr>
-              <p:nvPr/>
-            </p:nvSpPr>
-            <p:spPr>
-              <a:xfrm>
-                <a:off x="7851041" y="2057107"/>
-                <a:ext cx="1733004" cy="1077218"/>
-              </a:xfrm>
-              <a:prstGeom prst="rect">
-                <a:avLst/>
-              </a:prstGeom>
-              <a:blipFill>
-                <a:blip r:embed="rId5"/>
-                <a:stretch>
-                  <a:fillRect/>
-                </a:stretch>
-              </a:blipFill>
-            </p:spPr>
-            <p:txBody>
-              <a:bodyPr/>
-              <a:lstStyle/>
-              <a:p>
-                <a:r>
-                  <a:rPr lang="en-US">
-                    <a:noFill/>
-                  </a:rPr>
-                  <a:t> </a:t>
-                </a:r>
-              </a:p>
-            </p:txBody>
-          </p:sp>
-        </mc:Fallback>
-      </mc:AlternateContent>
-      <p:sp>
-        <p:nvSpPr>
-          <p:cNvPr id="17" name="TextBox 16">
-            <a:extLst>
-              <a:ext uri="{FF2B5EF4-FFF2-40B4-BE49-F238E27FC236}">
-                <a16:creationId xmlns:a16="http://schemas.microsoft.com/office/drawing/2014/main" id="{615ACE95-673B-3454-D2DF-B7B2FF224A25}"/>
-              </a:ext>
-            </a:extLst>
-          </p:cNvPr>
-          <p:cNvSpPr txBox="1"/>
-          <p:nvPr/>
-        </p:nvSpPr>
-        <p:spPr>
-          <a:xfrm>
-            <a:off x="5321371" y="850765"/>
-            <a:ext cx="4584629" cy="1200329"/>
-          </a:xfrm>
-          <a:prstGeom prst="rect">
-            <a:avLst/>
-          </a:prstGeom>
-          <a:noFill/>
-        </p:spPr>
-        <p:txBody>
-          <a:bodyPr wrap="square" rtlCol="0">
-            <a:spAutoFit/>
-          </a:bodyPr>
-          <a:lstStyle/>
-          <a:p>
-            <a:pPr algn="ctr"/>
-            <a:r>
-              <a:rPr lang="en-US" sz="2400" b="1" dirty="0"/>
-              <a:t>THIS GRAPH SAYS THE FOLLOWING ABOUT THESE BUNDLES:</a:t>
-            </a:r>
-          </a:p>
-        </p:txBody>
-      </p:sp>
-    </p:spTree>
-    <p:extLst>
-      <p:ext uri="{BB962C8B-B14F-4D97-AF65-F5344CB8AC3E}">
-        <p14:creationId xmlns:p14="http://schemas.microsoft.com/office/powerpoint/2010/main" val="1592041748"/>
-      </p:ext>
-    </p:extLst>
-  </p:cSld>
-  <p:clrMapOvr>
-    <a:masterClrMapping/>
-  </p:clrMapOvr>
-</p:sld>
-</file>
-
 <file path=ppt/theme/theme1.xml><?xml version="1.0" encoding="utf-8"?>
 <a:theme xmlns:a="http://schemas.openxmlformats.org/drawingml/2006/main" name="Office Theme">
   <a:themeElements>

</xml_diff>

<commit_message>
added profit max graphs
</commit_message>
<xml_diff>
--- a/Slides/graph-maker.pptx
+++ b/Slides/graph-maker.pptx
@@ -49,6 +49,8 @@
     <p:sldId id="297" r:id="rId43"/>
     <p:sldId id="298" r:id="rId44"/>
     <p:sldId id="299" r:id="rId45"/>
+    <p:sldId id="300" r:id="rId46"/>
+    <p:sldId id="301" r:id="rId47"/>
   </p:sldIdLst>
   <p:sldSz cx="12192000" cy="6858000"/>
   <p:notesSz cx="6858000" cy="9144000"/>
@@ -302,7 +304,7 @@
           <a:p>
             <a:fld id="{B3C0BABF-8EDA-4B51-8A1B-0A9A6121571D}" type="datetimeFigureOut">
               <a:rPr lang="en-US" smtClean="0"/>
-              <a:t>2/24/2024</a:t>
+              <a:t>2/26/2024</a:t>
             </a:fld>
             <a:endParaRPr lang="en-US"/>
           </a:p>
@@ -500,7 +502,7 @@
           <a:p>
             <a:fld id="{B3C0BABF-8EDA-4B51-8A1B-0A9A6121571D}" type="datetimeFigureOut">
               <a:rPr lang="en-US" smtClean="0"/>
-              <a:t>2/24/2024</a:t>
+              <a:t>2/26/2024</a:t>
             </a:fld>
             <a:endParaRPr lang="en-US"/>
           </a:p>
@@ -708,7 +710,7 @@
           <a:p>
             <a:fld id="{B3C0BABF-8EDA-4B51-8A1B-0A9A6121571D}" type="datetimeFigureOut">
               <a:rPr lang="en-US" smtClean="0"/>
-              <a:t>2/24/2024</a:t>
+              <a:t>2/26/2024</a:t>
             </a:fld>
             <a:endParaRPr lang="en-US"/>
           </a:p>
@@ -906,7 +908,7 @@
           <a:p>
             <a:fld id="{B3C0BABF-8EDA-4B51-8A1B-0A9A6121571D}" type="datetimeFigureOut">
               <a:rPr lang="en-US" smtClean="0"/>
-              <a:t>2/24/2024</a:t>
+              <a:t>2/26/2024</a:t>
             </a:fld>
             <a:endParaRPr lang="en-US"/>
           </a:p>
@@ -1181,7 +1183,7 @@
           <a:p>
             <a:fld id="{B3C0BABF-8EDA-4B51-8A1B-0A9A6121571D}" type="datetimeFigureOut">
               <a:rPr lang="en-US" smtClean="0"/>
-              <a:t>2/24/2024</a:t>
+              <a:t>2/26/2024</a:t>
             </a:fld>
             <a:endParaRPr lang="en-US"/>
           </a:p>
@@ -1446,7 +1448,7 @@
           <a:p>
             <a:fld id="{B3C0BABF-8EDA-4B51-8A1B-0A9A6121571D}" type="datetimeFigureOut">
               <a:rPr lang="en-US" smtClean="0"/>
-              <a:t>2/24/2024</a:t>
+              <a:t>2/26/2024</a:t>
             </a:fld>
             <a:endParaRPr lang="en-US"/>
           </a:p>
@@ -1858,7 +1860,7 @@
           <a:p>
             <a:fld id="{B3C0BABF-8EDA-4B51-8A1B-0A9A6121571D}" type="datetimeFigureOut">
               <a:rPr lang="en-US" smtClean="0"/>
-              <a:t>2/24/2024</a:t>
+              <a:t>2/26/2024</a:t>
             </a:fld>
             <a:endParaRPr lang="en-US"/>
           </a:p>
@@ -1999,7 +2001,7 @@
           <a:p>
             <a:fld id="{B3C0BABF-8EDA-4B51-8A1B-0A9A6121571D}" type="datetimeFigureOut">
               <a:rPr lang="en-US" smtClean="0"/>
-              <a:t>2/24/2024</a:t>
+              <a:t>2/26/2024</a:t>
             </a:fld>
             <a:endParaRPr lang="en-US"/>
           </a:p>
@@ -2112,7 +2114,7 @@
           <a:p>
             <a:fld id="{B3C0BABF-8EDA-4B51-8A1B-0A9A6121571D}" type="datetimeFigureOut">
               <a:rPr lang="en-US" smtClean="0"/>
-              <a:t>2/24/2024</a:t>
+              <a:t>2/26/2024</a:t>
             </a:fld>
             <a:endParaRPr lang="en-US"/>
           </a:p>
@@ -2423,7 +2425,7 @@
           <a:p>
             <a:fld id="{B3C0BABF-8EDA-4B51-8A1B-0A9A6121571D}" type="datetimeFigureOut">
               <a:rPr lang="en-US" smtClean="0"/>
-              <a:t>2/24/2024</a:t>
+              <a:t>2/26/2024</a:t>
             </a:fld>
             <a:endParaRPr lang="en-US"/>
           </a:p>
@@ -2711,7 +2713,7 @@
           <a:p>
             <a:fld id="{B3C0BABF-8EDA-4B51-8A1B-0A9A6121571D}" type="datetimeFigureOut">
               <a:rPr lang="en-US" smtClean="0"/>
-              <a:t>2/24/2024</a:t>
+              <a:t>2/26/2024</a:t>
             </a:fld>
             <a:endParaRPr lang="en-US"/>
           </a:p>
@@ -2952,7 +2954,7 @@
           <a:p>
             <a:fld id="{B3C0BABF-8EDA-4B51-8A1B-0A9A6121571D}" type="datetimeFigureOut">
               <a:rPr lang="en-US" smtClean="0"/>
-              <a:t>2/24/2024</a:t>
+              <a:t>2/26/2024</a:t>
             </a:fld>
             <a:endParaRPr lang="en-US"/>
           </a:p>
@@ -37534,8 +37536,8 @@
           <a:chExt cx="0" cy="0"/>
         </a:xfrm>
       </p:grpSpPr>
-      <mc:AlternateContent xmlns:mc="http://schemas.openxmlformats.org/markup-compatibility/2006">
-        <mc:Choice xmlns:a14="http://schemas.microsoft.com/office/drawing/2010/main" Requires="a14">
+      <mc:AlternateContent xmlns:mc="http://schemas.openxmlformats.org/markup-compatibility/2006" xmlns:a14="http://schemas.microsoft.com/office/drawing/2010/main">
+        <mc:Choice Requires="a14">
           <p:sp>
             <p:nvSpPr>
               <p:cNvPr id="13" name="TextBox 12">
@@ -37592,7 +37594,7 @@
             </p:txBody>
           </p:sp>
         </mc:Choice>
-        <mc:Fallback>
+        <mc:Fallback xmlns="">
           <p:sp>
             <p:nvSpPr>
               <p:cNvPr id="13" name="TextBox 12">
@@ -37637,8 +37639,8 @@
           </p:sp>
         </mc:Fallback>
       </mc:AlternateContent>
-      <mc:AlternateContent xmlns:mc="http://schemas.openxmlformats.org/markup-compatibility/2006">
-        <mc:Choice xmlns:a14="http://schemas.microsoft.com/office/drawing/2010/main" Requires="a14">
+      <mc:AlternateContent xmlns:mc="http://schemas.openxmlformats.org/markup-compatibility/2006" xmlns:a14="http://schemas.microsoft.com/office/drawing/2010/main">
+        <mc:Choice Requires="a14">
           <p:sp>
             <p:nvSpPr>
               <p:cNvPr id="14" name="TextBox 13">
@@ -37695,7 +37697,7 @@
             </p:txBody>
           </p:sp>
         </mc:Choice>
-        <mc:Fallback>
+        <mc:Fallback xmlns="">
           <p:sp>
             <p:nvSpPr>
               <p:cNvPr id="14" name="TextBox 13">
@@ -37819,8 +37821,8 @@
           </a:p>
         </p:txBody>
       </p:sp>
-      <mc:AlternateContent xmlns:mc="http://schemas.openxmlformats.org/markup-compatibility/2006">
-        <mc:Choice xmlns:a14="http://schemas.microsoft.com/office/drawing/2010/main" Requires="a14">
+      <mc:AlternateContent xmlns:mc="http://schemas.openxmlformats.org/markup-compatibility/2006" xmlns:a14="http://schemas.microsoft.com/office/drawing/2010/main">
+        <mc:Choice Requires="a14">
           <p:sp>
             <p:nvSpPr>
               <p:cNvPr id="17" name="TextBox 16">
@@ -37877,7 +37879,7 @@
             </p:txBody>
           </p:sp>
         </mc:Choice>
-        <mc:Fallback>
+        <mc:Fallback xmlns="">
           <p:sp>
             <p:nvSpPr>
               <p:cNvPr id="17" name="TextBox 16">
@@ -38102,8 +38104,8 @@
           </a:p>
         </p:txBody>
       </p:sp>
-      <mc:AlternateContent xmlns:mc="http://schemas.openxmlformats.org/markup-compatibility/2006">
-        <mc:Choice xmlns:a14="http://schemas.microsoft.com/office/drawing/2010/main" Requires="a14">
+      <mc:AlternateContent xmlns:mc="http://schemas.openxmlformats.org/markup-compatibility/2006" xmlns:a14="http://schemas.microsoft.com/office/drawing/2010/main">
+        <mc:Choice Requires="a14">
           <p:sp>
             <p:nvSpPr>
               <p:cNvPr id="20" name="TextBox 19">
@@ -38160,7 +38162,7 @@
             </p:txBody>
           </p:sp>
         </mc:Choice>
-        <mc:Fallback>
+        <mc:Fallback xmlns="">
           <p:sp>
             <p:nvSpPr>
               <p:cNvPr id="20" name="TextBox 19">
@@ -38297,8 +38299,8 @@
           </a:p>
         </p:txBody>
       </p:sp>
-      <mc:AlternateContent xmlns:mc="http://schemas.openxmlformats.org/markup-compatibility/2006">
-        <mc:Choice xmlns:a14="http://schemas.microsoft.com/office/drawing/2010/main" Requires="a14">
+      <mc:AlternateContent xmlns:mc="http://schemas.openxmlformats.org/markup-compatibility/2006" xmlns:a14="http://schemas.microsoft.com/office/drawing/2010/main">
+        <mc:Choice Requires="a14">
           <p:sp>
             <p:nvSpPr>
               <p:cNvPr id="22" name="TextBox 21">
@@ -38359,7 +38361,7 @@
             </p:txBody>
           </p:sp>
         </mc:Choice>
-        <mc:Fallback>
+        <mc:Fallback xmlns="">
           <p:sp>
             <p:nvSpPr>
               <p:cNvPr id="22" name="TextBox 21">
@@ -38494,8 +38496,8 @@
           </a:p>
         </p:txBody>
       </p:sp>
-      <mc:AlternateContent xmlns:mc="http://schemas.openxmlformats.org/markup-compatibility/2006">
-        <mc:Choice xmlns:a14="http://schemas.microsoft.com/office/drawing/2010/main" Requires="a14">
+      <mc:AlternateContent xmlns:mc="http://schemas.openxmlformats.org/markup-compatibility/2006" xmlns:a14="http://schemas.microsoft.com/office/drawing/2010/main">
+        <mc:Choice Requires="a14">
           <p:sp>
             <p:nvSpPr>
               <p:cNvPr id="24" name="TextBox 23">
@@ -38552,7 +38554,7 @@
             </p:txBody>
           </p:sp>
         </mc:Choice>
-        <mc:Fallback>
+        <mc:Fallback xmlns="">
           <p:sp>
             <p:nvSpPr>
               <p:cNvPr id="24" name="TextBox 23">
@@ -38729,8 +38731,8 @@
           </a:fontRef>
         </p:style>
       </p:cxnSp>
-      <mc:AlternateContent xmlns:mc="http://schemas.openxmlformats.org/markup-compatibility/2006">
-        <mc:Choice xmlns:a14="http://schemas.microsoft.com/office/drawing/2010/main" Requires="a14">
+      <mc:AlternateContent xmlns:mc="http://schemas.openxmlformats.org/markup-compatibility/2006" xmlns:a14="http://schemas.microsoft.com/office/drawing/2010/main">
+        <mc:Choice Requires="a14">
           <p:sp>
             <p:nvSpPr>
               <p:cNvPr id="41" name="TextBox 40">
@@ -38844,7 +38846,6 @@
                 </a:endParaRPr>
               </a:p>
               <a:p>
-                <a:pPr/>
                 <a:endParaRPr lang="en-US" b="1" dirty="0">
                   <a:solidFill>
                     <a:schemeClr val="accent2">
@@ -38856,7 +38857,7 @@
             </p:txBody>
           </p:sp>
         </mc:Choice>
-        <mc:Fallback>
+        <mc:Fallback xmlns="">
           <p:sp>
             <p:nvSpPr>
               <p:cNvPr id="41" name="TextBox 40">
@@ -38901,8 +38902,8 @@
           </p:sp>
         </mc:Fallback>
       </mc:AlternateContent>
-      <mc:AlternateContent xmlns:mc="http://schemas.openxmlformats.org/markup-compatibility/2006">
-        <mc:Choice xmlns:a14="http://schemas.microsoft.com/office/drawing/2010/main" Requires="a14">
+      <mc:AlternateContent xmlns:mc="http://schemas.openxmlformats.org/markup-compatibility/2006" xmlns:a14="http://schemas.microsoft.com/office/drawing/2010/main">
+        <mc:Choice Requires="a14">
           <p:sp>
             <p:nvSpPr>
               <p:cNvPr id="46" name="TextBox 45">
@@ -39016,7 +39017,6 @@
                 </a:endParaRPr>
               </a:p>
               <a:p>
-                <a:pPr/>
                 <a:endParaRPr lang="en-US" b="1" dirty="0">
                   <a:solidFill>
                     <a:schemeClr val="accent1">
@@ -39028,7 +39028,7 @@
             </p:txBody>
           </p:sp>
         </mc:Choice>
-        <mc:Fallback>
+        <mc:Fallback xmlns="">
           <p:sp>
             <p:nvSpPr>
               <p:cNvPr id="46" name="TextBox 45">
@@ -39257,8 +39257,8 @@
           </a:fontRef>
         </p:style>
       </p:cxnSp>
-      <mc:AlternateContent xmlns:mc="http://schemas.openxmlformats.org/markup-compatibility/2006">
-        <mc:Choice xmlns:a14="http://schemas.microsoft.com/office/drawing/2010/main" Requires="a14">
+      <mc:AlternateContent xmlns:mc="http://schemas.openxmlformats.org/markup-compatibility/2006" xmlns:a14="http://schemas.microsoft.com/office/drawing/2010/main">
+        <mc:Choice Requires="a14">
           <p:sp>
             <p:nvSpPr>
               <p:cNvPr id="60" name="TextBox 59">
@@ -39341,7 +39341,7 @@
             </p:txBody>
           </p:sp>
         </mc:Choice>
-        <mc:Fallback>
+        <mc:Fallback xmlns="">
           <p:sp>
             <p:nvSpPr>
               <p:cNvPr id="60" name="TextBox 59">
@@ -39386,8 +39386,8 @@
           </p:sp>
         </mc:Fallback>
       </mc:AlternateContent>
-      <mc:AlternateContent xmlns:mc="http://schemas.openxmlformats.org/markup-compatibility/2006">
-        <mc:Choice xmlns:a14="http://schemas.microsoft.com/office/drawing/2010/main" Requires="a14">
+      <mc:AlternateContent xmlns:mc="http://schemas.openxmlformats.org/markup-compatibility/2006" xmlns:a14="http://schemas.microsoft.com/office/drawing/2010/main">
+        <mc:Choice Requires="a14">
           <p:sp>
             <p:nvSpPr>
               <p:cNvPr id="61" name="TextBox 60">
@@ -39470,7 +39470,7 @@
             </p:txBody>
           </p:sp>
         </mc:Choice>
-        <mc:Fallback>
+        <mc:Fallback xmlns="">
           <p:sp>
             <p:nvSpPr>
               <p:cNvPr id="61" name="TextBox 60">
@@ -39515,8 +39515,8 @@
           </p:sp>
         </mc:Fallback>
       </mc:AlternateContent>
-      <mc:AlternateContent xmlns:mc="http://schemas.openxmlformats.org/markup-compatibility/2006">
-        <mc:Choice xmlns:a14="http://schemas.microsoft.com/office/drawing/2010/main" Requires="a14">
+      <mc:AlternateContent xmlns:mc="http://schemas.openxmlformats.org/markup-compatibility/2006" xmlns:a14="http://schemas.microsoft.com/office/drawing/2010/main">
+        <mc:Choice Requires="a14">
           <p:sp>
             <p:nvSpPr>
               <p:cNvPr id="62" name="TextBox 61">
@@ -39599,7 +39599,7 @@
             </p:txBody>
           </p:sp>
         </mc:Choice>
-        <mc:Fallback>
+        <mc:Fallback xmlns="">
           <p:sp>
             <p:nvSpPr>
               <p:cNvPr id="62" name="TextBox 61">
@@ -39644,8 +39644,8 @@
           </p:sp>
         </mc:Fallback>
       </mc:AlternateContent>
-      <mc:AlternateContent xmlns:mc="http://schemas.openxmlformats.org/markup-compatibility/2006">
-        <mc:Choice xmlns:a14="http://schemas.microsoft.com/office/drawing/2010/main" Requires="a14">
+      <mc:AlternateContent xmlns:mc="http://schemas.openxmlformats.org/markup-compatibility/2006" xmlns:a14="http://schemas.microsoft.com/office/drawing/2010/main">
+        <mc:Choice Requires="a14">
           <p:sp>
             <p:nvSpPr>
               <p:cNvPr id="63" name="TextBox 62">
@@ -39728,7 +39728,7 @@
             </p:txBody>
           </p:sp>
         </mc:Choice>
-        <mc:Fallback>
+        <mc:Fallback xmlns="">
           <p:sp>
             <p:nvSpPr>
               <p:cNvPr id="63" name="TextBox 62">
@@ -39817,8 +39817,8 @@
           </a:fontRef>
         </p:style>
       </p:cxnSp>
-      <mc:AlternateContent xmlns:mc="http://schemas.openxmlformats.org/markup-compatibility/2006">
-        <mc:Choice xmlns:a14="http://schemas.microsoft.com/office/drawing/2010/main" Requires="a14">
+      <mc:AlternateContent xmlns:mc="http://schemas.openxmlformats.org/markup-compatibility/2006" xmlns:a14="http://schemas.microsoft.com/office/drawing/2010/main">
+        <mc:Choice Requires="a14">
           <p:sp>
             <p:nvSpPr>
               <p:cNvPr id="68" name="TextBox 67">
@@ -39900,7 +39900,7 @@
             </p:txBody>
           </p:sp>
         </mc:Choice>
-        <mc:Fallback>
+        <mc:Fallback xmlns="">
           <p:sp>
             <p:nvSpPr>
               <p:cNvPr id="68" name="TextBox 67">
@@ -39945,8 +39945,8 @@
           </p:sp>
         </mc:Fallback>
       </mc:AlternateContent>
-      <mc:AlternateContent xmlns:mc="http://schemas.openxmlformats.org/markup-compatibility/2006">
-        <mc:Choice xmlns:a14="http://schemas.microsoft.com/office/drawing/2010/main" Requires="a14">
+      <mc:AlternateContent xmlns:mc="http://schemas.openxmlformats.org/markup-compatibility/2006" xmlns:a14="http://schemas.microsoft.com/office/drawing/2010/main">
+        <mc:Choice Requires="a14">
           <p:sp>
             <p:nvSpPr>
               <p:cNvPr id="69" name="TextBox 68">
@@ -40028,7 +40028,7 @@
             </p:txBody>
           </p:sp>
         </mc:Choice>
-        <mc:Fallback>
+        <mc:Fallback xmlns="">
           <p:sp>
             <p:nvSpPr>
               <p:cNvPr id="69" name="TextBox 68">
@@ -40109,8 +40109,8 @@
           <a:chExt cx="0" cy="0"/>
         </a:xfrm>
       </p:grpSpPr>
-      <mc:AlternateContent xmlns:mc="http://schemas.openxmlformats.org/markup-compatibility/2006">
-        <mc:Choice xmlns:a14="http://schemas.microsoft.com/office/drawing/2010/main" Requires="a14">
+      <mc:AlternateContent xmlns:mc="http://schemas.openxmlformats.org/markup-compatibility/2006" xmlns:a14="http://schemas.microsoft.com/office/drawing/2010/main">
+        <mc:Choice Requires="a14">
           <p:sp>
             <p:nvSpPr>
               <p:cNvPr id="13" name="TextBox 12">
@@ -40167,7 +40167,7 @@
             </p:txBody>
           </p:sp>
         </mc:Choice>
-        <mc:Fallback>
+        <mc:Fallback xmlns="">
           <p:sp>
             <p:nvSpPr>
               <p:cNvPr id="13" name="TextBox 12">
@@ -40212,8 +40212,8 @@
           </p:sp>
         </mc:Fallback>
       </mc:AlternateContent>
-      <mc:AlternateContent xmlns:mc="http://schemas.openxmlformats.org/markup-compatibility/2006">
-        <mc:Choice xmlns:a14="http://schemas.microsoft.com/office/drawing/2010/main" Requires="a14">
+      <mc:AlternateContent xmlns:mc="http://schemas.openxmlformats.org/markup-compatibility/2006" xmlns:a14="http://schemas.microsoft.com/office/drawing/2010/main">
+        <mc:Choice Requires="a14">
           <p:sp>
             <p:nvSpPr>
               <p:cNvPr id="14" name="TextBox 13">
@@ -40270,7 +40270,7 @@
             </p:txBody>
           </p:sp>
         </mc:Choice>
-        <mc:Fallback>
+        <mc:Fallback xmlns="">
           <p:sp>
             <p:nvSpPr>
               <p:cNvPr id="14" name="TextBox 13">
@@ -40692,7 +40692,6 @@
           </a:bodyPr>
           <a:lstStyle/>
           <a:p>
-            <a:pPr/>
             <a:r>
               <a:rPr lang="en-US" sz="2800" b="1" dirty="0">
                 <a:solidFill>
@@ -40749,8 +40748,8 @@
           </a:fontRef>
         </p:style>
       </p:cxnSp>
-      <mc:AlternateContent xmlns:mc="http://schemas.openxmlformats.org/markup-compatibility/2006">
-        <mc:Choice xmlns:a14="http://schemas.microsoft.com/office/drawing/2010/main" Requires="a14">
+      <mc:AlternateContent xmlns:mc="http://schemas.openxmlformats.org/markup-compatibility/2006" xmlns:a14="http://schemas.microsoft.com/office/drawing/2010/main">
+        <mc:Choice Requires="a14">
           <p:sp>
             <p:nvSpPr>
               <p:cNvPr id="46" name="TextBox 45">
@@ -40866,7 +40865,7 @@
             </p:txBody>
           </p:sp>
         </mc:Choice>
-        <mc:Fallback>
+        <mc:Fallback xmlns="">
           <p:sp>
             <p:nvSpPr>
               <p:cNvPr id="46" name="TextBox 45">
@@ -40911,8 +40910,8 @@
           </p:sp>
         </mc:Fallback>
       </mc:AlternateContent>
-      <mc:AlternateContent xmlns:mc="http://schemas.openxmlformats.org/markup-compatibility/2006">
-        <mc:Choice xmlns:a14="http://schemas.microsoft.com/office/drawing/2010/main" Requires="a14">
+      <mc:AlternateContent xmlns:mc="http://schemas.openxmlformats.org/markup-compatibility/2006" xmlns:a14="http://schemas.microsoft.com/office/drawing/2010/main">
+        <mc:Choice Requires="a14">
           <p:sp>
             <p:nvSpPr>
               <p:cNvPr id="68" name="TextBox 67">
@@ -40994,7 +40993,7 @@
             </p:txBody>
           </p:sp>
         </mc:Choice>
-        <mc:Fallback>
+        <mc:Fallback xmlns="">
           <p:sp>
             <p:nvSpPr>
               <p:cNvPr id="68" name="TextBox 67">
@@ -41308,8 +41307,8 @@
           </a:fontRef>
         </p:style>
       </p:cxnSp>
-      <mc:AlternateContent xmlns:mc="http://schemas.openxmlformats.org/markup-compatibility/2006">
-        <mc:Choice xmlns:a14="http://schemas.microsoft.com/office/drawing/2010/main" Requires="a14">
+      <mc:AlternateContent xmlns:mc="http://schemas.openxmlformats.org/markup-compatibility/2006" xmlns:a14="http://schemas.microsoft.com/office/drawing/2010/main">
+        <mc:Choice Requires="a14">
           <p:sp>
             <p:nvSpPr>
               <p:cNvPr id="30" name="TextBox 29">
@@ -41392,7 +41391,7 @@
             </p:txBody>
           </p:sp>
         </mc:Choice>
-        <mc:Fallback>
+        <mc:Fallback xmlns="">
           <p:sp>
             <p:nvSpPr>
               <p:cNvPr id="30" name="TextBox 29">
@@ -41437,8 +41436,8 @@
           </p:sp>
         </mc:Fallback>
       </mc:AlternateContent>
-      <mc:AlternateContent xmlns:mc="http://schemas.openxmlformats.org/markup-compatibility/2006">
-        <mc:Choice xmlns:a14="http://schemas.microsoft.com/office/drawing/2010/main" Requires="a14">
+      <mc:AlternateContent xmlns:mc="http://schemas.openxmlformats.org/markup-compatibility/2006" xmlns:a14="http://schemas.microsoft.com/office/drawing/2010/main">
+        <mc:Choice Requires="a14">
           <p:sp>
             <p:nvSpPr>
               <p:cNvPr id="31" name="TextBox 30">
@@ -41521,7 +41520,7 @@
             </p:txBody>
           </p:sp>
         </mc:Choice>
-        <mc:Fallback>
+        <mc:Fallback xmlns="">
           <p:sp>
             <p:nvSpPr>
               <p:cNvPr id="31" name="TextBox 30">
@@ -41570,6 +41569,440 @@
     <p:extLst>
       <p:ext uri="{BB962C8B-B14F-4D97-AF65-F5344CB8AC3E}">
         <p14:creationId xmlns:p14="http://schemas.microsoft.com/office/powerpoint/2010/main" val="3627808079"/>
+      </p:ext>
+    </p:extLst>
+  </p:cSld>
+  <p:clrMapOvr>
+    <a:masterClrMapping/>
+  </p:clrMapOvr>
+</p:sld>
+</file>
+
+<file path=ppt/slides/slide45.xml><?xml version="1.0" encoding="utf-8"?>
+<p:sld xmlns:a="http://schemas.openxmlformats.org/drawingml/2006/main" xmlns:r="http://schemas.openxmlformats.org/officeDocument/2006/relationships" xmlns:p="http://schemas.openxmlformats.org/presentationml/2006/main">
+  <p:cSld>
+    <p:spTree>
+      <p:nvGrpSpPr>
+        <p:cNvPr id="1" name=""/>
+        <p:cNvGrpSpPr/>
+        <p:nvPr/>
+      </p:nvGrpSpPr>
+      <p:grpSpPr>
+        <a:xfrm>
+          <a:off x="0" y="0"/>
+          <a:ext cx="0" cy="0"/>
+          <a:chOff x="0" y="0"/>
+          <a:chExt cx="0" cy="0"/>
+        </a:xfrm>
+      </p:grpSpPr>
+      <p:pic>
+        <p:nvPicPr>
+          <p:cNvPr id="3" name="Picture 2" descr="A graph of different colored squares&#10;&#10;Description automatically generated">
+            <a:extLst>
+              <a:ext uri="{FF2B5EF4-FFF2-40B4-BE49-F238E27FC236}">
+                <a16:creationId xmlns:a16="http://schemas.microsoft.com/office/drawing/2014/main" id="{B974D7FE-DF95-F3C0-0746-C746F3CAE9A7}"/>
+              </a:ext>
+            </a:extLst>
+          </p:cNvPr>
+          <p:cNvPicPr>
+            <a:picLocks noChangeAspect="1"/>
+          </p:cNvPicPr>
+          <p:nvPr/>
+        </p:nvPicPr>
+        <p:blipFill rotWithShape="1">
+          <a:blip r:embed="rId2">
+            <a:extLst>
+              <a:ext uri="{28A0092B-C50C-407E-A947-70E740481C1C}">
+                <a14:useLocalDpi xmlns:a14="http://schemas.microsoft.com/office/drawing/2010/main" val="0"/>
+              </a:ext>
+            </a:extLst>
+          </a:blip>
+          <a:srcRect t="4114"/>
+          <a:stretch/>
+        </p:blipFill>
+        <p:spPr>
+          <a:xfrm>
+            <a:off x="1712458" y="665018"/>
+            <a:ext cx="7831939" cy="6007366"/>
+          </a:xfrm>
+          <a:prstGeom prst="rect">
+            <a:avLst/>
+          </a:prstGeom>
+        </p:spPr>
+      </p:pic>
+      <p:sp>
+        <p:nvSpPr>
+          <p:cNvPr id="4" name="TextBox 3">
+            <a:extLst>
+              <a:ext uri="{FF2B5EF4-FFF2-40B4-BE49-F238E27FC236}">
+                <a16:creationId xmlns:a16="http://schemas.microsoft.com/office/drawing/2014/main" id="{A7B049F9-37DE-19C4-9D5D-925A30955E52}"/>
+              </a:ext>
+            </a:extLst>
+          </p:cNvPr>
+          <p:cNvSpPr txBox="1"/>
+          <p:nvPr/>
+        </p:nvSpPr>
+        <p:spPr>
+          <a:xfrm>
+            <a:off x="2647603" y="279497"/>
+            <a:ext cx="2141591" cy="369332"/>
+          </a:xfrm>
+          <a:prstGeom prst="rect">
+            <a:avLst/>
+          </a:prstGeom>
+          <a:noFill/>
+        </p:spPr>
+        <p:txBody>
+          <a:bodyPr wrap="square" rtlCol="0">
+            <a:spAutoFit/>
+          </a:bodyPr>
+          <a:lstStyle/>
+          <a:p>
+            <a:pPr algn="ctr"/>
+            <a:r>
+              <a:rPr lang="en-US" b="1" dirty="0">
+                <a:latin typeface="Boucherie Block" panose="02000506000000020004" pitchFamily="2" charset="0"/>
+              </a:rPr>
+              <a:t>D and below range</a:t>
+            </a:r>
+          </a:p>
+        </p:txBody>
+      </p:sp>
+      <p:sp>
+        <p:nvSpPr>
+          <p:cNvPr id="5" name="TextBox 4">
+            <a:extLst>
+              <a:ext uri="{FF2B5EF4-FFF2-40B4-BE49-F238E27FC236}">
+                <a16:creationId xmlns:a16="http://schemas.microsoft.com/office/drawing/2014/main" id="{14DB03D6-A63A-5C81-3F77-7EFA2ABAB085}"/>
+              </a:ext>
+            </a:extLst>
+          </p:cNvPr>
+          <p:cNvSpPr txBox="1"/>
+          <p:nvPr/>
+        </p:nvSpPr>
+        <p:spPr>
+          <a:xfrm>
+            <a:off x="4793720" y="295686"/>
+            <a:ext cx="1073018" cy="369332"/>
+          </a:xfrm>
+          <a:prstGeom prst="rect">
+            <a:avLst/>
+          </a:prstGeom>
+          <a:noFill/>
+        </p:spPr>
+        <p:txBody>
+          <a:bodyPr wrap="square" rtlCol="0">
+            <a:spAutoFit/>
+          </a:bodyPr>
+          <a:lstStyle/>
+          <a:p>
+            <a:pPr algn="ctr"/>
+            <a:r>
+              <a:rPr lang="en-US" b="1" dirty="0">
+                <a:latin typeface="Boucherie Block" panose="02000506000000020004" pitchFamily="2" charset="0"/>
+              </a:rPr>
+              <a:t>C range</a:t>
+            </a:r>
+          </a:p>
+        </p:txBody>
+      </p:sp>
+      <p:sp>
+        <p:nvSpPr>
+          <p:cNvPr id="6" name="TextBox 5">
+            <a:extLst>
+              <a:ext uri="{FF2B5EF4-FFF2-40B4-BE49-F238E27FC236}">
+                <a16:creationId xmlns:a16="http://schemas.microsoft.com/office/drawing/2014/main" id="{9FE412CF-A5BD-0D77-3051-9CE6CA47229A}"/>
+              </a:ext>
+            </a:extLst>
+          </p:cNvPr>
+          <p:cNvSpPr txBox="1"/>
+          <p:nvPr/>
+        </p:nvSpPr>
+        <p:spPr>
+          <a:xfrm>
+            <a:off x="6600500" y="279497"/>
+            <a:ext cx="1073018" cy="369332"/>
+          </a:xfrm>
+          <a:prstGeom prst="rect">
+            <a:avLst/>
+          </a:prstGeom>
+          <a:noFill/>
+        </p:spPr>
+        <p:txBody>
+          <a:bodyPr wrap="square" rtlCol="0">
+            <a:spAutoFit/>
+          </a:bodyPr>
+          <a:lstStyle/>
+          <a:p>
+            <a:pPr algn="ctr"/>
+            <a:r>
+              <a:rPr lang="en-US" b="1" dirty="0">
+                <a:latin typeface="Boucherie Block" panose="02000506000000020004" pitchFamily="2" charset="0"/>
+              </a:rPr>
+              <a:t>B range</a:t>
+            </a:r>
+          </a:p>
+        </p:txBody>
+      </p:sp>
+      <p:sp>
+        <p:nvSpPr>
+          <p:cNvPr id="7" name="TextBox 6">
+            <a:extLst>
+              <a:ext uri="{FF2B5EF4-FFF2-40B4-BE49-F238E27FC236}">
+                <a16:creationId xmlns:a16="http://schemas.microsoft.com/office/drawing/2014/main" id="{A6B6AE05-276A-D88C-0BA2-BF4DF9231F53}"/>
+              </a:ext>
+            </a:extLst>
+          </p:cNvPr>
+          <p:cNvSpPr txBox="1"/>
+          <p:nvPr/>
+        </p:nvSpPr>
+        <p:spPr>
+          <a:xfrm>
+            <a:off x="8301751" y="295686"/>
+            <a:ext cx="1073018" cy="369332"/>
+          </a:xfrm>
+          <a:prstGeom prst="rect">
+            <a:avLst/>
+          </a:prstGeom>
+          <a:noFill/>
+        </p:spPr>
+        <p:txBody>
+          <a:bodyPr wrap="square" rtlCol="0">
+            <a:spAutoFit/>
+          </a:bodyPr>
+          <a:lstStyle/>
+          <a:p>
+            <a:pPr algn="ctr"/>
+            <a:r>
+              <a:rPr lang="en-US" b="1" dirty="0">
+                <a:latin typeface="Boucherie Block" panose="02000506000000020004" pitchFamily="2" charset="0"/>
+              </a:rPr>
+              <a:t>a range</a:t>
+            </a:r>
+          </a:p>
+        </p:txBody>
+      </p:sp>
+    </p:spTree>
+    <p:extLst>
+      <p:ext uri="{BB962C8B-B14F-4D97-AF65-F5344CB8AC3E}">
+        <p14:creationId xmlns:p14="http://schemas.microsoft.com/office/powerpoint/2010/main" val="2150116344"/>
+      </p:ext>
+    </p:extLst>
+  </p:cSld>
+  <p:clrMapOvr>
+    <a:masterClrMapping/>
+  </p:clrMapOvr>
+</p:sld>
+</file>
+
+<file path=ppt/slides/slide46.xml><?xml version="1.0" encoding="utf-8"?>
+<p:sld xmlns:a="http://schemas.openxmlformats.org/drawingml/2006/main" xmlns:r="http://schemas.openxmlformats.org/officeDocument/2006/relationships" xmlns:p="http://schemas.openxmlformats.org/presentationml/2006/main">
+  <p:cSld>
+    <p:spTree>
+      <p:nvGrpSpPr>
+        <p:cNvPr id="1" name=""/>
+        <p:cNvGrpSpPr/>
+        <p:nvPr/>
+      </p:nvGrpSpPr>
+      <p:grpSpPr>
+        <a:xfrm>
+          <a:off x="0" y="0"/>
+          <a:ext cx="0" cy="0"/>
+          <a:chOff x="0" y="0"/>
+          <a:chExt cx="0" cy="0"/>
+        </a:xfrm>
+      </p:grpSpPr>
+      <p:pic>
+        <p:nvPicPr>
+          <p:cNvPr id="3" name="Picture 2" descr="A graph of different colored squares&#10;&#10;Description automatically generated">
+            <a:extLst>
+              <a:ext uri="{FF2B5EF4-FFF2-40B4-BE49-F238E27FC236}">
+                <a16:creationId xmlns:a16="http://schemas.microsoft.com/office/drawing/2014/main" id="{2E48C944-497B-E5B5-8404-B33C27D8EC50}"/>
+              </a:ext>
+            </a:extLst>
+          </p:cNvPr>
+          <p:cNvPicPr>
+            <a:picLocks noChangeAspect="1"/>
+          </p:cNvPicPr>
+          <p:nvPr/>
+        </p:nvPicPr>
+        <p:blipFill rotWithShape="1">
+          <a:blip r:embed="rId2">
+            <a:extLst>
+              <a:ext uri="{28A0092B-C50C-407E-A947-70E740481C1C}">
+                <a14:useLocalDpi xmlns:a14="http://schemas.microsoft.com/office/drawing/2010/main" val="0"/>
+              </a:ext>
+            </a:extLst>
+          </a:blip>
+          <a:srcRect t="4706"/>
+          <a:stretch/>
+        </p:blipFill>
+        <p:spPr>
+          <a:xfrm>
+            <a:off x="1747093" y="914252"/>
+            <a:ext cx="7667070" cy="5844590"/>
+          </a:xfrm>
+          <a:prstGeom prst="rect">
+            <a:avLst/>
+          </a:prstGeom>
+        </p:spPr>
+      </p:pic>
+      <p:sp>
+        <p:nvSpPr>
+          <p:cNvPr id="4" name="TextBox 3">
+            <a:extLst>
+              <a:ext uri="{FF2B5EF4-FFF2-40B4-BE49-F238E27FC236}">
+                <a16:creationId xmlns:a16="http://schemas.microsoft.com/office/drawing/2014/main" id="{08496662-8C1D-4038-E457-17E8670FC9C0}"/>
+              </a:ext>
+            </a:extLst>
+          </p:cNvPr>
+          <p:cNvSpPr txBox="1"/>
+          <p:nvPr/>
+        </p:nvSpPr>
+        <p:spPr>
+          <a:xfrm>
+            <a:off x="2656432" y="528731"/>
+            <a:ext cx="2141591" cy="369332"/>
+          </a:xfrm>
+          <a:prstGeom prst="rect">
+            <a:avLst/>
+          </a:prstGeom>
+          <a:noFill/>
+        </p:spPr>
+        <p:txBody>
+          <a:bodyPr wrap="square" rtlCol="0">
+            <a:spAutoFit/>
+          </a:bodyPr>
+          <a:lstStyle/>
+          <a:p>
+            <a:pPr algn="ctr"/>
+            <a:r>
+              <a:rPr lang="en-US" b="1" dirty="0">
+                <a:latin typeface="Boucherie Block" panose="02000506000000020004" pitchFamily="2" charset="0"/>
+              </a:rPr>
+              <a:t>D and below range</a:t>
+            </a:r>
+          </a:p>
+        </p:txBody>
+      </p:sp>
+      <p:sp>
+        <p:nvSpPr>
+          <p:cNvPr id="5" name="TextBox 4">
+            <a:extLst>
+              <a:ext uri="{FF2B5EF4-FFF2-40B4-BE49-F238E27FC236}">
+                <a16:creationId xmlns:a16="http://schemas.microsoft.com/office/drawing/2014/main" id="{82844350-2CB5-3BED-D841-E73875799A56}"/>
+              </a:ext>
+            </a:extLst>
+          </p:cNvPr>
+          <p:cNvSpPr txBox="1"/>
+          <p:nvPr/>
+        </p:nvSpPr>
+        <p:spPr>
+          <a:xfrm>
+            <a:off x="5044119" y="544920"/>
+            <a:ext cx="1073018" cy="369332"/>
+          </a:xfrm>
+          <a:prstGeom prst="rect">
+            <a:avLst/>
+          </a:prstGeom>
+          <a:noFill/>
+        </p:spPr>
+        <p:txBody>
+          <a:bodyPr wrap="square" rtlCol="0">
+            <a:spAutoFit/>
+          </a:bodyPr>
+          <a:lstStyle/>
+          <a:p>
+            <a:pPr algn="ctr"/>
+            <a:r>
+              <a:rPr lang="en-US" b="1" dirty="0">
+                <a:latin typeface="Boucherie Block" panose="02000506000000020004" pitchFamily="2" charset="0"/>
+              </a:rPr>
+              <a:t>C range</a:t>
+            </a:r>
+          </a:p>
+        </p:txBody>
+      </p:sp>
+      <p:sp>
+        <p:nvSpPr>
+          <p:cNvPr id="6" name="TextBox 5">
+            <a:extLst>
+              <a:ext uri="{FF2B5EF4-FFF2-40B4-BE49-F238E27FC236}">
+                <a16:creationId xmlns:a16="http://schemas.microsoft.com/office/drawing/2014/main" id="{B9C7772F-F79A-DE4D-62A0-D33143D6B4BF}"/>
+              </a:ext>
+            </a:extLst>
+          </p:cNvPr>
+          <p:cNvSpPr txBox="1"/>
+          <p:nvPr/>
+        </p:nvSpPr>
+        <p:spPr>
+          <a:xfrm>
+            <a:off x="6609329" y="544920"/>
+            <a:ext cx="1073018" cy="369332"/>
+          </a:xfrm>
+          <a:prstGeom prst="rect">
+            <a:avLst/>
+          </a:prstGeom>
+          <a:noFill/>
+        </p:spPr>
+        <p:txBody>
+          <a:bodyPr wrap="square" rtlCol="0">
+            <a:spAutoFit/>
+          </a:bodyPr>
+          <a:lstStyle/>
+          <a:p>
+            <a:pPr algn="ctr"/>
+            <a:r>
+              <a:rPr lang="en-US" b="1" dirty="0">
+                <a:latin typeface="Boucherie Block" panose="02000506000000020004" pitchFamily="2" charset="0"/>
+              </a:rPr>
+              <a:t>B range</a:t>
+            </a:r>
+          </a:p>
+        </p:txBody>
+      </p:sp>
+      <p:sp>
+        <p:nvSpPr>
+          <p:cNvPr id="7" name="TextBox 6">
+            <a:extLst>
+              <a:ext uri="{FF2B5EF4-FFF2-40B4-BE49-F238E27FC236}">
+                <a16:creationId xmlns:a16="http://schemas.microsoft.com/office/drawing/2014/main" id="{2A88645D-1007-F6BA-D5E2-E9E52FEB5127}"/>
+              </a:ext>
+            </a:extLst>
+          </p:cNvPr>
+          <p:cNvSpPr txBox="1"/>
+          <p:nvPr/>
+        </p:nvSpPr>
+        <p:spPr>
+          <a:xfrm>
+            <a:off x="8223382" y="544920"/>
+            <a:ext cx="1073018" cy="369332"/>
+          </a:xfrm>
+          <a:prstGeom prst="rect">
+            <a:avLst/>
+          </a:prstGeom>
+          <a:noFill/>
+        </p:spPr>
+        <p:txBody>
+          <a:bodyPr wrap="square" rtlCol="0">
+            <a:spAutoFit/>
+          </a:bodyPr>
+          <a:lstStyle/>
+          <a:p>
+            <a:pPr algn="ctr"/>
+            <a:r>
+              <a:rPr lang="en-US" b="1" dirty="0">
+                <a:latin typeface="Boucherie Block" panose="02000506000000020004" pitchFamily="2" charset="0"/>
+              </a:rPr>
+              <a:t>a range</a:t>
+            </a:r>
+          </a:p>
+        </p:txBody>
+      </p:sp>
+    </p:spTree>
+    <p:extLst>
+      <p:ext uri="{BB962C8B-B14F-4D97-AF65-F5344CB8AC3E}">
+        <p14:creationId xmlns:p14="http://schemas.microsoft.com/office/powerpoint/2010/main" val="1886886479"/>
       </p:ext>
     </p:extLst>
   </p:cSld>

</xml_diff>